<commit_message>
S2 - Kubernetes architecture [formatting and background] (p4)
</commit_message>
<xml_diff>
--- a/docs/images/slides_images.pptx
+++ b/docs/images/slides_images.pptx
@@ -7,10 +7,11 @@
   <p:sldIdLst>
     <p:sldId id="263" r:id="rId2"/>
     <p:sldId id="264" r:id="rId3"/>
-    <p:sldId id="259" r:id="rId4"/>
-    <p:sldId id="260" r:id="rId5"/>
-    <p:sldId id="261" r:id="rId6"/>
-    <p:sldId id="262" r:id="rId7"/>
+    <p:sldId id="265" r:id="rId4"/>
+    <p:sldId id="259" r:id="rId5"/>
+    <p:sldId id="260" r:id="rId6"/>
+    <p:sldId id="261" r:id="rId7"/>
+    <p:sldId id="262" r:id="rId8"/>
   </p:sldIdLst>
   <p:sldSz cx="12192000" cy="6858000"/>
   <p:notesSz cx="6858000" cy="9144000"/>
@@ -3714,6 +3715,126 @@
       </p:grpSpPr>
       <p:sp>
         <p:nvSpPr>
+          <p:cNvPr id="2" name="Title 1"/>
+          <p:cNvSpPr>
+            <a:spLocks noGrp="1"/>
+          </p:cNvSpPr>
+          <p:nvPr>
+            <p:ph type="title"/>
+          </p:nvPr>
+        </p:nvSpPr>
+        <p:spPr>
+          <a:xfrm>
+            <a:off x="820783" y="243205"/>
+            <a:ext cx="10515600" cy="827949"/>
+          </a:xfrm>
+        </p:spPr>
+        <p:txBody>
+          <a:bodyPr>
+            <a:normAutofit/>
+          </a:bodyPr>
+          <a:lstStyle/>
+          <a:p>
+            <a:r>
+              <a:rPr lang="en-US" sz="1400" dirty="0" smtClean="0"/>
+              <a:t>K_etcd_db.png</a:t>
+            </a:r>
+            <a:endParaRPr lang="en-GB" sz="1400" dirty="0"/>
+          </a:p>
+        </p:txBody>
+      </p:sp>
+      <p:pic>
+        <p:nvPicPr>
+          <p:cNvPr id="6" name="Picture 5" descr="Database PNG Transparent Images | PNG All"/>
+          <p:cNvPicPr>
+            <a:picLocks noChangeAspect="1"/>
+          </p:cNvPicPr>
+          <p:nvPr/>
+        </p:nvPicPr>
+        <p:blipFill>
+          <a:blip r:embed="rId2" cstate="print">
+            <a:extLst>
+              <a:ext uri="{28A0092B-C50C-407E-A947-70E740481C1C}">
+                <a14:useLocalDpi xmlns:a14="http://schemas.microsoft.com/office/drawing/2010/main" val="0"/>
+              </a:ext>
+            </a:extLst>
+          </a:blip>
+          <a:stretch>
+            <a:fillRect/>
+          </a:stretch>
+        </p:blipFill>
+        <p:spPr>
+          <a:xfrm>
+            <a:off x="2670380" y="2378666"/>
+            <a:ext cx="1318138" cy="1827574"/>
+          </a:xfrm>
+          <a:prstGeom prst="rect">
+            <a:avLst/>
+          </a:prstGeom>
+        </p:spPr>
+      </p:pic>
+      <p:pic>
+        <p:nvPicPr>
+          <p:cNvPr id="8" name="Picture 7"/>
+          <p:cNvPicPr>
+            <a:picLocks noChangeAspect="1"/>
+          </p:cNvPicPr>
+          <p:nvPr/>
+        </p:nvPicPr>
+        <p:blipFill>
+          <a:blip r:embed="rId3" cstate="print">
+            <a:extLst>
+              <a:ext uri="{28A0092B-C50C-407E-A947-70E740481C1C}">
+                <a14:useLocalDpi xmlns:a14="http://schemas.microsoft.com/office/drawing/2010/main" val="0"/>
+              </a:ext>
+            </a:extLst>
+          </a:blip>
+          <a:stretch>
+            <a:fillRect/>
+          </a:stretch>
+        </p:blipFill>
+        <p:spPr>
+          <a:xfrm>
+            <a:off x="4371703" y="2530991"/>
+            <a:ext cx="4669027" cy="1675249"/>
+          </a:xfrm>
+          <a:prstGeom prst="rect">
+            <a:avLst/>
+          </a:prstGeom>
+        </p:spPr>
+      </p:pic>
+    </p:spTree>
+    <p:extLst>
+      <p:ext uri="{BB962C8B-B14F-4D97-AF65-F5344CB8AC3E}">
+        <p14:creationId xmlns:p14="http://schemas.microsoft.com/office/powerpoint/2010/main" val="369310166"/>
+      </p:ext>
+    </p:extLst>
+  </p:cSld>
+  <p:clrMapOvr>
+    <a:masterClrMapping/>
+  </p:clrMapOvr>
+</p:sld>
+</file>
+
+<file path=ppt/slides/slide4.xml><?xml version="1.0" encoding="utf-8"?>
+<p:sld xmlns:a="http://schemas.openxmlformats.org/drawingml/2006/main" xmlns:r="http://schemas.openxmlformats.org/officeDocument/2006/relationships" xmlns:p="http://schemas.openxmlformats.org/presentationml/2006/main">
+  <p:cSld>
+    <p:spTree>
+      <p:nvGrpSpPr>
+        <p:cNvPr id="1" name=""/>
+        <p:cNvGrpSpPr/>
+        <p:nvPr/>
+      </p:nvGrpSpPr>
+      <p:grpSpPr>
+        <a:xfrm>
+          <a:off x="0" y="0"/>
+          <a:ext cx="0" cy="0"/>
+          <a:chOff x="0" y="0"/>
+          <a:chExt cx="0" cy="0"/>
+        </a:xfrm>
+      </p:grpSpPr>
+      <p:sp>
+        <p:nvSpPr>
           <p:cNvPr id="4" name="Title 1"/>
           <p:cNvSpPr txBox="1">
             <a:spLocks/>
@@ -4557,7 +4678,7 @@
 </p:sld>
 </file>
 
-<file path=ppt/slides/slide4.xml><?xml version="1.0" encoding="utf-8"?>
+<file path=ppt/slides/slide5.xml><?xml version="1.0" encoding="utf-8"?>
 <p:sld xmlns:a="http://schemas.openxmlformats.org/drawingml/2006/main" xmlns:r="http://schemas.openxmlformats.org/officeDocument/2006/relationships" xmlns:p="http://schemas.openxmlformats.org/presentationml/2006/main">
   <p:cSld>
     <p:spTree>
@@ -5947,7 +6068,7 @@
 </p:sld>
 </file>
 
-<file path=ppt/slides/slide5.xml><?xml version="1.0" encoding="utf-8"?>
+<file path=ppt/slides/slide6.xml><?xml version="1.0" encoding="utf-8"?>
 <p:sld xmlns:a="http://schemas.openxmlformats.org/drawingml/2006/main" xmlns:r="http://schemas.openxmlformats.org/officeDocument/2006/relationships" xmlns:p="http://schemas.openxmlformats.org/presentationml/2006/main">
   <p:cSld>
     <p:spTree>
@@ -6218,7 +6339,7 @@
 </p:sld>
 </file>
 
-<file path=ppt/slides/slide6.xml><?xml version="1.0" encoding="utf-8"?>
+<file path=ppt/slides/slide7.xml><?xml version="1.0" encoding="utf-8"?>
 <p:sld xmlns:a="http://schemas.openxmlformats.org/drawingml/2006/main" xmlns:r="http://schemas.openxmlformats.org/officeDocument/2006/relationships" xmlns:p="http://schemas.openxmlformats.org/presentationml/2006/main">
   <p:cSld>
     <p:spTree>

</xml_diff>

<commit_message>
Rename S7 to Inject Data Into Applications
</commit_message>
<xml_diff>
--- a/docs/images/slides_images.pptx
+++ b/docs/images/slides_images.pptx
@@ -12,6 +12,9 @@
     <p:sldId id="260" r:id="rId6"/>
     <p:sldId id="261" r:id="rId7"/>
     <p:sldId id="262" r:id="rId8"/>
+    <p:sldId id="266" r:id="rId9"/>
+    <p:sldId id="268" r:id="rId10"/>
+    <p:sldId id="269" r:id="rId11"/>
   </p:sldIdLst>
   <p:sldSz cx="12192000" cy="6858000"/>
   <p:notesSz cx="6858000" cy="9144000"/>
@@ -249,7 +252,7 @@
           <a:p>
             <a:fld id="{7F7B62DA-8992-4475-B647-5FA8317943B2}" type="datetimeFigureOut">
               <a:rPr lang="en-GB" smtClean="0"/>
-              <a:t>03/05/2021</a:t>
+              <a:t>05/05/2021</a:t>
             </a:fld>
             <a:endParaRPr lang="en-GB"/>
           </a:p>
@@ -419,7 +422,7 @@
           <a:p>
             <a:fld id="{7F7B62DA-8992-4475-B647-5FA8317943B2}" type="datetimeFigureOut">
               <a:rPr lang="en-GB" smtClean="0"/>
-              <a:t>03/05/2021</a:t>
+              <a:t>05/05/2021</a:t>
             </a:fld>
             <a:endParaRPr lang="en-GB"/>
           </a:p>
@@ -599,7 +602,7 @@
           <a:p>
             <a:fld id="{7F7B62DA-8992-4475-B647-5FA8317943B2}" type="datetimeFigureOut">
               <a:rPr lang="en-GB" smtClean="0"/>
-              <a:t>03/05/2021</a:t>
+              <a:t>05/05/2021</a:t>
             </a:fld>
             <a:endParaRPr lang="en-GB"/>
           </a:p>
@@ -769,7 +772,7 @@
           <a:p>
             <a:fld id="{7F7B62DA-8992-4475-B647-5FA8317943B2}" type="datetimeFigureOut">
               <a:rPr lang="en-GB" smtClean="0"/>
-              <a:t>03/05/2021</a:t>
+              <a:t>05/05/2021</a:t>
             </a:fld>
             <a:endParaRPr lang="en-GB"/>
           </a:p>
@@ -1015,7 +1018,7 @@
           <a:p>
             <a:fld id="{7F7B62DA-8992-4475-B647-5FA8317943B2}" type="datetimeFigureOut">
               <a:rPr lang="en-GB" smtClean="0"/>
-              <a:t>03/05/2021</a:t>
+              <a:t>05/05/2021</a:t>
             </a:fld>
             <a:endParaRPr lang="en-GB"/>
           </a:p>
@@ -1247,7 +1250,7 @@
           <a:p>
             <a:fld id="{7F7B62DA-8992-4475-B647-5FA8317943B2}" type="datetimeFigureOut">
               <a:rPr lang="en-GB" smtClean="0"/>
-              <a:t>03/05/2021</a:t>
+              <a:t>05/05/2021</a:t>
             </a:fld>
             <a:endParaRPr lang="en-GB"/>
           </a:p>
@@ -1614,7 +1617,7 @@
           <a:p>
             <a:fld id="{7F7B62DA-8992-4475-B647-5FA8317943B2}" type="datetimeFigureOut">
               <a:rPr lang="en-GB" smtClean="0"/>
-              <a:t>03/05/2021</a:t>
+              <a:t>05/05/2021</a:t>
             </a:fld>
             <a:endParaRPr lang="en-GB"/>
           </a:p>
@@ -1732,7 +1735,7 @@
           <a:p>
             <a:fld id="{7F7B62DA-8992-4475-B647-5FA8317943B2}" type="datetimeFigureOut">
               <a:rPr lang="en-GB" smtClean="0"/>
-              <a:t>03/05/2021</a:t>
+              <a:t>05/05/2021</a:t>
             </a:fld>
             <a:endParaRPr lang="en-GB"/>
           </a:p>
@@ -1827,7 +1830,7 @@
           <a:p>
             <a:fld id="{7F7B62DA-8992-4475-B647-5FA8317943B2}" type="datetimeFigureOut">
               <a:rPr lang="en-GB" smtClean="0"/>
-              <a:t>03/05/2021</a:t>
+              <a:t>05/05/2021</a:t>
             </a:fld>
             <a:endParaRPr lang="en-GB"/>
           </a:p>
@@ -2104,7 +2107,7 @@
           <a:p>
             <a:fld id="{7F7B62DA-8992-4475-B647-5FA8317943B2}" type="datetimeFigureOut">
               <a:rPr lang="en-GB" smtClean="0"/>
-              <a:t>03/05/2021</a:t>
+              <a:t>05/05/2021</a:t>
             </a:fld>
             <a:endParaRPr lang="en-GB"/>
           </a:p>
@@ -2357,7 +2360,7 @@
           <a:p>
             <a:fld id="{7F7B62DA-8992-4475-B647-5FA8317943B2}" type="datetimeFigureOut">
               <a:rPr lang="en-GB" smtClean="0"/>
-              <a:t>03/05/2021</a:t>
+              <a:t>05/05/2021</a:t>
             </a:fld>
             <a:endParaRPr lang="en-GB"/>
           </a:p>
@@ -2570,7 +2573,7 @@
           <a:p>
             <a:fld id="{7F7B62DA-8992-4475-B647-5FA8317943B2}" type="datetimeFigureOut">
               <a:rPr lang="en-GB" smtClean="0"/>
-              <a:t>03/05/2021</a:t>
+              <a:t>05/05/2021</a:t>
             </a:fld>
             <a:endParaRPr lang="en-GB"/>
           </a:p>
@@ -3027,6 +3030,763 @@
   <p:clrMapOvr>
     <a:masterClrMapping/>
   </p:clrMapOvr>
+  <p:timing>
+    <p:tnLst>
+      <p:par>
+        <p:cTn id="1" dur="indefinite" restart="never" nodeType="tmRoot"/>
+      </p:par>
+    </p:tnLst>
+  </p:timing>
+</p:sld>
+</file>
+
+<file path=ppt/slides/slide10.xml><?xml version="1.0" encoding="utf-8"?>
+<p:sld xmlns:a="http://schemas.openxmlformats.org/drawingml/2006/main" xmlns:r="http://schemas.openxmlformats.org/officeDocument/2006/relationships" xmlns:p="http://schemas.openxmlformats.org/presentationml/2006/main">
+  <p:cSld>
+    <p:spTree>
+      <p:nvGrpSpPr>
+        <p:cNvPr id="1" name=""/>
+        <p:cNvGrpSpPr/>
+        <p:nvPr/>
+      </p:nvGrpSpPr>
+      <p:grpSpPr>
+        <a:xfrm>
+          <a:off x="0" y="0"/>
+          <a:ext cx="0" cy="0"/>
+          <a:chOff x="0" y="0"/>
+          <a:chExt cx="0" cy="0"/>
+        </a:xfrm>
+      </p:grpSpPr>
+      <p:sp>
+        <p:nvSpPr>
+          <p:cNvPr id="9" name="Title 1"/>
+          <p:cNvSpPr txBox="1">
+            <a:spLocks/>
+          </p:cNvSpPr>
+          <p:nvPr/>
+        </p:nvSpPr>
+        <p:spPr>
+          <a:xfrm>
+            <a:off x="6592481" y="748306"/>
+            <a:ext cx="3440519" cy="1249827"/>
+          </a:xfrm>
+          <a:prstGeom prst="rect">
+            <a:avLst/>
+          </a:prstGeom>
+          <a:solidFill>
+            <a:schemeClr val="tx1"/>
+          </a:solidFill>
+        </p:spPr>
+        <p:txBody>
+          <a:bodyPr vert="horz" lIns="180000" tIns="180000" rIns="91440" bIns="45720" rtlCol="0" anchor="t">
+            <a:noAutofit/>
+          </a:bodyPr>
+          <a:lstStyle>
+            <a:lvl1pPr algn="l" defTabSz="914400" rtl="0" eaLnBrk="1" latinLnBrk="0" hangingPunct="1">
+              <a:lnSpc>
+                <a:spcPct val="90000"/>
+              </a:lnSpc>
+              <a:spcBef>
+                <a:spcPct val="0"/>
+              </a:spcBef>
+              <a:buNone/>
+              <a:defRPr sz="4400" kern="1200">
+                <a:solidFill>
+                  <a:schemeClr val="tx1"/>
+                </a:solidFill>
+                <a:latin typeface="+mj-lt"/>
+                <a:ea typeface="+mj-ea"/>
+                <a:cs typeface="+mj-cs"/>
+              </a:defRPr>
+            </a:lvl1pPr>
+          </a:lstStyle>
+          <a:p>
+            <a:r>
+              <a:rPr lang="en-GB" sz="2000" dirty="0" err="1" smtClean="0">
+                <a:solidFill>
+                  <a:srgbClr val="569CD6"/>
+                </a:solidFill>
+                <a:latin typeface="Consolas" panose="020B0609020204030204" pitchFamily="49" charset="0"/>
+              </a:rPr>
+              <a:t>env</a:t>
+            </a:r>
+            <a:r>
+              <a:rPr lang="en-GB" sz="2000" dirty="0">
+                <a:solidFill>
+                  <a:srgbClr val="D4D4D4"/>
+                </a:solidFill>
+                <a:latin typeface="Consolas" panose="020B0609020204030204" pitchFamily="49" charset="0"/>
+              </a:rPr>
+              <a:t>: </a:t>
+            </a:r>
+          </a:p>
+          <a:p>
+            <a:r>
+              <a:rPr lang="en-GB" sz="2000" dirty="0" smtClean="0">
+                <a:solidFill>
+                  <a:srgbClr val="D4D4D4"/>
+                </a:solidFill>
+                <a:latin typeface="Consolas" panose="020B0609020204030204" pitchFamily="49" charset="0"/>
+              </a:rPr>
+              <a:t>  -</a:t>
+            </a:r>
+            <a:r>
+              <a:rPr lang="en-GB" sz="2000" dirty="0">
+                <a:solidFill>
+                  <a:srgbClr val="D4D4D4"/>
+                </a:solidFill>
+                <a:latin typeface="Consolas" panose="020B0609020204030204" pitchFamily="49" charset="0"/>
+              </a:rPr>
+              <a:t> </a:t>
+            </a:r>
+            <a:r>
+              <a:rPr lang="en-GB" sz="2000" dirty="0">
+                <a:solidFill>
+                  <a:srgbClr val="569CD6"/>
+                </a:solidFill>
+                <a:latin typeface="Consolas" panose="020B0609020204030204" pitchFamily="49" charset="0"/>
+              </a:rPr>
+              <a:t>name</a:t>
+            </a:r>
+            <a:r>
+              <a:rPr lang="en-GB" sz="2000" dirty="0">
+                <a:solidFill>
+                  <a:srgbClr val="D4D4D4"/>
+                </a:solidFill>
+                <a:latin typeface="Consolas" panose="020B0609020204030204" pitchFamily="49" charset="0"/>
+              </a:rPr>
+              <a:t>: </a:t>
+            </a:r>
+            <a:r>
+              <a:rPr lang="en-GB" sz="2000" dirty="0">
+                <a:solidFill>
+                  <a:srgbClr val="CE9178"/>
+                </a:solidFill>
+                <a:latin typeface="Consolas" panose="020B0609020204030204" pitchFamily="49" charset="0"/>
+              </a:rPr>
+              <a:t>APP_COLOR</a:t>
+            </a:r>
+            <a:endParaRPr lang="en-GB" sz="2000" dirty="0">
+              <a:solidFill>
+                <a:srgbClr val="D4D4D4"/>
+              </a:solidFill>
+              <a:latin typeface="Consolas" panose="020B0609020204030204" pitchFamily="49" charset="0"/>
+            </a:endParaRPr>
+          </a:p>
+          <a:p>
+            <a:r>
+              <a:rPr lang="en-GB" sz="2000" dirty="0">
+                <a:solidFill>
+                  <a:srgbClr val="D4D4D4"/>
+                </a:solidFill>
+                <a:latin typeface="Consolas" panose="020B0609020204030204" pitchFamily="49" charset="0"/>
+              </a:rPr>
+              <a:t>  </a:t>
+            </a:r>
+            <a:r>
+              <a:rPr lang="en-GB" sz="2000" dirty="0" smtClean="0">
+                <a:solidFill>
+                  <a:srgbClr val="D4D4D4"/>
+                </a:solidFill>
+                <a:latin typeface="Consolas" panose="020B0609020204030204" pitchFamily="49" charset="0"/>
+              </a:rPr>
+              <a:t> </a:t>
+            </a:r>
+            <a:r>
+              <a:rPr lang="en-GB" sz="2000" dirty="0">
+                <a:solidFill>
+                  <a:srgbClr val="D4D4D4"/>
+                </a:solidFill>
+                <a:latin typeface="Consolas" panose="020B0609020204030204" pitchFamily="49" charset="0"/>
+              </a:rPr>
+              <a:t> </a:t>
+            </a:r>
+            <a:r>
+              <a:rPr lang="en-GB" sz="2000" dirty="0">
+                <a:solidFill>
+                  <a:srgbClr val="569CD6"/>
+                </a:solidFill>
+                <a:latin typeface="Consolas" panose="020B0609020204030204" pitchFamily="49" charset="0"/>
+              </a:rPr>
+              <a:t>value</a:t>
+            </a:r>
+            <a:r>
+              <a:rPr lang="en-GB" sz="2000" dirty="0">
+                <a:solidFill>
+                  <a:srgbClr val="D4D4D4"/>
+                </a:solidFill>
+                <a:latin typeface="Consolas" panose="020B0609020204030204" pitchFamily="49" charset="0"/>
+              </a:rPr>
+              <a:t>: </a:t>
+            </a:r>
+            <a:r>
+              <a:rPr lang="en-GB" sz="2000" dirty="0">
+                <a:solidFill>
+                  <a:srgbClr val="CE9178"/>
+                </a:solidFill>
+                <a:latin typeface="Consolas" panose="020B0609020204030204" pitchFamily="49" charset="0"/>
+              </a:rPr>
+              <a:t>"blue"</a:t>
+            </a:r>
+            <a:endParaRPr lang="en-GB" sz="2000" dirty="0">
+              <a:solidFill>
+                <a:srgbClr val="D4D4D4"/>
+              </a:solidFill>
+              <a:latin typeface="Consolas" panose="020B0609020204030204" pitchFamily="49" charset="0"/>
+            </a:endParaRPr>
+          </a:p>
+          <a:p>
+            <a:endParaRPr lang="en-GB" sz="2000" dirty="0" smtClean="0">
+              <a:solidFill>
+                <a:srgbClr val="D4D4D4"/>
+              </a:solidFill>
+              <a:latin typeface="Consolas" panose="020B0609020204030204" pitchFamily="49" charset="0"/>
+            </a:endParaRPr>
+          </a:p>
+          <a:p>
+            <a:r>
+              <a:rPr lang="en-GB" sz="2000" dirty="0">
+                <a:solidFill>
+                  <a:srgbClr val="D4D4D4"/>
+                </a:solidFill>
+                <a:latin typeface="Consolas" panose="020B0609020204030204" pitchFamily="49" charset="0"/>
+              </a:rPr>
+              <a:t>	 </a:t>
+            </a:r>
+            <a:endParaRPr lang="en-GB" sz="2000" dirty="0" smtClean="0">
+              <a:solidFill>
+                <a:srgbClr val="D4D4D4"/>
+              </a:solidFill>
+              <a:latin typeface="Consolas" panose="020B0609020204030204" pitchFamily="49" charset="0"/>
+            </a:endParaRPr>
+          </a:p>
+          <a:p>
+            <a:endParaRPr lang="en-GB" sz="2000" b="0" dirty="0">
+              <a:solidFill>
+                <a:srgbClr val="D4D4D4"/>
+              </a:solidFill>
+              <a:effectLst/>
+              <a:latin typeface="Consolas" panose="020B0609020204030204" pitchFamily="49" charset="0"/>
+            </a:endParaRPr>
+          </a:p>
+        </p:txBody>
+      </p:sp>
+      <p:sp>
+        <p:nvSpPr>
+          <p:cNvPr id="10" name="Content Placeholder 2"/>
+          <p:cNvSpPr>
+            <a:spLocks noGrp="1"/>
+          </p:cNvSpPr>
+          <p:nvPr>
+            <p:ph idx="1"/>
+          </p:nvPr>
+        </p:nvSpPr>
+        <p:spPr>
+          <a:xfrm>
+            <a:off x="838200" y="1825625"/>
+            <a:ext cx="2581275" cy="4351338"/>
+          </a:xfrm>
+        </p:spPr>
+        <p:txBody>
+          <a:bodyPr/>
+          <a:lstStyle/>
+          <a:p>
+            <a:pPr marL="0" indent="0">
+              <a:buNone/>
+            </a:pPr>
+            <a:r>
+              <a:rPr lang="en-US" dirty="0" smtClean="0"/>
+              <a:t>s</a:t>
+            </a:r>
+            <a:endParaRPr lang="en-GB" dirty="0"/>
+          </a:p>
+        </p:txBody>
+      </p:sp>
+      <p:sp>
+        <p:nvSpPr>
+          <p:cNvPr id="7" name="Title 1"/>
+          <p:cNvSpPr txBox="1">
+            <a:spLocks/>
+          </p:cNvSpPr>
+          <p:nvPr/>
+        </p:nvSpPr>
+        <p:spPr>
+          <a:xfrm>
+            <a:off x="6600943" y="2145315"/>
+            <a:ext cx="3432057" cy="1537686"/>
+          </a:xfrm>
+          <a:prstGeom prst="rect">
+            <a:avLst/>
+          </a:prstGeom>
+          <a:solidFill>
+            <a:schemeClr val="tx1"/>
+          </a:solidFill>
+        </p:spPr>
+        <p:txBody>
+          <a:bodyPr vert="horz" lIns="180000" tIns="180000" rIns="91440" bIns="45720" rtlCol="0" anchor="t">
+            <a:noAutofit/>
+          </a:bodyPr>
+          <a:lstStyle>
+            <a:lvl1pPr algn="l" defTabSz="914400" rtl="0" eaLnBrk="1" latinLnBrk="0" hangingPunct="1">
+              <a:lnSpc>
+                <a:spcPct val="90000"/>
+              </a:lnSpc>
+              <a:spcBef>
+                <a:spcPct val="0"/>
+              </a:spcBef>
+              <a:buNone/>
+              <a:defRPr sz="4400" kern="1200">
+                <a:solidFill>
+                  <a:schemeClr val="tx1"/>
+                </a:solidFill>
+                <a:latin typeface="+mj-lt"/>
+                <a:ea typeface="+mj-ea"/>
+                <a:cs typeface="+mj-cs"/>
+              </a:defRPr>
+            </a:lvl1pPr>
+          </a:lstStyle>
+          <a:p>
+            <a:r>
+              <a:rPr lang="en-GB" sz="2000" dirty="0" err="1" smtClean="0">
+                <a:solidFill>
+                  <a:srgbClr val="569CD6"/>
+                </a:solidFill>
+                <a:latin typeface="Consolas" panose="020B0609020204030204" pitchFamily="49" charset="0"/>
+              </a:rPr>
+              <a:t>env</a:t>
+            </a:r>
+            <a:r>
+              <a:rPr lang="en-GB" sz="2000" dirty="0">
+                <a:solidFill>
+                  <a:srgbClr val="D4D4D4"/>
+                </a:solidFill>
+                <a:latin typeface="Consolas" panose="020B0609020204030204" pitchFamily="49" charset="0"/>
+              </a:rPr>
+              <a:t>: </a:t>
+            </a:r>
+          </a:p>
+          <a:p>
+            <a:r>
+              <a:rPr lang="en-GB" sz="2000" dirty="0">
+                <a:solidFill>
+                  <a:srgbClr val="D4D4D4"/>
+                </a:solidFill>
+                <a:latin typeface="Consolas" panose="020B0609020204030204" pitchFamily="49" charset="0"/>
+              </a:rPr>
+              <a:t>  </a:t>
+            </a:r>
+            <a:r>
+              <a:rPr lang="en-GB" sz="2000" dirty="0" smtClean="0">
+                <a:solidFill>
+                  <a:srgbClr val="D4D4D4"/>
+                </a:solidFill>
+                <a:latin typeface="Consolas" panose="020B0609020204030204" pitchFamily="49" charset="0"/>
+              </a:rPr>
+              <a:t>-</a:t>
+            </a:r>
+            <a:r>
+              <a:rPr lang="en-GB" sz="2000" dirty="0">
+                <a:solidFill>
+                  <a:srgbClr val="D4D4D4"/>
+                </a:solidFill>
+                <a:latin typeface="Consolas" panose="020B0609020204030204" pitchFamily="49" charset="0"/>
+              </a:rPr>
+              <a:t> </a:t>
+            </a:r>
+            <a:r>
+              <a:rPr lang="en-GB" sz="2000" dirty="0">
+                <a:solidFill>
+                  <a:srgbClr val="569CD6"/>
+                </a:solidFill>
+                <a:latin typeface="Consolas" panose="020B0609020204030204" pitchFamily="49" charset="0"/>
+              </a:rPr>
+              <a:t>name</a:t>
+            </a:r>
+            <a:r>
+              <a:rPr lang="en-GB" sz="2000" dirty="0">
+                <a:solidFill>
+                  <a:srgbClr val="D4D4D4"/>
+                </a:solidFill>
+                <a:latin typeface="Consolas" panose="020B0609020204030204" pitchFamily="49" charset="0"/>
+              </a:rPr>
+              <a:t>: </a:t>
+            </a:r>
+            <a:r>
+              <a:rPr lang="en-GB" sz="2000" dirty="0" smtClean="0">
+                <a:solidFill>
+                  <a:srgbClr val="CE9178"/>
+                </a:solidFill>
+                <a:latin typeface="Consolas" panose="020B0609020204030204" pitchFamily="49" charset="0"/>
+              </a:rPr>
+              <a:t>APP_DB_USER</a:t>
+            </a:r>
+            <a:endParaRPr lang="en-GB" sz="2000" dirty="0">
+              <a:solidFill>
+                <a:srgbClr val="D4D4D4"/>
+              </a:solidFill>
+              <a:latin typeface="Consolas" panose="020B0609020204030204" pitchFamily="49" charset="0"/>
+            </a:endParaRPr>
+          </a:p>
+          <a:p>
+            <a:r>
+              <a:rPr lang="en-GB" sz="2000" dirty="0">
+                <a:solidFill>
+                  <a:srgbClr val="D4D4D4"/>
+                </a:solidFill>
+                <a:latin typeface="Consolas" panose="020B0609020204030204" pitchFamily="49" charset="0"/>
+              </a:rPr>
+              <a:t>    </a:t>
+            </a:r>
+            <a:r>
+              <a:rPr lang="en-GB" sz="2000" dirty="0" err="1" smtClean="0">
+                <a:solidFill>
+                  <a:srgbClr val="569CD6"/>
+                </a:solidFill>
+                <a:latin typeface="Consolas" panose="020B0609020204030204" pitchFamily="49" charset="0"/>
+              </a:rPr>
+              <a:t>valueFrom</a:t>
+            </a:r>
+            <a:r>
+              <a:rPr lang="en-GB" sz="2000" dirty="0" smtClean="0">
+                <a:solidFill>
+                  <a:srgbClr val="D4D4D4"/>
+                </a:solidFill>
+                <a:latin typeface="Consolas" panose="020B0609020204030204" pitchFamily="49" charset="0"/>
+              </a:rPr>
+              <a:t>:</a:t>
+            </a:r>
+          </a:p>
+          <a:p>
+            <a:r>
+              <a:rPr lang="en-GB" sz="2000" dirty="0">
+                <a:solidFill>
+                  <a:srgbClr val="D4D4D4"/>
+                </a:solidFill>
+                <a:latin typeface="Consolas" panose="020B0609020204030204" pitchFamily="49" charset="0"/>
+              </a:rPr>
+              <a:t>    </a:t>
+            </a:r>
+            <a:r>
+              <a:rPr lang="en-GB" sz="2000" dirty="0" smtClean="0">
+                <a:solidFill>
+                  <a:srgbClr val="D4D4D4"/>
+                </a:solidFill>
+                <a:latin typeface="Consolas" panose="020B0609020204030204" pitchFamily="49" charset="0"/>
+              </a:rPr>
+              <a:t>  </a:t>
+            </a:r>
+            <a:r>
+              <a:rPr lang="en-GB" sz="2000" dirty="0" err="1" smtClean="0">
+                <a:solidFill>
+                  <a:srgbClr val="569CD6"/>
+                </a:solidFill>
+                <a:latin typeface="Consolas" panose="020B0609020204030204" pitchFamily="49" charset="0"/>
+              </a:rPr>
+              <a:t>configMapKeyRef</a:t>
+            </a:r>
+            <a:r>
+              <a:rPr lang="en-GB" sz="2000" dirty="0" smtClean="0">
+                <a:solidFill>
+                  <a:srgbClr val="569CD6"/>
+                </a:solidFill>
+                <a:latin typeface="Consolas" panose="020B0609020204030204" pitchFamily="49" charset="0"/>
+              </a:rPr>
+              <a:t>:</a:t>
+            </a:r>
+            <a:endParaRPr lang="en-GB" sz="2000" dirty="0">
+              <a:solidFill>
+                <a:srgbClr val="D4D4D4"/>
+              </a:solidFill>
+              <a:latin typeface="Consolas" panose="020B0609020204030204" pitchFamily="49" charset="0"/>
+            </a:endParaRPr>
+          </a:p>
+          <a:p>
+            <a:endParaRPr lang="en-GB" sz="2000" dirty="0" smtClean="0">
+              <a:solidFill>
+                <a:srgbClr val="D4D4D4"/>
+              </a:solidFill>
+              <a:latin typeface="Consolas" panose="020B0609020204030204" pitchFamily="49" charset="0"/>
+            </a:endParaRPr>
+          </a:p>
+          <a:p>
+            <a:r>
+              <a:rPr lang="en-GB" sz="2000" dirty="0">
+                <a:solidFill>
+                  <a:srgbClr val="D4D4D4"/>
+                </a:solidFill>
+                <a:latin typeface="Consolas" panose="020B0609020204030204" pitchFamily="49" charset="0"/>
+              </a:rPr>
+              <a:t>	 </a:t>
+            </a:r>
+            <a:endParaRPr lang="en-GB" sz="2000" dirty="0" smtClean="0">
+              <a:solidFill>
+                <a:srgbClr val="D4D4D4"/>
+              </a:solidFill>
+              <a:latin typeface="Consolas" panose="020B0609020204030204" pitchFamily="49" charset="0"/>
+            </a:endParaRPr>
+          </a:p>
+          <a:p>
+            <a:endParaRPr lang="en-GB" sz="2000" b="0" dirty="0">
+              <a:solidFill>
+                <a:srgbClr val="D4D4D4"/>
+              </a:solidFill>
+              <a:effectLst/>
+              <a:latin typeface="Consolas" panose="020B0609020204030204" pitchFamily="49" charset="0"/>
+            </a:endParaRPr>
+          </a:p>
+        </p:txBody>
+      </p:sp>
+      <p:sp>
+        <p:nvSpPr>
+          <p:cNvPr id="8" name="Title 1"/>
+          <p:cNvSpPr txBox="1">
+            <a:spLocks/>
+          </p:cNvSpPr>
+          <p:nvPr/>
+        </p:nvSpPr>
+        <p:spPr>
+          <a:xfrm>
+            <a:off x="6592481" y="3830183"/>
+            <a:ext cx="3432057" cy="1537686"/>
+          </a:xfrm>
+          <a:prstGeom prst="rect">
+            <a:avLst/>
+          </a:prstGeom>
+          <a:solidFill>
+            <a:schemeClr val="tx1"/>
+          </a:solidFill>
+        </p:spPr>
+        <p:txBody>
+          <a:bodyPr vert="horz" lIns="180000" tIns="180000" rIns="91440" bIns="45720" rtlCol="0" anchor="t">
+            <a:noAutofit/>
+          </a:bodyPr>
+          <a:lstStyle>
+            <a:lvl1pPr algn="l" defTabSz="914400" rtl="0" eaLnBrk="1" latinLnBrk="0" hangingPunct="1">
+              <a:lnSpc>
+                <a:spcPct val="90000"/>
+              </a:lnSpc>
+              <a:spcBef>
+                <a:spcPct val="0"/>
+              </a:spcBef>
+              <a:buNone/>
+              <a:defRPr sz="4400" kern="1200">
+                <a:solidFill>
+                  <a:schemeClr val="tx1"/>
+                </a:solidFill>
+                <a:latin typeface="+mj-lt"/>
+                <a:ea typeface="+mj-ea"/>
+                <a:cs typeface="+mj-cs"/>
+              </a:defRPr>
+            </a:lvl1pPr>
+          </a:lstStyle>
+          <a:p>
+            <a:r>
+              <a:rPr lang="en-GB" sz="2000" dirty="0" err="1" smtClean="0">
+                <a:solidFill>
+                  <a:srgbClr val="569CD6"/>
+                </a:solidFill>
+                <a:latin typeface="Consolas" panose="020B0609020204030204" pitchFamily="49" charset="0"/>
+              </a:rPr>
+              <a:t>env</a:t>
+            </a:r>
+            <a:r>
+              <a:rPr lang="en-GB" sz="2000" dirty="0">
+                <a:solidFill>
+                  <a:srgbClr val="D4D4D4"/>
+                </a:solidFill>
+                <a:latin typeface="Consolas" panose="020B0609020204030204" pitchFamily="49" charset="0"/>
+              </a:rPr>
+              <a:t>: </a:t>
+            </a:r>
+          </a:p>
+          <a:p>
+            <a:r>
+              <a:rPr lang="en-GB" sz="2000" dirty="0">
+                <a:solidFill>
+                  <a:srgbClr val="D4D4D4"/>
+                </a:solidFill>
+                <a:latin typeface="Consolas" panose="020B0609020204030204" pitchFamily="49" charset="0"/>
+              </a:rPr>
+              <a:t>  </a:t>
+            </a:r>
+            <a:r>
+              <a:rPr lang="en-GB" sz="2000" dirty="0" smtClean="0">
+                <a:solidFill>
+                  <a:srgbClr val="D4D4D4"/>
+                </a:solidFill>
+                <a:latin typeface="Consolas" panose="020B0609020204030204" pitchFamily="49" charset="0"/>
+              </a:rPr>
+              <a:t>-</a:t>
+            </a:r>
+            <a:r>
+              <a:rPr lang="en-GB" sz="2000" dirty="0">
+                <a:solidFill>
+                  <a:srgbClr val="D4D4D4"/>
+                </a:solidFill>
+                <a:latin typeface="Consolas" panose="020B0609020204030204" pitchFamily="49" charset="0"/>
+              </a:rPr>
+              <a:t> </a:t>
+            </a:r>
+            <a:r>
+              <a:rPr lang="en-GB" sz="2000" dirty="0">
+                <a:solidFill>
+                  <a:srgbClr val="569CD6"/>
+                </a:solidFill>
+                <a:latin typeface="Consolas" panose="020B0609020204030204" pitchFamily="49" charset="0"/>
+              </a:rPr>
+              <a:t>name</a:t>
+            </a:r>
+            <a:r>
+              <a:rPr lang="en-GB" sz="2000" dirty="0">
+                <a:solidFill>
+                  <a:srgbClr val="D4D4D4"/>
+                </a:solidFill>
+                <a:latin typeface="Consolas" panose="020B0609020204030204" pitchFamily="49" charset="0"/>
+              </a:rPr>
+              <a:t>: </a:t>
+            </a:r>
+            <a:r>
+              <a:rPr lang="en-GB" sz="2000" dirty="0" smtClean="0">
+                <a:solidFill>
+                  <a:srgbClr val="CE9178"/>
+                </a:solidFill>
+                <a:latin typeface="Consolas" panose="020B0609020204030204" pitchFamily="49" charset="0"/>
+              </a:rPr>
+              <a:t>APP_DB_USER</a:t>
+            </a:r>
+            <a:endParaRPr lang="en-GB" sz="2000" dirty="0">
+              <a:solidFill>
+                <a:srgbClr val="D4D4D4"/>
+              </a:solidFill>
+              <a:latin typeface="Consolas" panose="020B0609020204030204" pitchFamily="49" charset="0"/>
+            </a:endParaRPr>
+          </a:p>
+          <a:p>
+            <a:r>
+              <a:rPr lang="en-GB" sz="2000" dirty="0">
+                <a:solidFill>
+                  <a:srgbClr val="D4D4D4"/>
+                </a:solidFill>
+                <a:latin typeface="Consolas" panose="020B0609020204030204" pitchFamily="49" charset="0"/>
+              </a:rPr>
+              <a:t>    </a:t>
+            </a:r>
+            <a:r>
+              <a:rPr lang="en-GB" sz="2000" dirty="0" err="1" smtClean="0">
+                <a:solidFill>
+                  <a:srgbClr val="569CD6"/>
+                </a:solidFill>
+                <a:latin typeface="Consolas" panose="020B0609020204030204" pitchFamily="49" charset="0"/>
+              </a:rPr>
+              <a:t>valueFrom</a:t>
+            </a:r>
+            <a:r>
+              <a:rPr lang="en-GB" sz="2000" dirty="0" smtClean="0">
+                <a:solidFill>
+                  <a:srgbClr val="D4D4D4"/>
+                </a:solidFill>
+                <a:latin typeface="Consolas" panose="020B0609020204030204" pitchFamily="49" charset="0"/>
+              </a:rPr>
+              <a:t>:</a:t>
+            </a:r>
+          </a:p>
+          <a:p>
+            <a:r>
+              <a:rPr lang="en-GB" sz="2000" dirty="0">
+                <a:solidFill>
+                  <a:srgbClr val="D4D4D4"/>
+                </a:solidFill>
+                <a:latin typeface="Consolas" panose="020B0609020204030204" pitchFamily="49" charset="0"/>
+              </a:rPr>
+              <a:t>    </a:t>
+            </a:r>
+            <a:r>
+              <a:rPr lang="en-GB" sz="2000" dirty="0" smtClean="0">
+                <a:solidFill>
+                  <a:srgbClr val="D4D4D4"/>
+                </a:solidFill>
+                <a:latin typeface="Consolas" panose="020B0609020204030204" pitchFamily="49" charset="0"/>
+              </a:rPr>
+              <a:t>  </a:t>
+            </a:r>
+            <a:r>
+              <a:rPr lang="en-GB" sz="2000" dirty="0" err="1" smtClean="0">
+                <a:solidFill>
+                  <a:srgbClr val="569CD6"/>
+                </a:solidFill>
+                <a:latin typeface="Consolas" panose="020B0609020204030204" pitchFamily="49" charset="0"/>
+              </a:rPr>
+              <a:t>secretKeyRef</a:t>
+            </a:r>
+            <a:r>
+              <a:rPr lang="en-GB" sz="2000" dirty="0" smtClean="0">
+                <a:solidFill>
+                  <a:srgbClr val="569CD6"/>
+                </a:solidFill>
+                <a:latin typeface="Consolas" panose="020B0609020204030204" pitchFamily="49" charset="0"/>
+              </a:rPr>
+              <a:t>:</a:t>
+            </a:r>
+            <a:endParaRPr lang="en-GB" sz="2000" dirty="0">
+              <a:solidFill>
+                <a:srgbClr val="D4D4D4"/>
+              </a:solidFill>
+              <a:latin typeface="Consolas" panose="020B0609020204030204" pitchFamily="49" charset="0"/>
+            </a:endParaRPr>
+          </a:p>
+          <a:p>
+            <a:endParaRPr lang="en-GB" sz="2000" dirty="0" smtClean="0">
+              <a:solidFill>
+                <a:srgbClr val="D4D4D4"/>
+              </a:solidFill>
+              <a:latin typeface="Consolas" panose="020B0609020204030204" pitchFamily="49" charset="0"/>
+            </a:endParaRPr>
+          </a:p>
+          <a:p>
+            <a:r>
+              <a:rPr lang="en-GB" sz="2000" dirty="0">
+                <a:solidFill>
+                  <a:srgbClr val="D4D4D4"/>
+                </a:solidFill>
+                <a:latin typeface="Consolas" panose="020B0609020204030204" pitchFamily="49" charset="0"/>
+              </a:rPr>
+              <a:t>	 </a:t>
+            </a:r>
+            <a:endParaRPr lang="en-GB" sz="2000" dirty="0" smtClean="0">
+              <a:solidFill>
+                <a:srgbClr val="D4D4D4"/>
+              </a:solidFill>
+              <a:latin typeface="Consolas" panose="020B0609020204030204" pitchFamily="49" charset="0"/>
+            </a:endParaRPr>
+          </a:p>
+          <a:p>
+            <a:endParaRPr lang="en-GB" sz="2000" b="0" dirty="0">
+              <a:solidFill>
+                <a:srgbClr val="D4D4D4"/>
+              </a:solidFill>
+              <a:effectLst/>
+              <a:latin typeface="Consolas" panose="020B0609020204030204" pitchFamily="49" charset="0"/>
+            </a:endParaRPr>
+          </a:p>
+        </p:txBody>
+      </p:sp>
+    </p:spTree>
+    <p:extLst>
+      <p:ext uri="{BB962C8B-B14F-4D97-AF65-F5344CB8AC3E}">
+        <p14:creationId xmlns:p14="http://schemas.microsoft.com/office/powerpoint/2010/main" val="1004153281"/>
+      </p:ext>
+    </p:extLst>
+  </p:cSld>
+  <p:clrMapOvr>
+    <a:masterClrMapping/>
+  </p:clrMapOvr>
+  <p:timing>
+    <p:tnLst>
+      <p:par>
+        <p:cTn id="1" dur="indefinite" restart="never" nodeType="tmRoot"/>
+      </p:par>
+    </p:tnLst>
+  </p:timing>
 </p:sld>
 </file>
 
@@ -3693,6 +4453,13 @@
   <p:clrMapOvr>
     <a:masterClrMapping/>
   </p:clrMapOvr>
+  <p:timing>
+    <p:tnLst>
+      <p:par>
+        <p:cTn id="1" dur="indefinite" restart="never" nodeType="tmRoot"/>
+      </p:par>
+    </p:tnLst>
+  </p:timing>
 </p:sld>
 </file>
 
@@ -3813,6 +4580,13 @@
   <p:clrMapOvr>
     <a:masterClrMapping/>
   </p:clrMapOvr>
+  <p:timing>
+    <p:tnLst>
+      <p:par>
+        <p:cTn id="1" dur="indefinite" restart="never" nodeType="tmRoot"/>
+      </p:par>
+    </p:tnLst>
+  </p:timing>
 </p:sld>
 </file>
 
@@ -6994,6 +7768,858 @@
   <p:clrMapOvr>
     <a:masterClrMapping/>
   </p:clrMapOvr>
+  <p:timing>
+    <p:tnLst>
+      <p:par>
+        <p:cTn id="1" dur="indefinite" restart="never" nodeType="tmRoot"/>
+      </p:par>
+    </p:tnLst>
+  </p:timing>
+</p:sld>
+</file>
+
+<file path=ppt/slides/slide8.xml><?xml version="1.0" encoding="utf-8"?>
+<p:sld xmlns:a="http://schemas.openxmlformats.org/drawingml/2006/main" xmlns:r="http://schemas.openxmlformats.org/officeDocument/2006/relationships" xmlns:p="http://schemas.openxmlformats.org/presentationml/2006/main">
+  <p:cSld>
+    <p:spTree>
+      <p:nvGrpSpPr>
+        <p:cNvPr id="1" name=""/>
+        <p:cNvGrpSpPr/>
+        <p:nvPr/>
+      </p:nvGrpSpPr>
+      <p:grpSpPr>
+        <a:xfrm>
+          <a:off x="0" y="0"/>
+          <a:ext cx="0" cy="0"/>
+          <a:chOff x="0" y="0"/>
+          <a:chExt cx="0" cy="0"/>
+        </a:xfrm>
+      </p:grpSpPr>
+      <p:sp>
+        <p:nvSpPr>
+          <p:cNvPr id="2" name="Title 1"/>
+          <p:cNvSpPr>
+            <a:spLocks noGrp="1"/>
+          </p:cNvSpPr>
+          <p:nvPr>
+            <p:ph type="title"/>
+          </p:nvPr>
+        </p:nvSpPr>
+        <p:spPr/>
+        <p:txBody>
+          <a:bodyPr/>
+          <a:lstStyle/>
+          <a:p>
+            <a:r>
+              <a:rPr lang="en-US" dirty="0"/>
+              <a:t>Section </a:t>
+            </a:r>
+            <a:r>
+              <a:rPr lang="en-US" dirty="0" smtClean="0"/>
+              <a:t>7</a:t>
+            </a:r>
+            <a:endParaRPr lang="en-GB" dirty="0"/>
+          </a:p>
+        </p:txBody>
+      </p:sp>
+      <p:sp>
+        <p:nvSpPr>
+          <p:cNvPr id="3" name="Content Placeholder 2"/>
+          <p:cNvSpPr>
+            <a:spLocks noGrp="1"/>
+          </p:cNvSpPr>
+          <p:nvPr>
+            <p:ph idx="1"/>
+          </p:nvPr>
+        </p:nvSpPr>
+        <p:spPr/>
+        <p:txBody>
+          <a:bodyPr/>
+          <a:lstStyle/>
+          <a:p>
+            <a:endParaRPr lang="en-GB" dirty="0"/>
+          </a:p>
+        </p:txBody>
+      </p:sp>
+    </p:spTree>
+    <p:extLst>
+      <p:ext uri="{BB962C8B-B14F-4D97-AF65-F5344CB8AC3E}">
+        <p14:creationId xmlns:p14="http://schemas.microsoft.com/office/powerpoint/2010/main" val="2055157450"/>
+      </p:ext>
+    </p:extLst>
+  </p:cSld>
+  <p:clrMapOvr>
+    <a:masterClrMapping/>
+  </p:clrMapOvr>
+  <p:timing>
+    <p:tnLst>
+      <p:par>
+        <p:cTn id="1" dur="indefinite" restart="never" nodeType="tmRoot"/>
+      </p:par>
+    </p:tnLst>
+  </p:timing>
+</p:sld>
+</file>
+
+<file path=ppt/slides/slide9.xml><?xml version="1.0" encoding="utf-8"?>
+<p:sld xmlns:a="http://schemas.openxmlformats.org/drawingml/2006/main" xmlns:r="http://schemas.openxmlformats.org/officeDocument/2006/relationships" xmlns:p="http://schemas.openxmlformats.org/presentationml/2006/main">
+  <p:cSld>
+    <p:spTree>
+      <p:nvGrpSpPr>
+        <p:cNvPr id="1" name=""/>
+        <p:cNvGrpSpPr/>
+        <p:nvPr/>
+      </p:nvGrpSpPr>
+      <p:grpSpPr>
+        <a:xfrm>
+          <a:off x="0" y="0"/>
+          <a:ext cx="0" cy="0"/>
+          <a:chOff x="0" y="0"/>
+          <a:chExt cx="0" cy="0"/>
+        </a:xfrm>
+      </p:grpSpPr>
+      <p:sp>
+        <p:nvSpPr>
+          <p:cNvPr id="9" name="Title 1"/>
+          <p:cNvSpPr txBox="1">
+            <a:spLocks/>
+          </p:cNvSpPr>
+          <p:nvPr/>
+        </p:nvSpPr>
+        <p:spPr>
+          <a:xfrm>
+            <a:off x="6592481" y="748306"/>
+            <a:ext cx="4532720" cy="5576294"/>
+          </a:xfrm>
+          <a:prstGeom prst="rect">
+            <a:avLst/>
+          </a:prstGeom>
+          <a:solidFill>
+            <a:schemeClr val="tx1"/>
+          </a:solidFill>
+        </p:spPr>
+        <p:txBody>
+          <a:bodyPr vert="horz" lIns="180000" tIns="180000" rIns="91440" bIns="45720" rtlCol="0" anchor="t">
+            <a:noAutofit/>
+          </a:bodyPr>
+          <a:lstStyle>
+            <a:lvl1pPr algn="l" defTabSz="914400" rtl="0" eaLnBrk="1" latinLnBrk="0" hangingPunct="1">
+              <a:lnSpc>
+                <a:spcPct val="90000"/>
+              </a:lnSpc>
+              <a:spcBef>
+                <a:spcPct val="0"/>
+              </a:spcBef>
+              <a:buNone/>
+              <a:defRPr sz="4400" kern="1200">
+                <a:solidFill>
+                  <a:schemeClr val="tx1"/>
+                </a:solidFill>
+                <a:latin typeface="+mj-lt"/>
+                <a:ea typeface="+mj-ea"/>
+                <a:cs typeface="+mj-cs"/>
+              </a:defRPr>
+            </a:lvl1pPr>
+          </a:lstStyle>
+          <a:p>
+            <a:r>
+              <a:rPr lang="en-GB" sz="2000" dirty="0" err="1">
+                <a:solidFill>
+                  <a:srgbClr val="569CD6"/>
+                </a:solidFill>
+                <a:latin typeface="Consolas" panose="020B0609020204030204" pitchFamily="49" charset="0"/>
+              </a:rPr>
+              <a:t>apiVersion</a:t>
+            </a:r>
+            <a:r>
+              <a:rPr lang="en-GB" sz="2000" dirty="0">
+                <a:solidFill>
+                  <a:srgbClr val="D4D4D4"/>
+                </a:solidFill>
+                <a:latin typeface="Consolas" panose="020B0609020204030204" pitchFamily="49" charset="0"/>
+              </a:rPr>
+              <a:t>: </a:t>
+            </a:r>
+            <a:r>
+              <a:rPr lang="en-GB" sz="2000" dirty="0">
+                <a:solidFill>
+                  <a:srgbClr val="CE9178"/>
+                </a:solidFill>
+                <a:latin typeface="Consolas" panose="020B0609020204030204" pitchFamily="49" charset="0"/>
+              </a:rPr>
+              <a:t>v1</a:t>
+            </a:r>
+            <a:endParaRPr lang="en-GB" sz="2000" dirty="0">
+              <a:solidFill>
+                <a:srgbClr val="D4D4D4"/>
+              </a:solidFill>
+              <a:latin typeface="Consolas" panose="020B0609020204030204" pitchFamily="49" charset="0"/>
+            </a:endParaRPr>
+          </a:p>
+          <a:p>
+            <a:r>
+              <a:rPr lang="en-GB" sz="2000" dirty="0">
+                <a:solidFill>
+                  <a:srgbClr val="569CD6"/>
+                </a:solidFill>
+                <a:latin typeface="Consolas" panose="020B0609020204030204" pitchFamily="49" charset="0"/>
+              </a:rPr>
+              <a:t>kind</a:t>
+            </a:r>
+            <a:r>
+              <a:rPr lang="en-GB" sz="2000" dirty="0">
+                <a:solidFill>
+                  <a:srgbClr val="D4D4D4"/>
+                </a:solidFill>
+                <a:latin typeface="Consolas" panose="020B0609020204030204" pitchFamily="49" charset="0"/>
+              </a:rPr>
+              <a:t>: </a:t>
+            </a:r>
+            <a:r>
+              <a:rPr lang="en-GB" sz="2000" dirty="0">
+                <a:solidFill>
+                  <a:srgbClr val="CE9178"/>
+                </a:solidFill>
+                <a:latin typeface="Consolas" panose="020B0609020204030204" pitchFamily="49" charset="0"/>
+              </a:rPr>
+              <a:t>Pod</a:t>
+            </a:r>
+            <a:endParaRPr lang="en-GB" sz="2000" dirty="0">
+              <a:solidFill>
+                <a:srgbClr val="D4D4D4"/>
+              </a:solidFill>
+              <a:latin typeface="Consolas" panose="020B0609020204030204" pitchFamily="49" charset="0"/>
+            </a:endParaRPr>
+          </a:p>
+          <a:p>
+            <a:r>
+              <a:rPr lang="en-GB" sz="2000" dirty="0">
+                <a:solidFill>
+                  <a:srgbClr val="569CD6"/>
+                </a:solidFill>
+                <a:latin typeface="Consolas" panose="020B0609020204030204" pitchFamily="49" charset="0"/>
+              </a:rPr>
+              <a:t>metadata</a:t>
+            </a:r>
+            <a:r>
+              <a:rPr lang="en-GB" sz="2000" dirty="0">
+                <a:solidFill>
+                  <a:srgbClr val="D4D4D4"/>
+                </a:solidFill>
+                <a:latin typeface="Consolas" panose="020B0609020204030204" pitchFamily="49" charset="0"/>
+              </a:rPr>
+              <a:t>:</a:t>
+            </a:r>
+          </a:p>
+          <a:p>
+            <a:r>
+              <a:rPr lang="en-GB" sz="2000" dirty="0">
+                <a:solidFill>
+                  <a:srgbClr val="D4D4D4"/>
+                </a:solidFill>
+                <a:latin typeface="Consolas" panose="020B0609020204030204" pitchFamily="49" charset="0"/>
+              </a:rPr>
+              <a:t>  </a:t>
+            </a:r>
+            <a:r>
+              <a:rPr lang="en-GB" sz="2000" dirty="0">
+                <a:solidFill>
+                  <a:srgbClr val="569CD6"/>
+                </a:solidFill>
+                <a:latin typeface="Consolas" panose="020B0609020204030204" pitchFamily="49" charset="0"/>
+              </a:rPr>
+              <a:t>name</a:t>
+            </a:r>
+            <a:r>
+              <a:rPr lang="en-GB" sz="2000" dirty="0">
+                <a:solidFill>
+                  <a:srgbClr val="D4D4D4"/>
+                </a:solidFill>
+                <a:latin typeface="Consolas" panose="020B0609020204030204" pitchFamily="49" charset="0"/>
+              </a:rPr>
+              <a:t>: </a:t>
+            </a:r>
+            <a:r>
+              <a:rPr lang="en-GB" sz="2000" dirty="0">
+                <a:solidFill>
+                  <a:srgbClr val="CE9178"/>
+                </a:solidFill>
+                <a:latin typeface="Consolas" panose="020B0609020204030204" pitchFamily="49" charset="0"/>
+              </a:rPr>
+              <a:t>simple-</a:t>
+            </a:r>
+            <a:r>
+              <a:rPr lang="en-GB" sz="2000" dirty="0" err="1">
+                <a:solidFill>
+                  <a:srgbClr val="CE9178"/>
+                </a:solidFill>
+                <a:latin typeface="Consolas" panose="020B0609020204030204" pitchFamily="49" charset="0"/>
+              </a:rPr>
+              <a:t>webapp</a:t>
+            </a:r>
+            <a:r>
+              <a:rPr lang="en-GB" sz="2000" dirty="0">
+                <a:solidFill>
+                  <a:srgbClr val="CE9178"/>
+                </a:solidFill>
+                <a:latin typeface="Consolas" panose="020B0609020204030204" pitchFamily="49" charset="0"/>
+              </a:rPr>
+              <a:t>-</a:t>
+            </a:r>
+            <a:r>
+              <a:rPr lang="en-GB" sz="2000" dirty="0" err="1">
+                <a:solidFill>
+                  <a:srgbClr val="CE9178"/>
+                </a:solidFill>
+                <a:latin typeface="Consolas" panose="020B0609020204030204" pitchFamily="49" charset="0"/>
+              </a:rPr>
+              <a:t>color</a:t>
+            </a:r>
+            <a:endParaRPr lang="en-GB" sz="2000" dirty="0">
+              <a:solidFill>
+                <a:srgbClr val="D4D4D4"/>
+              </a:solidFill>
+              <a:latin typeface="Consolas" panose="020B0609020204030204" pitchFamily="49" charset="0"/>
+            </a:endParaRPr>
+          </a:p>
+          <a:p>
+            <a:r>
+              <a:rPr lang="en-GB" sz="2000" dirty="0">
+                <a:solidFill>
+                  <a:srgbClr val="569CD6"/>
+                </a:solidFill>
+                <a:latin typeface="Consolas" panose="020B0609020204030204" pitchFamily="49" charset="0"/>
+              </a:rPr>
+              <a:t>spec</a:t>
+            </a:r>
+            <a:r>
+              <a:rPr lang="en-GB" sz="2000" dirty="0">
+                <a:solidFill>
+                  <a:srgbClr val="D4D4D4"/>
+                </a:solidFill>
+                <a:latin typeface="Consolas" panose="020B0609020204030204" pitchFamily="49" charset="0"/>
+              </a:rPr>
+              <a:t>:</a:t>
+            </a:r>
+          </a:p>
+          <a:p>
+            <a:r>
+              <a:rPr lang="en-GB" sz="2000" dirty="0">
+                <a:solidFill>
+                  <a:srgbClr val="D4D4D4"/>
+                </a:solidFill>
+                <a:latin typeface="Consolas" panose="020B0609020204030204" pitchFamily="49" charset="0"/>
+              </a:rPr>
+              <a:t>  </a:t>
+            </a:r>
+            <a:r>
+              <a:rPr lang="en-GB" sz="2000" dirty="0">
+                <a:solidFill>
+                  <a:srgbClr val="569CD6"/>
+                </a:solidFill>
+                <a:latin typeface="Consolas" panose="020B0609020204030204" pitchFamily="49" charset="0"/>
+              </a:rPr>
+              <a:t>containers</a:t>
+            </a:r>
+            <a:r>
+              <a:rPr lang="en-GB" sz="2000" dirty="0">
+                <a:solidFill>
+                  <a:srgbClr val="D4D4D4"/>
+                </a:solidFill>
+                <a:latin typeface="Consolas" panose="020B0609020204030204" pitchFamily="49" charset="0"/>
+              </a:rPr>
+              <a:t>:</a:t>
+            </a:r>
+          </a:p>
+          <a:p>
+            <a:r>
+              <a:rPr lang="en-GB" sz="2000" dirty="0">
+                <a:solidFill>
+                  <a:srgbClr val="D4D4D4"/>
+                </a:solidFill>
+                <a:latin typeface="Consolas" panose="020B0609020204030204" pitchFamily="49" charset="0"/>
+              </a:rPr>
+              <a:t>  - </a:t>
+            </a:r>
+            <a:r>
+              <a:rPr lang="en-GB" sz="2000" dirty="0">
+                <a:solidFill>
+                  <a:srgbClr val="569CD6"/>
+                </a:solidFill>
+                <a:latin typeface="Consolas" panose="020B0609020204030204" pitchFamily="49" charset="0"/>
+              </a:rPr>
+              <a:t>name</a:t>
+            </a:r>
+            <a:r>
+              <a:rPr lang="en-GB" sz="2000" dirty="0">
+                <a:solidFill>
+                  <a:srgbClr val="D4D4D4"/>
+                </a:solidFill>
+                <a:latin typeface="Consolas" panose="020B0609020204030204" pitchFamily="49" charset="0"/>
+              </a:rPr>
+              <a:t>: </a:t>
+            </a:r>
+            <a:r>
+              <a:rPr lang="en-GB" sz="2000" dirty="0">
+                <a:solidFill>
+                  <a:srgbClr val="CE9178"/>
+                </a:solidFill>
+                <a:latin typeface="Consolas" panose="020B0609020204030204" pitchFamily="49" charset="0"/>
+              </a:rPr>
+              <a:t>simple-</a:t>
+            </a:r>
+            <a:r>
+              <a:rPr lang="en-GB" sz="2000" dirty="0" err="1">
+                <a:solidFill>
+                  <a:srgbClr val="CE9178"/>
+                </a:solidFill>
+                <a:latin typeface="Consolas" panose="020B0609020204030204" pitchFamily="49" charset="0"/>
+              </a:rPr>
+              <a:t>webapp</a:t>
+            </a:r>
+            <a:r>
+              <a:rPr lang="en-GB" sz="2000" dirty="0">
+                <a:solidFill>
+                  <a:srgbClr val="CE9178"/>
+                </a:solidFill>
+                <a:latin typeface="Consolas" panose="020B0609020204030204" pitchFamily="49" charset="0"/>
+              </a:rPr>
+              <a:t>-</a:t>
+            </a:r>
+            <a:r>
+              <a:rPr lang="en-GB" sz="2000" dirty="0" err="1">
+                <a:solidFill>
+                  <a:srgbClr val="CE9178"/>
+                </a:solidFill>
+                <a:latin typeface="Consolas" panose="020B0609020204030204" pitchFamily="49" charset="0"/>
+              </a:rPr>
+              <a:t>color</a:t>
+            </a:r>
+            <a:endParaRPr lang="en-GB" sz="2000" dirty="0">
+              <a:solidFill>
+                <a:srgbClr val="D4D4D4"/>
+              </a:solidFill>
+              <a:latin typeface="Consolas" panose="020B0609020204030204" pitchFamily="49" charset="0"/>
+            </a:endParaRPr>
+          </a:p>
+          <a:p>
+            <a:r>
+              <a:rPr lang="en-GB" sz="2000" dirty="0">
+                <a:solidFill>
+                  <a:srgbClr val="D4D4D4"/>
+                </a:solidFill>
+                <a:latin typeface="Consolas" panose="020B0609020204030204" pitchFamily="49" charset="0"/>
+              </a:rPr>
+              <a:t>    </a:t>
+            </a:r>
+            <a:r>
+              <a:rPr lang="en-GB" sz="2000" dirty="0">
+                <a:solidFill>
+                  <a:srgbClr val="569CD6"/>
+                </a:solidFill>
+                <a:latin typeface="Consolas" panose="020B0609020204030204" pitchFamily="49" charset="0"/>
+              </a:rPr>
+              <a:t>image</a:t>
+            </a:r>
+            <a:r>
+              <a:rPr lang="en-GB" sz="2000" dirty="0">
+                <a:solidFill>
+                  <a:srgbClr val="D4D4D4"/>
+                </a:solidFill>
+                <a:latin typeface="Consolas" panose="020B0609020204030204" pitchFamily="49" charset="0"/>
+              </a:rPr>
+              <a:t>: </a:t>
+            </a:r>
+            <a:r>
+              <a:rPr lang="en-GB" sz="2000" dirty="0" smtClean="0">
+                <a:solidFill>
+                  <a:srgbClr val="CE9178"/>
+                </a:solidFill>
+                <a:latin typeface="Consolas" panose="020B0609020204030204" pitchFamily="49" charset="0"/>
+              </a:rPr>
+              <a:t>simple-</a:t>
+            </a:r>
+            <a:r>
+              <a:rPr lang="en-GB" sz="2000" dirty="0" err="1" smtClean="0">
+                <a:solidFill>
+                  <a:srgbClr val="CE9178"/>
+                </a:solidFill>
+                <a:latin typeface="Consolas" panose="020B0609020204030204" pitchFamily="49" charset="0"/>
+              </a:rPr>
+              <a:t>webapp</a:t>
+            </a:r>
+            <a:r>
+              <a:rPr lang="en-GB" sz="2000" dirty="0" smtClean="0">
+                <a:solidFill>
+                  <a:srgbClr val="CE9178"/>
+                </a:solidFill>
+                <a:latin typeface="Consolas" panose="020B0609020204030204" pitchFamily="49" charset="0"/>
+              </a:rPr>
+              <a:t>-</a:t>
+            </a:r>
+            <a:r>
+              <a:rPr lang="en-GB" sz="2000" dirty="0" err="1" smtClean="0">
+                <a:solidFill>
+                  <a:srgbClr val="CE9178"/>
+                </a:solidFill>
+                <a:latin typeface="Consolas" panose="020B0609020204030204" pitchFamily="49" charset="0"/>
+              </a:rPr>
+              <a:t>color</a:t>
+            </a:r>
+            <a:endParaRPr lang="en-GB" sz="2000" dirty="0">
+              <a:solidFill>
+                <a:srgbClr val="D4D4D4"/>
+              </a:solidFill>
+              <a:latin typeface="Consolas" panose="020B0609020204030204" pitchFamily="49" charset="0"/>
+            </a:endParaRPr>
+          </a:p>
+          <a:p>
+            <a:r>
+              <a:rPr lang="en-GB" sz="2000" dirty="0">
+                <a:solidFill>
+                  <a:srgbClr val="D4D4D4"/>
+                </a:solidFill>
+                <a:latin typeface="Consolas" panose="020B0609020204030204" pitchFamily="49" charset="0"/>
+              </a:rPr>
+              <a:t>    </a:t>
+            </a:r>
+            <a:r>
+              <a:rPr lang="en-GB" sz="2000" dirty="0" err="1">
+                <a:solidFill>
+                  <a:srgbClr val="569CD6"/>
+                </a:solidFill>
+                <a:latin typeface="Consolas" panose="020B0609020204030204" pitchFamily="49" charset="0"/>
+              </a:rPr>
+              <a:t>env</a:t>
+            </a:r>
+            <a:r>
+              <a:rPr lang="en-GB" sz="2000" dirty="0">
+                <a:solidFill>
+                  <a:srgbClr val="D4D4D4"/>
+                </a:solidFill>
+                <a:latin typeface="Consolas" panose="020B0609020204030204" pitchFamily="49" charset="0"/>
+              </a:rPr>
+              <a:t>: </a:t>
+            </a:r>
+          </a:p>
+          <a:p>
+            <a:r>
+              <a:rPr lang="en-GB" sz="2000" dirty="0">
+                <a:solidFill>
+                  <a:srgbClr val="D4D4D4"/>
+                </a:solidFill>
+                <a:latin typeface="Consolas" panose="020B0609020204030204" pitchFamily="49" charset="0"/>
+              </a:rPr>
+              <a:t>    - </a:t>
+            </a:r>
+            <a:r>
+              <a:rPr lang="en-GB" sz="2000" dirty="0">
+                <a:solidFill>
+                  <a:srgbClr val="569CD6"/>
+                </a:solidFill>
+                <a:latin typeface="Consolas" panose="020B0609020204030204" pitchFamily="49" charset="0"/>
+              </a:rPr>
+              <a:t>name</a:t>
+            </a:r>
+            <a:r>
+              <a:rPr lang="en-GB" sz="2000" dirty="0">
+                <a:solidFill>
+                  <a:srgbClr val="D4D4D4"/>
+                </a:solidFill>
+                <a:latin typeface="Consolas" panose="020B0609020204030204" pitchFamily="49" charset="0"/>
+              </a:rPr>
+              <a:t>: </a:t>
+            </a:r>
+            <a:r>
+              <a:rPr lang="en-GB" sz="2000" dirty="0">
+                <a:solidFill>
+                  <a:srgbClr val="CE9178"/>
+                </a:solidFill>
+                <a:latin typeface="Consolas" panose="020B0609020204030204" pitchFamily="49" charset="0"/>
+              </a:rPr>
+              <a:t>APP_COLOR</a:t>
+            </a:r>
+            <a:endParaRPr lang="en-GB" sz="2000" dirty="0">
+              <a:solidFill>
+                <a:srgbClr val="D4D4D4"/>
+              </a:solidFill>
+              <a:latin typeface="Consolas" panose="020B0609020204030204" pitchFamily="49" charset="0"/>
+            </a:endParaRPr>
+          </a:p>
+          <a:p>
+            <a:r>
+              <a:rPr lang="en-GB" sz="2000" dirty="0">
+                <a:solidFill>
+                  <a:srgbClr val="D4D4D4"/>
+                </a:solidFill>
+                <a:latin typeface="Consolas" panose="020B0609020204030204" pitchFamily="49" charset="0"/>
+              </a:rPr>
+              <a:t>      </a:t>
+            </a:r>
+            <a:r>
+              <a:rPr lang="en-GB" sz="2000" dirty="0">
+                <a:solidFill>
+                  <a:srgbClr val="569CD6"/>
+                </a:solidFill>
+                <a:latin typeface="Consolas" panose="020B0609020204030204" pitchFamily="49" charset="0"/>
+              </a:rPr>
+              <a:t>value</a:t>
+            </a:r>
+            <a:r>
+              <a:rPr lang="en-GB" sz="2000" dirty="0">
+                <a:solidFill>
+                  <a:srgbClr val="D4D4D4"/>
+                </a:solidFill>
+                <a:latin typeface="Consolas" panose="020B0609020204030204" pitchFamily="49" charset="0"/>
+              </a:rPr>
+              <a:t>: </a:t>
+            </a:r>
+            <a:r>
+              <a:rPr lang="en-GB" sz="2000" dirty="0">
+                <a:solidFill>
+                  <a:srgbClr val="CE9178"/>
+                </a:solidFill>
+                <a:latin typeface="Consolas" panose="020B0609020204030204" pitchFamily="49" charset="0"/>
+              </a:rPr>
+              <a:t>"blue"</a:t>
+            </a:r>
+            <a:endParaRPr lang="en-GB" sz="2000" dirty="0">
+              <a:solidFill>
+                <a:srgbClr val="D4D4D4"/>
+              </a:solidFill>
+              <a:latin typeface="Consolas" panose="020B0609020204030204" pitchFamily="49" charset="0"/>
+            </a:endParaRPr>
+          </a:p>
+          <a:p>
+            <a:r>
+              <a:rPr lang="en-GB" sz="2000" dirty="0">
+                <a:solidFill>
+                  <a:srgbClr val="D4D4D4"/>
+                </a:solidFill>
+                <a:latin typeface="Consolas" panose="020B0609020204030204" pitchFamily="49" charset="0"/>
+              </a:rPr>
+              <a:t>    - </a:t>
+            </a:r>
+            <a:r>
+              <a:rPr lang="en-GB" sz="2000" dirty="0">
+                <a:solidFill>
+                  <a:srgbClr val="569CD6"/>
+                </a:solidFill>
+                <a:latin typeface="Consolas" panose="020B0609020204030204" pitchFamily="49" charset="0"/>
+              </a:rPr>
+              <a:t>name</a:t>
+            </a:r>
+            <a:r>
+              <a:rPr lang="en-GB" sz="2000" dirty="0">
+                <a:solidFill>
+                  <a:srgbClr val="D4D4D4"/>
+                </a:solidFill>
+                <a:latin typeface="Consolas" panose="020B0609020204030204" pitchFamily="49" charset="0"/>
+              </a:rPr>
+              <a:t>: </a:t>
+            </a:r>
+            <a:r>
+              <a:rPr lang="en-GB" sz="2000" dirty="0">
+                <a:solidFill>
+                  <a:srgbClr val="CE9178"/>
+                </a:solidFill>
+                <a:latin typeface="Consolas" panose="020B0609020204030204" pitchFamily="49" charset="0"/>
+              </a:rPr>
+              <a:t>APP_PORT</a:t>
+            </a:r>
+            <a:endParaRPr lang="en-GB" sz="2000" dirty="0">
+              <a:solidFill>
+                <a:srgbClr val="D4D4D4"/>
+              </a:solidFill>
+              <a:latin typeface="Consolas" panose="020B0609020204030204" pitchFamily="49" charset="0"/>
+            </a:endParaRPr>
+          </a:p>
+          <a:p>
+            <a:r>
+              <a:rPr lang="en-GB" sz="2000" dirty="0">
+                <a:solidFill>
+                  <a:srgbClr val="D4D4D4"/>
+                </a:solidFill>
+                <a:latin typeface="Consolas" panose="020B0609020204030204" pitchFamily="49" charset="0"/>
+              </a:rPr>
+              <a:t>      </a:t>
+            </a:r>
+            <a:r>
+              <a:rPr lang="en-GB" sz="2000" dirty="0">
+                <a:solidFill>
+                  <a:srgbClr val="569CD6"/>
+                </a:solidFill>
+                <a:latin typeface="Consolas" panose="020B0609020204030204" pitchFamily="49" charset="0"/>
+              </a:rPr>
+              <a:t>value</a:t>
+            </a:r>
+            <a:r>
+              <a:rPr lang="en-GB" sz="2000" dirty="0">
+                <a:solidFill>
+                  <a:srgbClr val="D4D4D4"/>
+                </a:solidFill>
+                <a:latin typeface="Consolas" panose="020B0609020204030204" pitchFamily="49" charset="0"/>
+              </a:rPr>
+              <a:t>: </a:t>
+            </a:r>
+            <a:r>
+              <a:rPr lang="en-GB" sz="2000" dirty="0">
+                <a:solidFill>
+                  <a:srgbClr val="CE9178"/>
+                </a:solidFill>
+                <a:latin typeface="Consolas" panose="020B0609020204030204" pitchFamily="49" charset="0"/>
+              </a:rPr>
+              <a:t>"8080"</a:t>
+            </a:r>
+            <a:endParaRPr lang="en-GB" sz="2000" b="0" dirty="0">
+              <a:solidFill>
+                <a:srgbClr val="D4D4D4"/>
+              </a:solidFill>
+              <a:effectLst/>
+              <a:latin typeface="Consolas" panose="020B0609020204030204" pitchFamily="49" charset="0"/>
+            </a:endParaRPr>
+          </a:p>
+        </p:txBody>
+      </p:sp>
+      <p:sp>
+        <p:nvSpPr>
+          <p:cNvPr id="12" name="Rectangle 11"/>
+          <p:cNvSpPr/>
+          <p:nvPr/>
+        </p:nvSpPr>
+        <p:spPr>
+          <a:xfrm>
+            <a:off x="7248525" y="3133726"/>
+            <a:ext cx="2882596" cy="1504949"/>
+          </a:xfrm>
+          <a:prstGeom prst="rect">
+            <a:avLst/>
+          </a:prstGeom>
+          <a:noFill/>
+          <a:ln w="19050">
+            <a:solidFill>
+              <a:schemeClr val="accent2"/>
+            </a:solidFill>
+            <a:prstDash val="sysDash"/>
+          </a:ln>
+        </p:spPr>
+        <p:style>
+          <a:lnRef idx="2">
+            <a:schemeClr val="accent1">
+              <a:shade val="50000"/>
+            </a:schemeClr>
+          </a:lnRef>
+          <a:fillRef idx="1">
+            <a:schemeClr val="accent1"/>
+          </a:fillRef>
+          <a:effectRef idx="0">
+            <a:schemeClr val="accent1"/>
+          </a:effectRef>
+          <a:fontRef idx="minor">
+            <a:schemeClr val="lt1"/>
+          </a:fontRef>
+        </p:style>
+        <p:txBody>
+          <a:bodyPr rtlCol="0" anchor="ctr"/>
+          <a:lstStyle/>
+          <a:p>
+            <a:pPr algn="ctr"/>
+            <a:endParaRPr lang="en-GB"/>
+          </a:p>
+        </p:txBody>
+      </p:sp>
+      <p:sp>
+        <p:nvSpPr>
+          <p:cNvPr id="14" name="Snip Single Corner Rectangle 13"/>
+          <p:cNvSpPr/>
+          <p:nvPr/>
+        </p:nvSpPr>
+        <p:spPr>
+          <a:xfrm>
+            <a:off x="6598349" y="419100"/>
+            <a:ext cx="2038350" cy="348255"/>
+          </a:xfrm>
+          <a:prstGeom prst="snip1Rect">
+            <a:avLst/>
+          </a:prstGeom>
+        </p:spPr>
+        <p:style>
+          <a:lnRef idx="2">
+            <a:schemeClr val="dk1">
+              <a:shade val="50000"/>
+            </a:schemeClr>
+          </a:lnRef>
+          <a:fillRef idx="1">
+            <a:schemeClr val="dk1"/>
+          </a:fillRef>
+          <a:effectRef idx="0">
+            <a:schemeClr val="dk1"/>
+          </a:effectRef>
+          <a:fontRef idx="minor">
+            <a:schemeClr val="lt1"/>
+          </a:fontRef>
+        </p:style>
+        <p:txBody>
+          <a:bodyPr rtlCol="0" anchor="ctr"/>
+          <a:lstStyle/>
+          <a:p>
+            <a:pPr algn="ctr"/>
+            <a:r>
+              <a:rPr lang="en-US" dirty="0" err="1" smtClean="0"/>
+              <a:t>pod.yml</a:t>
+            </a:r>
+            <a:endParaRPr lang="en-GB" dirty="0"/>
+          </a:p>
+        </p:txBody>
+      </p:sp>
+      <p:sp>
+        <p:nvSpPr>
+          <p:cNvPr id="10" name="Content Placeholder 2"/>
+          <p:cNvSpPr>
+            <a:spLocks noGrp="1"/>
+          </p:cNvSpPr>
+          <p:nvPr>
+            <p:ph idx="1"/>
+          </p:nvPr>
+        </p:nvSpPr>
+        <p:spPr>
+          <a:xfrm>
+            <a:off x="838200" y="1825625"/>
+            <a:ext cx="2581275" cy="4351338"/>
+          </a:xfrm>
+        </p:spPr>
+        <p:txBody>
+          <a:bodyPr/>
+          <a:lstStyle/>
+          <a:p>
+            <a:pPr marL="0" indent="0">
+              <a:buNone/>
+            </a:pPr>
+            <a:r>
+              <a:rPr lang="en-US" dirty="0" smtClean="0"/>
+              <a:t>s</a:t>
+            </a:r>
+            <a:endParaRPr lang="en-GB" dirty="0"/>
+          </a:p>
+        </p:txBody>
+      </p:sp>
+    </p:spTree>
+    <p:extLst>
+      <p:ext uri="{BB962C8B-B14F-4D97-AF65-F5344CB8AC3E}">
+        <p14:creationId xmlns:p14="http://schemas.microsoft.com/office/powerpoint/2010/main" val="2471902898"/>
+      </p:ext>
+    </p:extLst>
+  </p:cSld>
+  <p:clrMapOvr>
+    <a:masterClrMapping/>
+  </p:clrMapOvr>
+  <p:timing>
+    <p:tnLst>
+      <p:par>
+        <p:cTn id="1" dur="indefinite" restart="never" nodeType="tmRoot"/>
+      </p:par>
+    </p:tnLst>
+  </p:timing>
 </p:sld>
 </file>
 

</xml_diff>

<commit_message>
S7 Inject Data Into Applications formatting
</commit_message>
<xml_diff>
--- a/docs/images/slides_images.pptx
+++ b/docs/images/slides_images.pptx
@@ -13,8 +13,9 @@
     <p:sldId id="261" r:id="rId7"/>
     <p:sldId id="262" r:id="rId8"/>
     <p:sldId id="266" r:id="rId9"/>
-    <p:sldId id="268" r:id="rId10"/>
-    <p:sldId id="269" r:id="rId11"/>
+    <p:sldId id="270" r:id="rId10"/>
+    <p:sldId id="268" r:id="rId11"/>
+    <p:sldId id="269" r:id="rId12"/>
   </p:sldIdLst>
   <p:sldSz cx="12192000" cy="6858000"/>
   <p:notesSz cx="6858000" cy="9144000"/>
@@ -3041,6 +3042,768 @@
 </file>
 
 <file path=ppt/slides/slide10.xml><?xml version="1.0" encoding="utf-8"?>
+<p:sld xmlns:a="http://schemas.openxmlformats.org/drawingml/2006/main" xmlns:r="http://schemas.openxmlformats.org/officeDocument/2006/relationships" xmlns:p="http://schemas.openxmlformats.org/presentationml/2006/main">
+  <p:cSld>
+    <p:spTree>
+      <p:nvGrpSpPr>
+        <p:cNvPr id="1" name=""/>
+        <p:cNvGrpSpPr/>
+        <p:nvPr/>
+      </p:nvGrpSpPr>
+      <p:grpSpPr>
+        <a:xfrm>
+          <a:off x="0" y="0"/>
+          <a:ext cx="0" cy="0"/>
+          <a:chOff x="0" y="0"/>
+          <a:chExt cx="0" cy="0"/>
+        </a:xfrm>
+      </p:grpSpPr>
+      <p:sp>
+        <p:nvSpPr>
+          <p:cNvPr id="9" name="Title 1"/>
+          <p:cNvSpPr txBox="1">
+            <a:spLocks/>
+          </p:cNvSpPr>
+          <p:nvPr/>
+        </p:nvSpPr>
+        <p:spPr>
+          <a:xfrm>
+            <a:off x="6592481" y="748306"/>
+            <a:ext cx="4532720" cy="5576294"/>
+          </a:xfrm>
+          <a:prstGeom prst="rect">
+            <a:avLst/>
+          </a:prstGeom>
+          <a:solidFill>
+            <a:schemeClr val="tx1"/>
+          </a:solidFill>
+        </p:spPr>
+        <p:txBody>
+          <a:bodyPr vert="horz" lIns="180000" tIns="180000" rIns="91440" bIns="45720" rtlCol="0" anchor="t">
+            <a:noAutofit/>
+          </a:bodyPr>
+          <a:lstStyle>
+            <a:lvl1pPr algn="l" defTabSz="914400" rtl="0" eaLnBrk="1" latinLnBrk="0" hangingPunct="1">
+              <a:lnSpc>
+                <a:spcPct val="90000"/>
+              </a:lnSpc>
+              <a:spcBef>
+                <a:spcPct val="0"/>
+              </a:spcBef>
+              <a:buNone/>
+              <a:defRPr sz="4400" kern="1200">
+                <a:solidFill>
+                  <a:schemeClr val="tx1"/>
+                </a:solidFill>
+                <a:latin typeface="+mj-lt"/>
+                <a:ea typeface="+mj-ea"/>
+                <a:cs typeface="+mj-cs"/>
+              </a:defRPr>
+            </a:lvl1pPr>
+          </a:lstStyle>
+          <a:p>
+            <a:r>
+              <a:rPr lang="en-GB" sz="2000" dirty="0" err="1">
+                <a:solidFill>
+                  <a:srgbClr val="569CD6"/>
+                </a:solidFill>
+                <a:latin typeface="Consolas" panose="020B0609020204030204" pitchFamily="49" charset="0"/>
+              </a:rPr>
+              <a:t>apiVersion</a:t>
+            </a:r>
+            <a:r>
+              <a:rPr lang="en-GB" sz="2000" dirty="0">
+                <a:solidFill>
+                  <a:srgbClr val="D4D4D4"/>
+                </a:solidFill>
+                <a:latin typeface="Consolas" panose="020B0609020204030204" pitchFamily="49" charset="0"/>
+              </a:rPr>
+              <a:t>: </a:t>
+            </a:r>
+            <a:r>
+              <a:rPr lang="en-GB" sz="2000" dirty="0">
+                <a:solidFill>
+                  <a:srgbClr val="CE9178"/>
+                </a:solidFill>
+                <a:latin typeface="Consolas" panose="020B0609020204030204" pitchFamily="49" charset="0"/>
+              </a:rPr>
+              <a:t>v1</a:t>
+            </a:r>
+            <a:endParaRPr lang="en-GB" sz="2000" dirty="0">
+              <a:solidFill>
+                <a:srgbClr val="D4D4D4"/>
+              </a:solidFill>
+              <a:latin typeface="Consolas" panose="020B0609020204030204" pitchFamily="49" charset="0"/>
+            </a:endParaRPr>
+          </a:p>
+          <a:p>
+            <a:r>
+              <a:rPr lang="en-GB" sz="2000" dirty="0">
+                <a:solidFill>
+                  <a:srgbClr val="569CD6"/>
+                </a:solidFill>
+                <a:latin typeface="Consolas" panose="020B0609020204030204" pitchFamily="49" charset="0"/>
+              </a:rPr>
+              <a:t>kind</a:t>
+            </a:r>
+            <a:r>
+              <a:rPr lang="en-GB" sz="2000" dirty="0">
+                <a:solidFill>
+                  <a:srgbClr val="D4D4D4"/>
+                </a:solidFill>
+                <a:latin typeface="Consolas" panose="020B0609020204030204" pitchFamily="49" charset="0"/>
+              </a:rPr>
+              <a:t>: </a:t>
+            </a:r>
+            <a:r>
+              <a:rPr lang="en-GB" sz="2000" dirty="0">
+                <a:solidFill>
+                  <a:srgbClr val="CE9178"/>
+                </a:solidFill>
+                <a:latin typeface="Consolas" panose="020B0609020204030204" pitchFamily="49" charset="0"/>
+              </a:rPr>
+              <a:t>Pod</a:t>
+            </a:r>
+            <a:endParaRPr lang="en-GB" sz="2000" dirty="0">
+              <a:solidFill>
+                <a:srgbClr val="D4D4D4"/>
+              </a:solidFill>
+              <a:latin typeface="Consolas" panose="020B0609020204030204" pitchFamily="49" charset="0"/>
+            </a:endParaRPr>
+          </a:p>
+          <a:p>
+            <a:r>
+              <a:rPr lang="en-GB" sz="2000" dirty="0">
+                <a:solidFill>
+                  <a:srgbClr val="569CD6"/>
+                </a:solidFill>
+                <a:latin typeface="Consolas" panose="020B0609020204030204" pitchFamily="49" charset="0"/>
+              </a:rPr>
+              <a:t>metadata</a:t>
+            </a:r>
+            <a:r>
+              <a:rPr lang="en-GB" sz="2000" dirty="0">
+                <a:solidFill>
+                  <a:srgbClr val="D4D4D4"/>
+                </a:solidFill>
+                <a:latin typeface="Consolas" panose="020B0609020204030204" pitchFamily="49" charset="0"/>
+              </a:rPr>
+              <a:t>:</a:t>
+            </a:r>
+          </a:p>
+          <a:p>
+            <a:r>
+              <a:rPr lang="en-GB" sz="2000" dirty="0">
+                <a:solidFill>
+                  <a:srgbClr val="D4D4D4"/>
+                </a:solidFill>
+                <a:latin typeface="Consolas" panose="020B0609020204030204" pitchFamily="49" charset="0"/>
+              </a:rPr>
+              <a:t>  </a:t>
+            </a:r>
+            <a:r>
+              <a:rPr lang="en-GB" sz="2000" dirty="0">
+                <a:solidFill>
+                  <a:srgbClr val="569CD6"/>
+                </a:solidFill>
+                <a:latin typeface="Consolas" panose="020B0609020204030204" pitchFamily="49" charset="0"/>
+              </a:rPr>
+              <a:t>name</a:t>
+            </a:r>
+            <a:r>
+              <a:rPr lang="en-GB" sz="2000" dirty="0">
+                <a:solidFill>
+                  <a:srgbClr val="D4D4D4"/>
+                </a:solidFill>
+                <a:latin typeface="Consolas" panose="020B0609020204030204" pitchFamily="49" charset="0"/>
+              </a:rPr>
+              <a:t>: </a:t>
+            </a:r>
+            <a:r>
+              <a:rPr lang="en-GB" sz="2000" dirty="0">
+                <a:solidFill>
+                  <a:srgbClr val="CE9178"/>
+                </a:solidFill>
+                <a:latin typeface="Consolas" panose="020B0609020204030204" pitchFamily="49" charset="0"/>
+              </a:rPr>
+              <a:t>simple-</a:t>
+            </a:r>
+            <a:r>
+              <a:rPr lang="en-GB" sz="2000" dirty="0" err="1">
+                <a:solidFill>
+                  <a:srgbClr val="CE9178"/>
+                </a:solidFill>
+                <a:latin typeface="Consolas" panose="020B0609020204030204" pitchFamily="49" charset="0"/>
+              </a:rPr>
+              <a:t>webapp</a:t>
+            </a:r>
+            <a:r>
+              <a:rPr lang="en-GB" sz="2000" dirty="0">
+                <a:solidFill>
+                  <a:srgbClr val="CE9178"/>
+                </a:solidFill>
+                <a:latin typeface="Consolas" panose="020B0609020204030204" pitchFamily="49" charset="0"/>
+              </a:rPr>
+              <a:t>-</a:t>
+            </a:r>
+            <a:r>
+              <a:rPr lang="en-GB" sz="2000" dirty="0" err="1">
+                <a:solidFill>
+                  <a:srgbClr val="CE9178"/>
+                </a:solidFill>
+                <a:latin typeface="Consolas" panose="020B0609020204030204" pitchFamily="49" charset="0"/>
+              </a:rPr>
+              <a:t>color</a:t>
+            </a:r>
+            <a:endParaRPr lang="en-GB" sz="2000" dirty="0">
+              <a:solidFill>
+                <a:srgbClr val="D4D4D4"/>
+              </a:solidFill>
+              <a:latin typeface="Consolas" panose="020B0609020204030204" pitchFamily="49" charset="0"/>
+            </a:endParaRPr>
+          </a:p>
+          <a:p>
+            <a:r>
+              <a:rPr lang="en-GB" sz="2000" dirty="0">
+                <a:solidFill>
+                  <a:srgbClr val="569CD6"/>
+                </a:solidFill>
+                <a:latin typeface="Consolas" panose="020B0609020204030204" pitchFamily="49" charset="0"/>
+              </a:rPr>
+              <a:t>spec</a:t>
+            </a:r>
+            <a:r>
+              <a:rPr lang="en-GB" sz="2000" dirty="0">
+                <a:solidFill>
+                  <a:srgbClr val="D4D4D4"/>
+                </a:solidFill>
+                <a:latin typeface="Consolas" panose="020B0609020204030204" pitchFamily="49" charset="0"/>
+              </a:rPr>
+              <a:t>:</a:t>
+            </a:r>
+          </a:p>
+          <a:p>
+            <a:r>
+              <a:rPr lang="en-GB" sz="2000" dirty="0">
+                <a:solidFill>
+                  <a:srgbClr val="D4D4D4"/>
+                </a:solidFill>
+                <a:latin typeface="Consolas" panose="020B0609020204030204" pitchFamily="49" charset="0"/>
+              </a:rPr>
+              <a:t>  </a:t>
+            </a:r>
+            <a:r>
+              <a:rPr lang="en-GB" sz="2000" dirty="0">
+                <a:solidFill>
+                  <a:srgbClr val="569CD6"/>
+                </a:solidFill>
+                <a:latin typeface="Consolas" panose="020B0609020204030204" pitchFamily="49" charset="0"/>
+              </a:rPr>
+              <a:t>containers</a:t>
+            </a:r>
+            <a:r>
+              <a:rPr lang="en-GB" sz="2000" dirty="0">
+                <a:solidFill>
+                  <a:srgbClr val="D4D4D4"/>
+                </a:solidFill>
+                <a:latin typeface="Consolas" panose="020B0609020204030204" pitchFamily="49" charset="0"/>
+              </a:rPr>
+              <a:t>:</a:t>
+            </a:r>
+          </a:p>
+          <a:p>
+            <a:r>
+              <a:rPr lang="en-GB" sz="2000" dirty="0">
+                <a:solidFill>
+                  <a:srgbClr val="D4D4D4"/>
+                </a:solidFill>
+                <a:latin typeface="Consolas" panose="020B0609020204030204" pitchFamily="49" charset="0"/>
+              </a:rPr>
+              <a:t>  - </a:t>
+            </a:r>
+            <a:r>
+              <a:rPr lang="en-GB" sz="2000" dirty="0">
+                <a:solidFill>
+                  <a:srgbClr val="569CD6"/>
+                </a:solidFill>
+                <a:latin typeface="Consolas" panose="020B0609020204030204" pitchFamily="49" charset="0"/>
+              </a:rPr>
+              <a:t>name</a:t>
+            </a:r>
+            <a:r>
+              <a:rPr lang="en-GB" sz="2000" dirty="0">
+                <a:solidFill>
+                  <a:srgbClr val="D4D4D4"/>
+                </a:solidFill>
+                <a:latin typeface="Consolas" panose="020B0609020204030204" pitchFamily="49" charset="0"/>
+              </a:rPr>
+              <a:t>: </a:t>
+            </a:r>
+            <a:r>
+              <a:rPr lang="en-GB" sz="2000" dirty="0">
+                <a:solidFill>
+                  <a:srgbClr val="CE9178"/>
+                </a:solidFill>
+                <a:latin typeface="Consolas" panose="020B0609020204030204" pitchFamily="49" charset="0"/>
+              </a:rPr>
+              <a:t>simple-</a:t>
+            </a:r>
+            <a:r>
+              <a:rPr lang="en-GB" sz="2000" dirty="0" err="1">
+                <a:solidFill>
+                  <a:srgbClr val="CE9178"/>
+                </a:solidFill>
+                <a:latin typeface="Consolas" panose="020B0609020204030204" pitchFamily="49" charset="0"/>
+              </a:rPr>
+              <a:t>webapp</a:t>
+            </a:r>
+            <a:r>
+              <a:rPr lang="en-GB" sz="2000" dirty="0">
+                <a:solidFill>
+                  <a:srgbClr val="CE9178"/>
+                </a:solidFill>
+                <a:latin typeface="Consolas" panose="020B0609020204030204" pitchFamily="49" charset="0"/>
+              </a:rPr>
+              <a:t>-</a:t>
+            </a:r>
+            <a:r>
+              <a:rPr lang="en-GB" sz="2000" dirty="0" err="1">
+                <a:solidFill>
+                  <a:srgbClr val="CE9178"/>
+                </a:solidFill>
+                <a:latin typeface="Consolas" panose="020B0609020204030204" pitchFamily="49" charset="0"/>
+              </a:rPr>
+              <a:t>color</a:t>
+            </a:r>
+            <a:endParaRPr lang="en-GB" sz="2000" dirty="0">
+              <a:solidFill>
+                <a:srgbClr val="D4D4D4"/>
+              </a:solidFill>
+              <a:latin typeface="Consolas" panose="020B0609020204030204" pitchFamily="49" charset="0"/>
+            </a:endParaRPr>
+          </a:p>
+          <a:p>
+            <a:r>
+              <a:rPr lang="en-GB" sz="2000" dirty="0">
+                <a:solidFill>
+                  <a:srgbClr val="D4D4D4"/>
+                </a:solidFill>
+                <a:latin typeface="Consolas" panose="020B0609020204030204" pitchFamily="49" charset="0"/>
+              </a:rPr>
+              <a:t>    </a:t>
+            </a:r>
+            <a:r>
+              <a:rPr lang="en-GB" sz="2000" dirty="0">
+                <a:solidFill>
+                  <a:srgbClr val="569CD6"/>
+                </a:solidFill>
+                <a:latin typeface="Consolas" panose="020B0609020204030204" pitchFamily="49" charset="0"/>
+              </a:rPr>
+              <a:t>image</a:t>
+            </a:r>
+            <a:r>
+              <a:rPr lang="en-GB" sz="2000" dirty="0">
+                <a:solidFill>
+                  <a:srgbClr val="D4D4D4"/>
+                </a:solidFill>
+                <a:latin typeface="Consolas" panose="020B0609020204030204" pitchFamily="49" charset="0"/>
+              </a:rPr>
+              <a:t>: </a:t>
+            </a:r>
+            <a:r>
+              <a:rPr lang="en-GB" sz="2000" dirty="0" smtClean="0">
+                <a:solidFill>
+                  <a:srgbClr val="CE9178"/>
+                </a:solidFill>
+                <a:latin typeface="Consolas" panose="020B0609020204030204" pitchFamily="49" charset="0"/>
+              </a:rPr>
+              <a:t>simple-</a:t>
+            </a:r>
+            <a:r>
+              <a:rPr lang="en-GB" sz="2000" dirty="0" err="1" smtClean="0">
+                <a:solidFill>
+                  <a:srgbClr val="CE9178"/>
+                </a:solidFill>
+                <a:latin typeface="Consolas" panose="020B0609020204030204" pitchFamily="49" charset="0"/>
+              </a:rPr>
+              <a:t>webapp</a:t>
+            </a:r>
+            <a:r>
+              <a:rPr lang="en-GB" sz="2000" dirty="0" smtClean="0">
+                <a:solidFill>
+                  <a:srgbClr val="CE9178"/>
+                </a:solidFill>
+                <a:latin typeface="Consolas" panose="020B0609020204030204" pitchFamily="49" charset="0"/>
+              </a:rPr>
+              <a:t>-</a:t>
+            </a:r>
+            <a:r>
+              <a:rPr lang="en-GB" sz="2000" dirty="0" err="1" smtClean="0">
+                <a:solidFill>
+                  <a:srgbClr val="CE9178"/>
+                </a:solidFill>
+                <a:latin typeface="Consolas" panose="020B0609020204030204" pitchFamily="49" charset="0"/>
+              </a:rPr>
+              <a:t>color</a:t>
+            </a:r>
+            <a:endParaRPr lang="en-GB" sz="2000" dirty="0">
+              <a:solidFill>
+                <a:srgbClr val="D4D4D4"/>
+              </a:solidFill>
+              <a:latin typeface="Consolas" panose="020B0609020204030204" pitchFamily="49" charset="0"/>
+            </a:endParaRPr>
+          </a:p>
+          <a:p>
+            <a:r>
+              <a:rPr lang="en-GB" sz="2000" dirty="0">
+                <a:solidFill>
+                  <a:srgbClr val="D4D4D4"/>
+                </a:solidFill>
+                <a:latin typeface="Consolas" panose="020B0609020204030204" pitchFamily="49" charset="0"/>
+              </a:rPr>
+              <a:t>    </a:t>
+            </a:r>
+            <a:r>
+              <a:rPr lang="en-GB" sz="2000" dirty="0" err="1">
+                <a:solidFill>
+                  <a:srgbClr val="569CD6"/>
+                </a:solidFill>
+                <a:latin typeface="Consolas" panose="020B0609020204030204" pitchFamily="49" charset="0"/>
+              </a:rPr>
+              <a:t>env</a:t>
+            </a:r>
+            <a:r>
+              <a:rPr lang="en-GB" sz="2000" dirty="0">
+                <a:solidFill>
+                  <a:srgbClr val="D4D4D4"/>
+                </a:solidFill>
+                <a:latin typeface="Consolas" panose="020B0609020204030204" pitchFamily="49" charset="0"/>
+              </a:rPr>
+              <a:t>: </a:t>
+            </a:r>
+          </a:p>
+          <a:p>
+            <a:r>
+              <a:rPr lang="en-GB" sz="2000" dirty="0">
+                <a:solidFill>
+                  <a:srgbClr val="D4D4D4"/>
+                </a:solidFill>
+                <a:latin typeface="Consolas" panose="020B0609020204030204" pitchFamily="49" charset="0"/>
+              </a:rPr>
+              <a:t>    - </a:t>
+            </a:r>
+            <a:r>
+              <a:rPr lang="en-GB" sz="2000" dirty="0">
+                <a:solidFill>
+                  <a:srgbClr val="569CD6"/>
+                </a:solidFill>
+                <a:latin typeface="Consolas" panose="020B0609020204030204" pitchFamily="49" charset="0"/>
+              </a:rPr>
+              <a:t>name</a:t>
+            </a:r>
+            <a:r>
+              <a:rPr lang="en-GB" sz="2000" dirty="0">
+                <a:solidFill>
+                  <a:srgbClr val="D4D4D4"/>
+                </a:solidFill>
+                <a:latin typeface="Consolas" panose="020B0609020204030204" pitchFamily="49" charset="0"/>
+              </a:rPr>
+              <a:t>: </a:t>
+            </a:r>
+            <a:r>
+              <a:rPr lang="en-GB" sz="2000" dirty="0">
+                <a:solidFill>
+                  <a:srgbClr val="CE9178"/>
+                </a:solidFill>
+                <a:latin typeface="Consolas" panose="020B0609020204030204" pitchFamily="49" charset="0"/>
+              </a:rPr>
+              <a:t>APP_COLOR</a:t>
+            </a:r>
+            <a:endParaRPr lang="en-GB" sz="2000" dirty="0">
+              <a:solidFill>
+                <a:srgbClr val="D4D4D4"/>
+              </a:solidFill>
+              <a:latin typeface="Consolas" panose="020B0609020204030204" pitchFamily="49" charset="0"/>
+            </a:endParaRPr>
+          </a:p>
+          <a:p>
+            <a:r>
+              <a:rPr lang="en-GB" sz="2000" dirty="0">
+                <a:solidFill>
+                  <a:srgbClr val="D4D4D4"/>
+                </a:solidFill>
+                <a:latin typeface="Consolas" panose="020B0609020204030204" pitchFamily="49" charset="0"/>
+              </a:rPr>
+              <a:t>      </a:t>
+            </a:r>
+            <a:r>
+              <a:rPr lang="en-GB" sz="2000" dirty="0">
+                <a:solidFill>
+                  <a:srgbClr val="569CD6"/>
+                </a:solidFill>
+                <a:latin typeface="Consolas" panose="020B0609020204030204" pitchFamily="49" charset="0"/>
+              </a:rPr>
+              <a:t>value</a:t>
+            </a:r>
+            <a:r>
+              <a:rPr lang="en-GB" sz="2000" dirty="0">
+                <a:solidFill>
+                  <a:srgbClr val="D4D4D4"/>
+                </a:solidFill>
+                <a:latin typeface="Consolas" panose="020B0609020204030204" pitchFamily="49" charset="0"/>
+              </a:rPr>
+              <a:t>: </a:t>
+            </a:r>
+            <a:r>
+              <a:rPr lang="en-GB" sz="2000" dirty="0">
+                <a:solidFill>
+                  <a:srgbClr val="CE9178"/>
+                </a:solidFill>
+                <a:latin typeface="Consolas" panose="020B0609020204030204" pitchFamily="49" charset="0"/>
+              </a:rPr>
+              <a:t>"blue"</a:t>
+            </a:r>
+            <a:endParaRPr lang="en-GB" sz="2000" dirty="0">
+              <a:solidFill>
+                <a:srgbClr val="D4D4D4"/>
+              </a:solidFill>
+              <a:latin typeface="Consolas" panose="020B0609020204030204" pitchFamily="49" charset="0"/>
+            </a:endParaRPr>
+          </a:p>
+          <a:p>
+            <a:r>
+              <a:rPr lang="en-GB" sz="2000" dirty="0">
+                <a:solidFill>
+                  <a:srgbClr val="D4D4D4"/>
+                </a:solidFill>
+                <a:latin typeface="Consolas" panose="020B0609020204030204" pitchFamily="49" charset="0"/>
+              </a:rPr>
+              <a:t>    - </a:t>
+            </a:r>
+            <a:r>
+              <a:rPr lang="en-GB" sz="2000" dirty="0">
+                <a:solidFill>
+                  <a:srgbClr val="569CD6"/>
+                </a:solidFill>
+                <a:latin typeface="Consolas" panose="020B0609020204030204" pitchFamily="49" charset="0"/>
+              </a:rPr>
+              <a:t>name</a:t>
+            </a:r>
+            <a:r>
+              <a:rPr lang="en-GB" sz="2000" dirty="0">
+                <a:solidFill>
+                  <a:srgbClr val="D4D4D4"/>
+                </a:solidFill>
+                <a:latin typeface="Consolas" panose="020B0609020204030204" pitchFamily="49" charset="0"/>
+              </a:rPr>
+              <a:t>: </a:t>
+            </a:r>
+            <a:r>
+              <a:rPr lang="en-GB" sz="2000" dirty="0">
+                <a:solidFill>
+                  <a:srgbClr val="CE9178"/>
+                </a:solidFill>
+                <a:latin typeface="Consolas" panose="020B0609020204030204" pitchFamily="49" charset="0"/>
+              </a:rPr>
+              <a:t>APP_PORT</a:t>
+            </a:r>
+            <a:endParaRPr lang="en-GB" sz="2000" dirty="0">
+              <a:solidFill>
+                <a:srgbClr val="D4D4D4"/>
+              </a:solidFill>
+              <a:latin typeface="Consolas" panose="020B0609020204030204" pitchFamily="49" charset="0"/>
+            </a:endParaRPr>
+          </a:p>
+          <a:p>
+            <a:r>
+              <a:rPr lang="en-GB" sz="2000" dirty="0">
+                <a:solidFill>
+                  <a:srgbClr val="D4D4D4"/>
+                </a:solidFill>
+                <a:latin typeface="Consolas" panose="020B0609020204030204" pitchFamily="49" charset="0"/>
+              </a:rPr>
+              <a:t>      </a:t>
+            </a:r>
+            <a:r>
+              <a:rPr lang="en-GB" sz="2000" dirty="0">
+                <a:solidFill>
+                  <a:srgbClr val="569CD6"/>
+                </a:solidFill>
+                <a:latin typeface="Consolas" panose="020B0609020204030204" pitchFamily="49" charset="0"/>
+              </a:rPr>
+              <a:t>value</a:t>
+            </a:r>
+            <a:r>
+              <a:rPr lang="en-GB" sz="2000" dirty="0">
+                <a:solidFill>
+                  <a:srgbClr val="D4D4D4"/>
+                </a:solidFill>
+                <a:latin typeface="Consolas" panose="020B0609020204030204" pitchFamily="49" charset="0"/>
+              </a:rPr>
+              <a:t>: </a:t>
+            </a:r>
+            <a:r>
+              <a:rPr lang="en-GB" sz="2000" dirty="0">
+                <a:solidFill>
+                  <a:srgbClr val="CE9178"/>
+                </a:solidFill>
+                <a:latin typeface="Consolas" panose="020B0609020204030204" pitchFamily="49" charset="0"/>
+              </a:rPr>
+              <a:t>"8080"</a:t>
+            </a:r>
+            <a:endParaRPr lang="en-GB" sz="2000" b="0" dirty="0">
+              <a:solidFill>
+                <a:srgbClr val="D4D4D4"/>
+              </a:solidFill>
+              <a:effectLst/>
+              <a:latin typeface="Consolas" panose="020B0609020204030204" pitchFamily="49" charset="0"/>
+            </a:endParaRPr>
+          </a:p>
+        </p:txBody>
+      </p:sp>
+      <p:sp>
+        <p:nvSpPr>
+          <p:cNvPr id="12" name="Rectangle 11"/>
+          <p:cNvSpPr/>
+          <p:nvPr/>
+        </p:nvSpPr>
+        <p:spPr>
+          <a:xfrm>
+            <a:off x="7248525" y="3133726"/>
+            <a:ext cx="2882596" cy="1504949"/>
+          </a:xfrm>
+          <a:prstGeom prst="rect">
+            <a:avLst/>
+          </a:prstGeom>
+          <a:noFill/>
+          <a:ln w="19050">
+            <a:solidFill>
+              <a:schemeClr val="accent2"/>
+            </a:solidFill>
+            <a:prstDash val="sysDash"/>
+          </a:ln>
+        </p:spPr>
+        <p:style>
+          <a:lnRef idx="2">
+            <a:schemeClr val="accent1">
+              <a:shade val="50000"/>
+            </a:schemeClr>
+          </a:lnRef>
+          <a:fillRef idx="1">
+            <a:schemeClr val="accent1"/>
+          </a:fillRef>
+          <a:effectRef idx="0">
+            <a:schemeClr val="accent1"/>
+          </a:effectRef>
+          <a:fontRef idx="minor">
+            <a:schemeClr val="lt1"/>
+          </a:fontRef>
+        </p:style>
+        <p:txBody>
+          <a:bodyPr rtlCol="0" anchor="ctr"/>
+          <a:lstStyle/>
+          <a:p>
+            <a:pPr algn="ctr"/>
+            <a:endParaRPr lang="en-GB"/>
+          </a:p>
+        </p:txBody>
+      </p:sp>
+      <p:sp>
+        <p:nvSpPr>
+          <p:cNvPr id="14" name="Snip Single Corner Rectangle 13"/>
+          <p:cNvSpPr/>
+          <p:nvPr/>
+        </p:nvSpPr>
+        <p:spPr>
+          <a:xfrm>
+            <a:off x="6598349" y="419100"/>
+            <a:ext cx="2038350" cy="348255"/>
+          </a:xfrm>
+          <a:prstGeom prst="snip1Rect">
+            <a:avLst/>
+          </a:prstGeom>
+        </p:spPr>
+        <p:style>
+          <a:lnRef idx="2">
+            <a:schemeClr val="dk1">
+              <a:shade val="50000"/>
+            </a:schemeClr>
+          </a:lnRef>
+          <a:fillRef idx="1">
+            <a:schemeClr val="dk1"/>
+          </a:fillRef>
+          <a:effectRef idx="0">
+            <a:schemeClr val="dk1"/>
+          </a:effectRef>
+          <a:fontRef idx="minor">
+            <a:schemeClr val="lt1"/>
+          </a:fontRef>
+        </p:style>
+        <p:txBody>
+          <a:bodyPr rtlCol="0" anchor="ctr"/>
+          <a:lstStyle/>
+          <a:p>
+            <a:pPr algn="ctr"/>
+            <a:r>
+              <a:rPr lang="en-US" dirty="0" err="1" smtClean="0"/>
+              <a:t>pod.yml</a:t>
+            </a:r>
+            <a:endParaRPr lang="en-GB" dirty="0"/>
+          </a:p>
+        </p:txBody>
+      </p:sp>
+      <p:sp>
+        <p:nvSpPr>
+          <p:cNvPr id="10" name="Content Placeholder 2"/>
+          <p:cNvSpPr>
+            <a:spLocks noGrp="1"/>
+          </p:cNvSpPr>
+          <p:nvPr>
+            <p:ph idx="1"/>
+          </p:nvPr>
+        </p:nvSpPr>
+        <p:spPr>
+          <a:xfrm>
+            <a:off x="838200" y="1825625"/>
+            <a:ext cx="2581275" cy="4351338"/>
+          </a:xfrm>
+        </p:spPr>
+        <p:txBody>
+          <a:bodyPr/>
+          <a:lstStyle/>
+          <a:p>
+            <a:pPr marL="0" indent="0">
+              <a:buNone/>
+            </a:pPr>
+            <a:r>
+              <a:rPr lang="en-US" dirty="0" smtClean="0"/>
+              <a:t>s</a:t>
+            </a:r>
+            <a:endParaRPr lang="en-GB" dirty="0"/>
+          </a:p>
+        </p:txBody>
+      </p:sp>
+    </p:spTree>
+    <p:extLst>
+      <p:ext uri="{BB962C8B-B14F-4D97-AF65-F5344CB8AC3E}">
+        <p14:creationId xmlns:p14="http://schemas.microsoft.com/office/powerpoint/2010/main" val="2471902898"/>
+      </p:ext>
+    </p:extLst>
+  </p:cSld>
+  <p:clrMapOvr>
+    <a:masterClrMapping/>
+  </p:clrMapOvr>
+  <p:timing>
+    <p:tnLst>
+      <p:par>
+        <p:cTn id="1" dur="indefinite" restart="never" nodeType="tmRoot"/>
+      </p:par>
+    </p:tnLst>
+  </p:timing>
+</p:sld>
+</file>
+
+<file path=ppt/slides/slide11.xml><?xml version="1.0" encoding="utf-8"?>
 <p:sld xmlns:a="http://schemas.openxmlformats.org/drawingml/2006/main" xmlns:r="http://schemas.openxmlformats.org/officeDocument/2006/relationships" xmlns:p="http://schemas.openxmlformats.org/presentationml/2006/main">
   <p:cSld>
     <p:spTree>
@@ -7889,7 +8652,7 @@
         <p:spPr>
           <a:xfrm>
             <a:off x="6592481" y="748306"/>
-            <a:ext cx="4532720" cy="5576294"/>
+            <a:ext cx="4162606" cy="3448556"/>
           </a:xfrm>
           <a:prstGeom prst="rect">
             <a:avLst/>
@@ -7922,6 +8685,11 @@
             </a:lvl1pPr>
           </a:lstStyle>
           <a:p>
+            <a:pPr>
+              <a:lnSpc>
+                <a:spcPct val="100000"/>
+              </a:lnSpc>
+            </a:pPr>
             <a:r>
               <a:rPr lang="en-GB" sz="2000" dirty="0" err="1">
                 <a:solidFill>
@@ -7957,6 +8725,11 @@
             </a:endParaRPr>
           </a:p>
           <a:p>
+            <a:pPr>
+              <a:lnSpc>
+                <a:spcPct val="100000"/>
+              </a:lnSpc>
+            </a:pPr>
             <a:r>
               <a:rPr lang="en-GB" sz="2000" dirty="0">
                 <a:solidFill>
@@ -7992,6 +8765,11 @@
             </a:endParaRPr>
           </a:p>
           <a:p>
+            <a:pPr>
+              <a:lnSpc>
+                <a:spcPct val="100000"/>
+              </a:lnSpc>
+            </a:pPr>
             <a:r>
               <a:rPr lang="en-GB" sz="2000" dirty="0">
                 <a:solidFill>
@@ -8012,6 +8790,11 @@
             </a:r>
           </a:p>
           <a:p>
+            <a:pPr>
+              <a:lnSpc>
+                <a:spcPct val="100000"/>
+              </a:lnSpc>
+            </a:pPr>
             <a:r>
               <a:rPr lang="en-GB" sz="2000" dirty="0">
                 <a:solidFill>
@@ -8040,40 +8823,22 @@
               <a:t>: </a:t>
             </a:r>
             <a:r>
-              <a:rPr lang="en-GB" sz="2000" dirty="0">
+              <a:rPr lang="en-GB" sz="2000" dirty="0" err="1">
                 <a:solidFill>
                   <a:srgbClr val="CE9178"/>
                 </a:solidFill>
                 <a:latin typeface="Consolas" panose="020B0609020204030204" pitchFamily="49" charset="0"/>
               </a:rPr>
-              <a:t>simple-</a:t>
-            </a:r>
-            <a:r>
-              <a:rPr lang="en-GB" sz="2000" dirty="0" err="1">
+              <a:t>ubuntu</a:t>
+            </a:r>
+            <a:r>
+              <a:rPr lang="en-GB" sz="2000" dirty="0">
                 <a:solidFill>
                   <a:srgbClr val="CE9178"/>
                 </a:solidFill>
                 <a:latin typeface="Consolas" panose="020B0609020204030204" pitchFamily="49" charset="0"/>
               </a:rPr>
-              <a:t>webapp</a:t>
-            </a:r>
-            <a:r>
-              <a:rPr lang="en-GB" sz="2000" dirty="0">
-                <a:solidFill>
-                  <a:srgbClr val="CE9178"/>
-                </a:solidFill>
-                <a:latin typeface="Consolas" panose="020B0609020204030204" pitchFamily="49" charset="0"/>
-              </a:rPr>
-              <a:t>-</a:t>
-            </a:r>
-            <a:r>
-              <a:rPr lang="en-GB" sz="2000" dirty="0" err="1">
-                <a:solidFill>
-                  <a:srgbClr val="CE9178"/>
-                </a:solidFill>
-                <a:latin typeface="Consolas" panose="020B0609020204030204" pitchFamily="49" charset="0"/>
-              </a:rPr>
-              <a:t>color</a:t>
+              <a:t>-sleeper-pod</a:t>
             </a:r>
             <a:endParaRPr lang="en-GB" sz="2000" dirty="0">
               <a:solidFill>
@@ -8083,6 +8848,11 @@
             </a:endParaRPr>
           </a:p>
           <a:p>
+            <a:pPr>
+              <a:lnSpc>
+                <a:spcPct val="100000"/>
+              </a:lnSpc>
+            </a:pPr>
             <a:r>
               <a:rPr lang="en-GB" sz="2000" dirty="0">
                 <a:solidFill>
@@ -8103,6 +8873,11 @@
             </a:r>
           </a:p>
           <a:p>
+            <a:pPr>
+              <a:lnSpc>
+                <a:spcPct val="100000"/>
+              </a:lnSpc>
+            </a:pPr>
             <a:r>
               <a:rPr lang="en-GB" sz="2000" dirty="0">
                 <a:solidFill>
@@ -8132,6 +8907,11 @@
             </a:r>
           </a:p>
           <a:p>
+            <a:pPr>
+              <a:lnSpc>
+                <a:spcPct val="100000"/>
+              </a:lnSpc>
+            </a:pPr>
             <a:r>
               <a:rPr lang="en-GB" sz="2000" dirty="0">
                 <a:solidFill>
@@ -8160,40 +8940,22 @@
               <a:t>: </a:t>
             </a:r>
             <a:r>
-              <a:rPr lang="en-GB" sz="2000" dirty="0">
+              <a:rPr lang="en-GB" sz="2000" dirty="0" err="1" smtClean="0">
                 <a:solidFill>
                   <a:srgbClr val="CE9178"/>
                 </a:solidFill>
                 <a:latin typeface="Consolas" panose="020B0609020204030204" pitchFamily="49" charset="0"/>
               </a:rPr>
-              <a:t>simple-</a:t>
-            </a:r>
-            <a:r>
-              <a:rPr lang="en-GB" sz="2000" dirty="0" err="1">
+              <a:t>ubuntu</a:t>
+            </a:r>
+            <a:r>
+              <a:rPr lang="en-GB" sz="2000" dirty="0" smtClean="0">
                 <a:solidFill>
                   <a:srgbClr val="CE9178"/>
                 </a:solidFill>
                 <a:latin typeface="Consolas" panose="020B0609020204030204" pitchFamily="49" charset="0"/>
               </a:rPr>
-              <a:t>webapp</a:t>
-            </a:r>
-            <a:r>
-              <a:rPr lang="en-GB" sz="2000" dirty="0">
-                <a:solidFill>
-                  <a:srgbClr val="CE9178"/>
-                </a:solidFill>
-                <a:latin typeface="Consolas" panose="020B0609020204030204" pitchFamily="49" charset="0"/>
-              </a:rPr>
-              <a:t>-</a:t>
-            </a:r>
-            <a:r>
-              <a:rPr lang="en-GB" sz="2000" dirty="0" err="1">
-                <a:solidFill>
-                  <a:srgbClr val="CE9178"/>
-                </a:solidFill>
-                <a:latin typeface="Consolas" panose="020B0609020204030204" pitchFamily="49" charset="0"/>
-              </a:rPr>
-              <a:t>color</a:t>
+              <a:t>-sleeper</a:t>
             </a:r>
             <a:endParaRPr lang="en-GB" sz="2000" dirty="0">
               <a:solidFill>
@@ -8203,6 +8965,11 @@
             </a:endParaRPr>
           </a:p>
           <a:p>
+            <a:pPr>
+              <a:lnSpc>
+                <a:spcPct val="100000"/>
+              </a:lnSpc>
+            </a:pPr>
             <a:r>
               <a:rPr lang="en-GB" sz="2000" dirty="0">
                 <a:solidFill>
@@ -8231,40 +8998,22 @@
               <a:t>: </a:t>
             </a:r>
             <a:r>
-              <a:rPr lang="en-GB" sz="2000" dirty="0" smtClean="0">
+              <a:rPr lang="en-GB" sz="2000" dirty="0" err="1">
                 <a:solidFill>
                   <a:srgbClr val="CE9178"/>
                 </a:solidFill>
                 <a:latin typeface="Consolas" panose="020B0609020204030204" pitchFamily="49" charset="0"/>
               </a:rPr>
-              <a:t>simple-</a:t>
-            </a:r>
-            <a:r>
-              <a:rPr lang="en-GB" sz="2000" dirty="0" err="1" smtClean="0">
+              <a:t>ubuntu</a:t>
+            </a:r>
+            <a:r>
+              <a:rPr lang="en-GB" sz="2000" dirty="0">
                 <a:solidFill>
                   <a:srgbClr val="CE9178"/>
                 </a:solidFill>
                 <a:latin typeface="Consolas" panose="020B0609020204030204" pitchFamily="49" charset="0"/>
               </a:rPr>
-              <a:t>webapp</a:t>
-            </a:r>
-            <a:r>
-              <a:rPr lang="en-GB" sz="2000" dirty="0" smtClean="0">
-                <a:solidFill>
-                  <a:srgbClr val="CE9178"/>
-                </a:solidFill>
-                <a:latin typeface="Consolas" panose="020B0609020204030204" pitchFamily="49" charset="0"/>
-              </a:rPr>
-              <a:t>-</a:t>
-            </a:r>
-            <a:r>
-              <a:rPr lang="en-GB" sz="2000" dirty="0" err="1" smtClean="0">
-                <a:solidFill>
-                  <a:srgbClr val="CE9178"/>
-                </a:solidFill>
-                <a:latin typeface="Consolas" panose="020B0609020204030204" pitchFamily="49" charset="0"/>
-              </a:rPr>
-              <a:t>color</a:t>
+              <a:t>-sleeper</a:t>
             </a:r>
             <a:endParaRPr lang="en-GB" sz="2000" dirty="0">
               <a:solidFill>
@@ -8274,6 +9023,11 @@
             </a:endParaRPr>
           </a:p>
           <a:p>
+            <a:pPr>
+              <a:lnSpc>
+                <a:spcPct val="100000"/>
+              </a:lnSpc>
+            </a:pPr>
             <a:r>
               <a:rPr lang="en-GB" sz="2000" dirty="0">
                 <a:solidFill>
@@ -8284,51 +9038,74 @@
               <a:t>    </a:t>
             </a:r>
             <a:r>
+              <a:rPr lang="en-GB" sz="2000" dirty="0">
+                <a:solidFill>
+                  <a:srgbClr val="569CD6"/>
+                </a:solidFill>
+                <a:latin typeface="Consolas" panose="020B0609020204030204" pitchFamily="49" charset="0"/>
+              </a:rPr>
+              <a:t>command</a:t>
+            </a:r>
+            <a:r>
+              <a:rPr lang="en-GB" sz="2000" dirty="0">
+                <a:solidFill>
+                  <a:srgbClr val="D4D4D4"/>
+                </a:solidFill>
+                <a:latin typeface="Consolas" panose="020B0609020204030204" pitchFamily="49" charset="0"/>
+              </a:rPr>
+              <a:t>: [</a:t>
+            </a:r>
+            <a:r>
+              <a:rPr lang="en-GB" sz="2000" dirty="0">
+                <a:solidFill>
+                  <a:srgbClr val="CE9178"/>
+                </a:solidFill>
+                <a:latin typeface="Consolas" panose="020B0609020204030204" pitchFamily="49" charset="0"/>
+              </a:rPr>
+              <a:t>sleep3.0</a:t>
+            </a:r>
+            <a:r>
+              <a:rPr lang="en-GB" sz="2000" dirty="0">
+                <a:solidFill>
+                  <a:srgbClr val="D4D4D4"/>
+                </a:solidFill>
+                <a:latin typeface="Consolas" panose="020B0609020204030204" pitchFamily="49" charset="0"/>
+              </a:rPr>
+              <a:t>]</a:t>
+            </a:r>
+          </a:p>
+          <a:p>
+            <a:pPr>
+              <a:lnSpc>
+                <a:spcPct val="100000"/>
+              </a:lnSpc>
+            </a:pPr>
+            <a:r>
+              <a:rPr lang="en-GB" sz="2000" dirty="0">
+                <a:solidFill>
+                  <a:srgbClr val="D4D4D4"/>
+                </a:solidFill>
+                <a:latin typeface="Consolas" panose="020B0609020204030204" pitchFamily="49" charset="0"/>
+              </a:rPr>
+              <a:t>    </a:t>
+            </a:r>
+            <a:r>
               <a:rPr lang="en-GB" sz="2000" dirty="0" err="1">
                 <a:solidFill>
                   <a:srgbClr val="569CD6"/>
                 </a:solidFill>
                 <a:latin typeface="Consolas" panose="020B0609020204030204" pitchFamily="49" charset="0"/>
               </a:rPr>
-              <a:t>env</a:t>
-            </a:r>
-            <a:r>
-              <a:rPr lang="en-GB" sz="2000" dirty="0">
-                <a:solidFill>
-                  <a:srgbClr val="D4D4D4"/>
-                </a:solidFill>
-                <a:latin typeface="Consolas" panose="020B0609020204030204" pitchFamily="49" charset="0"/>
-              </a:rPr>
-              <a:t>: </a:t>
-            </a:r>
-          </a:p>
-          <a:p>
-            <a:r>
-              <a:rPr lang="en-GB" sz="2000" dirty="0">
-                <a:solidFill>
-                  <a:srgbClr val="D4D4D4"/>
-                </a:solidFill>
-                <a:latin typeface="Consolas" panose="020B0609020204030204" pitchFamily="49" charset="0"/>
-              </a:rPr>
-              <a:t>    - </a:t>
-            </a:r>
-            <a:r>
-              <a:rPr lang="en-GB" sz="2000" dirty="0">
-                <a:solidFill>
-                  <a:srgbClr val="569CD6"/>
-                </a:solidFill>
-                <a:latin typeface="Consolas" panose="020B0609020204030204" pitchFamily="49" charset="0"/>
-              </a:rPr>
-              <a:t>name</a:t>
-            </a:r>
-            <a:r>
-              <a:rPr lang="en-GB" sz="2000" dirty="0">
-                <a:solidFill>
-                  <a:srgbClr val="D4D4D4"/>
-                </a:solidFill>
-                <a:latin typeface="Consolas" panose="020B0609020204030204" pitchFamily="49" charset="0"/>
-              </a:rPr>
-              <a:t>: </a:t>
+              <a:t>args</a:t>
+            </a:r>
+            <a:r>
+              <a:rPr lang="en-GB" sz="2000" dirty="0">
+                <a:solidFill>
+                  <a:srgbClr val="D4D4D4"/>
+                </a:solidFill>
+                <a:latin typeface="Consolas" panose="020B0609020204030204" pitchFamily="49" charset="0"/>
+              </a:rPr>
+              <a:t>: [</a:t>
             </a:r>
             <a:r>
               <a:rPr lang="en-GB" sz="2000" dirty="0">
@@ -8337,139 +9114,16 @@
                 </a:solidFill>
                 <a:latin typeface="Consolas" panose="020B0609020204030204" pitchFamily="49" charset="0"/>
               </a:rPr>
-              <a:t>APP_COLOR</a:t>
-            </a:r>
-            <a:endParaRPr lang="en-GB" sz="2000" dirty="0">
-              <a:solidFill>
-                <a:srgbClr val="D4D4D4"/>
-              </a:solidFill>
-              <a:latin typeface="Consolas" panose="020B0609020204030204" pitchFamily="49" charset="0"/>
-            </a:endParaRPr>
-          </a:p>
-          <a:p>
-            <a:r>
-              <a:rPr lang="en-GB" sz="2000" dirty="0">
-                <a:solidFill>
-                  <a:srgbClr val="D4D4D4"/>
-                </a:solidFill>
-                <a:latin typeface="Consolas" panose="020B0609020204030204" pitchFamily="49" charset="0"/>
-              </a:rPr>
-              <a:t>      </a:t>
-            </a:r>
-            <a:r>
-              <a:rPr lang="en-GB" sz="2000" dirty="0">
-                <a:solidFill>
-                  <a:srgbClr val="569CD6"/>
-                </a:solidFill>
-                <a:latin typeface="Consolas" panose="020B0609020204030204" pitchFamily="49" charset="0"/>
-              </a:rPr>
-              <a:t>value</a:t>
-            </a:r>
-            <a:r>
-              <a:rPr lang="en-GB" sz="2000" dirty="0">
-                <a:solidFill>
-                  <a:srgbClr val="D4D4D4"/>
-                </a:solidFill>
-                <a:latin typeface="Consolas" panose="020B0609020204030204" pitchFamily="49" charset="0"/>
-              </a:rPr>
-              <a:t>: </a:t>
-            </a:r>
-            <a:r>
-              <a:rPr lang="en-GB" sz="2000" dirty="0">
-                <a:solidFill>
-                  <a:srgbClr val="CE9178"/>
-                </a:solidFill>
-                <a:latin typeface="Consolas" panose="020B0609020204030204" pitchFamily="49" charset="0"/>
-              </a:rPr>
-              <a:t>"blue"</a:t>
-            </a:r>
-            <a:endParaRPr lang="en-GB" sz="2000" dirty="0">
-              <a:solidFill>
-                <a:srgbClr val="D4D4D4"/>
-              </a:solidFill>
-              <a:latin typeface="Consolas" panose="020B0609020204030204" pitchFamily="49" charset="0"/>
-            </a:endParaRPr>
-          </a:p>
-          <a:p>
-            <a:r>
-              <a:rPr lang="en-GB" sz="2000" dirty="0">
-                <a:solidFill>
-                  <a:srgbClr val="D4D4D4"/>
-                </a:solidFill>
-                <a:latin typeface="Consolas" panose="020B0609020204030204" pitchFamily="49" charset="0"/>
-              </a:rPr>
-              <a:t>    - </a:t>
-            </a:r>
-            <a:r>
-              <a:rPr lang="en-GB" sz="2000" dirty="0">
-                <a:solidFill>
-                  <a:srgbClr val="569CD6"/>
-                </a:solidFill>
-                <a:latin typeface="Consolas" panose="020B0609020204030204" pitchFamily="49" charset="0"/>
-              </a:rPr>
-              <a:t>name</a:t>
-            </a:r>
-            <a:r>
-              <a:rPr lang="en-GB" sz="2000" dirty="0">
-                <a:solidFill>
-                  <a:srgbClr val="D4D4D4"/>
-                </a:solidFill>
-                <a:latin typeface="Consolas" panose="020B0609020204030204" pitchFamily="49" charset="0"/>
-              </a:rPr>
-              <a:t>: </a:t>
-            </a:r>
-            <a:r>
-              <a:rPr lang="en-GB" sz="2000" dirty="0">
-                <a:solidFill>
-                  <a:srgbClr val="CE9178"/>
-                </a:solidFill>
-                <a:latin typeface="Consolas" panose="020B0609020204030204" pitchFamily="49" charset="0"/>
-              </a:rPr>
-              <a:t>APP_PORT</a:t>
-            </a:r>
-            <a:endParaRPr lang="en-GB" sz="2000" dirty="0">
-              <a:solidFill>
-                <a:srgbClr val="D4D4D4"/>
-              </a:solidFill>
-              <a:latin typeface="Consolas" panose="020B0609020204030204" pitchFamily="49" charset="0"/>
-            </a:endParaRPr>
-          </a:p>
-          <a:p>
-            <a:r>
-              <a:rPr lang="en-GB" sz="2000" dirty="0">
-                <a:solidFill>
-                  <a:srgbClr val="D4D4D4"/>
-                </a:solidFill>
-                <a:latin typeface="Consolas" panose="020B0609020204030204" pitchFamily="49" charset="0"/>
-              </a:rPr>
-              <a:t>      </a:t>
-            </a:r>
-            <a:r>
-              <a:rPr lang="en-GB" sz="2000" dirty="0">
-                <a:solidFill>
-                  <a:srgbClr val="569CD6"/>
-                </a:solidFill>
-                <a:latin typeface="Consolas" panose="020B0609020204030204" pitchFamily="49" charset="0"/>
-              </a:rPr>
-              <a:t>value</a:t>
-            </a:r>
-            <a:r>
-              <a:rPr lang="en-GB" sz="2000" dirty="0">
-                <a:solidFill>
-                  <a:srgbClr val="D4D4D4"/>
-                </a:solidFill>
-                <a:latin typeface="Consolas" panose="020B0609020204030204" pitchFamily="49" charset="0"/>
-              </a:rPr>
-              <a:t>: </a:t>
-            </a:r>
-            <a:r>
-              <a:rPr lang="en-GB" sz="2000" dirty="0">
-                <a:solidFill>
-                  <a:srgbClr val="CE9178"/>
-                </a:solidFill>
-                <a:latin typeface="Consolas" panose="020B0609020204030204" pitchFamily="49" charset="0"/>
-              </a:rPr>
-              <a:t>"8080"</a:t>
+              <a:t>"15"</a:t>
+            </a:r>
+            <a:r>
+              <a:rPr lang="en-GB" sz="2000" dirty="0">
+                <a:solidFill>
+                  <a:srgbClr val="D4D4D4"/>
+                </a:solidFill>
+                <a:latin typeface="Consolas" panose="020B0609020204030204" pitchFamily="49" charset="0"/>
+              </a:rPr>
+              <a:t>]</a:t>
             </a:r>
             <a:endParaRPr lang="en-GB" sz="2000" b="0" dirty="0">
               <a:solidFill>
@@ -8483,14 +9137,89 @@
       </p:sp>
       <p:sp>
         <p:nvSpPr>
-          <p:cNvPr id="12" name="Rectangle 11"/>
+          <p:cNvPr id="14" name="Snip Single Corner Rectangle 13"/>
           <p:cNvSpPr/>
           <p:nvPr/>
         </p:nvSpPr>
         <p:spPr>
           <a:xfrm>
-            <a:off x="7248525" y="3133726"/>
-            <a:ext cx="2882596" cy="1504949"/>
+            <a:off x="6598349" y="419100"/>
+            <a:ext cx="2038350" cy="348255"/>
+          </a:xfrm>
+          <a:prstGeom prst="snip1Rect">
+            <a:avLst/>
+          </a:prstGeom>
+        </p:spPr>
+        <p:style>
+          <a:lnRef idx="2">
+            <a:schemeClr val="dk1">
+              <a:shade val="50000"/>
+            </a:schemeClr>
+          </a:lnRef>
+          <a:fillRef idx="1">
+            <a:schemeClr val="dk1"/>
+          </a:fillRef>
+          <a:effectRef idx="0">
+            <a:schemeClr val="dk1"/>
+          </a:effectRef>
+          <a:fontRef idx="minor">
+            <a:schemeClr val="lt1"/>
+          </a:fontRef>
+        </p:style>
+        <p:txBody>
+          <a:bodyPr rtlCol="0" anchor="ctr"/>
+          <a:lstStyle/>
+          <a:p>
+            <a:pPr algn="ctr"/>
+            <a:r>
+              <a:rPr lang="en-US" dirty="0" err="1" smtClean="0"/>
+              <a:t>pod.yml</a:t>
+            </a:r>
+            <a:endParaRPr lang="en-GB" dirty="0"/>
+          </a:p>
+        </p:txBody>
+      </p:sp>
+      <p:sp>
+        <p:nvSpPr>
+          <p:cNvPr id="10" name="Content Placeholder 2"/>
+          <p:cNvSpPr>
+            <a:spLocks noGrp="1"/>
+          </p:cNvSpPr>
+          <p:nvPr>
+            <p:ph idx="1"/>
+          </p:nvPr>
+        </p:nvSpPr>
+        <p:spPr>
+          <a:xfrm>
+            <a:off x="838200" y="1825625"/>
+            <a:ext cx="2581275" cy="4351338"/>
+          </a:xfrm>
+        </p:spPr>
+        <p:txBody>
+          <a:bodyPr/>
+          <a:lstStyle/>
+          <a:p>
+            <a:pPr marL="0" indent="0">
+              <a:buNone/>
+            </a:pPr>
+            <a:r>
+              <a:rPr lang="en-US" dirty="0" smtClean="0"/>
+              <a:t>s</a:t>
+            </a:r>
+            <a:endParaRPr lang="en-GB" dirty="0"/>
+          </a:p>
+        </p:txBody>
+      </p:sp>
+      <p:sp>
+        <p:nvSpPr>
+          <p:cNvPr id="6" name="Rectangle 5"/>
+          <p:cNvSpPr/>
+          <p:nvPr/>
+        </p:nvSpPr>
+        <p:spPr>
+          <a:xfrm>
+            <a:off x="7110046" y="3387970"/>
+            <a:ext cx="3182816" cy="668216"/>
           </a:xfrm>
           <a:prstGeom prst="rect">
             <a:avLst/>
@@ -8528,85 +9257,10 @@
           </a:p>
         </p:txBody>
       </p:sp>
-      <p:sp>
-        <p:nvSpPr>
-          <p:cNvPr id="14" name="Snip Single Corner Rectangle 13"/>
-          <p:cNvSpPr/>
-          <p:nvPr/>
-        </p:nvSpPr>
-        <p:spPr>
-          <a:xfrm>
-            <a:off x="6598349" y="419100"/>
-            <a:ext cx="2038350" cy="348255"/>
-          </a:xfrm>
-          <a:prstGeom prst="snip1Rect">
-            <a:avLst/>
-          </a:prstGeom>
-        </p:spPr>
-        <p:style>
-          <a:lnRef idx="2">
-            <a:schemeClr val="dk1">
-              <a:shade val="50000"/>
-            </a:schemeClr>
-          </a:lnRef>
-          <a:fillRef idx="1">
-            <a:schemeClr val="dk1"/>
-          </a:fillRef>
-          <a:effectRef idx="0">
-            <a:schemeClr val="dk1"/>
-          </a:effectRef>
-          <a:fontRef idx="minor">
-            <a:schemeClr val="lt1"/>
-          </a:fontRef>
-        </p:style>
-        <p:txBody>
-          <a:bodyPr rtlCol="0" anchor="ctr"/>
-          <a:lstStyle/>
-          <a:p>
-            <a:pPr algn="ctr"/>
-            <a:r>
-              <a:rPr lang="en-US" dirty="0" err="1" smtClean="0"/>
-              <a:t>pod.yml</a:t>
-            </a:r>
-            <a:endParaRPr lang="en-GB" dirty="0"/>
-          </a:p>
-        </p:txBody>
-      </p:sp>
-      <p:sp>
-        <p:nvSpPr>
-          <p:cNvPr id="10" name="Content Placeholder 2"/>
-          <p:cNvSpPr>
-            <a:spLocks noGrp="1"/>
-          </p:cNvSpPr>
-          <p:nvPr>
-            <p:ph idx="1"/>
-          </p:nvPr>
-        </p:nvSpPr>
-        <p:spPr>
-          <a:xfrm>
-            <a:off x="838200" y="1825625"/>
-            <a:ext cx="2581275" cy="4351338"/>
-          </a:xfrm>
-        </p:spPr>
-        <p:txBody>
-          <a:bodyPr/>
-          <a:lstStyle/>
-          <a:p>
-            <a:pPr marL="0" indent="0">
-              <a:buNone/>
-            </a:pPr>
-            <a:r>
-              <a:rPr lang="en-US" dirty="0" smtClean="0"/>
-              <a:t>s</a:t>
-            </a:r>
-            <a:endParaRPr lang="en-GB" dirty="0"/>
-          </a:p>
-        </p:txBody>
-      </p:sp>
     </p:spTree>
     <p:extLst>
       <p:ext uri="{BB962C8B-B14F-4D97-AF65-F5344CB8AC3E}">
-        <p14:creationId xmlns:p14="http://schemas.microsoft.com/office/powerpoint/2010/main" val="2471902898"/>
+        <p14:creationId xmlns:p14="http://schemas.microsoft.com/office/powerpoint/2010/main" val="3223514410"/>
       </p:ext>
     </p:extLst>
   </p:cSld>

</xml_diff>

<commit_message>
Section 4 update - formatting
</commit_message>
<xml_diff>
--- a/docs/images/slides_images.pptx
+++ b/docs/images/slides_images.pptx
@@ -8,14 +8,17 @@
     <p:sldId id="263" r:id="rId2"/>
     <p:sldId id="264" r:id="rId3"/>
     <p:sldId id="265" r:id="rId4"/>
-    <p:sldId id="259" r:id="rId5"/>
-    <p:sldId id="260" r:id="rId6"/>
-    <p:sldId id="261" r:id="rId7"/>
-    <p:sldId id="262" r:id="rId8"/>
-    <p:sldId id="266" r:id="rId9"/>
-    <p:sldId id="270" r:id="rId10"/>
-    <p:sldId id="268" r:id="rId11"/>
-    <p:sldId id="269" r:id="rId12"/>
+    <p:sldId id="271" r:id="rId5"/>
+    <p:sldId id="273" r:id="rId6"/>
+    <p:sldId id="272" r:id="rId7"/>
+    <p:sldId id="259" r:id="rId8"/>
+    <p:sldId id="260" r:id="rId9"/>
+    <p:sldId id="261" r:id="rId10"/>
+    <p:sldId id="262" r:id="rId11"/>
+    <p:sldId id="266" r:id="rId12"/>
+    <p:sldId id="270" r:id="rId13"/>
+    <p:sldId id="268" r:id="rId14"/>
+    <p:sldId id="269" r:id="rId15"/>
   </p:sldIdLst>
   <p:sldSz cx="12192000" cy="6858000"/>
   <p:notesSz cx="6858000" cy="9144000"/>
@@ -253,7 +256,7 @@
           <a:p>
             <a:fld id="{7F7B62DA-8992-4475-B647-5FA8317943B2}" type="datetimeFigureOut">
               <a:rPr lang="en-GB" smtClean="0"/>
-              <a:t>05/05/2021</a:t>
+              <a:t>19/05/2021</a:t>
             </a:fld>
             <a:endParaRPr lang="en-GB"/>
           </a:p>
@@ -423,7 +426,7 @@
           <a:p>
             <a:fld id="{7F7B62DA-8992-4475-B647-5FA8317943B2}" type="datetimeFigureOut">
               <a:rPr lang="en-GB" smtClean="0"/>
-              <a:t>05/05/2021</a:t>
+              <a:t>19/05/2021</a:t>
             </a:fld>
             <a:endParaRPr lang="en-GB"/>
           </a:p>
@@ -603,7 +606,7 @@
           <a:p>
             <a:fld id="{7F7B62DA-8992-4475-B647-5FA8317943B2}" type="datetimeFigureOut">
               <a:rPr lang="en-GB" smtClean="0"/>
-              <a:t>05/05/2021</a:t>
+              <a:t>19/05/2021</a:t>
             </a:fld>
             <a:endParaRPr lang="en-GB"/>
           </a:p>
@@ -773,7 +776,7 @@
           <a:p>
             <a:fld id="{7F7B62DA-8992-4475-B647-5FA8317943B2}" type="datetimeFigureOut">
               <a:rPr lang="en-GB" smtClean="0"/>
-              <a:t>05/05/2021</a:t>
+              <a:t>19/05/2021</a:t>
             </a:fld>
             <a:endParaRPr lang="en-GB"/>
           </a:p>
@@ -1019,7 +1022,7 @@
           <a:p>
             <a:fld id="{7F7B62DA-8992-4475-B647-5FA8317943B2}" type="datetimeFigureOut">
               <a:rPr lang="en-GB" smtClean="0"/>
-              <a:t>05/05/2021</a:t>
+              <a:t>19/05/2021</a:t>
             </a:fld>
             <a:endParaRPr lang="en-GB"/>
           </a:p>
@@ -1251,7 +1254,7 @@
           <a:p>
             <a:fld id="{7F7B62DA-8992-4475-B647-5FA8317943B2}" type="datetimeFigureOut">
               <a:rPr lang="en-GB" smtClean="0"/>
-              <a:t>05/05/2021</a:t>
+              <a:t>19/05/2021</a:t>
             </a:fld>
             <a:endParaRPr lang="en-GB"/>
           </a:p>
@@ -1618,7 +1621,7 @@
           <a:p>
             <a:fld id="{7F7B62DA-8992-4475-B647-5FA8317943B2}" type="datetimeFigureOut">
               <a:rPr lang="en-GB" smtClean="0"/>
-              <a:t>05/05/2021</a:t>
+              <a:t>19/05/2021</a:t>
             </a:fld>
             <a:endParaRPr lang="en-GB"/>
           </a:p>
@@ -1736,7 +1739,7 @@
           <a:p>
             <a:fld id="{7F7B62DA-8992-4475-B647-5FA8317943B2}" type="datetimeFigureOut">
               <a:rPr lang="en-GB" smtClean="0"/>
-              <a:t>05/05/2021</a:t>
+              <a:t>19/05/2021</a:t>
             </a:fld>
             <a:endParaRPr lang="en-GB"/>
           </a:p>
@@ -1831,7 +1834,7 @@
           <a:p>
             <a:fld id="{7F7B62DA-8992-4475-B647-5FA8317943B2}" type="datetimeFigureOut">
               <a:rPr lang="en-GB" smtClean="0"/>
-              <a:t>05/05/2021</a:t>
+              <a:t>19/05/2021</a:t>
             </a:fld>
             <a:endParaRPr lang="en-GB"/>
           </a:p>
@@ -2108,7 +2111,7 @@
           <a:p>
             <a:fld id="{7F7B62DA-8992-4475-B647-5FA8317943B2}" type="datetimeFigureOut">
               <a:rPr lang="en-GB" smtClean="0"/>
-              <a:t>05/05/2021</a:t>
+              <a:t>19/05/2021</a:t>
             </a:fld>
             <a:endParaRPr lang="en-GB"/>
           </a:p>
@@ -2361,7 +2364,7 @@
           <a:p>
             <a:fld id="{7F7B62DA-8992-4475-B647-5FA8317943B2}" type="datetimeFigureOut">
               <a:rPr lang="en-GB" smtClean="0"/>
-              <a:t>05/05/2021</a:t>
+              <a:t>19/05/2021</a:t>
             </a:fld>
             <a:endParaRPr lang="en-GB"/>
           </a:p>
@@ -2574,7 +2577,7 @@
           <a:p>
             <a:fld id="{7F7B62DA-8992-4475-B647-5FA8317943B2}" type="datetimeFigureOut">
               <a:rPr lang="en-GB" smtClean="0"/>
-              <a:t>05/05/2021</a:t>
+              <a:t>19/05/2021</a:t>
             </a:fld>
             <a:endParaRPr lang="en-GB"/>
           </a:p>
@@ -3002,25 +3005,6 @@
           </a:p>
         </p:txBody>
       </p:sp>
-      <p:sp>
-        <p:nvSpPr>
-          <p:cNvPr id="3" name="Content Placeholder 2"/>
-          <p:cNvSpPr>
-            <a:spLocks noGrp="1"/>
-          </p:cNvSpPr>
-          <p:nvPr>
-            <p:ph idx="1"/>
-          </p:nvPr>
-        </p:nvSpPr>
-        <p:spPr/>
-        <p:txBody>
-          <a:bodyPr/>
-          <a:lstStyle/>
-          <a:p>
-            <a:endParaRPr lang="en-GB" dirty="0"/>
-          </a:p>
-        </p:txBody>
-      </p:sp>
     </p:spTree>
     <p:extLst>
       <p:ext uri="{BB962C8B-B14F-4D97-AF65-F5344CB8AC3E}">
@@ -3058,6 +3042,1388 @@
           <a:chExt cx="0" cy="0"/>
         </a:xfrm>
       </p:grpSpPr>
+      <p:pic>
+        <p:nvPicPr>
+          <p:cNvPr id="4" name="Picture 3"/>
+          <p:cNvPicPr>
+            <a:picLocks noChangeAspect="1"/>
+          </p:cNvPicPr>
+          <p:nvPr/>
+        </p:nvPicPr>
+        <p:blipFill>
+          <a:blip r:embed="rId2">
+            <a:extLst>
+              <a:ext uri="{28A0092B-C50C-407E-A947-70E740481C1C}">
+                <a14:useLocalDpi xmlns:a14="http://schemas.microsoft.com/office/drawing/2010/main" val="0"/>
+              </a:ext>
+            </a:extLst>
+          </a:blip>
+          <a:stretch>
+            <a:fillRect/>
+          </a:stretch>
+        </p:blipFill>
+        <p:spPr>
+          <a:xfrm>
+            <a:off x="0" y="931615"/>
+            <a:ext cx="7856901" cy="4663844"/>
+          </a:xfrm>
+          <a:prstGeom prst="rect">
+            <a:avLst/>
+          </a:prstGeom>
+        </p:spPr>
+      </p:pic>
+      <p:cxnSp>
+        <p:nvCxnSpPr>
+          <p:cNvPr id="16" name="Elbow Connector 15"/>
+          <p:cNvCxnSpPr/>
+          <p:nvPr/>
+        </p:nvCxnSpPr>
+        <p:spPr>
+          <a:xfrm flipV="1">
+            <a:off x="1332412" y="2481943"/>
+            <a:ext cx="1210491" cy="374470"/>
+          </a:xfrm>
+          <a:prstGeom prst="bentConnector3">
+            <a:avLst>
+              <a:gd name="adj1" fmla="val 360"/>
+            </a:avLst>
+          </a:prstGeom>
+          <a:ln w="19050">
+            <a:solidFill>
+              <a:schemeClr val="accent1">
+                <a:lumMod val="20000"/>
+                <a:lumOff val="80000"/>
+              </a:schemeClr>
+            </a:solidFill>
+            <a:prstDash val="dashDot"/>
+            <a:tailEnd type="triangle"/>
+          </a:ln>
+        </p:spPr>
+        <p:style>
+          <a:lnRef idx="1">
+            <a:schemeClr val="accent1"/>
+          </a:lnRef>
+          <a:fillRef idx="0">
+            <a:schemeClr val="accent1"/>
+          </a:fillRef>
+          <a:effectRef idx="0">
+            <a:schemeClr val="accent1"/>
+          </a:effectRef>
+          <a:fontRef idx="minor">
+            <a:schemeClr val="tx1"/>
+          </a:fontRef>
+        </p:style>
+      </p:cxnSp>
+      <p:sp>
+        <p:nvSpPr>
+          <p:cNvPr id="25" name="TextBox 24"/>
+          <p:cNvSpPr txBox="1"/>
+          <p:nvPr/>
+        </p:nvSpPr>
+        <p:spPr>
+          <a:xfrm>
+            <a:off x="8170090" y="1009753"/>
+            <a:ext cx="3595189" cy="3970318"/>
+          </a:xfrm>
+          <a:prstGeom prst="rect">
+            <a:avLst/>
+          </a:prstGeom>
+          <a:solidFill>
+            <a:schemeClr val="tx1"/>
+          </a:solidFill>
+        </p:spPr>
+        <p:txBody>
+          <a:bodyPr wrap="square" rtlCol="0">
+            <a:spAutoFit/>
+          </a:bodyPr>
+          <a:lstStyle/>
+          <a:p>
+            <a:r>
+              <a:rPr lang="en-GB" dirty="0" err="1">
+                <a:solidFill>
+                  <a:srgbClr val="569CD6"/>
+                </a:solidFill>
+                <a:latin typeface="Consolas" panose="020B0609020204030204" pitchFamily="49" charset="0"/>
+              </a:rPr>
+              <a:t>apiVersion</a:t>
+            </a:r>
+            <a:r>
+              <a:rPr lang="en-GB" dirty="0">
+                <a:solidFill>
+                  <a:srgbClr val="D4D4D4"/>
+                </a:solidFill>
+                <a:latin typeface="Consolas" panose="020B0609020204030204" pitchFamily="49" charset="0"/>
+              </a:rPr>
+              <a:t>: </a:t>
+            </a:r>
+            <a:r>
+              <a:rPr lang="en-GB" dirty="0">
+                <a:solidFill>
+                  <a:srgbClr val="CE9178"/>
+                </a:solidFill>
+                <a:latin typeface="Consolas" panose="020B0609020204030204" pitchFamily="49" charset="0"/>
+              </a:rPr>
+              <a:t>v1</a:t>
+            </a:r>
+            <a:endParaRPr lang="en-GB" dirty="0">
+              <a:solidFill>
+                <a:srgbClr val="D4D4D4"/>
+              </a:solidFill>
+              <a:latin typeface="Consolas" panose="020B0609020204030204" pitchFamily="49" charset="0"/>
+            </a:endParaRPr>
+          </a:p>
+          <a:p>
+            <a:r>
+              <a:rPr lang="en-GB" dirty="0">
+                <a:solidFill>
+                  <a:srgbClr val="569CD6"/>
+                </a:solidFill>
+                <a:latin typeface="Consolas" panose="020B0609020204030204" pitchFamily="49" charset="0"/>
+              </a:rPr>
+              <a:t>kind</a:t>
+            </a:r>
+            <a:r>
+              <a:rPr lang="en-GB" dirty="0">
+                <a:solidFill>
+                  <a:srgbClr val="D4D4D4"/>
+                </a:solidFill>
+                <a:latin typeface="Consolas" panose="020B0609020204030204" pitchFamily="49" charset="0"/>
+              </a:rPr>
+              <a:t>: </a:t>
+            </a:r>
+            <a:r>
+              <a:rPr lang="en-GB" dirty="0">
+                <a:solidFill>
+                  <a:srgbClr val="CE9178"/>
+                </a:solidFill>
+                <a:latin typeface="Consolas" panose="020B0609020204030204" pitchFamily="49" charset="0"/>
+              </a:rPr>
+              <a:t>Service</a:t>
+            </a:r>
+            <a:endParaRPr lang="en-GB" dirty="0">
+              <a:solidFill>
+                <a:srgbClr val="D4D4D4"/>
+              </a:solidFill>
+              <a:latin typeface="Consolas" panose="020B0609020204030204" pitchFamily="49" charset="0"/>
+            </a:endParaRPr>
+          </a:p>
+          <a:p>
+            <a:r>
+              <a:rPr lang="en-GB" dirty="0">
+                <a:solidFill>
+                  <a:srgbClr val="569CD6"/>
+                </a:solidFill>
+                <a:latin typeface="Consolas" panose="020B0609020204030204" pitchFamily="49" charset="0"/>
+              </a:rPr>
+              <a:t>metadata</a:t>
+            </a:r>
+            <a:r>
+              <a:rPr lang="en-GB" dirty="0">
+                <a:solidFill>
+                  <a:srgbClr val="D4D4D4"/>
+                </a:solidFill>
+                <a:latin typeface="Consolas" panose="020B0609020204030204" pitchFamily="49" charset="0"/>
+              </a:rPr>
+              <a:t>:</a:t>
+            </a:r>
+          </a:p>
+          <a:p>
+            <a:r>
+              <a:rPr lang="en-GB" dirty="0">
+                <a:solidFill>
+                  <a:srgbClr val="D4D4D4"/>
+                </a:solidFill>
+                <a:latin typeface="Consolas" panose="020B0609020204030204" pitchFamily="49" charset="0"/>
+              </a:rPr>
+              <a:t>  </a:t>
+            </a:r>
+            <a:r>
+              <a:rPr lang="en-GB" dirty="0">
+                <a:solidFill>
+                  <a:srgbClr val="569CD6"/>
+                </a:solidFill>
+                <a:latin typeface="Consolas" panose="020B0609020204030204" pitchFamily="49" charset="0"/>
+              </a:rPr>
+              <a:t>name</a:t>
+            </a:r>
+            <a:r>
+              <a:rPr lang="en-GB" dirty="0">
+                <a:solidFill>
+                  <a:srgbClr val="D4D4D4"/>
+                </a:solidFill>
+                <a:latin typeface="Consolas" panose="020B0609020204030204" pitchFamily="49" charset="0"/>
+              </a:rPr>
+              <a:t>: </a:t>
+            </a:r>
+            <a:r>
+              <a:rPr lang="en-GB" dirty="0">
+                <a:solidFill>
+                  <a:srgbClr val="CE9178"/>
+                </a:solidFill>
+                <a:latin typeface="Consolas" panose="020B0609020204030204" pitchFamily="49" charset="0"/>
+              </a:rPr>
+              <a:t>back-end</a:t>
+            </a:r>
+            <a:endParaRPr lang="en-GB" dirty="0">
+              <a:solidFill>
+                <a:srgbClr val="D4D4D4"/>
+              </a:solidFill>
+              <a:latin typeface="Consolas" panose="020B0609020204030204" pitchFamily="49" charset="0"/>
+            </a:endParaRPr>
+          </a:p>
+          <a:p>
+            <a:r>
+              <a:rPr lang="en-GB" dirty="0">
+                <a:solidFill>
+                  <a:srgbClr val="569CD6"/>
+                </a:solidFill>
+                <a:latin typeface="Consolas" panose="020B0609020204030204" pitchFamily="49" charset="0"/>
+              </a:rPr>
+              <a:t>spec</a:t>
+            </a:r>
+            <a:r>
+              <a:rPr lang="en-GB" dirty="0">
+                <a:solidFill>
+                  <a:srgbClr val="D4D4D4"/>
+                </a:solidFill>
+                <a:latin typeface="Consolas" panose="020B0609020204030204" pitchFamily="49" charset="0"/>
+              </a:rPr>
+              <a:t>:</a:t>
+            </a:r>
+          </a:p>
+          <a:p>
+            <a:r>
+              <a:rPr lang="en-GB" dirty="0">
+                <a:solidFill>
+                  <a:srgbClr val="D4D4D4"/>
+                </a:solidFill>
+                <a:latin typeface="Consolas" panose="020B0609020204030204" pitchFamily="49" charset="0"/>
+              </a:rPr>
+              <a:t>  </a:t>
+            </a:r>
+            <a:r>
+              <a:rPr lang="en-GB" dirty="0">
+                <a:solidFill>
+                  <a:srgbClr val="569CD6"/>
+                </a:solidFill>
+                <a:latin typeface="Consolas" panose="020B0609020204030204" pitchFamily="49" charset="0"/>
+              </a:rPr>
+              <a:t>type</a:t>
+            </a:r>
+            <a:r>
+              <a:rPr lang="en-GB" dirty="0">
+                <a:solidFill>
+                  <a:srgbClr val="D4D4D4"/>
+                </a:solidFill>
+                <a:latin typeface="Consolas" panose="020B0609020204030204" pitchFamily="49" charset="0"/>
+              </a:rPr>
+              <a:t>: </a:t>
+            </a:r>
+            <a:r>
+              <a:rPr lang="en-GB" dirty="0" err="1">
+                <a:solidFill>
+                  <a:srgbClr val="CE9178"/>
+                </a:solidFill>
+                <a:latin typeface="Consolas" panose="020B0609020204030204" pitchFamily="49" charset="0"/>
+              </a:rPr>
+              <a:t>ClusterIP</a:t>
+            </a:r>
+            <a:endParaRPr lang="en-GB" dirty="0">
+              <a:solidFill>
+                <a:srgbClr val="D4D4D4"/>
+              </a:solidFill>
+              <a:latin typeface="Consolas" panose="020B0609020204030204" pitchFamily="49" charset="0"/>
+            </a:endParaRPr>
+          </a:p>
+          <a:p>
+            <a:r>
+              <a:rPr lang="en-GB" dirty="0">
+                <a:solidFill>
+                  <a:srgbClr val="D4D4D4"/>
+                </a:solidFill>
+                <a:latin typeface="Consolas" panose="020B0609020204030204" pitchFamily="49" charset="0"/>
+              </a:rPr>
+              <a:t>  </a:t>
+            </a:r>
+            <a:r>
+              <a:rPr lang="en-GB" dirty="0">
+                <a:solidFill>
+                  <a:srgbClr val="569CD6"/>
+                </a:solidFill>
+                <a:latin typeface="Consolas" panose="020B0609020204030204" pitchFamily="49" charset="0"/>
+              </a:rPr>
+              <a:t>ports</a:t>
+            </a:r>
+            <a:r>
+              <a:rPr lang="en-GB" dirty="0">
+                <a:solidFill>
+                  <a:srgbClr val="D4D4D4"/>
+                </a:solidFill>
+                <a:latin typeface="Consolas" panose="020B0609020204030204" pitchFamily="49" charset="0"/>
+              </a:rPr>
+              <a:t>:</a:t>
+            </a:r>
+          </a:p>
+          <a:p>
+            <a:r>
+              <a:rPr lang="en-GB" dirty="0">
+                <a:solidFill>
+                  <a:srgbClr val="D4D4D4"/>
+                </a:solidFill>
+                <a:latin typeface="Consolas" panose="020B0609020204030204" pitchFamily="49" charset="0"/>
+              </a:rPr>
+              <a:t>    - </a:t>
+            </a:r>
+            <a:r>
+              <a:rPr lang="en-GB" dirty="0">
+                <a:solidFill>
+                  <a:srgbClr val="569CD6"/>
+                </a:solidFill>
+                <a:latin typeface="Consolas" panose="020B0609020204030204" pitchFamily="49" charset="0"/>
+              </a:rPr>
+              <a:t>port</a:t>
+            </a:r>
+            <a:r>
+              <a:rPr lang="en-GB" dirty="0">
+                <a:solidFill>
+                  <a:srgbClr val="D4D4D4"/>
+                </a:solidFill>
+                <a:latin typeface="Consolas" panose="020B0609020204030204" pitchFamily="49" charset="0"/>
+              </a:rPr>
+              <a:t>: </a:t>
+            </a:r>
+            <a:r>
+              <a:rPr lang="en-GB" dirty="0">
+                <a:solidFill>
+                  <a:srgbClr val="B5CEA8"/>
+                </a:solidFill>
+                <a:latin typeface="Consolas" panose="020B0609020204030204" pitchFamily="49" charset="0"/>
+              </a:rPr>
+              <a:t>80</a:t>
+            </a:r>
+            <a:endParaRPr lang="en-GB" dirty="0">
+              <a:solidFill>
+                <a:srgbClr val="D4D4D4"/>
+              </a:solidFill>
+              <a:latin typeface="Consolas" panose="020B0609020204030204" pitchFamily="49" charset="0"/>
+            </a:endParaRPr>
+          </a:p>
+          <a:p>
+            <a:r>
+              <a:rPr lang="en-GB" dirty="0">
+                <a:solidFill>
+                  <a:srgbClr val="D4D4D4"/>
+                </a:solidFill>
+                <a:latin typeface="Consolas" panose="020B0609020204030204" pitchFamily="49" charset="0"/>
+              </a:rPr>
+              <a:t>      </a:t>
+            </a:r>
+            <a:r>
+              <a:rPr lang="en-GB" dirty="0" err="1">
+                <a:solidFill>
+                  <a:srgbClr val="569CD6"/>
+                </a:solidFill>
+                <a:latin typeface="Consolas" panose="020B0609020204030204" pitchFamily="49" charset="0"/>
+              </a:rPr>
+              <a:t>targetPort</a:t>
+            </a:r>
+            <a:r>
+              <a:rPr lang="en-GB" dirty="0">
+                <a:solidFill>
+                  <a:srgbClr val="D4D4D4"/>
+                </a:solidFill>
+                <a:latin typeface="Consolas" panose="020B0609020204030204" pitchFamily="49" charset="0"/>
+              </a:rPr>
+              <a:t>: </a:t>
+            </a:r>
+            <a:r>
+              <a:rPr lang="en-GB" dirty="0">
+                <a:solidFill>
+                  <a:srgbClr val="B5CEA8"/>
+                </a:solidFill>
+                <a:latin typeface="Consolas" panose="020B0609020204030204" pitchFamily="49" charset="0"/>
+              </a:rPr>
+              <a:t>80</a:t>
+            </a:r>
+            <a:endParaRPr lang="en-GB" dirty="0">
+              <a:solidFill>
+                <a:srgbClr val="D4D4D4"/>
+              </a:solidFill>
+              <a:latin typeface="Consolas" panose="020B0609020204030204" pitchFamily="49" charset="0"/>
+            </a:endParaRPr>
+          </a:p>
+          <a:p>
+            <a:r>
+              <a:rPr lang="en-GB" dirty="0">
+                <a:solidFill>
+                  <a:srgbClr val="D4D4D4"/>
+                </a:solidFill>
+                <a:latin typeface="Consolas" panose="020B0609020204030204" pitchFamily="49" charset="0"/>
+              </a:rPr>
+              <a:t>  </a:t>
+            </a:r>
+            <a:r>
+              <a:rPr lang="en-GB" dirty="0">
+                <a:solidFill>
+                  <a:srgbClr val="569CD6"/>
+                </a:solidFill>
+                <a:latin typeface="Consolas" panose="020B0609020204030204" pitchFamily="49" charset="0"/>
+              </a:rPr>
+              <a:t>selector</a:t>
+            </a:r>
+            <a:r>
+              <a:rPr lang="en-GB" dirty="0">
+                <a:solidFill>
+                  <a:srgbClr val="D4D4D4"/>
+                </a:solidFill>
+                <a:latin typeface="Consolas" panose="020B0609020204030204" pitchFamily="49" charset="0"/>
+              </a:rPr>
+              <a:t>:</a:t>
+            </a:r>
+          </a:p>
+          <a:p>
+            <a:r>
+              <a:rPr lang="en-GB" dirty="0">
+                <a:solidFill>
+                  <a:srgbClr val="D4D4D4"/>
+                </a:solidFill>
+                <a:latin typeface="Consolas" panose="020B0609020204030204" pitchFamily="49" charset="0"/>
+              </a:rPr>
+              <a:t>    </a:t>
+            </a:r>
+            <a:r>
+              <a:rPr lang="en-GB" dirty="0">
+                <a:solidFill>
+                  <a:srgbClr val="569CD6"/>
+                </a:solidFill>
+                <a:latin typeface="Consolas" panose="020B0609020204030204" pitchFamily="49" charset="0"/>
+              </a:rPr>
+              <a:t>app</a:t>
+            </a:r>
+            <a:r>
+              <a:rPr lang="en-GB" dirty="0">
+                <a:solidFill>
+                  <a:srgbClr val="D4D4D4"/>
+                </a:solidFill>
+                <a:latin typeface="Consolas" panose="020B0609020204030204" pitchFamily="49" charset="0"/>
+              </a:rPr>
+              <a:t>: </a:t>
+            </a:r>
+            <a:r>
+              <a:rPr lang="en-GB" dirty="0" err="1">
+                <a:solidFill>
+                  <a:srgbClr val="CE9178"/>
+                </a:solidFill>
+                <a:latin typeface="Consolas" panose="020B0609020204030204" pitchFamily="49" charset="0"/>
+              </a:rPr>
+              <a:t>myapp</a:t>
+            </a:r>
+            <a:endParaRPr lang="en-GB" dirty="0">
+              <a:solidFill>
+                <a:srgbClr val="D4D4D4"/>
+              </a:solidFill>
+              <a:latin typeface="Consolas" panose="020B0609020204030204" pitchFamily="49" charset="0"/>
+            </a:endParaRPr>
+          </a:p>
+          <a:p>
+            <a:r>
+              <a:rPr lang="en-GB" dirty="0">
+                <a:solidFill>
+                  <a:srgbClr val="D4D4D4"/>
+                </a:solidFill>
+                <a:latin typeface="Consolas" panose="020B0609020204030204" pitchFamily="49" charset="0"/>
+              </a:rPr>
+              <a:t>    </a:t>
+            </a:r>
+            <a:r>
+              <a:rPr lang="en-GB" dirty="0">
+                <a:solidFill>
+                  <a:srgbClr val="569CD6"/>
+                </a:solidFill>
+                <a:latin typeface="Consolas" panose="020B0609020204030204" pitchFamily="49" charset="0"/>
+              </a:rPr>
+              <a:t>type</a:t>
+            </a:r>
+            <a:r>
+              <a:rPr lang="en-GB" dirty="0">
+                <a:solidFill>
+                  <a:srgbClr val="D4D4D4"/>
+                </a:solidFill>
+                <a:latin typeface="Consolas" panose="020B0609020204030204" pitchFamily="49" charset="0"/>
+              </a:rPr>
+              <a:t>: </a:t>
+            </a:r>
+            <a:r>
+              <a:rPr lang="en-GB" dirty="0">
+                <a:solidFill>
+                  <a:srgbClr val="CE9178"/>
+                </a:solidFill>
+                <a:latin typeface="Consolas" panose="020B0609020204030204" pitchFamily="49" charset="0"/>
+              </a:rPr>
+              <a:t>back-end</a:t>
+            </a:r>
+            <a:endParaRPr lang="en-GB" dirty="0">
+              <a:solidFill>
+                <a:srgbClr val="D4D4D4"/>
+              </a:solidFill>
+              <a:latin typeface="Consolas" panose="020B0609020204030204" pitchFamily="49" charset="0"/>
+            </a:endParaRPr>
+          </a:p>
+          <a:p>
+            <a:endParaRPr lang="en-US" dirty="0" smtClean="0"/>
+          </a:p>
+          <a:p>
+            <a:endParaRPr lang="en-GB" dirty="0"/>
+          </a:p>
+        </p:txBody>
+      </p:sp>
+      <p:sp>
+        <p:nvSpPr>
+          <p:cNvPr id="26" name="Snip Single Corner Rectangle 25"/>
+          <p:cNvSpPr/>
+          <p:nvPr/>
+        </p:nvSpPr>
+        <p:spPr>
+          <a:xfrm>
+            <a:off x="8170091" y="661498"/>
+            <a:ext cx="2038350" cy="348255"/>
+          </a:xfrm>
+          <a:prstGeom prst="snip1Rect">
+            <a:avLst/>
+          </a:prstGeom>
+        </p:spPr>
+        <p:style>
+          <a:lnRef idx="2">
+            <a:schemeClr val="dk1">
+              <a:shade val="50000"/>
+            </a:schemeClr>
+          </a:lnRef>
+          <a:fillRef idx="1">
+            <a:schemeClr val="dk1"/>
+          </a:fillRef>
+          <a:effectRef idx="0">
+            <a:schemeClr val="dk1"/>
+          </a:effectRef>
+          <a:fontRef idx="minor">
+            <a:schemeClr val="lt1"/>
+          </a:fontRef>
+        </p:style>
+        <p:txBody>
+          <a:bodyPr rtlCol="0" anchor="ctr"/>
+          <a:lstStyle/>
+          <a:p>
+            <a:pPr algn="ctr"/>
+            <a:r>
+              <a:rPr lang="en-US" dirty="0" err="1" smtClean="0"/>
+              <a:t>service.yml</a:t>
+            </a:r>
+            <a:endParaRPr lang="en-GB" dirty="0"/>
+          </a:p>
+        </p:txBody>
+      </p:sp>
+      <p:sp>
+        <p:nvSpPr>
+          <p:cNvPr id="27" name="Rectangle 26"/>
+          <p:cNvSpPr/>
+          <p:nvPr/>
+        </p:nvSpPr>
+        <p:spPr>
+          <a:xfrm>
+            <a:off x="8692262" y="2994912"/>
+            <a:ext cx="1963017" cy="269298"/>
+          </a:xfrm>
+          <a:prstGeom prst="rect">
+            <a:avLst/>
+          </a:prstGeom>
+          <a:noFill/>
+          <a:ln w="19050">
+            <a:solidFill>
+              <a:schemeClr val="accent1">
+                <a:lumMod val="75000"/>
+              </a:schemeClr>
+            </a:solidFill>
+            <a:prstDash val="sysDash"/>
+          </a:ln>
+        </p:spPr>
+        <p:style>
+          <a:lnRef idx="2">
+            <a:schemeClr val="accent1">
+              <a:shade val="50000"/>
+            </a:schemeClr>
+          </a:lnRef>
+          <a:fillRef idx="1">
+            <a:schemeClr val="accent1"/>
+          </a:fillRef>
+          <a:effectRef idx="0">
+            <a:schemeClr val="accent1"/>
+          </a:effectRef>
+          <a:fontRef idx="minor">
+            <a:schemeClr val="lt1"/>
+          </a:fontRef>
+        </p:style>
+        <p:txBody>
+          <a:bodyPr rtlCol="0" anchor="ctr"/>
+          <a:lstStyle/>
+          <a:p>
+            <a:pPr algn="ctr"/>
+            <a:endParaRPr lang="en-GB"/>
+          </a:p>
+        </p:txBody>
+      </p:sp>
+    </p:spTree>
+    <p:extLst>
+      <p:ext uri="{BB962C8B-B14F-4D97-AF65-F5344CB8AC3E}">
+        <p14:creationId xmlns:p14="http://schemas.microsoft.com/office/powerpoint/2010/main" val="3190478507"/>
+      </p:ext>
+    </p:extLst>
+  </p:cSld>
+  <p:clrMapOvr>
+    <a:masterClrMapping/>
+  </p:clrMapOvr>
+  <p:timing>
+    <p:tnLst>
+      <p:par>
+        <p:cTn id="1" dur="indefinite" restart="never" nodeType="tmRoot"/>
+      </p:par>
+    </p:tnLst>
+  </p:timing>
+</p:sld>
+</file>
+
+<file path=ppt/slides/slide11.xml><?xml version="1.0" encoding="utf-8"?>
+<p:sld xmlns:a="http://schemas.openxmlformats.org/drawingml/2006/main" xmlns:r="http://schemas.openxmlformats.org/officeDocument/2006/relationships" xmlns:p="http://schemas.openxmlformats.org/presentationml/2006/main">
+  <p:cSld>
+    <p:spTree>
+      <p:nvGrpSpPr>
+        <p:cNvPr id="1" name=""/>
+        <p:cNvGrpSpPr/>
+        <p:nvPr/>
+      </p:nvGrpSpPr>
+      <p:grpSpPr>
+        <a:xfrm>
+          <a:off x="0" y="0"/>
+          <a:ext cx="0" cy="0"/>
+          <a:chOff x="0" y="0"/>
+          <a:chExt cx="0" cy="0"/>
+        </a:xfrm>
+      </p:grpSpPr>
+      <p:sp>
+        <p:nvSpPr>
+          <p:cNvPr id="2" name="Title 1"/>
+          <p:cNvSpPr>
+            <a:spLocks noGrp="1"/>
+          </p:cNvSpPr>
+          <p:nvPr>
+            <p:ph type="title"/>
+          </p:nvPr>
+        </p:nvSpPr>
+        <p:spPr/>
+        <p:txBody>
+          <a:bodyPr/>
+          <a:lstStyle/>
+          <a:p>
+            <a:r>
+              <a:rPr lang="en-US" dirty="0"/>
+              <a:t>Section </a:t>
+            </a:r>
+            <a:r>
+              <a:rPr lang="en-US" dirty="0" smtClean="0"/>
+              <a:t>7</a:t>
+            </a:r>
+            <a:endParaRPr lang="en-GB" dirty="0"/>
+          </a:p>
+        </p:txBody>
+      </p:sp>
+    </p:spTree>
+    <p:extLst>
+      <p:ext uri="{BB962C8B-B14F-4D97-AF65-F5344CB8AC3E}">
+        <p14:creationId xmlns:p14="http://schemas.microsoft.com/office/powerpoint/2010/main" val="2055157450"/>
+      </p:ext>
+    </p:extLst>
+  </p:cSld>
+  <p:clrMapOvr>
+    <a:masterClrMapping/>
+  </p:clrMapOvr>
+  <p:timing>
+    <p:tnLst>
+      <p:par>
+        <p:cTn id="1" dur="indefinite" restart="never" nodeType="tmRoot"/>
+      </p:par>
+    </p:tnLst>
+  </p:timing>
+</p:sld>
+</file>
+
+<file path=ppt/slides/slide12.xml><?xml version="1.0" encoding="utf-8"?>
+<p:sld xmlns:a="http://schemas.openxmlformats.org/drawingml/2006/main" xmlns:r="http://schemas.openxmlformats.org/officeDocument/2006/relationships" xmlns:p="http://schemas.openxmlformats.org/presentationml/2006/main">
+  <p:cSld>
+    <p:spTree>
+      <p:nvGrpSpPr>
+        <p:cNvPr id="1" name=""/>
+        <p:cNvGrpSpPr/>
+        <p:nvPr/>
+      </p:nvGrpSpPr>
+      <p:grpSpPr>
+        <a:xfrm>
+          <a:off x="0" y="0"/>
+          <a:ext cx="0" cy="0"/>
+          <a:chOff x="0" y="0"/>
+          <a:chExt cx="0" cy="0"/>
+        </a:xfrm>
+      </p:grpSpPr>
+      <p:sp>
+        <p:nvSpPr>
+          <p:cNvPr id="9" name="Title 1"/>
+          <p:cNvSpPr txBox="1">
+            <a:spLocks/>
+          </p:cNvSpPr>
+          <p:nvPr/>
+        </p:nvSpPr>
+        <p:spPr>
+          <a:xfrm>
+            <a:off x="6592481" y="748306"/>
+            <a:ext cx="4162606" cy="3448556"/>
+          </a:xfrm>
+          <a:prstGeom prst="rect">
+            <a:avLst/>
+          </a:prstGeom>
+          <a:solidFill>
+            <a:schemeClr val="tx1"/>
+          </a:solidFill>
+        </p:spPr>
+        <p:txBody>
+          <a:bodyPr vert="horz" lIns="180000" tIns="180000" rIns="91440" bIns="45720" rtlCol="0" anchor="t">
+            <a:noAutofit/>
+          </a:bodyPr>
+          <a:lstStyle>
+            <a:lvl1pPr algn="l" defTabSz="914400" rtl="0" eaLnBrk="1" latinLnBrk="0" hangingPunct="1">
+              <a:lnSpc>
+                <a:spcPct val="90000"/>
+              </a:lnSpc>
+              <a:spcBef>
+                <a:spcPct val="0"/>
+              </a:spcBef>
+              <a:buNone/>
+              <a:defRPr sz="4400" kern="1200">
+                <a:solidFill>
+                  <a:schemeClr val="tx1"/>
+                </a:solidFill>
+                <a:latin typeface="+mj-lt"/>
+                <a:ea typeface="+mj-ea"/>
+                <a:cs typeface="+mj-cs"/>
+              </a:defRPr>
+            </a:lvl1pPr>
+          </a:lstStyle>
+          <a:p>
+            <a:pPr>
+              <a:lnSpc>
+                <a:spcPct val="100000"/>
+              </a:lnSpc>
+            </a:pPr>
+            <a:r>
+              <a:rPr lang="en-GB" sz="2000" dirty="0" err="1">
+                <a:solidFill>
+                  <a:srgbClr val="569CD6"/>
+                </a:solidFill>
+                <a:latin typeface="Consolas" panose="020B0609020204030204" pitchFamily="49" charset="0"/>
+              </a:rPr>
+              <a:t>apiVersion</a:t>
+            </a:r>
+            <a:r>
+              <a:rPr lang="en-GB" sz="2000" dirty="0">
+                <a:solidFill>
+                  <a:srgbClr val="D4D4D4"/>
+                </a:solidFill>
+                <a:latin typeface="Consolas" panose="020B0609020204030204" pitchFamily="49" charset="0"/>
+              </a:rPr>
+              <a:t>: </a:t>
+            </a:r>
+            <a:r>
+              <a:rPr lang="en-GB" sz="2000" dirty="0">
+                <a:solidFill>
+                  <a:srgbClr val="CE9178"/>
+                </a:solidFill>
+                <a:latin typeface="Consolas" panose="020B0609020204030204" pitchFamily="49" charset="0"/>
+              </a:rPr>
+              <a:t>v1</a:t>
+            </a:r>
+            <a:endParaRPr lang="en-GB" sz="2000" dirty="0">
+              <a:solidFill>
+                <a:srgbClr val="D4D4D4"/>
+              </a:solidFill>
+              <a:latin typeface="Consolas" panose="020B0609020204030204" pitchFamily="49" charset="0"/>
+            </a:endParaRPr>
+          </a:p>
+          <a:p>
+            <a:pPr>
+              <a:lnSpc>
+                <a:spcPct val="100000"/>
+              </a:lnSpc>
+            </a:pPr>
+            <a:r>
+              <a:rPr lang="en-GB" sz="2000" dirty="0">
+                <a:solidFill>
+                  <a:srgbClr val="569CD6"/>
+                </a:solidFill>
+                <a:latin typeface="Consolas" panose="020B0609020204030204" pitchFamily="49" charset="0"/>
+              </a:rPr>
+              <a:t>kind</a:t>
+            </a:r>
+            <a:r>
+              <a:rPr lang="en-GB" sz="2000" dirty="0">
+                <a:solidFill>
+                  <a:srgbClr val="D4D4D4"/>
+                </a:solidFill>
+                <a:latin typeface="Consolas" panose="020B0609020204030204" pitchFamily="49" charset="0"/>
+              </a:rPr>
+              <a:t>: </a:t>
+            </a:r>
+            <a:r>
+              <a:rPr lang="en-GB" sz="2000" dirty="0">
+                <a:solidFill>
+                  <a:srgbClr val="CE9178"/>
+                </a:solidFill>
+                <a:latin typeface="Consolas" panose="020B0609020204030204" pitchFamily="49" charset="0"/>
+              </a:rPr>
+              <a:t>Pod</a:t>
+            </a:r>
+            <a:endParaRPr lang="en-GB" sz="2000" dirty="0">
+              <a:solidFill>
+                <a:srgbClr val="D4D4D4"/>
+              </a:solidFill>
+              <a:latin typeface="Consolas" panose="020B0609020204030204" pitchFamily="49" charset="0"/>
+            </a:endParaRPr>
+          </a:p>
+          <a:p>
+            <a:pPr>
+              <a:lnSpc>
+                <a:spcPct val="100000"/>
+              </a:lnSpc>
+            </a:pPr>
+            <a:r>
+              <a:rPr lang="en-GB" sz="2000" dirty="0">
+                <a:solidFill>
+                  <a:srgbClr val="569CD6"/>
+                </a:solidFill>
+                <a:latin typeface="Consolas" panose="020B0609020204030204" pitchFamily="49" charset="0"/>
+              </a:rPr>
+              <a:t>metadata</a:t>
+            </a:r>
+            <a:r>
+              <a:rPr lang="en-GB" sz="2000" dirty="0">
+                <a:solidFill>
+                  <a:srgbClr val="D4D4D4"/>
+                </a:solidFill>
+                <a:latin typeface="Consolas" panose="020B0609020204030204" pitchFamily="49" charset="0"/>
+              </a:rPr>
+              <a:t>:</a:t>
+            </a:r>
+          </a:p>
+          <a:p>
+            <a:pPr>
+              <a:lnSpc>
+                <a:spcPct val="100000"/>
+              </a:lnSpc>
+            </a:pPr>
+            <a:r>
+              <a:rPr lang="en-GB" sz="2000" dirty="0">
+                <a:solidFill>
+                  <a:srgbClr val="D4D4D4"/>
+                </a:solidFill>
+                <a:latin typeface="Consolas" panose="020B0609020204030204" pitchFamily="49" charset="0"/>
+              </a:rPr>
+              <a:t>  </a:t>
+            </a:r>
+            <a:r>
+              <a:rPr lang="en-GB" sz="2000" dirty="0">
+                <a:solidFill>
+                  <a:srgbClr val="569CD6"/>
+                </a:solidFill>
+                <a:latin typeface="Consolas" panose="020B0609020204030204" pitchFamily="49" charset="0"/>
+              </a:rPr>
+              <a:t>name</a:t>
+            </a:r>
+            <a:r>
+              <a:rPr lang="en-GB" sz="2000" dirty="0">
+                <a:solidFill>
+                  <a:srgbClr val="D4D4D4"/>
+                </a:solidFill>
+                <a:latin typeface="Consolas" panose="020B0609020204030204" pitchFamily="49" charset="0"/>
+              </a:rPr>
+              <a:t>: </a:t>
+            </a:r>
+            <a:r>
+              <a:rPr lang="en-GB" sz="2000" dirty="0" err="1">
+                <a:solidFill>
+                  <a:srgbClr val="CE9178"/>
+                </a:solidFill>
+                <a:latin typeface="Consolas" panose="020B0609020204030204" pitchFamily="49" charset="0"/>
+              </a:rPr>
+              <a:t>ubuntu</a:t>
+            </a:r>
+            <a:r>
+              <a:rPr lang="en-GB" sz="2000" dirty="0">
+                <a:solidFill>
+                  <a:srgbClr val="CE9178"/>
+                </a:solidFill>
+                <a:latin typeface="Consolas" panose="020B0609020204030204" pitchFamily="49" charset="0"/>
+              </a:rPr>
+              <a:t>-sleeper-pod</a:t>
+            </a:r>
+            <a:endParaRPr lang="en-GB" sz="2000" dirty="0">
+              <a:solidFill>
+                <a:srgbClr val="D4D4D4"/>
+              </a:solidFill>
+              <a:latin typeface="Consolas" panose="020B0609020204030204" pitchFamily="49" charset="0"/>
+            </a:endParaRPr>
+          </a:p>
+          <a:p>
+            <a:pPr>
+              <a:lnSpc>
+                <a:spcPct val="100000"/>
+              </a:lnSpc>
+            </a:pPr>
+            <a:r>
+              <a:rPr lang="en-GB" sz="2000" dirty="0">
+                <a:solidFill>
+                  <a:srgbClr val="569CD6"/>
+                </a:solidFill>
+                <a:latin typeface="Consolas" panose="020B0609020204030204" pitchFamily="49" charset="0"/>
+              </a:rPr>
+              <a:t>spec</a:t>
+            </a:r>
+            <a:r>
+              <a:rPr lang="en-GB" sz="2000" dirty="0">
+                <a:solidFill>
+                  <a:srgbClr val="D4D4D4"/>
+                </a:solidFill>
+                <a:latin typeface="Consolas" panose="020B0609020204030204" pitchFamily="49" charset="0"/>
+              </a:rPr>
+              <a:t>:</a:t>
+            </a:r>
+          </a:p>
+          <a:p>
+            <a:pPr>
+              <a:lnSpc>
+                <a:spcPct val="100000"/>
+              </a:lnSpc>
+            </a:pPr>
+            <a:r>
+              <a:rPr lang="en-GB" sz="2000" dirty="0">
+                <a:solidFill>
+                  <a:srgbClr val="D4D4D4"/>
+                </a:solidFill>
+                <a:latin typeface="Consolas" panose="020B0609020204030204" pitchFamily="49" charset="0"/>
+              </a:rPr>
+              <a:t>  </a:t>
+            </a:r>
+            <a:r>
+              <a:rPr lang="en-GB" sz="2000" dirty="0">
+                <a:solidFill>
+                  <a:srgbClr val="569CD6"/>
+                </a:solidFill>
+                <a:latin typeface="Consolas" panose="020B0609020204030204" pitchFamily="49" charset="0"/>
+              </a:rPr>
+              <a:t>containers</a:t>
+            </a:r>
+            <a:r>
+              <a:rPr lang="en-GB" sz="2000" dirty="0">
+                <a:solidFill>
+                  <a:srgbClr val="D4D4D4"/>
+                </a:solidFill>
+                <a:latin typeface="Consolas" panose="020B0609020204030204" pitchFamily="49" charset="0"/>
+              </a:rPr>
+              <a:t>:</a:t>
+            </a:r>
+          </a:p>
+          <a:p>
+            <a:pPr>
+              <a:lnSpc>
+                <a:spcPct val="100000"/>
+              </a:lnSpc>
+            </a:pPr>
+            <a:r>
+              <a:rPr lang="en-GB" sz="2000" dirty="0">
+                <a:solidFill>
+                  <a:srgbClr val="D4D4D4"/>
+                </a:solidFill>
+                <a:latin typeface="Consolas" panose="020B0609020204030204" pitchFamily="49" charset="0"/>
+              </a:rPr>
+              <a:t>  - </a:t>
+            </a:r>
+            <a:r>
+              <a:rPr lang="en-GB" sz="2000" dirty="0">
+                <a:solidFill>
+                  <a:srgbClr val="569CD6"/>
+                </a:solidFill>
+                <a:latin typeface="Consolas" panose="020B0609020204030204" pitchFamily="49" charset="0"/>
+              </a:rPr>
+              <a:t>name</a:t>
+            </a:r>
+            <a:r>
+              <a:rPr lang="en-GB" sz="2000" dirty="0">
+                <a:solidFill>
+                  <a:srgbClr val="D4D4D4"/>
+                </a:solidFill>
+                <a:latin typeface="Consolas" panose="020B0609020204030204" pitchFamily="49" charset="0"/>
+              </a:rPr>
+              <a:t>: </a:t>
+            </a:r>
+            <a:r>
+              <a:rPr lang="en-GB" sz="2000" dirty="0" err="1" smtClean="0">
+                <a:solidFill>
+                  <a:srgbClr val="CE9178"/>
+                </a:solidFill>
+                <a:latin typeface="Consolas" panose="020B0609020204030204" pitchFamily="49" charset="0"/>
+              </a:rPr>
+              <a:t>ubuntu</a:t>
+            </a:r>
+            <a:r>
+              <a:rPr lang="en-GB" sz="2000" dirty="0" smtClean="0">
+                <a:solidFill>
+                  <a:srgbClr val="CE9178"/>
+                </a:solidFill>
+                <a:latin typeface="Consolas" panose="020B0609020204030204" pitchFamily="49" charset="0"/>
+              </a:rPr>
+              <a:t>-sleeper</a:t>
+            </a:r>
+            <a:endParaRPr lang="en-GB" sz="2000" dirty="0">
+              <a:solidFill>
+                <a:srgbClr val="D4D4D4"/>
+              </a:solidFill>
+              <a:latin typeface="Consolas" panose="020B0609020204030204" pitchFamily="49" charset="0"/>
+            </a:endParaRPr>
+          </a:p>
+          <a:p>
+            <a:pPr>
+              <a:lnSpc>
+                <a:spcPct val="100000"/>
+              </a:lnSpc>
+            </a:pPr>
+            <a:r>
+              <a:rPr lang="en-GB" sz="2000" dirty="0">
+                <a:solidFill>
+                  <a:srgbClr val="D4D4D4"/>
+                </a:solidFill>
+                <a:latin typeface="Consolas" panose="020B0609020204030204" pitchFamily="49" charset="0"/>
+              </a:rPr>
+              <a:t>    </a:t>
+            </a:r>
+            <a:r>
+              <a:rPr lang="en-GB" sz="2000" dirty="0">
+                <a:solidFill>
+                  <a:srgbClr val="569CD6"/>
+                </a:solidFill>
+                <a:latin typeface="Consolas" panose="020B0609020204030204" pitchFamily="49" charset="0"/>
+              </a:rPr>
+              <a:t>image</a:t>
+            </a:r>
+            <a:r>
+              <a:rPr lang="en-GB" sz="2000" dirty="0">
+                <a:solidFill>
+                  <a:srgbClr val="D4D4D4"/>
+                </a:solidFill>
+                <a:latin typeface="Consolas" panose="020B0609020204030204" pitchFamily="49" charset="0"/>
+              </a:rPr>
+              <a:t>: </a:t>
+            </a:r>
+            <a:r>
+              <a:rPr lang="en-GB" sz="2000" dirty="0" err="1">
+                <a:solidFill>
+                  <a:srgbClr val="CE9178"/>
+                </a:solidFill>
+                <a:latin typeface="Consolas" panose="020B0609020204030204" pitchFamily="49" charset="0"/>
+              </a:rPr>
+              <a:t>ubuntu</a:t>
+            </a:r>
+            <a:r>
+              <a:rPr lang="en-GB" sz="2000" dirty="0">
+                <a:solidFill>
+                  <a:srgbClr val="CE9178"/>
+                </a:solidFill>
+                <a:latin typeface="Consolas" panose="020B0609020204030204" pitchFamily="49" charset="0"/>
+              </a:rPr>
+              <a:t>-sleeper</a:t>
+            </a:r>
+            <a:endParaRPr lang="en-GB" sz="2000" dirty="0">
+              <a:solidFill>
+                <a:srgbClr val="D4D4D4"/>
+              </a:solidFill>
+              <a:latin typeface="Consolas" panose="020B0609020204030204" pitchFamily="49" charset="0"/>
+            </a:endParaRPr>
+          </a:p>
+          <a:p>
+            <a:pPr>
+              <a:lnSpc>
+                <a:spcPct val="100000"/>
+              </a:lnSpc>
+            </a:pPr>
+            <a:r>
+              <a:rPr lang="en-GB" sz="2000" dirty="0">
+                <a:solidFill>
+                  <a:srgbClr val="D4D4D4"/>
+                </a:solidFill>
+                <a:latin typeface="Consolas" panose="020B0609020204030204" pitchFamily="49" charset="0"/>
+              </a:rPr>
+              <a:t>    </a:t>
+            </a:r>
+            <a:r>
+              <a:rPr lang="en-GB" sz="2000" dirty="0">
+                <a:solidFill>
+                  <a:srgbClr val="569CD6"/>
+                </a:solidFill>
+                <a:latin typeface="Consolas" panose="020B0609020204030204" pitchFamily="49" charset="0"/>
+              </a:rPr>
+              <a:t>command</a:t>
+            </a:r>
+            <a:r>
+              <a:rPr lang="en-GB" sz="2000" dirty="0">
+                <a:solidFill>
+                  <a:srgbClr val="D4D4D4"/>
+                </a:solidFill>
+                <a:latin typeface="Consolas" panose="020B0609020204030204" pitchFamily="49" charset="0"/>
+              </a:rPr>
+              <a:t>: [</a:t>
+            </a:r>
+            <a:r>
+              <a:rPr lang="en-GB" sz="2000" dirty="0">
+                <a:solidFill>
+                  <a:srgbClr val="CE9178"/>
+                </a:solidFill>
+                <a:latin typeface="Consolas" panose="020B0609020204030204" pitchFamily="49" charset="0"/>
+              </a:rPr>
+              <a:t>sleep3.0</a:t>
+            </a:r>
+            <a:r>
+              <a:rPr lang="en-GB" sz="2000" dirty="0">
+                <a:solidFill>
+                  <a:srgbClr val="D4D4D4"/>
+                </a:solidFill>
+                <a:latin typeface="Consolas" panose="020B0609020204030204" pitchFamily="49" charset="0"/>
+              </a:rPr>
+              <a:t>]</a:t>
+            </a:r>
+          </a:p>
+          <a:p>
+            <a:pPr>
+              <a:lnSpc>
+                <a:spcPct val="100000"/>
+              </a:lnSpc>
+            </a:pPr>
+            <a:r>
+              <a:rPr lang="en-GB" sz="2000" dirty="0">
+                <a:solidFill>
+                  <a:srgbClr val="D4D4D4"/>
+                </a:solidFill>
+                <a:latin typeface="Consolas" panose="020B0609020204030204" pitchFamily="49" charset="0"/>
+              </a:rPr>
+              <a:t>    </a:t>
+            </a:r>
+            <a:r>
+              <a:rPr lang="en-GB" sz="2000" dirty="0" err="1">
+                <a:solidFill>
+                  <a:srgbClr val="569CD6"/>
+                </a:solidFill>
+                <a:latin typeface="Consolas" panose="020B0609020204030204" pitchFamily="49" charset="0"/>
+              </a:rPr>
+              <a:t>args</a:t>
+            </a:r>
+            <a:r>
+              <a:rPr lang="en-GB" sz="2000" dirty="0">
+                <a:solidFill>
+                  <a:srgbClr val="D4D4D4"/>
+                </a:solidFill>
+                <a:latin typeface="Consolas" panose="020B0609020204030204" pitchFamily="49" charset="0"/>
+              </a:rPr>
+              <a:t>: [</a:t>
+            </a:r>
+            <a:r>
+              <a:rPr lang="en-GB" sz="2000" dirty="0">
+                <a:solidFill>
+                  <a:srgbClr val="CE9178"/>
+                </a:solidFill>
+                <a:latin typeface="Consolas" panose="020B0609020204030204" pitchFamily="49" charset="0"/>
+              </a:rPr>
+              <a:t>"15"</a:t>
+            </a:r>
+            <a:r>
+              <a:rPr lang="en-GB" sz="2000" dirty="0">
+                <a:solidFill>
+                  <a:srgbClr val="D4D4D4"/>
+                </a:solidFill>
+                <a:latin typeface="Consolas" panose="020B0609020204030204" pitchFamily="49" charset="0"/>
+              </a:rPr>
+              <a:t>]</a:t>
+            </a:r>
+            <a:endParaRPr lang="en-GB" sz="2000" b="0" dirty="0">
+              <a:solidFill>
+                <a:srgbClr val="D4D4D4"/>
+              </a:solidFill>
+              <a:effectLst/>
+              <a:latin typeface="Consolas" panose="020B0609020204030204" pitchFamily="49" charset="0"/>
+            </a:endParaRPr>
+          </a:p>
+        </p:txBody>
+      </p:sp>
+      <p:sp>
+        <p:nvSpPr>
+          <p:cNvPr id="14" name="Snip Single Corner Rectangle 13"/>
+          <p:cNvSpPr/>
+          <p:nvPr/>
+        </p:nvSpPr>
+        <p:spPr>
+          <a:xfrm>
+            <a:off x="6598349" y="419100"/>
+            <a:ext cx="2038350" cy="348255"/>
+          </a:xfrm>
+          <a:prstGeom prst="snip1Rect">
+            <a:avLst/>
+          </a:prstGeom>
+        </p:spPr>
+        <p:style>
+          <a:lnRef idx="2">
+            <a:schemeClr val="dk1">
+              <a:shade val="50000"/>
+            </a:schemeClr>
+          </a:lnRef>
+          <a:fillRef idx="1">
+            <a:schemeClr val="dk1"/>
+          </a:fillRef>
+          <a:effectRef idx="0">
+            <a:schemeClr val="dk1"/>
+          </a:effectRef>
+          <a:fontRef idx="minor">
+            <a:schemeClr val="lt1"/>
+          </a:fontRef>
+        </p:style>
+        <p:txBody>
+          <a:bodyPr rtlCol="0" anchor="ctr"/>
+          <a:lstStyle/>
+          <a:p>
+            <a:pPr algn="ctr"/>
+            <a:r>
+              <a:rPr lang="en-US" dirty="0" err="1" smtClean="0"/>
+              <a:t>pod.yml</a:t>
+            </a:r>
+            <a:endParaRPr lang="en-GB" dirty="0"/>
+          </a:p>
+        </p:txBody>
+      </p:sp>
+      <p:sp>
+        <p:nvSpPr>
+          <p:cNvPr id="10" name="Content Placeholder 2"/>
+          <p:cNvSpPr>
+            <a:spLocks noGrp="1"/>
+          </p:cNvSpPr>
+          <p:nvPr>
+            <p:ph idx="1"/>
+          </p:nvPr>
+        </p:nvSpPr>
+        <p:spPr>
+          <a:xfrm>
+            <a:off x="838200" y="1825625"/>
+            <a:ext cx="2581275" cy="4351338"/>
+          </a:xfrm>
+        </p:spPr>
+        <p:txBody>
+          <a:bodyPr/>
+          <a:lstStyle/>
+          <a:p>
+            <a:pPr marL="0" indent="0">
+              <a:buNone/>
+            </a:pPr>
+            <a:r>
+              <a:rPr lang="en-US" dirty="0" smtClean="0"/>
+              <a:t>s</a:t>
+            </a:r>
+            <a:endParaRPr lang="en-GB" dirty="0"/>
+          </a:p>
+        </p:txBody>
+      </p:sp>
+      <p:sp>
+        <p:nvSpPr>
+          <p:cNvPr id="6" name="Rectangle 5"/>
+          <p:cNvSpPr/>
+          <p:nvPr/>
+        </p:nvSpPr>
+        <p:spPr>
+          <a:xfrm>
+            <a:off x="7110046" y="3387970"/>
+            <a:ext cx="3182816" cy="668216"/>
+          </a:xfrm>
+          <a:prstGeom prst="rect">
+            <a:avLst/>
+          </a:prstGeom>
+          <a:noFill/>
+          <a:ln w="19050">
+            <a:solidFill>
+              <a:schemeClr val="accent2"/>
+            </a:solidFill>
+            <a:prstDash val="sysDash"/>
+          </a:ln>
+        </p:spPr>
+        <p:style>
+          <a:lnRef idx="2">
+            <a:schemeClr val="accent1">
+              <a:shade val="50000"/>
+            </a:schemeClr>
+          </a:lnRef>
+          <a:fillRef idx="1">
+            <a:schemeClr val="accent1"/>
+          </a:fillRef>
+          <a:effectRef idx="0">
+            <a:schemeClr val="accent1"/>
+          </a:effectRef>
+          <a:fontRef idx="minor">
+            <a:schemeClr val="lt1"/>
+          </a:fontRef>
+        </p:style>
+        <p:txBody>
+          <a:bodyPr rtlCol="0" anchor="ctr"/>
+          <a:lstStyle/>
+          <a:p>
+            <a:pPr algn="ctr"/>
+            <a:endParaRPr lang="en-GB"/>
+          </a:p>
+        </p:txBody>
+      </p:sp>
+    </p:spTree>
+    <p:extLst>
+      <p:ext uri="{BB962C8B-B14F-4D97-AF65-F5344CB8AC3E}">
+        <p14:creationId xmlns:p14="http://schemas.microsoft.com/office/powerpoint/2010/main" val="3223514410"/>
+      </p:ext>
+    </p:extLst>
+  </p:cSld>
+  <p:clrMapOvr>
+    <a:masterClrMapping/>
+  </p:clrMapOvr>
+  <p:timing>
+    <p:tnLst>
+      <p:par>
+        <p:cTn id="1" dur="indefinite" restart="never" nodeType="tmRoot"/>
+      </p:par>
+    </p:tnLst>
+  </p:timing>
+</p:sld>
+</file>
+
+<file path=ppt/slides/slide13.xml><?xml version="1.0" encoding="utf-8"?>
+<p:sld xmlns:a="http://schemas.openxmlformats.org/drawingml/2006/main" xmlns:r="http://schemas.openxmlformats.org/officeDocument/2006/relationships" xmlns:p="http://schemas.openxmlformats.org/presentationml/2006/main">
+  <p:cSld>
+    <p:spTree>
+      <p:nvGrpSpPr>
+        <p:cNvPr id="1" name=""/>
+        <p:cNvGrpSpPr/>
+        <p:nvPr/>
+      </p:nvGrpSpPr>
+      <p:grpSpPr>
+        <a:xfrm>
+          <a:off x="0" y="0"/>
+          <a:ext cx="0" cy="0"/>
+          <a:chOff x="0" y="0"/>
+          <a:chExt cx="0" cy="0"/>
+        </a:xfrm>
+      </p:grpSpPr>
       <p:sp>
         <p:nvSpPr>
           <p:cNvPr id="9" name="Title 1"/>
@@ -3803,7 +5169,7 @@
 </p:sld>
 </file>
 
-<file path=ppt/slides/slide11.xml><?xml version="1.0" encoding="utf-8"?>
+<file path=ppt/slides/slide14.xml><?xml version="1.0" encoding="utf-8"?>
 <p:sld xmlns:a="http://schemas.openxmlformats.org/drawingml/2006/main" xmlns:r="http://schemas.openxmlformats.org/officeDocument/2006/relationships" xmlns:p="http://schemas.openxmlformats.org/presentationml/2006/main">
   <p:cSld>
     <p:spTree>
@@ -5372,6 +6738,637 @@
       </p:grpSpPr>
       <p:sp>
         <p:nvSpPr>
+          <p:cNvPr id="2" name="Title 1"/>
+          <p:cNvSpPr>
+            <a:spLocks noGrp="1"/>
+          </p:cNvSpPr>
+          <p:nvPr>
+            <p:ph type="title"/>
+          </p:nvPr>
+        </p:nvSpPr>
+        <p:spPr/>
+        <p:txBody>
+          <a:bodyPr/>
+          <a:lstStyle/>
+          <a:p>
+            <a:r>
+              <a:rPr lang="en-US" dirty="0"/>
+              <a:t>Section </a:t>
+            </a:r>
+            <a:r>
+              <a:rPr lang="en-US" dirty="0"/>
+              <a:t>4 - First </a:t>
+            </a:r>
+            <a:r>
+              <a:rPr lang="en-US" dirty="0" err="1"/>
+              <a:t>kubectl</a:t>
+            </a:r>
+            <a:r>
+              <a:rPr lang="en-US" dirty="0"/>
+              <a:t> commands</a:t>
+            </a:r>
+            <a:endParaRPr lang="en-GB" dirty="0"/>
+          </a:p>
+        </p:txBody>
+      </p:sp>
+    </p:spTree>
+    <p:extLst>
+      <p:ext uri="{BB962C8B-B14F-4D97-AF65-F5344CB8AC3E}">
+        <p14:creationId xmlns:p14="http://schemas.microsoft.com/office/powerpoint/2010/main" val="1471900931"/>
+      </p:ext>
+    </p:extLst>
+  </p:cSld>
+  <p:clrMapOvr>
+    <a:masterClrMapping/>
+  </p:clrMapOvr>
+  <p:timing>
+    <p:tnLst>
+      <p:par>
+        <p:cTn id="1" dur="indefinite" restart="never" nodeType="tmRoot"/>
+      </p:par>
+    </p:tnLst>
+  </p:timing>
+</p:sld>
+</file>
+
+<file path=ppt/slides/slide5.xml><?xml version="1.0" encoding="utf-8"?>
+<p:sld xmlns:a="http://schemas.openxmlformats.org/drawingml/2006/main" xmlns:r="http://schemas.openxmlformats.org/officeDocument/2006/relationships" xmlns:p="http://schemas.openxmlformats.org/presentationml/2006/main">
+  <p:cSld>
+    <p:spTree>
+      <p:nvGrpSpPr>
+        <p:cNvPr id="1" name=""/>
+        <p:cNvGrpSpPr/>
+        <p:nvPr/>
+      </p:nvGrpSpPr>
+      <p:grpSpPr>
+        <a:xfrm>
+          <a:off x="0" y="0"/>
+          <a:ext cx="0" cy="0"/>
+          <a:chOff x="0" y="0"/>
+          <a:chExt cx="0" cy="0"/>
+        </a:xfrm>
+      </p:grpSpPr>
+      <p:sp>
+        <p:nvSpPr>
+          <p:cNvPr id="9" name="Title 1"/>
+          <p:cNvSpPr txBox="1">
+            <a:spLocks/>
+          </p:cNvSpPr>
+          <p:nvPr/>
+        </p:nvSpPr>
+        <p:spPr>
+          <a:xfrm>
+            <a:off x="6592481" y="748306"/>
+            <a:ext cx="4532720" cy="3328394"/>
+          </a:xfrm>
+          <a:prstGeom prst="rect">
+            <a:avLst/>
+          </a:prstGeom>
+          <a:solidFill>
+            <a:schemeClr val="tx1"/>
+          </a:solidFill>
+        </p:spPr>
+        <p:txBody>
+          <a:bodyPr vert="horz" lIns="180000" tIns="180000" rIns="91440" bIns="45720" rtlCol="0" anchor="t">
+            <a:noAutofit/>
+          </a:bodyPr>
+          <a:lstStyle>
+            <a:lvl1pPr algn="l" defTabSz="914400" rtl="0" eaLnBrk="1" latinLnBrk="0" hangingPunct="1">
+              <a:lnSpc>
+                <a:spcPct val="90000"/>
+              </a:lnSpc>
+              <a:spcBef>
+                <a:spcPct val="0"/>
+              </a:spcBef>
+              <a:buNone/>
+              <a:defRPr sz="4400" kern="1200">
+                <a:solidFill>
+                  <a:schemeClr val="tx1"/>
+                </a:solidFill>
+                <a:latin typeface="+mj-lt"/>
+                <a:ea typeface="+mj-ea"/>
+                <a:cs typeface="+mj-cs"/>
+              </a:defRPr>
+            </a:lvl1pPr>
+          </a:lstStyle>
+          <a:p>
+            <a:pPr>
+              <a:lnSpc>
+                <a:spcPct val="100000"/>
+              </a:lnSpc>
+            </a:pPr>
+            <a:r>
+              <a:rPr lang="en-GB" sz="2000" dirty="0" err="1">
+                <a:solidFill>
+                  <a:srgbClr val="569CD6"/>
+                </a:solidFill>
+                <a:latin typeface="Consolas" panose="020B0609020204030204" pitchFamily="49" charset="0"/>
+              </a:rPr>
+              <a:t>apiVersion</a:t>
+            </a:r>
+            <a:r>
+              <a:rPr lang="en-GB" sz="2000" dirty="0">
+                <a:solidFill>
+                  <a:srgbClr val="D4D4D4"/>
+                </a:solidFill>
+                <a:latin typeface="Consolas" panose="020B0609020204030204" pitchFamily="49" charset="0"/>
+              </a:rPr>
+              <a:t>: </a:t>
+            </a:r>
+            <a:r>
+              <a:rPr lang="en-GB" sz="2000" dirty="0">
+                <a:solidFill>
+                  <a:srgbClr val="CE9178"/>
+                </a:solidFill>
+                <a:latin typeface="Consolas" panose="020B0609020204030204" pitchFamily="49" charset="0"/>
+              </a:rPr>
+              <a:t>v1</a:t>
+            </a:r>
+            <a:endParaRPr lang="en-GB" sz="2000" dirty="0">
+              <a:solidFill>
+                <a:srgbClr val="D4D4D4"/>
+              </a:solidFill>
+              <a:latin typeface="Consolas" panose="020B0609020204030204" pitchFamily="49" charset="0"/>
+            </a:endParaRPr>
+          </a:p>
+          <a:p>
+            <a:pPr>
+              <a:lnSpc>
+                <a:spcPct val="100000"/>
+              </a:lnSpc>
+            </a:pPr>
+            <a:r>
+              <a:rPr lang="en-GB" sz="2000" dirty="0">
+                <a:solidFill>
+                  <a:srgbClr val="569CD6"/>
+                </a:solidFill>
+                <a:latin typeface="Consolas" panose="020B0609020204030204" pitchFamily="49" charset="0"/>
+              </a:rPr>
+              <a:t>kind</a:t>
+            </a:r>
+            <a:r>
+              <a:rPr lang="en-GB" sz="2000" dirty="0">
+                <a:solidFill>
+                  <a:srgbClr val="D4D4D4"/>
+                </a:solidFill>
+                <a:latin typeface="Consolas" panose="020B0609020204030204" pitchFamily="49" charset="0"/>
+              </a:rPr>
+              <a:t>: </a:t>
+            </a:r>
+            <a:r>
+              <a:rPr lang="en-GB" sz="2000" dirty="0">
+                <a:solidFill>
+                  <a:srgbClr val="CE9178"/>
+                </a:solidFill>
+                <a:latin typeface="Consolas" panose="020B0609020204030204" pitchFamily="49" charset="0"/>
+              </a:rPr>
+              <a:t>Pod</a:t>
+            </a:r>
+            <a:endParaRPr lang="en-GB" sz="2000" dirty="0">
+              <a:solidFill>
+                <a:srgbClr val="D4D4D4"/>
+              </a:solidFill>
+              <a:latin typeface="Consolas" panose="020B0609020204030204" pitchFamily="49" charset="0"/>
+            </a:endParaRPr>
+          </a:p>
+          <a:p>
+            <a:pPr>
+              <a:lnSpc>
+                <a:spcPct val="100000"/>
+              </a:lnSpc>
+            </a:pPr>
+            <a:r>
+              <a:rPr lang="en-GB" sz="2000" dirty="0">
+                <a:solidFill>
+                  <a:srgbClr val="569CD6"/>
+                </a:solidFill>
+                <a:latin typeface="Consolas" panose="020B0609020204030204" pitchFamily="49" charset="0"/>
+              </a:rPr>
+              <a:t>metadata</a:t>
+            </a:r>
+            <a:r>
+              <a:rPr lang="en-GB" sz="2000" dirty="0">
+                <a:solidFill>
+                  <a:srgbClr val="D4D4D4"/>
+                </a:solidFill>
+                <a:latin typeface="Consolas" panose="020B0609020204030204" pitchFamily="49" charset="0"/>
+              </a:rPr>
+              <a:t>:</a:t>
+            </a:r>
+          </a:p>
+          <a:p>
+            <a:pPr>
+              <a:lnSpc>
+                <a:spcPct val="100000"/>
+              </a:lnSpc>
+            </a:pPr>
+            <a:r>
+              <a:rPr lang="en-GB" sz="2000" dirty="0">
+                <a:solidFill>
+                  <a:srgbClr val="D4D4D4"/>
+                </a:solidFill>
+                <a:latin typeface="Consolas" panose="020B0609020204030204" pitchFamily="49" charset="0"/>
+              </a:rPr>
+              <a:t>  </a:t>
+            </a:r>
+            <a:r>
+              <a:rPr lang="en-GB" sz="2000" dirty="0">
+                <a:solidFill>
+                  <a:srgbClr val="569CD6"/>
+                </a:solidFill>
+                <a:latin typeface="Consolas" panose="020B0609020204030204" pitchFamily="49" charset="0"/>
+              </a:rPr>
+              <a:t>name</a:t>
+            </a:r>
+            <a:r>
+              <a:rPr lang="en-GB" sz="2000" dirty="0">
+                <a:solidFill>
+                  <a:srgbClr val="D4D4D4"/>
+                </a:solidFill>
+                <a:latin typeface="Consolas" panose="020B0609020204030204" pitchFamily="49" charset="0"/>
+              </a:rPr>
+              <a:t>: </a:t>
+            </a:r>
+            <a:r>
+              <a:rPr lang="en-GB" sz="2000" dirty="0">
+                <a:solidFill>
+                  <a:srgbClr val="CE9178"/>
+                </a:solidFill>
+                <a:latin typeface="Consolas" panose="020B0609020204030204" pitchFamily="49" charset="0"/>
+              </a:rPr>
+              <a:t>pod-</a:t>
+            </a:r>
+            <a:r>
+              <a:rPr lang="en-GB" sz="2000" dirty="0" err="1">
+                <a:solidFill>
+                  <a:srgbClr val="CE9178"/>
+                </a:solidFill>
+                <a:latin typeface="Consolas" panose="020B0609020204030204" pitchFamily="49" charset="0"/>
+              </a:rPr>
+              <a:t>nginx</a:t>
+            </a:r>
+            <a:endParaRPr lang="en-GB" sz="2000" dirty="0">
+              <a:solidFill>
+                <a:srgbClr val="D4D4D4"/>
+              </a:solidFill>
+              <a:latin typeface="Consolas" panose="020B0609020204030204" pitchFamily="49" charset="0"/>
+            </a:endParaRPr>
+          </a:p>
+          <a:p>
+            <a:pPr>
+              <a:lnSpc>
+                <a:spcPct val="100000"/>
+              </a:lnSpc>
+            </a:pPr>
+            <a:r>
+              <a:rPr lang="en-GB" sz="2000" dirty="0">
+                <a:solidFill>
+                  <a:srgbClr val="569CD6"/>
+                </a:solidFill>
+                <a:latin typeface="Consolas" panose="020B0609020204030204" pitchFamily="49" charset="0"/>
+              </a:rPr>
+              <a:t>spec</a:t>
+            </a:r>
+            <a:r>
+              <a:rPr lang="en-GB" sz="2000" dirty="0">
+                <a:solidFill>
+                  <a:srgbClr val="D4D4D4"/>
+                </a:solidFill>
+                <a:latin typeface="Consolas" panose="020B0609020204030204" pitchFamily="49" charset="0"/>
+              </a:rPr>
+              <a:t>:</a:t>
+            </a:r>
+          </a:p>
+          <a:p>
+            <a:pPr>
+              <a:lnSpc>
+                <a:spcPct val="100000"/>
+              </a:lnSpc>
+            </a:pPr>
+            <a:r>
+              <a:rPr lang="en-GB" sz="2000" dirty="0">
+                <a:solidFill>
+                  <a:srgbClr val="D4D4D4"/>
+                </a:solidFill>
+                <a:latin typeface="Consolas" panose="020B0609020204030204" pitchFamily="49" charset="0"/>
+              </a:rPr>
+              <a:t>  </a:t>
+            </a:r>
+            <a:r>
+              <a:rPr lang="en-GB" sz="2000" dirty="0">
+                <a:solidFill>
+                  <a:srgbClr val="569CD6"/>
+                </a:solidFill>
+                <a:latin typeface="Consolas" panose="020B0609020204030204" pitchFamily="49" charset="0"/>
+              </a:rPr>
+              <a:t>containers</a:t>
+            </a:r>
+            <a:r>
+              <a:rPr lang="en-GB" sz="2000" dirty="0">
+                <a:solidFill>
+                  <a:srgbClr val="D4D4D4"/>
+                </a:solidFill>
+                <a:latin typeface="Consolas" panose="020B0609020204030204" pitchFamily="49" charset="0"/>
+              </a:rPr>
+              <a:t>:</a:t>
+            </a:r>
+          </a:p>
+          <a:p>
+            <a:pPr>
+              <a:lnSpc>
+                <a:spcPct val="100000"/>
+              </a:lnSpc>
+            </a:pPr>
+            <a:r>
+              <a:rPr lang="en-GB" sz="2000" dirty="0">
+                <a:solidFill>
+                  <a:srgbClr val="D4D4D4"/>
+                </a:solidFill>
+                <a:latin typeface="Consolas" panose="020B0609020204030204" pitchFamily="49" charset="0"/>
+              </a:rPr>
+              <a:t>    - </a:t>
+            </a:r>
+            <a:r>
+              <a:rPr lang="en-GB" sz="2000" dirty="0">
+                <a:solidFill>
+                  <a:srgbClr val="569CD6"/>
+                </a:solidFill>
+                <a:latin typeface="Consolas" panose="020B0609020204030204" pitchFamily="49" charset="0"/>
+              </a:rPr>
+              <a:t>image</a:t>
+            </a:r>
+            <a:r>
+              <a:rPr lang="en-GB" sz="2000" dirty="0">
+                <a:solidFill>
+                  <a:srgbClr val="D4D4D4"/>
+                </a:solidFill>
+                <a:latin typeface="Consolas" panose="020B0609020204030204" pitchFamily="49" charset="0"/>
+              </a:rPr>
+              <a:t>: </a:t>
+            </a:r>
+            <a:r>
+              <a:rPr lang="en-GB" sz="2000" dirty="0" err="1">
+                <a:solidFill>
+                  <a:srgbClr val="CE9178"/>
+                </a:solidFill>
+                <a:latin typeface="Consolas" panose="020B0609020204030204" pitchFamily="49" charset="0"/>
+              </a:rPr>
+              <a:t>nginx</a:t>
+            </a:r>
+            <a:endParaRPr lang="en-GB" sz="2000" dirty="0">
+              <a:solidFill>
+                <a:srgbClr val="D4D4D4"/>
+              </a:solidFill>
+              <a:latin typeface="Consolas" panose="020B0609020204030204" pitchFamily="49" charset="0"/>
+            </a:endParaRPr>
+          </a:p>
+          <a:p>
+            <a:pPr>
+              <a:lnSpc>
+                <a:spcPct val="100000"/>
+              </a:lnSpc>
+            </a:pPr>
+            <a:r>
+              <a:rPr lang="en-GB" sz="2000" dirty="0">
+                <a:solidFill>
+                  <a:srgbClr val="D4D4D4"/>
+                </a:solidFill>
+                <a:latin typeface="Consolas" panose="020B0609020204030204" pitchFamily="49" charset="0"/>
+              </a:rPr>
+              <a:t>      </a:t>
+            </a:r>
+            <a:r>
+              <a:rPr lang="en-GB" sz="2000" dirty="0">
+                <a:solidFill>
+                  <a:srgbClr val="569CD6"/>
+                </a:solidFill>
+                <a:latin typeface="Consolas" panose="020B0609020204030204" pitchFamily="49" charset="0"/>
+              </a:rPr>
+              <a:t>name</a:t>
+            </a:r>
+            <a:r>
+              <a:rPr lang="en-GB" sz="2000" dirty="0">
+                <a:solidFill>
+                  <a:srgbClr val="D4D4D4"/>
+                </a:solidFill>
+                <a:latin typeface="Consolas" panose="020B0609020204030204" pitchFamily="49" charset="0"/>
+              </a:rPr>
+              <a:t>: </a:t>
+            </a:r>
+            <a:r>
+              <a:rPr lang="en-GB" sz="2000" dirty="0">
+                <a:solidFill>
+                  <a:srgbClr val="CE9178"/>
+                </a:solidFill>
+                <a:latin typeface="Consolas" panose="020B0609020204030204" pitchFamily="49" charset="0"/>
+              </a:rPr>
+              <a:t>container-</a:t>
+            </a:r>
+            <a:r>
+              <a:rPr lang="en-GB" sz="2000" dirty="0" err="1">
+                <a:solidFill>
+                  <a:srgbClr val="CE9178"/>
+                </a:solidFill>
+                <a:latin typeface="Consolas" panose="020B0609020204030204" pitchFamily="49" charset="0"/>
+              </a:rPr>
+              <a:t>nginx</a:t>
+            </a:r>
+            <a:endParaRPr lang="en-GB" sz="2000" b="0" dirty="0">
+              <a:solidFill>
+                <a:srgbClr val="D4D4D4"/>
+              </a:solidFill>
+              <a:effectLst/>
+              <a:latin typeface="Consolas" panose="020B0609020204030204" pitchFamily="49" charset="0"/>
+            </a:endParaRPr>
+          </a:p>
+        </p:txBody>
+      </p:sp>
+      <p:sp>
+        <p:nvSpPr>
+          <p:cNvPr id="14" name="Snip Single Corner Rectangle 13"/>
+          <p:cNvSpPr/>
+          <p:nvPr/>
+        </p:nvSpPr>
+        <p:spPr>
+          <a:xfrm>
+            <a:off x="6598349" y="419100"/>
+            <a:ext cx="2038350" cy="348255"/>
+          </a:xfrm>
+          <a:prstGeom prst="snip1Rect">
+            <a:avLst/>
+          </a:prstGeom>
+        </p:spPr>
+        <p:style>
+          <a:lnRef idx="2">
+            <a:schemeClr val="dk1">
+              <a:shade val="50000"/>
+            </a:schemeClr>
+          </a:lnRef>
+          <a:fillRef idx="1">
+            <a:schemeClr val="dk1"/>
+          </a:fillRef>
+          <a:effectRef idx="0">
+            <a:schemeClr val="dk1"/>
+          </a:effectRef>
+          <a:fontRef idx="minor">
+            <a:schemeClr val="lt1"/>
+          </a:fontRef>
+        </p:style>
+        <p:txBody>
+          <a:bodyPr rtlCol="0" anchor="ctr"/>
+          <a:lstStyle/>
+          <a:p>
+            <a:pPr algn="ctr"/>
+            <a:r>
+              <a:rPr lang="en-US" dirty="0" err="1" smtClean="0"/>
+              <a:t>pod.yml</a:t>
+            </a:r>
+            <a:r>
+              <a:rPr lang="en-US" dirty="0" smtClean="0"/>
+              <a:t> </a:t>
+            </a:r>
+            <a:endParaRPr lang="en-GB" dirty="0"/>
+          </a:p>
+        </p:txBody>
+      </p:sp>
+      <p:sp>
+        <p:nvSpPr>
+          <p:cNvPr id="10" name="Content Placeholder 2"/>
+          <p:cNvSpPr>
+            <a:spLocks noGrp="1"/>
+          </p:cNvSpPr>
+          <p:nvPr>
+            <p:ph idx="1"/>
+          </p:nvPr>
+        </p:nvSpPr>
+        <p:spPr>
+          <a:xfrm>
+            <a:off x="838200" y="1825625"/>
+            <a:ext cx="2581275" cy="4351338"/>
+          </a:xfrm>
+        </p:spPr>
+        <p:txBody>
+          <a:bodyPr/>
+          <a:lstStyle/>
+          <a:p>
+            <a:pPr marL="0" indent="0">
+              <a:buNone/>
+            </a:pPr>
+            <a:r>
+              <a:rPr lang="en-US" dirty="0" smtClean="0"/>
+              <a:t>s</a:t>
+            </a:r>
+            <a:endParaRPr lang="en-GB" dirty="0"/>
+          </a:p>
+        </p:txBody>
+      </p:sp>
+    </p:spTree>
+    <p:extLst>
+      <p:ext uri="{BB962C8B-B14F-4D97-AF65-F5344CB8AC3E}">
+        <p14:creationId xmlns:p14="http://schemas.microsoft.com/office/powerpoint/2010/main" val="2047917521"/>
+      </p:ext>
+    </p:extLst>
+  </p:cSld>
+  <p:clrMapOvr>
+    <a:masterClrMapping/>
+  </p:clrMapOvr>
+  <p:timing>
+    <p:tnLst>
+      <p:par>
+        <p:cTn id="1" dur="indefinite" restart="never" nodeType="tmRoot"/>
+      </p:par>
+    </p:tnLst>
+  </p:timing>
+</p:sld>
+</file>
+
+<file path=ppt/slides/slide6.xml><?xml version="1.0" encoding="utf-8"?>
+<p:sld xmlns:a="http://schemas.openxmlformats.org/drawingml/2006/main" xmlns:r="http://schemas.openxmlformats.org/officeDocument/2006/relationships" xmlns:p="http://schemas.openxmlformats.org/presentationml/2006/main">
+  <p:cSld>
+    <p:spTree>
+      <p:nvGrpSpPr>
+        <p:cNvPr id="1" name=""/>
+        <p:cNvGrpSpPr/>
+        <p:nvPr/>
+      </p:nvGrpSpPr>
+      <p:grpSpPr>
+        <a:xfrm>
+          <a:off x="0" y="0"/>
+          <a:ext cx="0" cy="0"/>
+          <a:chOff x="0" y="0"/>
+          <a:chExt cx="0" cy="0"/>
+        </a:xfrm>
+      </p:grpSpPr>
+      <p:sp>
+        <p:nvSpPr>
+          <p:cNvPr id="2" name="Title 1"/>
+          <p:cNvSpPr>
+            <a:spLocks noGrp="1"/>
+          </p:cNvSpPr>
+          <p:nvPr>
+            <p:ph type="title"/>
+          </p:nvPr>
+        </p:nvSpPr>
+        <p:spPr/>
+        <p:txBody>
+          <a:bodyPr/>
+          <a:lstStyle/>
+          <a:p>
+            <a:r>
+              <a:rPr lang="en-US" dirty="0"/>
+              <a:t>Section </a:t>
+            </a:r>
+            <a:r>
+              <a:rPr lang="en-US" dirty="0" smtClean="0"/>
+              <a:t>6</a:t>
+            </a:r>
+            <a:r>
+              <a:rPr lang="en-US" dirty="0"/>
+              <a:t> - Kubernetes Services</a:t>
+            </a:r>
+            <a:endParaRPr lang="en-GB" dirty="0"/>
+          </a:p>
+        </p:txBody>
+      </p:sp>
+    </p:spTree>
+    <p:extLst>
+      <p:ext uri="{BB962C8B-B14F-4D97-AF65-F5344CB8AC3E}">
+        <p14:creationId xmlns:p14="http://schemas.microsoft.com/office/powerpoint/2010/main" val="3882183709"/>
+      </p:ext>
+    </p:extLst>
+  </p:cSld>
+  <p:clrMapOvr>
+    <a:masterClrMapping/>
+  </p:clrMapOvr>
+  <p:timing>
+    <p:tnLst>
+      <p:par>
+        <p:cTn id="1" dur="indefinite" restart="never" nodeType="tmRoot"/>
+      </p:par>
+    </p:tnLst>
+  </p:timing>
+</p:sld>
+</file>
+
+<file path=ppt/slides/slide7.xml><?xml version="1.0" encoding="utf-8"?>
+<p:sld xmlns:a="http://schemas.openxmlformats.org/drawingml/2006/main" xmlns:r="http://schemas.openxmlformats.org/officeDocument/2006/relationships" xmlns:p="http://schemas.openxmlformats.org/presentationml/2006/main">
+  <p:cSld>
+    <p:spTree>
+      <p:nvGrpSpPr>
+        <p:cNvPr id="1" name=""/>
+        <p:cNvGrpSpPr/>
+        <p:nvPr/>
+      </p:nvGrpSpPr>
+      <p:grpSpPr>
+        <a:xfrm>
+          <a:off x="0" y="0"/>
+          <a:ext cx="0" cy="0"/>
+          <a:chOff x="0" y="0"/>
+          <a:chExt cx="0" cy="0"/>
+        </a:xfrm>
+      </p:grpSpPr>
+      <p:sp>
+        <p:nvSpPr>
           <p:cNvPr id="4" name="Title 1"/>
           <p:cNvSpPr txBox="1">
             <a:spLocks/>
@@ -6215,7 +8212,7 @@
 </p:sld>
 </file>
 
-<file path=ppt/slides/slide5.xml><?xml version="1.0" encoding="utf-8"?>
+<file path=ppt/slides/slide8.xml><?xml version="1.0" encoding="utf-8"?>
 <p:sld xmlns:a="http://schemas.openxmlformats.org/drawingml/2006/main" xmlns:r="http://schemas.openxmlformats.org/officeDocument/2006/relationships" xmlns:p="http://schemas.openxmlformats.org/presentationml/2006/main">
   <p:cSld>
     <p:spTree>
@@ -7605,7 +9602,7 @@
 </p:sld>
 </file>
 
-<file path=ppt/slides/slide6.xml><?xml version="1.0" encoding="utf-8"?>
+<file path=ppt/slides/slide9.xml><?xml version="1.0" encoding="utf-8"?>
 <p:sld xmlns:a="http://schemas.openxmlformats.org/drawingml/2006/main" xmlns:r="http://schemas.openxmlformats.org/officeDocument/2006/relationships" xmlns:p="http://schemas.openxmlformats.org/presentationml/2006/main">
   <p:cSld>
     <p:spTree>
@@ -7860,1407 +9857,6 @@
     <p:extLst>
       <p:ext uri="{BB962C8B-B14F-4D97-AF65-F5344CB8AC3E}">
         <p14:creationId xmlns:p14="http://schemas.microsoft.com/office/powerpoint/2010/main" val="2063092107"/>
-      </p:ext>
-    </p:extLst>
-  </p:cSld>
-  <p:clrMapOvr>
-    <a:masterClrMapping/>
-  </p:clrMapOvr>
-  <p:timing>
-    <p:tnLst>
-      <p:par>
-        <p:cTn id="1" dur="indefinite" restart="never" nodeType="tmRoot"/>
-      </p:par>
-    </p:tnLst>
-  </p:timing>
-</p:sld>
-</file>
-
-<file path=ppt/slides/slide7.xml><?xml version="1.0" encoding="utf-8"?>
-<p:sld xmlns:a="http://schemas.openxmlformats.org/drawingml/2006/main" xmlns:r="http://schemas.openxmlformats.org/officeDocument/2006/relationships" xmlns:p="http://schemas.openxmlformats.org/presentationml/2006/main">
-  <p:cSld>
-    <p:spTree>
-      <p:nvGrpSpPr>
-        <p:cNvPr id="1" name=""/>
-        <p:cNvGrpSpPr/>
-        <p:nvPr/>
-      </p:nvGrpSpPr>
-      <p:grpSpPr>
-        <a:xfrm>
-          <a:off x="0" y="0"/>
-          <a:ext cx="0" cy="0"/>
-          <a:chOff x="0" y="0"/>
-          <a:chExt cx="0" cy="0"/>
-        </a:xfrm>
-      </p:grpSpPr>
-      <p:pic>
-        <p:nvPicPr>
-          <p:cNvPr id="4" name="Picture 3"/>
-          <p:cNvPicPr>
-            <a:picLocks noChangeAspect="1"/>
-          </p:cNvPicPr>
-          <p:nvPr/>
-        </p:nvPicPr>
-        <p:blipFill>
-          <a:blip r:embed="rId2">
-            <a:extLst>
-              <a:ext uri="{28A0092B-C50C-407E-A947-70E740481C1C}">
-                <a14:useLocalDpi xmlns:a14="http://schemas.microsoft.com/office/drawing/2010/main" val="0"/>
-              </a:ext>
-            </a:extLst>
-          </a:blip>
-          <a:stretch>
-            <a:fillRect/>
-          </a:stretch>
-        </p:blipFill>
-        <p:spPr>
-          <a:xfrm>
-            <a:off x="0" y="931615"/>
-            <a:ext cx="7856901" cy="4663844"/>
-          </a:xfrm>
-          <a:prstGeom prst="rect">
-            <a:avLst/>
-          </a:prstGeom>
-        </p:spPr>
-      </p:pic>
-      <p:cxnSp>
-        <p:nvCxnSpPr>
-          <p:cNvPr id="16" name="Elbow Connector 15"/>
-          <p:cNvCxnSpPr/>
-          <p:nvPr/>
-        </p:nvCxnSpPr>
-        <p:spPr>
-          <a:xfrm flipV="1">
-            <a:off x="1332412" y="2481943"/>
-            <a:ext cx="1210491" cy="374470"/>
-          </a:xfrm>
-          <a:prstGeom prst="bentConnector3">
-            <a:avLst>
-              <a:gd name="adj1" fmla="val 360"/>
-            </a:avLst>
-          </a:prstGeom>
-          <a:ln w="19050">
-            <a:solidFill>
-              <a:schemeClr val="accent1">
-                <a:lumMod val="20000"/>
-                <a:lumOff val="80000"/>
-              </a:schemeClr>
-            </a:solidFill>
-            <a:prstDash val="dashDot"/>
-            <a:tailEnd type="triangle"/>
-          </a:ln>
-        </p:spPr>
-        <p:style>
-          <a:lnRef idx="1">
-            <a:schemeClr val="accent1"/>
-          </a:lnRef>
-          <a:fillRef idx="0">
-            <a:schemeClr val="accent1"/>
-          </a:fillRef>
-          <a:effectRef idx="0">
-            <a:schemeClr val="accent1"/>
-          </a:effectRef>
-          <a:fontRef idx="minor">
-            <a:schemeClr val="tx1"/>
-          </a:fontRef>
-        </p:style>
-      </p:cxnSp>
-      <p:sp>
-        <p:nvSpPr>
-          <p:cNvPr id="25" name="TextBox 24"/>
-          <p:cNvSpPr txBox="1"/>
-          <p:nvPr/>
-        </p:nvSpPr>
-        <p:spPr>
-          <a:xfrm>
-            <a:off x="8170090" y="1009753"/>
-            <a:ext cx="3595189" cy="3970318"/>
-          </a:xfrm>
-          <a:prstGeom prst="rect">
-            <a:avLst/>
-          </a:prstGeom>
-          <a:solidFill>
-            <a:schemeClr val="tx1"/>
-          </a:solidFill>
-        </p:spPr>
-        <p:txBody>
-          <a:bodyPr wrap="square" rtlCol="0">
-            <a:spAutoFit/>
-          </a:bodyPr>
-          <a:lstStyle/>
-          <a:p>
-            <a:r>
-              <a:rPr lang="en-GB" dirty="0" err="1">
-                <a:solidFill>
-                  <a:srgbClr val="569CD6"/>
-                </a:solidFill>
-                <a:latin typeface="Consolas" panose="020B0609020204030204" pitchFamily="49" charset="0"/>
-              </a:rPr>
-              <a:t>apiVersion</a:t>
-            </a:r>
-            <a:r>
-              <a:rPr lang="en-GB" dirty="0">
-                <a:solidFill>
-                  <a:srgbClr val="D4D4D4"/>
-                </a:solidFill>
-                <a:latin typeface="Consolas" panose="020B0609020204030204" pitchFamily="49" charset="0"/>
-              </a:rPr>
-              <a:t>: </a:t>
-            </a:r>
-            <a:r>
-              <a:rPr lang="en-GB" dirty="0">
-                <a:solidFill>
-                  <a:srgbClr val="CE9178"/>
-                </a:solidFill>
-                <a:latin typeface="Consolas" panose="020B0609020204030204" pitchFamily="49" charset="0"/>
-              </a:rPr>
-              <a:t>v1</a:t>
-            </a:r>
-            <a:endParaRPr lang="en-GB" dirty="0">
-              <a:solidFill>
-                <a:srgbClr val="D4D4D4"/>
-              </a:solidFill>
-              <a:latin typeface="Consolas" panose="020B0609020204030204" pitchFamily="49" charset="0"/>
-            </a:endParaRPr>
-          </a:p>
-          <a:p>
-            <a:r>
-              <a:rPr lang="en-GB" dirty="0">
-                <a:solidFill>
-                  <a:srgbClr val="569CD6"/>
-                </a:solidFill>
-                <a:latin typeface="Consolas" panose="020B0609020204030204" pitchFamily="49" charset="0"/>
-              </a:rPr>
-              <a:t>kind</a:t>
-            </a:r>
-            <a:r>
-              <a:rPr lang="en-GB" dirty="0">
-                <a:solidFill>
-                  <a:srgbClr val="D4D4D4"/>
-                </a:solidFill>
-                <a:latin typeface="Consolas" panose="020B0609020204030204" pitchFamily="49" charset="0"/>
-              </a:rPr>
-              <a:t>: </a:t>
-            </a:r>
-            <a:r>
-              <a:rPr lang="en-GB" dirty="0">
-                <a:solidFill>
-                  <a:srgbClr val="CE9178"/>
-                </a:solidFill>
-                <a:latin typeface="Consolas" panose="020B0609020204030204" pitchFamily="49" charset="0"/>
-              </a:rPr>
-              <a:t>Service</a:t>
-            </a:r>
-            <a:endParaRPr lang="en-GB" dirty="0">
-              <a:solidFill>
-                <a:srgbClr val="D4D4D4"/>
-              </a:solidFill>
-              <a:latin typeface="Consolas" panose="020B0609020204030204" pitchFamily="49" charset="0"/>
-            </a:endParaRPr>
-          </a:p>
-          <a:p>
-            <a:r>
-              <a:rPr lang="en-GB" dirty="0">
-                <a:solidFill>
-                  <a:srgbClr val="569CD6"/>
-                </a:solidFill>
-                <a:latin typeface="Consolas" panose="020B0609020204030204" pitchFamily="49" charset="0"/>
-              </a:rPr>
-              <a:t>metadata</a:t>
-            </a:r>
-            <a:r>
-              <a:rPr lang="en-GB" dirty="0">
-                <a:solidFill>
-                  <a:srgbClr val="D4D4D4"/>
-                </a:solidFill>
-                <a:latin typeface="Consolas" panose="020B0609020204030204" pitchFamily="49" charset="0"/>
-              </a:rPr>
-              <a:t>:</a:t>
-            </a:r>
-          </a:p>
-          <a:p>
-            <a:r>
-              <a:rPr lang="en-GB" dirty="0">
-                <a:solidFill>
-                  <a:srgbClr val="D4D4D4"/>
-                </a:solidFill>
-                <a:latin typeface="Consolas" panose="020B0609020204030204" pitchFamily="49" charset="0"/>
-              </a:rPr>
-              <a:t>  </a:t>
-            </a:r>
-            <a:r>
-              <a:rPr lang="en-GB" dirty="0">
-                <a:solidFill>
-                  <a:srgbClr val="569CD6"/>
-                </a:solidFill>
-                <a:latin typeface="Consolas" panose="020B0609020204030204" pitchFamily="49" charset="0"/>
-              </a:rPr>
-              <a:t>name</a:t>
-            </a:r>
-            <a:r>
-              <a:rPr lang="en-GB" dirty="0">
-                <a:solidFill>
-                  <a:srgbClr val="D4D4D4"/>
-                </a:solidFill>
-                <a:latin typeface="Consolas" panose="020B0609020204030204" pitchFamily="49" charset="0"/>
-              </a:rPr>
-              <a:t>: </a:t>
-            </a:r>
-            <a:r>
-              <a:rPr lang="en-GB" dirty="0">
-                <a:solidFill>
-                  <a:srgbClr val="CE9178"/>
-                </a:solidFill>
-                <a:latin typeface="Consolas" panose="020B0609020204030204" pitchFamily="49" charset="0"/>
-              </a:rPr>
-              <a:t>back-end</a:t>
-            </a:r>
-            <a:endParaRPr lang="en-GB" dirty="0">
-              <a:solidFill>
-                <a:srgbClr val="D4D4D4"/>
-              </a:solidFill>
-              <a:latin typeface="Consolas" panose="020B0609020204030204" pitchFamily="49" charset="0"/>
-            </a:endParaRPr>
-          </a:p>
-          <a:p>
-            <a:r>
-              <a:rPr lang="en-GB" dirty="0">
-                <a:solidFill>
-                  <a:srgbClr val="569CD6"/>
-                </a:solidFill>
-                <a:latin typeface="Consolas" panose="020B0609020204030204" pitchFamily="49" charset="0"/>
-              </a:rPr>
-              <a:t>spec</a:t>
-            </a:r>
-            <a:r>
-              <a:rPr lang="en-GB" dirty="0">
-                <a:solidFill>
-                  <a:srgbClr val="D4D4D4"/>
-                </a:solidFill>
-                <a:latin typeface="Consolas" panose="020B0609020204030204" pitchFamily="49" charset="0"/>
-              </a:rPr>
-              <a:t>:</a:t>
-            </a:r>
-          </a:p>
-          <a:p>
-            <a:r>
-              <a:rPr lang="en-GB" dirty="0">
-                <a:solidFill>
-                  <a:srgbClr val="D4D4D4"/>
-                </a:solidFill>
-                <a:latin typeface="Consolas" panose="020B0609020204030204" pitchFamily="49" charset="0"/>
-              </a:rPr>
-              <a:t>  </a:t>
-            </a:r>
-            <a:r>
-              <a:rPr lang="en-GB" dirty="0">
-                <a:solidFill>
-                  <a:srgbClr val="569CD6"/>
-                </a:solidFill>
-                <a:latin typeface="Consolas" panose="020B0609020204030204" pitchFamily="49" charset="0"/>
-              </a:rPr>
-              <a:t>type</a:t>
-            </a:r>
-            <a:r>
-              <a:rPr lang="en-GB" dirty="0">
-                <a:solidFill>
-                  <a:srgbClr val="D4D4D4"/>
-                </a:solidFill>
-                <a:latin typeface="Consolas" panose="020B0609020204030204" pitchFamily="49" charset="0"/>
-              </a:rPr>
-              <a:t>: </a:t>
-            </a:r>
-            <a:r>
-              <a:rPr lang="en-GB" dirty="0" err="1">
-                <a:solidFill>
-                  <a:srgbClr val="CE9178"/>
-                </a:solidFill>
-                <a:latin typeface="Consolas" panose="020B0609020204030204" pitchFamily="49" charset="0"/>
-              </a:rPr>
-              <a:t>ClusterIP</a:t>
-            </a:r>
-            <a:endParaRPr lang="en-GB" dirty="0">
-              <a:solidFill>
-                <a:srgbClr val="D4D4D4"/>
-              </a:solidFill>
-              <a:latin typeface="Consolas" panose="020B0609020204030204" pitchFamily="49" charset="0"/>
-            </a:endParaRPr>
-          </a:p>
-          <a:p>
-            <a:r>
-              <a:rPr lang="en-GB" dirty="0">
-                <a:solidFill>
-                  <a:srgbClr val="D4D4D4"/>
-                </a:solidFill>
-                <a:latin typeface="Consolas" panose="020B0609020204030204" pitchFamily="49" charset="0"/>
-              </a:rPr>
-              <a:t>  </a:t>
-            </a:r>
-            <a:r>
-              <a:rPr lang="en-GB" dirty="0">
-                <a:solidFill>
-                  <a:srgbClr val="569CD6"/>
-                </a:solidFill>
-                <a:latin typeface="Consolas" panose="020B0609020204030204" pitchFamily="49" charset="0"/>
-              </a:rPr>
-              <a:t>ports</a:t>
-            </a:r>
-            <a:r>
-              <a:rPr lang="en-GB" dirty="0">
-                <a:solidFill>
-                  <a:srgbClr val="D4D4D4"/>
-                </a:solidFill>
-                <a:latin typeface="Consolas" panose="020B0609020204030204" pitchFamily="49" charset="0"/>
-              </a:rPr>
-              <a:t>:</a:t>
-            </a:r>
-          </a:p>
-          <a:p>
-            <a:r>
-              <a:rPr lang="en-GB" dirty="0">
-                <a:solidFill>
-                  <a:srgbClr val="D4D4D4"/>
-                </a:solidFill>
-                <a:latin typeface="Consolas" panose="020B0609020204030204" pitchFamily="49" charset="0"/>
-              </a:rPr>
-              <a:t>    - </a:t>
-            </a:r>
-            <a:r>
-              <a:rPr lang="en-GB" dirty="0">
-                <a:solidFill>
-                  <a:srgbClr val="569CD6"/>
-                </a:solidFill>
-                <a:latin typeface="Consolas" panose="020B0609020204030204" pitchFamily="49" charset="0"/>
-              </a:rPr>
-              <a:t>port</a:t>
-            </a:r>
-            <a:r>
-              <a:rPr lang="en-GB" dirty="0">
-                <a:solidFill>
-                  <a:srgbClr val="D4D4D4"/>
-                </a:solidFill>
-                <a:latin typeface="Consolas" panose="020B0609020204030204" pitchFamily="49" charset="0"/>
-              </a:rPr>
-              <a:t>: </a:t>
-            </a:r>
-            <a:r>
-              <a:rPr lang="en-GB" dirty="0">
-                <a:solidFill>
-                  <a:srgbClr val="B5CEA8"/>
-                </a:solidFill>
-                <a:latin typeface="Consolas" panose="020B0609020204030204" pitchFamily="49" charset="0"/>
-              </a:rPr>
-              <a:t>80</a:t>
-            </a:r>
-            <a:endParaRPr lang="en-GB" dirty="0">
-              <a:solidFill>
-                <a:srgbClr val="D4D4D4"/>
-              </a:solidFill>
-              <a:latin typeface="Consolas" panose="020B0609020204030204" pitchFamily="49" charset="0"/>
-            </a:endParaRPr>
-          </a:p>
-          <a:p>
-            <a:r>
-              <a:rPr lang="en-GB" dirty="0">
-                <a:solidFill>
-                  <a:srgbClr val="D4D4D4"/>
-                </a:solidFill>
-                <a:latin typeface="Consolas" panose="020B0609020204030204" pitchFamily="49" charset="0"/>
-              </a:rPr>
-              <a:t>      </a:t>
-            </a:r>
-            <a:r>
-              <a:rPr lang="en-GB" dirty="0" err="1">
-                <a:solidFill>
-                  <a:srgbClr val="569CD6"/>
-                </a:solidFill>
-                <a:latin typeface="Consolas" panose="020B0609020204030204" pitchFamily="49" charset="0"/>
-              </a:rPr>
-              <a:t>targetPort</a:t>
-            </a:r>
-            <a:r>
-              <a:rPr lang="en-GB" dirty="0">
-                <a:solidFill>
-                  <a:srgbClr val="D4D4D4"/>
-                </a:solidFill>
-                <a:latin typeface="Consolas" panose="020B0609020204030204" pitchFamily="49" charset="0"/>
-              </a:rPr>
-              <a:t>: </a:t>
-            </a:r>
-            <a:r>
-              <a:rPr lang="en-GB" dirty="0">
-                <a:solidFill>
-                  <a:srgbClr val="B5CEA8"/>
-                </a:solidFill>
-                <a:latin typeface="Consolas" panose="020B0609020204030204" pitchFamily="49" charset="0"/>
-              </a:rPr>
-              <a:t>80</a:t>
-            </a:r>
-            <a:endParaRPr lang="en-GB" dirty="0">
-              <a:solidFill>
-                <a:srgbClr val="D4D4D4"/>
-              </a:solidFill>
-              <a:latin typeface="Consolas" panose="020B0609020204030204" pitchFamily="49" charset="0"/>
-            </a:endParaRPr>
-          </a:p>
-          <a:p>
-            <a:r>
-              <a:rPr lang="en-GB" dirty="0">
-                <a:solidFill>
-                  <a:srgbClr val="D4D4D4"/>
-                </a:solidFill>
-                <a:latin typeface="Consolas" panose="020B0609020204030204" pitchFamily="49" charset="0"/>
-              </a:rPr>
-              <a:t>  </a:t>
-            </a:r>
-            <a:r>
-              <a:rPr lang="en-GB" dirty="0">
-                <a:solidFill>
-                  <a:srgbClr val="569CD6"/>
-                </a:solidFill>
-                <a:latin typeface="Consolas" panose="020B0609020204030204" pitchFamily="49" charset="0"/>
-              </a:rPr>
-              <a:t>selector</a:t>
-            </a:r>
-            <a:r>
-              <a:rPr lang="en-GB" dirty="0">
-                <a:solidFill>
-                  <a:srgbClr val="D4D4D4"/>
-                </a:solidFill>
-                <a:latin typeface="Consolas" panose="020B0609020204030204" pitchFamily="49" charset="0"/>
-              </a:rPr>
-              <a:t>:</a:t>
-            </a:r>
-          </a:p>
-          <a:p>
-            <a:r>
-              <a:rPr lang="en-GB" dirty="0">
-                <a:solidFill>
-                  <a:srgbClr val="D4D4D4"/>
-                </a:solidFill>
-                <a:latin typeface="Consolas" panose="020B0609020204030204" pitchFamily="49" charset="0"/>
-              </a:rPr>
-              <a:t>    </a:t>
-            </a:r>
-            <a:r>
-              <a:rPr lang="en-GB" dirty="0">
-                <a:solidFill>
-                  <a:srgbClr val="569CD6"/>
-                </a:solidFill>
-                <a:latin typeface="Consolas" panose="020B0609020204030204" pitchFamily="49" charset="0"/>
-              </a:rPr>
-              <a:t>app</a:t>
-            </a:r>
-            <a:r>
-              <a:rPr lang="en-GB" dirty="0">
-                <a:solidFill>
-                  <a:srgbClr val="D4D4D4"/>
-                </a:solidFill>
-                <a:latin typeface="Consolas" panose="020B0609020204030204" pitchFamily="49" charset="0"/>
-              </a:rPr>
-              <a:t>: </a:t>
-            </a:r>
-            <a:r>
-              <a:rPr lang="en-GB" dirty="0" err="1">
-                <a:solidFill>
-                  <a:srgbClr val="CE9178"/>
-                </a:solidFill>
-                <a:latin typeface="Consolas" panose="020B0609020204030204" pitchFamily="49" charset="0"/>
-              </a:rPr>
-              <a:t>myapp</a:t>
-            </a:r>
-            <a:endParaRPr lang="en-GB" dirty="0">
-              <a:solidFill>
-                <a:srgbClr val="D4D4D4"/>
-              </a:solidFill>
-              <a:latin typeface="Consolas" panose="020B0609020204030204" pitchFamily="49" charset="0"/>
-            </a:endParaRPr>
-          </a:p>
-          <a:p>
-            <a:r>
-              <a:rPr lang="en-GB" dirty="0">
-                <a:solidFill>
-                  <a:srgbClr val="D4D4D4"/>
-                </a:solidFill>
-                <a:latin typeface="Consolas" panose="020B0609020204030204" pitchFamily="49" charset="0"/>
-              </a:rPr>
-              <a:t>    </a:t>
-            </a:r>
-            <a:r>
-              <a:rPr lang="en-GB" dirty="0">
-                <a:solidFill>
-                  <a:srgbClr val="569CD6"/>
-                </a:solidFill>
-                <a:latin typeface="Consolas" panose="020B0609020204030204" pitchFamily="49" charset="0"/>
-              </a:rPr>
-              <a:t>type</a:t>
-            </a:r>
-            <a:r>
-              <a:rPr lang="en-GB" dirty="0">
-                <a:solidFill>
-                  <a:srgbClr val="D4D4D4"/>
-                </a:solidFill>
-                <a:latin typeface="Consolas" panose="020B0609020204030204" pitchFamily="49" charset="0"/>
-              </a:rPr>
-              <a:t>: </a:t>
-            </a:r>
-            <a:r>
-              <a:rPr lang="en-GB" dirty="0">
-                <a:solidFill>
-                  <a:srgbClr val="CE9178"/>
-                </a:solidFill>
-                <a:latin typeface="Consolas" panose="020B0609020204030204" pitchFamily="49" charset="0"/>
-              </a:rPr>
-              <a:t>back-end</a:t>
-            </a:r>
-            <a:endParaRPr lang="en-GB" dirty="0">
-              <a:solidFill>
-                <a:srgbClr val="D4D4D4"/>
-              </a:solidFill>
-              <a:latin typeface="Consolas" panose="020B0609020204030204" pitchFamily="49" charset="0"/>
-            </a:endParaRPr>
-          </a:p>
-          <a:p>
-            <a:endParaRPr lang="en-US" dirty="0" smtClean="0"/>
-          </a:p>
-          <a:p>
-            <a:endParaRPr lang="en-GB" dirty="0"/>
-          </a:p>
-        </p:txBody>
-      </p:sp>
-      <p:sp>
-        <p:nvSpPr>
-          <p:cNvPr id="26" name="Snip Single Corner Rectangle 25"/>
-          <p:cNvSpPr/>
-          <p:nvPr/>
-        </p:nvSpPr>
-        <p:spPr>
-          <a:xfrm>
-            <a:off x="8170091" y="661498"/>
-            <a:ext cx="2038350" cy="348255"/>
-          </a:xfrm>
-          <a:prstGeom prst="snip1Rect">
-            <a:avLst/>
-          </a:prstGeom>
-        </p:spPr>
-        <p:style>
-          <a:lnRef idx="2">
-            <a:schemeClr val="dk1">
-              <a:shade val="50000"/>
-            </a:schemeClr>
-          </a:lnRef>
-          <a:fillRef idx="1">
-            <a:schemeClr val="dk1"/>
-          </a:fillRef>
-          <a:effectRef idx="0">
-            <a:schemeClr val="dk1"/>
-          </a:effectRef>
-          <a:fontRef idx="minor">
-            <a:schemeClr val="lt1"/>
-          </a:fontRef>
-        </p:style>
-        <p:txBody>
-          <a:bodyPr rtlCol="0" anchor="ctr"/>
-          <a:lstStyle/>
-          <a:p>
-            <a:pPr algn="ctr"/>
-            <a:r>
-              <a:rPr lang="en-US" dirty="0" err="1" smtClean="0"/>
-              <a:t>service.yml</a:t>
-            </a:r>
-            <a:endParaRPr lang="en-GB" dirty="0"/>
-          </a:p>
-        </p:txBody>
-      </p:sp>
-      <p:sp>
-        <p:nvSpPr>
-          <p:cNvPr id="27" name="Rectangle 26"/>
-          <p:cNvSpPr/>
-          <p:nvPr/>
-        </p:nvSpPr>
-        <p:spPr>
-          <a:xfrm>
-            <a:off x="8692262" y="2994912"/>
-            <a:ext cx="1963017" cy="269298"/>
-          </a:xfrm>
-          <a:prstGeom prst="rect">
-            <a:avLst/>
-          </a:prstGeom>
-          <a:noFill/>
-          <a:ln w="19050">
-            <a:solidFill>
-              <a:schemeClr val="accent1">
-                <a:lumMod val="75000"/>
-              </a:schemeClr>
-            </a:solidFill>
-            <a:prstDash val="sysDash"/>
-          </a:ln>
-        </p:spPr>
-        <p:style>
-          <a:lnRef idx="2">
-            <a:schemeClr val="accent1">
-              <a:shade val="50000"/>
-            </a:schemeClr>
-          </a:lnRef>
-          <a:fillRef idx="1">
-            <a:schemeClr val="accent1"/>
-          </a:fillRef>
-          <a:effectRef idx="0">
-            <a:schemeClr val="accent1"/>
-          </a:effectRef>
-          <a:fontRef idx="minor">
-            <a:schemeClr val="lt1"/>
-          </a:fontRef>
-        </p:style>
-        <p:txBody>
-          <a:bodyPr rtlCol="0" anchor="ctr"/>
-          <a:lstStyle/>
-          <a:p>
-            <a:pPr algn="ctr"/>
-            <a:endParaRPr lang="en-GB"/>
-          </a:p>
-        </p:txBody>
-      </p:sp>
-    </p:spTree>
-    <p:extLst>
-      <p:ext uri="{BB962C8B-B14F-4D97-AF65-F5344CB8AC3E}">
-        <p14:creationId xmlns:p14="http://schemas.microsoft.com/office/powerpoint/2010/main" val="3190478507"/>
-      </p:ext>
-    </p:extLst>
-  </p:cSld>
-  <p:clrMapOvr>
-    <a:masterClrMapping/>
-  </p:clrMapOvr>
-  <p:timing>
-    <p:tnLst>
-      <p:par>
-        <p:cTn id="1" dur="indefinite" restart="never" nodeType="tmRoot"/>
-      </p:par>
-    </p:tnLst>
-  </p:timing>
-</p:sld>
-</file>
-
-<file path=ppt/slides/slide8.xml><?xml version="1.0" encoding="utf-8"?>
-<p:sld xmlns:a="http://schemas.openxmlformats.org/drawingml/2006/main" xmlns:r="http://schemas.openxmlformats.org/officeDocument/2006/relationships" xmlns:p="http://schemas.openxmlformats.org/presentationml/2006/main">
-  <p:cSld>
-    <p:spTree>
-      <p:nvGrpSpPr>
-        <p:cNvPr id="1" name=""/>
-        <p:cNvGrpSpPr/>
-        <p:nvPr/>
-      </p:nvGrpSpPr>
-      <p:grpSpPr>
-        <a:xfrm>
-          <a:off x="0" y="0"/>
-          <a:ext cx="0" cy="0"/>
-          <a:chOff x="0" y="0"/>
-          <a:chExt cx="0" cy="0"/>
-        </a:xfrm>
-      </p:grpSpPr>
-      <p:sp>
-        <p:nvSpPr>
-          <p:cNvPr id="2" name="Title 1"/>
-          <p:cNvSpPr>
-            <a:spLocks noGrp="1"/>
-          </p:cNvSpPr>
-          <p:nvPr>
-            <p:ph type="title"/>
-          </p:nvPr>
-        </p:nvSpPr>
-        <p:spPr/>
-        <p:txBody>
-          <a:bodyPr/>
-          <a:lstStyle/>
-          <a:p>
-            <a:r>
-              <a:rPr lang="en-US" dirty="0"/>
-              <a:t>Section </a:t>
-            </a:r>
-            <a:r>
-              <a:rPr lang="en-US" dirty="0" smtClean="0"/>
-              <a:t>7</a:t>
-            </a:r>
-            <a:endParaRPr lang="en-GB" dirty="0"/>
-          </a:p>
-        </p:txBody>
-      </p:sp>
-      <p:sp>
-        <p:nvSpPr>
-          <p:cNvPr id="3" name="Content Placeholder 2"/>
-          <p:cNvSpPr>
-            <a:spLocks noGrp="1"/>
-          </p:cNvSpPr>
-          <p:nvPr>
-            <p:ph idx="1"/>
-          </p:nvPr>
-        </p:nvSpPr>
-        <p:spPr/>
-        <p:txBody>
-          <a:bodyPr/>
-          <a:lstStyle/>
-          <a:p>
-            <a:endParaRPr lang="en-GB" dirty="0"/>
-          </a:p>
-        </p:txBody>
-      </p:sp>
-    </p:spTree>
-    <p:extLst>
-      <p:ext uri="{BB962C8B-B14F-4D97-AF65-F5344CB8AC3E}">
-        <p14:creationId xmlns:p14="http://schemas.microsoft.com/office/powerpoint/2010/main" val="2055157450"/>
-      </p:ext>
-    </p:extLst>
-  </p:cSld>
-  <p:clrMapOvr>
-    <a:masterClrMapping/>
-  </p:clrMapOvr>
-  <p:timing>
-    <p:tnLst>
-      <p:par>
-        <p:cTn id="1" dur="indefinite" restart="never" nodeType="tmRoot"/>
-      </p:par>
-    </p:tnLst>
-  </p:timing>
-</p:sld>
-</file>
-
-<file path=ppt/slides/slide9.xml><?xml version="1.0" encoding="utf-8"?>
-<p:sld xmlns:a="http://schemas.openxmlformats.org/drawingml/2006/main" xmlns:r="http://schemas.openxmlformats.org/officeDocument/2006/relationships" xmlns:p="http://schemas.openxmlformats.org/presentationml/2006/main">
-  <p:cSld>
-    <p:spTree>
-      <p:nvGrpSpPr>
-        <p:cNvPr id="1" name=""/>
-        <p:cNvGrpSpPr/>
-        <p:nvPr/>
-      </p:nvGrpSpPr>
-      <p:grpSpPr>
-        <a:xfrm>
-          <a:off x="0" y="0"/>
-          <a:ext cx="0" cy="0"/>
-          <a:chOff x="0" y="0"/>
-          <a:chExt cx="0" cy="0"/>
-        </a:xfrm>
-      </p:grpSpPr>
-      <p:sp>
-        <p:nvSpPr>
-          <p:cNvPr id="9" name="Title 1"/>
-          <p:cNvSpPr txBox="1">
-            <a:spLocks/>
-          </p:cNvSpPr>
-          <p:nvPr/>
-        </p:nvSpPr>
-        <p:spPr>
-          <a:xfrm>
-            <a:off x="6592481" y="748306"/>
-            <a:ext cx="4162606" cy="3448556"/>
-          </a:xfrm>
-          <a:prstGeom prst="rect">
-            <a:avLst/>
-          </a:prstGeom>
-          <a:solidFill>
-            <a:schemeClr val="tx1"/>
-          </a:solidFill>
-        </p:spPr>
-        <p:txBody>
-          <a:bodyPr vert="horz" lIns="180000" tIns="180000" rIns="91440" bIns="45720" rtlCol="0" anchor="t">
-            <a:noAutofit/>
-          </a:bodyPr>
-          <a:lstStyle>
-            <a:lvl1pPr algn="l" defTabSz="914400" rtl="0" eaLnBrk="1" latinLnBrk="0" hangingPunct="1">
-              <a:lnSpc>
-                <a:spcPct val="90000"/>
-              </a:lnSpc>
-              <a:spcBef>
-                <a:spcPct val="0"/>
-              </a:spcBef>
-              <a:buNone/>
-              <a:defRPr sz="4400" kern="1200">
-                <a:solidFill>
-                  <a:schemeClr val="tx1"/>
-                </a:solidFill>
-                <a:latin typeface="+mj-lt"/>
-                <a:ea typeface="+mj-ea"/>
-                <a:cs typeface="+mj-cs"/>
-              </a:defRPr>
-            </a:lvl1pPr>
-          </a:lstStyle>
-          <a:p>
-            <a:pPr>
-              <a:lnSpc>
-                <a:spcPct val="100000"/>
-              </a:lnSpc>
-            </a:pPr>
-            <a:r>
-              <a:rPr lang="en-GB" sz="2000" dirty="0" err="1">
-                <a:solidFill>
-                  <a:srgbClr val="569CD6"/>
-                </a:solidFill>
-                <a:latin typeface="Consolas" panose="020B0609020204030204" pitchFamily="49" charset="0"/>
-              </a:rPr>
-              <a:t>apiVersion</a:t>
-            </a:r>
-            <a:r>
-              <a:rPr lang="en-GB" sz="2000" dirty="0">
-                <a:solidFill>
-                  <a:srgbClr val="D4D4D4"/>
-                </a:solidFill>
-                <a:latin typeface="Consolas" panose="020B0609020204030204" pitchFamily="49" charset="0"/>
-              </a:rPr>
-              <a:t>: </a:t>
-            </a:r>
-            <a:r>
-              <a:rPr lang="en-GB" sz="2000" dirty="0">
-                <a:solidFill>
-                  <a:srgbClr val="CE9178"/>
-                </a:solidFill>
-                <a:latin typeface="Consolas" panose="020B0609020204030204" pitchFamily="49" charset="0"/>
-              </a:rPr>
-              <a:t>v1</a:t>
-            </a:r>
-            <a:endParaRPr lang="en-GB" sz="2000" dirty="0">
-              <a:solidFill>
-                <a:srgbClr val="D4D4D4"/>
-              </a:solidFill>
-              <a:latin typeface="Consolas" panose="020B0609020204030204" pitchFamily="49" charset="0"/>
-            </a:endParaRPr>
-          </a:p>
-          <a:p>
-            <a:pPr>
-              <a:lnSpc>
-                <a:spcPct val="100000"/>
-              </a:lnSpc>
-            </a:pPr>
-            <a:r>
-              <a:rPr lang="en-GB" sz="2000" dirty="0">
-                <a:solidFill>
-                  <a:srgbClr val="569CD6"/>
-                </a:solidFill>
-                <a:latin typeface="Consolas" panose="020B0609020204030204" pitchFamily="49" charset="0"/>
-              </a:rPr>
-              <a:t>kind</a:t>
-            </a:r>
-            <a:r>
-              <a:rPr lang="en-GB" sz="2000" dirty="0">
-                <a:solidFill>
-                  <a:srgbClr val="D4D4D4"/>
-                </a:solidFill>
-                <a:latin typeface="Consolas" panose="020B0609020204030204" pitchFamily="49" charset="0"/>
-              </a:rPr>
-              <a:t>: </a:t>
-            </a:r>
-            <a:r>
-              <a:rPr lang="en-GB" sz="2000" dirty="0">
-                <a:solidFill>
-                  <a:srgbClr val="CE9178"/>
-                </a:solidFill>
-                <a:latin typeface="Consolas" panose="020B0609020204030204" pitchFamily="49" charset="0"/>
-              </a:rPr>
-              <a:t>Pod</a:t>
-            </a:r>
-            <a:endParaRPr lang="en-GB" sz="2000" dirty="0">
-              <a:solidFill>
-                <a:srgbClr val="D4D4D4"/>
-              </a:solidFill>
-              <a:latin typeface="Consolas" panose="020B0609020204030204" pitchFamily="49" charset="0"/>
-            </a:endParaRPr>
-          </a:p>
-          <a:p>
-            <a:pPr>
-              <a:lnSpc>
-                <a:spcPct val="100000"/>
-              </a:lnSpc>
-            </a:pPr>
-            <a:r>
-              <a:rPr lang="en-GB" sz="2000" dirty="0">
-                <a:solidFill>
-                  <a:srgbClr val="569CD6"/>
-                </a:solidFill>
-                <a:latin typeface="Consolas" panose="020B0609020204030204" pitchFamily="49" charset="0"/>
-              </a:rPr>
-              <a:t>metadata</a:t>
-            </a:r>
-            <a:r>
-              <a:rPr lang="en-GB" sz="2000" dirty="0">
-                <a:solidFill>
-                  <a:srgbClr val="D4D4D4"/>
-                </a:solidFill>
-                <a:latin typeface="Consolas" panose="020B0609020204030204" pitchFamily="49" charset="0"/>
-              </a:rPr>
-              <a:t>:</a:t>
-            </a:r>
-          </a:p>
-          <a:p>
-            <a:pPr>
-              <a:lnSpc>
-                <a:spcPct val="100000"/>
-              </a:lnSpc>
-            </a:pPr>
-            <a:r>
-              <a:rPr lang="en-GB" sz="2000" dirty="0">
-                <a:solidFill>
-                  <a:srgbClr val="D4D4D4"/>
-                </a:solidFill>
-                <a:latin typeface="Consolas" panose="020B0609020204030204" pitchFamily="49" charset="0"/>
-              </a:rPr>
-              <a:t>  </a:t>
-            </a:r>
-            <a:r>
-              <a:rPr lang="en-GB" sz="2000" dirty="0">
-                <a:solidFill>
-                  <a:srgbClr val="569CD6"/>
-                </a:solidFill>
-                <a:latin typeface="Consolas" panose="020B0609020204030204" pitchFamily="49" charset="0"/>
-              </a:rPr>
-              <a:t>name</a:t>
-            </a:r>
-            <a:r>
-              <a:rPr lang="en-GB" sz="2000" dirty="0">
-                <a:solidFill>
-                  <a:srgbClr val="D4D4D4"/>
-                </a:solidFill>
-                <a:latin typeface="Consolas" panose="020B0609020204030204" pitchFamily="49" charset="0"/>
-              </a:rPr>
-              <a:t>: </a:t>
-            </a:r>
-            <a:r>
-              <a:rPr lang="en-GB" sz="2000" dirty="0" err="1">
-                <a:solidFill>
-                  <a:srgbClr val="CE9178"/>
-                </a:solidFill>
-                <a:latin typeface="Consolas" panose="020B0609020204030204" pitchFamily="49" charset="0"/>
-              </a:rPr>
-              <a:t>ubuntu</a:t>
-            </a:r>
-            <a:r>
-              <a:rPr lang="en-GB" sz="2000" dirty="0">
-                <a:solidFill>
-                  <a:srgbClr val="CE9178"/>
-                </a:solidFill>
-                <a:latin typeface="Consolas" panose="020B0609020204030204" pitchFamily="49" charset="0"/>
-              </a:rPr>
-              <a:t>-sleeper-pod</a:t>
-            </a:r>
-            <a:endParaRPr lang="en-GB" sz="2000" dirty="0">
-              <a:solidFill>
-                <a:srgbClr val="D4D4D4"/>
-              </a:solidFill>
-              <a:latin typeface="Consolas" panose="020B0609020204030204" pitchFamily="49" charset="0"/>
-            </a:endParaRPr>
-          </a:p>
-          <a:p>
-            <a:pPr>
-              <a:lnSpc>
-                <a:spcPct val="100000"/>
-              </a:lnSpc>
-            </a:pPr>
-            <a:r>
-              <a:rPr lang="en-GB" sz="2000" dirty="0">
-                <a:solidFill>
-                  <a:srgbClr val="569CD6"/>
-                </a:solidFill>
-                <a:latin typeface="Consolas" panose="020B0609020204030204" pitchFamily="49" charset="0"/>
-              </a:rPr>
-              <a:t>spec</a:t>
-            </a:r>
-            <a:r>
-              <a:rPr lang="en-GB" sz="2000" dirty="0">
-                <a:solidFill>
-                  <a:srgbClr val="D4D4D4"/>
-                </a:solidFill>
-                <a:latin typeface="Consolas" panose="020B0609020204030204" pitchFamily="49" charset="0"/>
-              </a:rPr>
-              <a:t>:</a:t>
-            </a:r>
-          </a:p>
-          <a:p>
-            <a:pPr>
-              <a:lnSpc>
-                <a:spcPct val="100000"/>
-              </a:lnSpc>
-            </a:pPr>
-            <a:r>
-              <a:rPr lang="en-GB" sz="2000" dirty="0">
-                <a:solidFill>
-                  <a:srgbClr val="D4D4D4"/>
-                </a:solidFill>
-                <a:latin typeface="Consolas" panose="020B0609020204030204" pitchFamily="49" charset="0"/>
-              </a:rPr>
-              <a:t>  </a:t>
-            </a:r>
-            <a:r>
-              <a:rPr lang="en-GB" sz="2000" dirty="0">
-                <a:solidFill>
-                  <a:srgbClr val="569CD6"/>
-                </a:solidFill>
-                <a:latin typeface="Consolas" panose="020B0609020204030204" pitchFamily="49" charset="0"/>
-              </a:rPr>
-              <a:t>containers</a:t>
-            </a:r>
-            <a:r>
-              <a:rPr lang="en-GB" sz="2000" dirty="0">
-                <a:solidFill>
-                  <a:srgbClr val="D4D4D4"/>
-                </a:solidFill>
-                <a:latin typeface="Consolas" panose="020B0609020204030204" pitchFamily="49" charset="0"/>
-              </a:rPr>
-              <a:t>:</a:t>
-            </a:r>
-          </a:p>
-          <a:p>
-            <a:pPr>
-              <a:lnSpc>
-                <a:spcPct val="100000"/>
-              </a:lnSpc>
-            </a:pPr>
-            <a:r>
-              <a:rPr lang="en-GB" sz="2000" dirty="0">
-                <a:solidFill>
-                  <a:srgbClr val="D4D4D4"/>
-                </a:solidFill>
-                <a:latin typeface="Consolas" panose="020B0609020204030204" pitchFamily="49" charset="0"/>
-              </a:rPr>
-              <a:t>  - </a:t>
-            </a:r>
-            <a:r>
-              <a:rPr lang="en-GB" sz="2000" dirty="0">
-                <a:solidFill>
-                  <a:srgbClr val="569CD6"/>
-                </a:solidFill>
-                <a:latin typeface="Consolas" panose="020B0609020204030204" pitchFamily="49" charset="0"/>
-              </a:rPr>
-              <a:t>name</a:t>
-            </a:r>
-            <a:r>
-              <a:rPr lang="en-GB" sz="2000" dirty="0">
-                <a:solidFill>
-                  <a:srgbClr val="D4D4D4"/>
-                </a:solidFill>
-                <a:latin typeface="Consolas" panose="020B0609020204030204" pitchFamily="49" charset="0"/>
-              </a:rPr>
-              <a:t>: </a:t>
-            </a:r>
-            <a:r>
-              <a:rPr lang="en-GB" sz="2000" dirty="0" err="1" smtClean="0">
-                <a:solidFill>
-                  <a:srgbClr val="CE9178"/>
-                </a:solidFill>
-                <a:latin typeface="Consolas" panose="020B0609020204030204" pitchFamily="49" charset="0"/>
-              </a:rPr>
-              <a:t>ubuntu</a:t>
-            </a:r>
-            <a:r>
-              <a:rPr lang="en-GB" sz="2000" dirty="0" smtClean="0">
-                <a:solidFill>
-                  <a:srgbClr val="CE9178"/>
-                </a:solidFill>
-                <a:latin typeface="Consolas" panose="020B0609020204030204" pitchFamily="49" charset="0"/>
-              </a:rPr>
-              <a:t>-sleeper</a:t>
-            </a:r>
-            <a:endParaRPr lang="en-GB" sz="2000" dirty="0">
-              <a:solidFill>
-                <a:srgbClr val="D4D4D4"/>
-              </a:solidFill>
-              <a:latin typeface="Consolas" panose="020B0609020204030204" pitchFamily="49" charset="0"/>
-            </a:endParaRPr>
-          </a:p>
-          <a:p>
-            <a:pPr>
-              <a:lnSpc>
-                <a:spcPct val="100000"/>
-              </a:lnSpc>
-            </a:pPr>
-            <a:r>
-              <a:rPr lang="en-GB" sz="2000" dirty="0">
-                <a:solidFill>
-                  <a:srgbClr val="D4D4D4"/>
-                </a:solidFill>
-                <a:latin typeface="Consolas" panose="020B0609020204030204" pitchFamily="49" charset="0"/>
-              </a:rPr>
-              <a:t>    </a:t>
-            </a:r>
-            <a:r>
-              <a:rPr lang="en-GB" sz="2000" dirty="0">
-                <a:solidFill>
-                  <a:srgbClr val="569CD6"/>
-                </a:solidFill>
-                <a:latin typeface="Consolas" panose="020B0609020204030204" pitchFamily="49" charset="0"/>
-              </a:rPr>
-              <a:t>image</a:t>
-            </a:r>
-            <a:r>
-              <a:rPr lang="en-GB" sz="2000" dirty="0">
-                <a:solidFill>
-                  <a:srgbClr val="D4D4D4"/>
-                </a:solidFill>
-                <a:latin typeface="Consolas" panose="020B0609020204030204" pitchFamily="49" charset="0"/>
-              </a:rPr>
-              <a:t>: </a:t>
-            </a:r>
-            <a:r>
-              <a:rPr lang="en-GB" sz="2000" dirty="0" err="1">
-                <a:solidFill>
-                  <a:srgbClr val="CE9178"/>
-                </a:solidFill>
-                <a:latin typeface="Consolas" panose="020B0609020204030204" pitchFamily="49" charset="0"/>
-              </a:rPr>
-              <a:t>ubuntu</a:t>
-            </a:r>
-            <a:r>
-              <a:rPr lang="en-GB" sz="2000" dirty="0">
-                <a:solidFill>
-                  <a:srgbClr val="CE9178"/>
-                </a:solidFill>
-                <a:latin typeface="Consolas" panose="020B0609020204030204" pitchFamily="49" charset="0"/>
-              </a:rPr>
-              <a:t>-sleeper</a:t>
-            </a:r>
-            <a:endParaRPr lang="en-GB" sz="2000" dirty="0">
-              <a:solidFill>
-                <a:srgbClr val="D4D4D4"/>
-              </a:solidFill>
-              <a:latin typeface="Consolas" panose="020B0609020204030204" pitchFamily="49" charset="0"/>
-            </a:endParaRPr>
-          </a:p>
-          <a:p>
-            <a:pPr>
-              <a:lnSpc>
-                <a:spcPct val="100000"/>
-              </a:lnSpc>
-            </a:pPr>
-            <a:r>
-              <a:rPr lang="en-GB" sz="2000" dirty="0">
-                <a:solidFill>
-                  <a:srgbClr val="D4D4D4"/>
-                </a:solidFill>
-                <a:latin typeface="Consolas" panose="020B0609020204030204" pitchFamily="49" charset="0"/>
-              </a:rPr>
-              <a:t>    </a:t>
-            </a:r>
-            <a:r>
-              <a:rPr lang="en-GB" sz="2000" dirty="0">
-                <a:solidFill>
-                  <a:srgbClr val="569CD6"/>
-                </a:solidFill>
-                <a:latin typeface="Consolas" panose="020B0609020204030204" pitchFamily="49" charset="0"/>
-              </a:rPr>
-              <a:t>command</a:t>
-            </a:r>
-            <a:r>
-              <a:rPr lang="en-GB" sz="2000" dirty="0">
-                <a:solidFill>
-                  <a:srgbClr val="D4D4D4"/>
-                </a:solidFill>
-                <a:latin typeface="Consolas" panose="020B0609020204030204" pitchFamily="49" charset="0"/>
-              </a:rPr>
-              <a:t>: [</a:t>
-            </a:r>
-            <a:r>
-              <a:rPr lang="en-GB" sz="2000" dirty="0">
-                <a:solidFill>
-                  <a:srgbClr val="CE9178"/>
-                </a:solidFill>
-                <a:latin typeface="Consolas" panose="020B0609020204030204" pitchFamily="49" charset="0"/>
-              </a:rPr>
-              <a:t>sleep3.0</a:t>
-            </a:r>
-            <a:r>
-              <a:rPr lang="en-GB" sz="2000" dirty="0">
-                <a:solidFill>
-                  <a:srgbClr val="D4D4D4"/>
-                </a:solidFill>
-                <a:latin typeface="Consolas" panose="020B0609020204030204" pitchFamily="49" charset="0"/>
-              </a:rPr>
-              <a:t>]</a:t>
-            </a:r>
-          </a:p>
-          <a:p>
-            <a:pPr>
-              <a:lnSpc>
-                <a:spcPct val="100000"/>
-              </a:lnSpc>
-            </a:pPr>
-            <a:r>
-              <a:rPr lang="en-GB" sz="2000" dirty="0">
-                <a:solidFill>
-                  <a:srgbClr val="D4D4D4"/>
-                </a:solidFill>
-                <a:latin typeface="Consolas" panose="020B0609020204030204" pitchFamily="49" charset="0"/>
-              </a:rPr>
-              <a:t>    </a:t>
-            </a:r>
-            <a:r>
-              <a:rPr lang="en-GB" sz="2000" dirty="0" err="1">
-                <a:solidFill>
-                  <a:srgbClr val="569CD6"/>
-                </a:solidFill>
-                <a:latin typeface="Consolas" panose="020B0609020204030204" pitchFamily="49" charset="0"/>
-              </a:rPr>
-              <a:t>args</a:t>
-            </a:r>
-            <a:r>
-              <a:rPr lang="en-GB" sz="2000" dirty="0">
-                <a:solidFill>
-                  <a:srgbClr val="D4D4D4"/>
-                </a:solidFill>
-                <a:latin typeface="Consolas" panose="020B0609020204030204" pitchFamily="49" charset="0"/>
-              </a:rPr>
-              <a:t>: [</a:t>
-            </a:r>
-            <a:r>
-              <a:rPr lang="en-GB" sz="2000" dirty="0">
-                <a:solidFill>
-                  <a:srgbClr val="CE9178"/>
-                </a:solidFill>
-                <a:latin typeface="Consolas" panose="020B0609020204030204" pitchFamily="49" charset="0"/>
-              </a:rPr>
-              <a:t>"15"</a:t>
-            </a:r>
-            <a:r>
-              <a:rPr lang="en-GB" sz="2000" dirty="0">
-                <a:solidFill>
-                  <a:srgbClr val="D4D4D4"/>
-                </a:solidFill>
-                <a:latin typeface="Consolas" panose="020B0609020204030204" pitchFamily="49" charset="0"/>
-              </a:rPr>
-              <a:t>]</a:t>
-            </a:r>
-            <a:endParaRPr lang="en-GB" sz="2000" b="0" dirty="0">
-              <a:solidFill>
-                <a:srgbClr val="D4D4D4"/>
-              </a:solidFill>
-              <a:effectLst/>
-              <a:latin typeface="Consolas" panose="020B0609020204030204" pitchFamily="49" charset="0"/>
-            </a:endParaRPr>
-          </a:p>
-        </p:txBody>
-      </p:sp>
-      <p:sp>
-        <p:nvSpPr>
-          <p:cNvPr id="14" name="Snip Single Corner Rectangle 13"/>
-          <p:cNvSpPr/>
-          <p:nvPr/>
-        </p:nvSpPr>
-        <p:spPr>
-          <a:xfrm>
-            <a:off x="6598349" y="419100"/>
-            <a:ext cx="2038350" cy="348255"/>
-          </a:xfrm>
-          <a:prstGeom prst="snip1Rect">
-            <a:avLst/>
-          </a:prstGeom>
-        </p:spPr>
-        <p:style>
-          <a:lnRef idx="2">
-            <a:schemeClr val="dk1">
-              <a:shade val="50000"/>
-            </a:schemeClr>
-          </a:lnRef>
-          <a:fillRef idx="1">
-            <a:schemeClr val="dk1"/>
-          </a:fillRef>
-          <a:effectRef idx="0">
-            <a:schemeClr val="dk1"/>
-          </a:effectRef>
-          <a:fontRef idx="minor">
-            <a:schemeClr val="lt1"/>
-          </a:fontRef>
-        </p:style>
-        <p:txBody>
-          <a:bodyPr rtlCol="0" anchor="ctr"/>
-          <a:lstStyle/>
-          <a:p>
-            <a:pPr algn="ctr"/>
-            <a:r>
-              <a:rPr lang="en-US" dirty="0" err="1" smtClean="0"/>
-              <a:t>pod.yml</a:t>
-            </a:r>
-            <a:endParaRPr lang="en-GB" dirty="0"/>
-          </a:p>
-        </p:txBody>
-      </p:sp>
-      <p:sp>
-        <p:nvSpPr>
-          <p:cNvPr id="10" name="Content Placeholder 2"/>
-          <p:cNvSpPr>
-            <a:spLocks noGrp="1"/>
-          </p:cNvSpPr>
-          <p:nvPr>
-            <p:ph idx="1"/>
-          </p:nvPr>
-        </p:nvSpPr>
-        <p:spPr>
-          <a:xfrm>
-            <a:off x="838200" y="1825625"/>
-            <a:ext cx="2581275" cy="4351338"/>
-          </a:xfrm>
-        </p:spPr>
-        <p:txBody>
-          <a:bodyPr/>
-          <a:lstStyle/>
-          <a:p>
-            <a:pPr marL="0" indent="0">
-              <a:buNone/>
-            </a:pPr>
-            <a:r>
-              <a:rPr lang="en-US" dirty="0" smtClean="0"/>
-              <a:t>s</a:t>
-            </a:r>
-            <a:endParaRPr lang="en-GB" dirty="0"/>
-          </a:p>
-        </p:txBody>
-      </p:sp>
-      <p:sp>
-        <p:nvSpPr>
-          <p:cNvPr id="6" name="Rectangle 5"/>
-          <p:cNvSpPr/>
-          <p:nvPr/>
-        </p:nvSpPr>
-        <p:spPr>
-          <a:xfrm>
-            <a:off x="7110046" y="3387970"/>
-            <a:ext cx="3182816" cy="668216"/>
-          </a:xfrm>
-          <a:prstGeom prst="rect">
-            <a:avLst/>
-          </a:prstGeom>
-          <a:noFill/>
-          <a:ln w="19050">
-            <a:solidFill>
-              <a:schemeClr val="accent2"/>
-            </a:solidFill>
-            <a:prstDash val="sysDash"/>
-          </a:ln>
-        </p:spPr>
-        <p:style>
-          <a:lnRef idx="2">
-            <a:schemeClr val="accent1">
-              <a:shade val="50000"/>
-            </a:schemeClr>
-          </a:lnRef>
-          <a:fillRef idx="1">
-            <a:schemeClr val="accent1"/>
-          </a:fillRef>
-          <a:effectRef idx="0">
-            <a:schemeClr val="accent1"/>
-          </a:effectRef>
-          <a:fontRef idx="minor">
-            <a:schemeClr val="lt1"/>
-          </a:fontRef>
-        </p:style>
-        <p:txBody>
-          <a:bodyPr rtlCol="0" anchor="ctr"/>
-          <a:lstStyle/>
-          <a:p>
-            <a:pPr algn="ctr"/>
-            <a:endParaRPr lang="en-GB"/>
-          </a:p>
-        </p:txBody>
-      </p:sp>
-    </p:spTree>
-    <p:extLst>
-      <p:ext uri="{BB962C8B-B14F-4D97-AF65-F5344CB8AC3E}">
-        <p14:creationId xmlns:p14="http://schemas.microsoft.com/office/powerpoint/2010/main" val="3223514410"/>
       </p:ext>
     </p:extLst>
   </p:cSld>

</xml_diff>

<commit_message>
update - S5 Kubernetes object definition file - yaml p2
</commit_message>
<xml_diff>
--- a/docs/images/slides_images.pptx
+++ b/docs/images/slides_images.pptx
@@ -3057,8 +3057,8 @@
         </p:nvSpPr>
         <p:spPr>
           <a:xfrm>
-            <a:off x="6592481" y="748305"/>
-            <a:ext cx="4532720" cy="3919489"/>
+            <a:off x="6592481" y="748306"/>
+            <a:ext cx="4532720" cy="2534826"/>
           </a:xfrm>
           <a:prstGeom prst="rect">
             <a:avLst/>
@@ -3092,31 +3092,13 @@
           </a:lstStyle>
           <a:p>
             <a:r>
-              <a:rPr lang="en-GB" sz="2000" dirty="0" err="1" smtClean="0">
-                <a:solidFill>
-                  <a:srgbClr val="569CD6"/>
-                </a:solidFill>
-                <a:latin typeface="Consolas" panose="020B0609020204030204" pitchFamily="49" charset="0"/>
-              </a:rPr>
-              <a:t>apiVersion</a:t>
-            </a:r>
-            <a:r>
-              <a:rPr lang="en-GB" sz="2000" dirty="0">
-                <a:solidFill>
-                  <a:srgbClr val="D4D4D4"/>
-                </a:solidFill>
-                <a:latin typeface="Consolas" panose="020B0609020204030204" pitchFamily="49" charset="0"/>
-              </a:rPr>
-              <a:t>: </a:t>
-            </a:r>
-            <a:r>
-              <a:rPr lang="en-GB" sz="2000" dirty="0">
+              <a:rPr lang="en-US" sz="2000" dirty="0" smtClean="0">
                 <a:solidFill>
                   <a:srgbClr val="CE9178"/>
                 </a:solidFill>
                 <a:latin typeface="Consolas" panose="020B0609020204030204" pitchFamily="49" charset="0"/>
               </a:rPr>
-              <a:t>v1</a:t>
+              <a:t>...</a:t>
             </a:r>
             <a:endParaRPr lang="en-GB" sz="2000" dirty="0">
               <a:solidFill>
@@ -3133,7 +3115,65 @@
                 </a:solidFill>
                 <a:latin typeface="Consolas" panose="020B0609020204030204" pitchFamily="49" charset="0"/>
               </a:rPr>
-              <a:t>kind</a:t>
+              <a:t>spec</a:t>
+            </a:r>
+            <a:r>
+              <a:rPr lang="en-GB" sz="2000" dirty="0">
+                <a:solidFill>
+                  <a:srgbClr val="D4D4D4"/>
+                </a:solidFill>
+                <a:latin typeface="Consolas" panose="020B0609020204030204" pitchFamily="49" charset="0"/>
+              </a:rPr>
+              <a:t>:</a:t>
+            </a:r>
+          </a:p>
+          <a:p>
+            <a:r>
+              <a:rPr lang="en-GB" sz="2000" dirty="0">
+                <a:solidFill>
+                  <a:srgbClr val="D4D4D4"/>
+                </a:solidFill>
+                <a:latin typeface="Consolas" panose="020B0609020204030204" pitchFamily="49" charset="0"/>
+              </a:rPr>
+              <a:t>  </a:t>
+            </a:r>
+            <a:r>
+              <a:rPr lang="en-GB" sz="2000" dirty="0">
+                <a:solidFill>
+                  <a:srgbClr val="569CD6"/>
+                </a:solidFill>
+                <a:latin typeface="Consolas" panose="020B0609020204030204" pitchFamily="49" charset="0"/>
+              </a:rPr>
+              <a:t>containers</a:t>
+            </a:r>
+            <a:r>
+              <a:rPr lang="en-GB" sz="2000" dirty="0">
+                <a:solidFill>
+                  <a:srgbClr val="D4D4D4"/>
+                </a:solidFill>
+                <a:latin typeface="Consolas" panose="020B0609020204030204" pitchFamily="49" charset="0"/>
+              </a:rPr>
+              <a:t>:</a:t>
+            </a:r>
+          </a:p>
+          <a:p>
+            <a:r>
+              <a:rPr lang="en-GB" sz="2000" dirty="0">
+                <a:solidFill>
+                  <a:srgbClr val="D4D4D4"/>
+                </a:solidFill>
+                <a:latin typeface="Consolas" panose="020B0609020204030204" pitchFamily="49" charset="0"/>
+              </a:rPr>
+              <a:t>  - </a:t>
+            </a:r>
+            <a:r>
+              <a:rPr lang="en-GB" sz="2000" dirty="0">
+                <a:solidFill>
+                  <a:srgbClr val="569CD6"/>
+                </a:solidFill>
+                <a:latin typeface="Consolas" panose="020B0609020204030204" pitchFamily="49" charset="0"/>
+              </a:rPr>
+              <a:t>name</a:t>
             </a:r>
             <a:r>
               <a:rPr lang="en-GB" sz="2000" dirty="0">
@@ -3145,13 +3185,22 @@
               <a:t>: </a:t>
             </a:r>
             <a:r>
-              <a:rPr lang="en-GB" sz="2000" dirty="0">
+              <a:rPr lang="en-GB" sz="2000" dirty="0" err="1">
                 <a:solidFill>
                   <a:srgbClr val="CE9178"/>
                 </a:solidFill>
                 <a:latin typeface="Consolas" panose="020B0609020204030204" pitchFamily="49" charset="0"/>
               </a:rPr>
-              <a:t>Pod</a:t>
+              <a:t>nginx</a:t>
+            </a:r>
+            <a:r>
+              <a:rPr lang="en-GB" sz="2000" dirty="0">
+                <a:solidFill>
+                  <a:srgbClr val="CE9178"/>
+                </a:solidFill>
+                <a:latin typeface="Consolas" panose="020B0609020204030204" pitchFamily="49" charset="0"/>
+              </a:rPr>
+              <a:t>-container</a:t>
             </a:r>
             <a:endParaRPr lang="en-GB" sz="2000" dirty="0">
               <a:solidFill>
@@ -3164,40 +3213,20 @@
             <a:r>
               <a:rPr lang="en-GB" sz="2000" dirty="0">
                 <a:solidFill>
+                  <a:srgbClr val="D4D4D4"/>
+                </a:solidFill>
+                <a:latin typeface="Consolas" panose="020B0609020204030204" pitchFamily="49" charset="0"/>
+              </a:rPr>
+              <a:t>    </a:t>
+            </a:r>
+            <a:r>
+              <a:rPr lang="en-GB" sz="2000" dirty="0">
+                <a:solidFill>
                   <a:srgbClr val="569CD6"/>
                 </a:solidFill>
                 <a:latin typeface="Consolas" panose="020B0609020204030204" pitchFamily="49" charset="0"/>
               </a:rPr>
-              <a:t>metadata</a:t>
-            </a:r>
-            <a:r>
-              <a:rPr lang="en-GB" sz="2000" dirty="0">
-                <a:solidFill>
-                  <a:srgbClr val="D4D4D4"/>
-                </a:solidFill>
-                <a:latin typeface="Consolas" panose="020B0609020204030204" pitchFamily="49" charset="0"/>
-              </a:rPr>
-              <a:t>:</a:t>
-            </a:r>
-          </a:p>
-          <a:p>
-            <a:r>
-              <a:rPr lang="en-GB" sz="2000" dirty="0" smtClean="0">
-                <a:solidFill>
-                  <a:srgbClr val="D4D4D4"/>
-                </a:solidFill>
-                <a:latin typeface="Consolas" panose="020B0609020204030204" pitchFamily="49" charset="0"/>
-              </a:rPr>
-              <a:t>  </a:t>
-            </a:r>
-            <a:r>
-              <a:rPr lang="en-GB" sz="2000" dirty="0" smtClean="0">
-                <a:solidFill>
-                  <a:srgbClr val="569CD6"/>
-                </a:solidFill>
-                <a:latin typeface="Consolas" panose="020B0609020204030204" pitchFamily="49" charset="0"/>
-              </a:rPr>
-              <a:t>name</a:t>
+              <a:t>image</a:t>
             </a:r>
             <a:r>
               <a:rPr lang="en-GB" sz="2000" dirty="0">
@@ -3216,15 +3245,6 @@
                 <a:latin typeface="Consolas" panose="020B0609020204030204" pitchFamily="49" charset="0"/>
               </a:rPr>
               <a:t>nginx</a:t>
-            </a:r>
-            <a:r>
-              <a:rPr lang="en-GB" sz="2000" dirty="0">
-                <a:solidFill>
-                  <a:srgbClr val="CE9178"/>
-                </a:solidFill>
-                <a:latin typeface="Consolas" panose="020B0609020204030204" pitchFamily="49" charset="0"/>
-              </a:rPr>
-              <a:t>-pod</a:t>
             </a:r>
             <a:endParaRPr lang="en-GB" sz="2000" dirty="0">
               <a:solidFill>
@@ -3241,7 +3261,7 @@
                 </a:solidFill>
                 <a:latin typeface="Consolas" panose="020B0609020204030204" pitchFamily="49" charset="0"/>
               </a:rPr>
-              <a:t>  </a:t>
+              <a:t>  - </a:t>
             </a:r>
             <a:r>
               <a:rPr lang="en-GB" sz="2000" dirty="0">
@@ -3250,52 +3270,7 @@
                 </a:solidFill>
                 <a:latin typeface="Consolas" panose="020B0609020204030204" pitchFamily="49" charset="0"/>
               </a:rPr>
-              <a:t>labels</a:t>
-            </a:r>
-            <a:r>
-              <a:rPr lang="en-GB" sz="2000" dirty="0">
-                <a:solidFill>
-                  <a:srgbClr val="D4D4D4"/>
-                </a:solidFill>
-                <a:latin typeface="Consolas" panose="020B0609020204030204" pitchFamily="49" charset="0"/>
-              </a:rPr>
-              <a:t>:</a:t>
-            </a:r>
-          </a:p>
-          <a:p>
-            <a:r>
-              <a:rPr lang="en-GB" sz="2000" dirty="0">
-                <a:solidFill>
-                  <a:srgbClr val="D4D4D4"/>
-                </a:solidFill>
-                <a:latin typeface="Consolas" panose="020B0609020204030204" pitchFamily="49" charset="0"/>
-              </a:rPr>
-              <a:t>  </a:t>
-            </a:r>
-            <a:r>
-              <a:rPr lang="en-GB" sz="2000" dirty="0">
-                <a:solidFill>
-                  <a:schemeClr val="accent2"/>
-                </a:solidFill>
-              </a:rPr>
-              <a:t> </a:t>
-            </a:r>
-            <a:r>
-              <a:rPr lang="en-GB" sz="2000" dirty="0" smtClean="0">
-                <a:solidFill>
-                  <a:schemeClr val="accent2"/>
-                </a:solidFill>
-              </a:rPr>
-              <a:t>    </a:t>
-            </a:r>
-            <a:r>
-              <a:rPr lang="en-GB" sz="2000" dirty="0" smtClean="0">
-                <a:solidFill>
-                  <a:srgbClr val="569CD6"/>
-                </a:solidFill>
-                <a:latin typeface="Consolas" panose="020B0609020204030204" pitchFamily="49" charset="0"/>
-              </a:rPr>
-              <a:t>app</a:t>
+              <a:t>name</a:t>
             </a:r>
             <a:r>
               <a:rPr lang="en-GB" sz="2000" dirty="0">
@@ -3313,7 +3288,7 @@
                 </a:solidFill>
                 <a:latin typeface="Consolas" panose="020B0609020204030204" pitchFamily="49" charset="0"/>
               </a:rPr>
-              <a:t>my-app</a:t>
+              <a:t>log-shipper</a:t>
             </a:r>
             <a:endParaRPr lang="en-GB" sz="2000" dirty="0">
               <a:solidFill>
@@ -3333,13 +3308,13 @@
               <a:t>    </a:t>
             </a:r>
             <a:r>
-              <a:rPr lang="en-GB" sz="2000" dirty="0" err="1">
+              <a:rPr lang="en-GB" sz="2000" dirty="0">
                 <a:solidFill>
                   <a:srgbClr val="569CD6"/>
                 </a:solidFill>
                 <a:latin typeface="Consolas" panose="020B0609020204030204" pitchFamily="49" charset="0"/>
               </a:rPr>
-              <a:t>env</a:t>
+              <a:t>image</a:t>
             </a:r>
             <a:r>
               <a:rPr lang="en-GB" sz="2000" dirty="0">
@@ -3357,7 +3332,7 @@
                 </a:solidFill>
                 <a:latin typeface="Consolas" panose="020B0609020204030204" pitchFamily="49" charset="0"/>
               </a:rPr>
-              <a:t>production</a:t>
+              <a:t>alpine</a:t>
             </a:r>
             <a:endParaRPr lang="en-GB" sz="2000" dirty="0">
               <a:solidFill>
@@ -3374,189 +3349,16 @@
                 </a:solidFill>
                 <a:latin typeface="Consolas" panose="020B0609020204030204" pitchFamily="49" charset="0"/>
               </a:rPr>
-              <a:t>    </a:t>
-            </a:r>
-            <a:r>
-              <a:rPr lang="en-GB" sz="2000" dirty="0">
-                <a:solidFill>
-                  <a:srgbClr val="569CD6"/>
-                </a:solidFill>
-                <a:latin typeface="Consolas" panose="020B0609020204030204" pitchFamily="49" charset="0"/>
-              </a:rPr>
-              <a:t>tier</a:t>
-            </a:r>
-            <a:r>
-              <a:rPr lang="en-GB" sz="2000" dirty="0">
-                <a:solidFill>
-                  <a:srgbClr val="D4D4D4"/>
-                </a:solidFill>
-                <a:latin typeface="Consolas" panose="020B0609020204030204" pitchFamily="49" charset="0"/>
-              </a:rPr>
-              <a:t>: </a:t>
-            </a:r>
-            <a:r>
-              <a:rPr lang="en-GB" sz="2000" dirty="0" smtClean="0">
-                <a:solidFill>
-                  <a:srgbClr val="CE9178"/>
-                </a:solidFill>
-                <a:latin typeface="Consolas" panose="020B0609020204030204" pitchFamily="49" charset="0"/>
-              </a:rPr>
-              <a:t>frontend</a:t>
-            </a:r>
-            <a:endParaRPr lang="en-GB" sz="2000" dirty="0">
-              <a:solidFill>
-                <a:srgbClr val="D4D4D4"/>
-              </a:solidFill>
-              <a:latin typeface="Consolas" panose="020B0609020204030204" pitchFamily="49" charset="0"/>
-            </a:endParaRPr>
-          </a:p>
-          <a:p>
-            <a:r>
-              <a:rPr lang="en-GB" sz="2000" dirty="0">
-                <a:solidFill>
-                  <a:srgbClr val="569CD6"/>
-                </a:solidFill>
-                <a:latin typeface="Consolas" panose="020B0609020204030204" pitchFamily="49" charset="0"/>
-              </a:rPr>
-              <a:t>spec</a:t>
-            </a:r>
-            <a:r>
-              <a:rPr lang="en-GB" sz="2000" dirty="0">
-                <a:solidFill>
-                  <a:srgbClr val="D4D4D4"/>
-                </a:solidFill>
-                <a:latin typeface="Consolas" panose="020B0609020204030204" pitchFamily="49" charset="0"/>
-              </a:rPr>
-              <a:t>:</a:t>
-            </a:r>
-          </a:p>
-          <a:p>
-            <a:r>
-              <a:rPr lang="en-GB" sz="2000" dirty="0">
-                <a:solidFill>
-                  <a:srgbClr val="D4D4D4"/>
-                </a:solidFill>
-                <a:latin typeface="Consolas" panose="020B0609020204030204" pitchFamily="49" charset="0"/>
-              </a:rPr>
-              <a:t>  </a:t>
-            </a:r>
-            <a:r>
-              <a:rPr lang="en-GB" sz="2000" dirty="0">
-                <a:solidFill>
-                  <a:srgbClr val="569CD6"/>
-                </a:solidFill>
-                <a:latin typeface="Consolas" panose="020B0609020204030204" pitchFamily="49" charset="0"/>
-              </a:rPr>
-              <a:t>containers</a:t>
-            </a:r>
-            <a:r>
-              <a:rPr lang="en-GB" sz="2000" dirty="0">
-                <a:solidFill>
-                  <a:srgbClr val="D4D4D4"/>
-                </a:solidFill>
-                <a:latin typeface="Consolas" panose="020B0609020204030204" pitchFamily="49" charset="0"/>
-              </a:rPr>
-              <a:t>:</a:t>
-            </a:r>
-          </a:p>
-          <a:p>
-            <a:r>
-              <a:rPr lang="en-GB" sz="2000" dirty="0">
-                <a:solidFill>
-                  <a:srgbClr val="D4D4D4"/>
-                </a:solidFill>
-                <a:latin typeface="Consolas" panose="020B0609020204030204" pitchFamily="49" charset="0"/>
-              </a:rPr>
-              <a:t>  - </a:t>
-            </a:r>
-            <a:r>
-              <a:rPr lang="en-GB" sz="2000" dirty="0">
-                <a:solidFill>
-                  <a:srgbClr val="569CD6"/>
-                </a:solidFill>
-                <a:latin typeface="Consolas" panose="020B0609020204030204" pitchFamily="49" charset="0"/>
-              </a:rPr>
-              <a:t>name</a:t>
-            </a:r>
-            <a:r>
-              <a:rPr lang="en-GB" sz="2000" dirty="0">
-                <a:solidFill>
-                  <a:srgbClr val="D4D4D4"/>
-                </a:solidFill>
-                <a:latin typeface="Consolas" panose="020B0609020204030204" pitchFamily="49" charset="0"/>
-              </a:rPr>
-              <a:t>: </a:t>
-            </a:r>
-            <a:r>
-              <a:rPr lang="en-GB" sz="2000" dirty="0" err="1">
-                <a:solidFill>
-                  <a:srgbClr val="CE9178"/>
-                </a:solidFill>
-                <a:latin typeface="Consolas" panose="020B0609020204030204" pitchFamily="49" charset="0"/>
-              </a:rPr>
-              <a:t>nginx</a:t>
-            </a:r>
-            <a:r>
-              <a:rPr lang="en-GB" sz="2000" dirty="0">
-                <a:solidFill>
-                  <a:srgbClr val="CE9178"/>
-                </a:solidFill>
-                <a:latin typeface="Consolas" panose="020B0609020204030204" pitchFamily="49" charset="0"/>
-              </a:rPr>
-              <a:t>-container</a:t>
-            </a:r>
-            <a:endParaRPr lang="en-GB" sz="2000" dirty="0">
-              <a:solidFill>
-                <a:srgbClr val="D4D4D4"/>
-              </a:solidFill>
-              <a:latin typeface="Consolas" panose="020B0609020204030204" pitchFamily="49" charset="0"/>
-            </a:endParaRPr>
-          </a:p>
-          <a:p>
-            <a:r>
-              <a:rPr lang="en-GB" sz="2000" dirty="0">
-                <a:solidFill>
-                  <a:srgbClr val="D4D4D4"/>
-                </a:solidFill>
-                <a:latin typeface="Consolas" panose="020B0609020204030204" pitchFamily="49" charset="0"/>
-              </a:rPr>
-              <a:t>    </a:t>
-            </a:r>
-            <a:r>
-              <a:rPr lang="en-GB" sz="2000" dirty="0">
-                <a:solidFill>
-                  <a:srgbClr val="569CD6"/>
-                </a:solidFill>
-                <a:latin typeface="Consolas" panose="020B0609020204030204" pitchFamily="49" charset="0"/>
-              </a:rPr>
-              <a:t>image</a:t>
-            </a:r>
-            <a:r>
-              <a:rPr lang="en-GB" sz="2000" dirty="0">
-                <a:solidFill>
-                  <a:srgbClr val="D4D4D4"/>
-                </a:solidFill>
-                <a:latin typeface="Consolas" panose="020B0609020204030204" pitchFamily="49" charset="0"/>
-              </a:rPr>
-              <a:t>: </a:t>
-            </a:r>
-            <a:r>
-              <a:rPr lang="en-GB" sz="2000" dirty="0" err="1">
-                <a:solidFill>
-                  <a:srgbClr val="CE9178"/>
-                </a:solidFill>
-                <a:latin typeface="Consolas" panose="020B0609020204030204" pitchFamily="49" charset="0"/>
-              </a:rPr>
-              <a:t>nginx</a:t>
-            </a:r>
-            <a:endParaRPr lang="en-GB" sz="2000" dirty="0">
-              <a:solidFill>
-                <a:srgbClr val="D4D4D4"/>
-              </a:solidFill>
-              <a:latin typeface="Consolas" panose="020B0609020204030204" pitchFamily="49" charset="0"/>
-            </a:endParaRPr>
-          </a:p>
-          <a:p>
+              <a:t/>
+            </a:r>
+            <a:br>
+              <a:rPr lang="en-GB" sz="2000" dirty="0">
+                <a:solidFill>
+                  <a:srgbClr val="D4D4D4"/>
+                </a:solidFill>
+                <a:latin typeface="Consolas" panose="020B0609020204030204" pitchFamily="49" charset="0"/>
+              </a:rPr>
+            </a:br>
             <a:endParaRPr lang="en-GB" sz="2000" b="0" dirty="0">
               <a:solidFill>
                 <a:srgbClr val="D4D4D4"/>

</xml_diff>

<commit_message>
update - S5 Kubernetes object definition file - yaml p4
</commit_message>
<xml_diff>
--- a/docs/images/slides_images.pptx
+++ b/docs/images/slides_images.pptx
@@ -21,17 +21,18 @@
     <p:sldId id="281" r:id="rId15"/>
     <p:sldId id="282" r:id="rId16"/>
     <p:sldId id="284" r:id="rId17"/>
-    <p:sldId id="285" r:id="rId18"/>
-    <p:sldId id="286" r:id="rId19"/>
-    <p:sldId id="272" r:id="rId20"/>
-    <p:sldId id="259" r:id="rId21"/>
-    <p:sldId id="260" r:id="rId22"/>
-    <p:sldId id="261" r:id="rId23"/>
-    <p:sldId id="262" r:id="rId24"/>
-    <p:sldId id="266" r:id="rId25"/>
-    <p:sldId id="270" r:id="rId26"/>
-    <p:sldId id="268" r:id="rId27"/>
-    <p:sldId id="269" r:id="rId28"/>
+    <p:sldId id="287" r:id="rId18"/>
+    <p:sldId id="285" r:id="rId19"/>
+    <p:sldId id="286" r:id="rId20"/>
+    <p:sldId id="272" r:id="rId21"/>
+    <p:sldId id="259" r:id="rId22"/>
+    <p:sldId id="260" r:id="rId23"/>
+    <p:sldId id="261" r:id="rId24"/>
+    <p:sldId id="262" r:id="rId25"/>
+    <p:sldId id="266" r:id="rId26"/>
+    <p:sldId id="270" r:id="rId27"/>
+    <p:sldId id="268" r:id="rId28"/>
+    <p:sldId id="269" r:id="rId29"/>
   </p:sldIdLst>
   <p:sldSz cx="12192000" cy="6858000"/>
   <p:notesSz cx="6858000" cy="9144000"/>
@@ -4081,13 +4082,6 @@
               </a:rPr>
               <a:t>:</a:t>
             </a:r>
-            <a:endParaRPr lang="en-GB" sz="2000" b="0" dirty="0" smtClean="0">
-              <a:solidFill>
-                <a:srgbClr val="D4D4D4"/>
-              </a:solidFill>
-              <a:effectLst/>
-              <a:latin typeface="Consolas" panose="020B0609020204030204" pitchFamily="49" charset="0"/>
-            </a:endParaRPr>
           </a:p>
           <a:p>
             <a:r>
@@ -8156,6 +8150,428 @@
       </p:grpSpPr>
       <p:sp>
         <p:nvSpPr>
+          <p:cNvPr id="4" name="Title 1"/>
+          <p:cNvSpPr txBox="1">
+            <a:spLocks/>
+          </p:cNvSpPr>
+          <p:nvPr/>
+        </p:nvSpPr>
+        <p:spPr>
+          <a:xfrm>
+            <a:off x="538960" y="748305"/>
+            <a:ext cx="5167812" cy="2543535"/>
+          </a:xfrm>
+          <a:prstGeom prst="rect">
+            <a:avLst/>
+          </a:prstGeom>
+          <a:solidFill>
+            <a:schemeClr val="tx1"/>
+          </a:solidFill>
+        </p:spPr>
+        <p:txBody>
+          <a:bodyPr vert="horz" lIns="180000" tIns="180000" rIns="91440" bIns="45720" rtlCol="0" anchor="t">
+            <a:noAutofit/>
+          </a:bodyPr>
+          <a:lstStyle>
+            <a:lvl1pPr algn="l" defTabSz="914400" rtl="0" eaLnBrk="1" latinLnBrk="0" hangingPunct="1">
+              <a:lnSpc>
+                <a:spcPct val="90000"/>
+              </a:lnSpc>
+              <a:spcBef>
+                <a:spcPct val="0"/>
+              </a:spcBef>
+              <a:buNone/>
+              <a:defRPr sz="4400" kern="1200">
+                <a:solidFill>
+                  <a:schemeClr val="tx1"/>
+                </a:solidFill>
+                <a:latin typeface="+mj-lt"/>
+                <a:ea typeface="+mj-ea"/>
+                <a:cs typeface="+mj-cs"/>
+              </a:defRPr>
+            </a:lvl1pPr>
+          </a:lstStyle>
+          <a:p>
+            <a:pPr>
+              <a:lnSpc>
+                <a:spcPct val="100000"/>
+              </a:lnSpc>
+            </a:pPr>
+            <a:r>
+              <a:rPr lang="en-GB" sz="1800" dirty="0" err="1">
+                <a:solidFill>
+                  <a:srgbClr val="569CD6"/>
+                </a:solidFill>
+                <a:latin typeface="Consolas" panose="020B0609020204030204" pitchFamily="49" charset="0"/>
+              </a:rPr>
+              <a:t>apiVersion</a:t>
+            </a:r>
+            <a:r>
+              <a:rPr lang="en-GB" sz="1800" dirty="0">
+                <a:solidFill>
+                  <a:srgbClr val="D4D4D4"/>
+                </a:solidFill>
+                <a:latin typeface="Consolas" panose="020B0609020204030204" pitchFamily="49" charset="0"/>
+              </a:rPr>
+              <a:t>: </a:t>
+            </a:r>
+            <a:r>
+              <a:rPr lang="en-GB" sz="1800" dirty="0">
+                <a:solidFill>
+                  <a:srgbClr val="CE9178"/>
+                </a:solidFill>
+                <a:latin typeface="Consolas" panose="020B0609020204030204" pitchFamily="49" charset="0"/>
+              </a:rPr>
+              <a:t>apps/v1</a:t>
+            </a:r>
+            <a:endParaRPr lang="en-GB" sz="1800" dirty="0">
+              <a:solidFill>
+                <a:srgbClr val="D4D4D4"/>
+              </a:solidFill>
+              <a:latin typeface="Consolas" panose="020B0609020204030204" pitchFamily="49" charset="0"/>
+            </a:endParaRPr>
+          </a:p>
+          <a:p>
+            <a:pPr>
+              <a:lnSpc>
+                <a:spcPct val="100000"/>
+              </a:lnSpc>
+            </a:pPr>
+            <a:r>
+              <a:rPr lang="en-GB" sz="1800" dirty="0">
+                <a:solidFill>
+                  <a:srgbClr val="569CD6"/>
+                </a:solidFill>
+                <a:latin typeface="Consolas" panose="020B0609020204030204" pitchFamily="49" charset="0"/>
+              </a:rPr>
+              <a:t>kind</a:t>
+            </a:r>
+            <a:r>
+              <a:rPr lang="en-GB" sz="1800" dirty="0">
+                <a:solidFill>
+                  <a:srgbClr val="D4D4D4"/>
+                </a:solidFill>
+                <a:latin typeface="Consolas" panose="020B0609020204030204" pitchFamily="49" charset="0"/>
+              </a:rPr>
+              <a:t>: </a:t>
+            </a:r>
+            <a:r>
+              <a:rPr lang="en-GB" sz="1800" dirty="0">
+                <a:solidFill>
+                  <a:srgbClr val="CE9178"/>
+                </a:solidFill>
+                <a:latin typeface="Consolas" panose="020B0609020204030204" pitchFamily="49" charset="0"/>
+              </a:rPr>
+              <a:t>Deployment</a:t>
+            </a:r>
+            <a:endParaRPr lang="en-GB" sz="1800" dirty="0">
+              <a:solidFill>
+                <a:srgbClr val="D4D4D4"/>
+              </a:solidFill>
+              <a:latin typeface="Consolas" panose="020B0609020204030204" pitchFamily="49" charset="0"/>
+            </a:endParaRPr>
+          </a:p>
+          <a:p>
+            <a:pPr>
+              <a:lnSpc>
+                <a:spcPct val="100000"/>
+              </a:lnSpc>
+            </a:pPr>
+            <a:r>
+              <a:rPr lang="en-GB" sz="1800" dirty="0">
+                <a:solidFill>
+                  <a:srgbClr val="569CD6"/>
+                </a:solidFill>
+                <a:latin typeface="Consolas" panose="020B0609020204030204" pitchFamily="49" charset="0"/>
+              </a:rPr>
+              <a:t>metadata</a:t>
+            </a:r>
+            <a:r>
+              <a:rPr lang="en-GB" sz="1800" dirty="0">
+                <a:solidFill>
+                  <a:srgbClr val="D4D4D4"/>
+                </a:solidFill>
+                <a:latin typeface="Consolas" panose="020B0609020204030204" pitchFamily="49" charset="0"/>
+              </a:rPr>
+              <a:t>:</a:t>
+            </a:r>
+          </a:p>
+          <a:p>
+            <a:pPr>
+              <a:lnSpc>
+                <a:spcPct val="100000"/>
+              </a:lnSpc>
+            </a:pPr>
+            <a:r>
+              <a:rPr lang="en-GB" sz="1800" dirty="0">
+                <a:solidFill>
+                  <a:srgbClr val="D4D4D4"/>
+                </a:solidFill>
+                <a:latin typeface="Consolas" panose="020B0609020204030204" pitchFamily="49" charset="0"/>
+              </a:rPr>
+              <a:t>  </a:t>
+            </a:r>
+            <a:r>
+              <a:rPr lang="en-GB" sz="1800" dirty="0">
+                <a:solidFill>
+                  <a:srgbClr val="569CD6"/>
+                </a:solidFill>
+                <a:latin typeface="Consolas" panose="020B0609020204030204" pitchFamily="49" charset="0"/>
+              </a:rPr>
+              <a:t>name</a:t>
+            </a:r>
+            <a:r>
+              <a:rPr lang="en-GB" sz="1800" dirty="0">
+                <a:solidFill>
+                  <a:srgbClr val="D4D4D4"/>
+                </a:solidFill>
+                <a:latin typeface="Consolas" panose="020B0609020204030204" pitchFamily="49" charset="0"/>
+              </a:rPr>
+              <a:t>: </a:t>
+            </a:r>
+            <a:r>
+              <a:rPr lang="en-GB" sz="1800" dirty="0" err="1">
+                <a:solidFill>
+                  <a:srgbClr val="CE9178"/>
+                </a:solidFill>
+                <a:latin typeface="Consolas" panose="020B0609020204030204" pitchFamily="49" charset="0"/>
+              </a:rPr>
+              <a:t>nginx</a:t>
+            </a:r>
+            <a:r>
+              <a:rPr lang="en-GB" sz="1800" dirty="0">
+                <a:solidFill>
+                  <a:srgbClr val="CE9178"/>
+                </a:solidFill>
+                <a:latin typeface="Consolas" panose="020B0609020204030204" pitchFamily="49" charset="0"/>
+              </a:rPr>
+              <a:t>-deploy</a:t>
+            </a:r>
+            <a:endParaRPr lang="en-GB" sz="1800" dirty="0">
+              <a:solidFill>
+                <a:srgbClr val="D4D4D4"/>
+              </a:solidFill>
+              <a:latin typeface="Consolas" panose="020B0609020204030204" pitchFamily="49" charset="0"/>
+            </a:endParaRPr>
+          </a:p>
+          <a:p>
+            <a:pPr>
+              <a:lnSpc>
+                <a:spcPct val="100000"/>
+              </a:lnSpc>
+            </a:pPr>
+            <a:r>
+              <a:rPr lang="en-GB" sz="1800" dirty="0">
+                <a:solidFill>
+                  <a:srgbClr val="569CD6"/>
+                </a:solidFill>
+                <a:latin typeface="Consolas" panose="020B0609020204030204" pitchFamily="49" charset="0"/>
+              </a:rPr>
+              <a:t>spec</a:t>
+            </a:r>
+            <a:r>
+              <a:rPr lang="en-GB" sz="1800" dirty="0">
+                <a:solidFill>
+                  <a:srgbClr val="D4D4D4"/>
+                </a:solidFill>
+                <a:latin typeface="Consolas" panose="020B0609020204030204" pitchFamily="49" charset="0"/>
+              </a:rPr>
+              <a:t>:</a:t>
+            </a:r>
+          </a:p>
+          <a:p>
+            <a:pPr>
+              <a:lnSpc>
+                <a:spcPct val="100000"/>
+              </a:lnSpc>
+            </a:pPr>
+            <a:r>
+              <a:rPr lang="en-GB" sz="1800" dirty="0">
+                <a:solidFill>
+                  <a:srgbClr val="D4D4D4"/>
+                </a:solidFill>
+                <a:latin typeface="Consolas" panose="020B0609020204030204" pitchFamily="49" charset="0"/>
+              </a:rPr>
+              <a:t>  </a:t>
+            </a:r>
+            <a:r>
+              <a:rPr lang="en-GB" sz="1800" dirty="0">
+                <a:solidFill>
+                  <a:srgbClr val="569CD6"/>
+                </a:solidFill>
+                <a:latin typeface="Consolas" panose="020B0609020204030204" pitchFamily="49" charset="0"/>
+              </a:rPr>
+              <a:t>replicas</a:t>
+            </a:r>
+            <a:r>
+              <a:rPr lang="en-GB" sz="1800" dirty="0">
+                <a:solidFill>
+                  <a:srgbClr val="D4D4D4"/>
+                </a:solidFill>
+                <a:latin typeface="Consolas" panose="020B0609020204030204" pitchFamily="49" charset="0"/>
+              </a:rPr>
+              <a:t>: </a:t>
+            </a:r>
+          </a:p>
+          <a:p>
+            <a:pPr>
+              <a:lnSpc>
+                <a:spcPct val="100000"/>
+              </a:lnSpc>
+            </a:pPr>
+            <a:r>
+              <a:rPr lang="en-GB" sz="1800" dirty="0" smtClean="0">
+                <a:solidFill>
+                  <a:srgbClr val="D4D4D4"/>
+                </a:solidFill>
+                <a:latin typeface="Consolas" panose="020B0609020204030204" pitchFamily="49" charset="0"/>
+              </a:rPr>
+              <a:t>  </a:t>
+            </a:r>
+            <a:r>
+              <a:rPr lang="en-GB" sz="1800" dirty="0" smtClean="0">
+                <a:solidFill>
+                  <a:srgbClr val="569CD6"/>
+                </a:solidFill>
+                <a:latin typeface="Consolas" panose="020B0609020204030204" pitchFamily="49" charset="0"/>
+              </a:rPr>
+              <a:t>selector</a:t>
+            </a:r>
+            <a:r>
+              <a:rPr lang="en-GB" sz="1800" dirty="0" smtClean="0">
+                <a:solidFill>
+                  <a:srgbClr val="D4D4D4"/>
+                </a:solidFill>
+                <a:latin typeface="Consolas" panose="020B0609020204030204" pitchFamily="49" charset="0"/>
+              </a:rPr>
+              <a:t>:</a:t>
+            </a:r>
+          </a:p>
+          <a:p>
+            <a:pPr>
+              <a:lnSpc>
+                <a:spcPct val="100000"/>
+              </a:lnSpc>
+            </a:pPr>
+            <a:r>
+              <a:rPr lang="en-GB" sz="1800" dirty="0">
+                <a:solidFill>
+                  <a:srgbClr val="D4D4D4"/>
+                </a:solidFill>
+                <a:latin typeface="Consolas" panose="020B0609020204030204" pitchFamily="49" charset="0"/>
+              </a:rPr>
+              <a:t>  </a:t>
+            </a:r>
+            <a:r>
+              <a:rPr lang="en-GB" sz="1800" dirty="0">
+                <a:solidFill>
+                  <a:srgbClr val="569CD6"/>
+                </a:solidFill>
+                <a:latin typeface="Consolas" panose="020B0609020204030204" pitchFamily="49" charset="0"/>
+              </a:rPr>
+              <a:t>template</a:t>
+            </a:r>
+            <a:r>
+              <a:rPr lang="en-GB" sz="1800" dirty="0" smtClean="0">
+                <a:solidFill>
+                  <a:srgbClr val="D4D4D4"/>
+                </a:solidFill>
+                <a:latin typeface="Consolas" panose="020B0609020204030204" pitchFamily="49" charset="0"/>
+              </a:rPr>
+              <a:t>:</a:t>
+            </a:r>
+            <a:endParaRPr lang="en-GB" sz="1800" dirty="0">
+              <a:solidFill>
+                <a:srgbClr val="D4D4D4"/>
+              </a:solidFill>
+              <a:latin typeface="Consolas" panose="020B0609020204030204" pitchFamily="49" charset="0"/>
+            </a:endParaRPr>
+          </a:p>
+        </p:txBody>
+      </p:sp>
+      <p:sp>
+        <p:nvSpPr>
+          <p:cNvPr id="6" name="Snip Single Corner Rectangle 5"/>
+          <p:cNvSpPr/>
+          <p:nvPr/>
+        </p:nvSpPr>
+        <p:spPr>
+          <a:xfrm>
+            <a:off x="543528" y="400050"/>
+            <a:ext cx="2038350" cy="348255"/>
+          </a:xfrm>
+          <a:prstGeom prst="snip1Rect">
+            <a:avLst/>
+          </a:prstGeom>
+        </p:spPr>
+        <p:style>
+          <a:lnRef idx="2">
+            <a:schemeClr val="dk1">
+              <a:shade val="50000"/>
+            </a:schemeClr>
+          </a:lnRef>
+          <a:fillRef idx="1">
+            <a:schemeClr val="dk1"/>
+          </a:fillRef>
+          <a:effectRef idx="0">
+            <a:schemeClr val="dk1"/>
+          </a:effectRef>
+          <a:fontRef idx="minor">
+            <a:schemeClr val="lt1"/>
+          </a:fontRef>
+        </p:style>
+        <p:txBody>
+          <a:bodyPr rtlCol="0" anchor="ctr"/>
+          <a:lstStyle/>
+          <a:p>
+            <a:pPr algn="ctr"/>
+            <a:r>
+              <a:rPr lang="en-US" dirty="0" err="1" smtClean="0"/>
+              <a:t>deployment.yml</a:t>
+            </a:r>
+            <a:endParaRPr lang="en-GB" dirty="0"/>
+          </a:p>
+        </p:txBody>
+      </p:sp>
+    </p:spTree>
+    <p:extLst>
+      <p:ext uri="{BB962C8B-B14F-4D97-AF65-F5344CB8AC3E}">
+        <p14:creationId xmlns:p14="http://schemas.microsoft.com/office/powerpoint/2010/main" val="171940552"/>
+      </p:ext>
+    </p:extLst>
+  </p:cSld>
+  <p:clrMapOvr>
+    <a:masterClrMapping/>
+  </p:clrMapOvr>
+  <p:timing>
+    <p:tnLst>
+      <p:par>
+        <p:cTn id="1" dur="indefinite" restart="never" nodeType="tmRoot"/>
+      </p:par>
+    </p:tnLst>
+  </p:timing>
+</p:sld>
+</file>
+
+<file path=ppt/slides/slide17.xml><?xml version="1.0" encoding="utf-8"?>
+<p:sld xmlns:a="http://schemas.openxmlformats.org/drawingml/2006/main" xmlns:r="http://schemas.openxmlformats.org/officeDocument/2006/relationships" xmlns:p="http://schemas.openxmlformats.org/presentationml/2006/main">
+  <p:cSld>
+    <p:spTree>
+      <p:nvGrpSpPr>
+        <p:cNvPr id="1" name=""/>
+        <p:cNvGrpSpPr/>
+        <p:nvPr/>
+      </p:nvGrpSpPr>
+      <p:grpSpPr>
+        <a:xfrm>
+          <a:off x="0" y="0"/>
+          <a:ext cx="0" cy="0"/>
+          <a:chOff x="0" y="0"/>
+          <a:chExt cx="0" cy="0"/>
+        </a:xfrm>
+      </p:grpSpPr>
+      <p:sp>
+        <p:nvSpPr>
           <p:cNvPr id="9" name="Title 1"/>
           <p:cNvSpPr txBox="1">
             <a:spLocks/>
@@ -9915,1055 +10331,7 @@
     </p:spTree>
     <p:extLst>
       <p:ext uri="{BB962C8B-B14F-4D97-AF65-F5344CB8AC3E}">
-        <p14:creationId xmlns:p14="http://schemas.microsoft.com/office/powerpoint/2010/main" val="171940552"/>
-      </p:ext>
-    </p:extLst>
-  </p:cSld>
-  <p:clrMapOvr>
-    <a:masterClrMapping/>
-  </p:clrMapOvr>
-  <p:timing>
-    <p:tnLst>
-      <p:par>
-        <p:cTn id="1" dur="indefinite" restart="never" nodeType="tmRoot"/>
-      </p:par>
-    </p:tnLst>
-  </p:timing>
-</p:sld>
-</file>
-
-<file path=ppt/slides/slide17.xml><?xml version="1.0" encoding="utf-8"?>
-<p:sld xmlns:a="http://schemas.openxmlformats.org/drawingml/2006/main" xmlns:r="http://schemas.openxmlformats.org/officeDocument/2006/relationships" xmlns:p="http://schemas.openxmlformats.org/presentationml/2006/main">
-  <p:cSld>
-    <p:spTree>
-      <p:nvGrpSpPr>
-        <p:cNvPr id="1" name=""/>
-        <p:cNvGrpSpPr/>
-        <p:nvPr/>
-      </p:nvGrpSpPr>
-      <p:grpSpPr>
-        <a:xfrm>
-          <a:off x="0" y="0"/>
-          <a:ext cx="0" cy="0"/>
-          <a:chOff x="0" y="0"/>
-          <a:chExt cx="0" cy="0"/>
-        </a:xfrm>
-      </p:grpSpPr>
-      <p:sp>
-        <p:nvSpPr>
-          <p:cNvPr id="4" name="Title 1"/>
-          <p:cNvSpPr txBox="1">
-            <a:spLocks/>
-          </p:cNvSpPr>
-          <p:nvPr/>
-        </p:nvSpPr>
-        <p:spPr>
-          <a:xfrm>
-            <a:off x="538959" y="748305"/>
-            <a:ext cx="10919615" cy="5909670"/>
-          </a:xfrm>
-          <a:prstGeom prst="rect">
-            <a:avLst/>
-          </a:prstGeom>
-          <a:solidFill>
-            <a:schemeClr val="tx1"/>
-          </a:solidFill>
-        </p:spPr>
-        <p:txBody>
-          <a:bodyPr vert="horz" lIns="180000" tIns="180000" rIns="91440" bIns="45720" rtlCol="0" anchor="t">
-            <a:noAutofit/>
-          </a:bodyPr>
-          <a:lstStyle>
-            <a:lvl1pPr algn="l" defTabSz="914400" rtl="0" eaLnBrk="1" latinLnBrk="0" hangingPunct="1">
-              <a:lnSpc>
-                <a:spcPct val="90000"/>
-              </a:lnSpc>
-              <a:spcBef>
-                <a:spcPct val="0"/>
-              </a:spcBef>
-              <a:buNone/>
-              <a:defRPr sz="4400" kern="1200">
-                <a:solidFill>
-                  <a:schemeClr val="tx1"/>
-                </a:solidFill>
-                <a:latin typeface="+mj-lt"/>
-                <a:ea typeface="+mj-ea"/>
-                <a:cs typeface="+mj-cs"/>
-              </a:defRPr>
-            </a:lvl1pPr>
-          </a:lstStyle>
-          <a:p>
-            <a:pPr>
-              <a:lnSpc>
-                <a:spcPct val="100000"/>
-              </a:lnSpc>
-            </a:pPr>
-            <a:r>
-              <a:rPr lang="en-GB" sz="1800" dirty="0" err="1">
-                <a:solidFill>
-                  <a:srgbClr val="569CD6"/>
-                </a:solidFill>
-                <a:latin typeface="Consolas" panose="020B0609020204030204" pitchFamily="49" charset="0"/>
-              </a:rPr>
-              <a:t>apiVersion</a:t>
-            </a:r>
-            <a:r>
-              <a:rPr lang="en-GB" sz="1800" dirty="0">
-                <a:solidFill>
-                  <a:srgbClr val="D4D4D4"/>
-                </a:solidFill>
-                <a:latin typeface="Consolas" panose="020B0609020204030204" pitchFamily="49" charset="0"/>
-              </a:rPr>
-              <a:t>: </a:t>
-            </a:r>
-            <a:r>
-              <a:rPr lang="en-GB" sz="1800" dirty="0">
-                <a:solidFill>
-                  <a:srgbClr val="CE9178"/>
-                </a:solidFill>
-                <a:latin typeface="Consolas" panose="020B0609020204030204" pitchFamily="49" charset="0"/>
-              </a:rPr>
-              <a:t>apps/v1</a:t>
-            </a:r>
-            <a:endParaRPr lang="en-GB" sz="1800" dirty="0">
-              <a:solidFill>
-                <a:srgbClr val="D4D4D4"/>
-              </a:solidFill>
-              <a:latin typeface="Consolas" panose="020B0609020204030204" pitchFamily="49" charset="0"/>
-            </a:endParaRPr>
-          </a:p>
-          <a:p>
-            <a:pPr>
-              <a:lnSpc>
-                <a:spcPct val="100000"/>
-              </a:lnSpc>
-            </a:pPr>
-            <a:r>
-              <a:rPr lang="en-GB" sz="1800" dirty="0">
-                <a:solidFill>
-                  <a:srgbClr val="569CD6"/>
-                </a:solidFill>
-                <a:latin typeface="Consolas" panose="020B0609020204030204" pitchFamily="49" charset="0"/>
-              </a:rPr>
-              <a:t>kind</a:t>
-            </a:r>
-            <a:r>
-              <a:rPr lang="en-GB" sz="1800" dirty="0">
-                <a:solidFill>
-                  <a:srgbClr val="D4D4D4"/>
-                </a:solidFill>
-                <a:latin typeface="Consolas" panose="020B0609020204030204" pitchFamily="49" charset="0"/>
-              </a:rPr>
-              <a:t>: </a:t>
-            </a:r>
-            <a:r>
-              <a:rPr lang="en-GB" sz="1800" dirty="0">
-                <a:solidFill>
-                  <a:srgbClr val="CE9178"/>
-                </a:solidFill>
-                <a:latin typeface="Consolas" panose="020B0609020204030204" pitchFamily="49" charset="0"/>
-              </a:rPr>
-              <a:t>Deployment</a:t>
-            </a:r>
-            <a:endParaRPr lang="en-GB" sz="1800" dirty="0">
-              <a:solidFill>
-                <a:srgbClr val="D4D4D4"/>
-              </a:solidFill>
-              <a:latin typeface="Consolas" panose="020B0609020204030204" pitchFamily="49" charset="0"/>
-            </a:endParaRPr>
-          </a:p>
-          <a:p>
-            <a:pPr>
-              <a:lnSpc>
-                <a:spcPct val="100000"/>
-              </a:lnSpc>
-            </a:pPr>
-            <a:r>
-              <a:rPr lang="en-GB" sz="1800" dirty="0">
-                <a:solidFill>
-                  <a:srgbClr val="569CD6"/>
-                </a:solidFill>
-                <a:latin typeface="Consolas" panose="020B0609020204030204" pitchFamily="49" charset="0"/>
-              </a:rPr>
-              <a:t>metadata</a:t>
-            </a:r>
-            <a:r>
-              <a:rPr lang="en-GB" sz="1800" dirty="0">
-                <a:solidFill>
-                  <a:srgbClr val="D4D4D4"/>
-                </a:solidFill>
-                <a:latin typeface="Consolas" panose="020B0609020204030204" pitchFamily="49" charset="0"/>
-              </a:rPr>
-              <a:t>:</a:t>
-            </a:r>
-          </a:p>
-          <a:p>
-            <a:pPr>
-              <a:lnSpc>
-                <a:spcPct val="100000"/>
-              </a:lnSpc>
-            </a:pPr>
-            <a:r>
-              <a:rPr lang="en-GB" sz="1800" dirty="0">
-                <a:solidFill>
-                  <a:srgbClr val="D4D4D4"/>
-                </a:solidFill>
-                <a:latin typeface="Consolas" panose="020B0609020204030204" pitchFamily="49" charset="0"/>
-              </a:rPr>
-              <a:t>  </a:t>
-            </a:r>
-            <a:r>
-              <a:rPr lang="en-GB" sz="1800" dirty="0">
-                <a:solidFill>
-                  <a:srgbClr val="569CD6"/>
-                </a:solidFill>
-                <a:latin typeface="Consolas" panose="020B0609020204030204" pitchFamily="49" charset="0"/>
-              </a:rPr>
-              <a:t>name</a:t>
-            </a:r>
-            <a:r>
-              <a:rPr lang="en-GB" sz="1800" dirty="0">
-                <a:solidFill>
-                  <a:srgbClr val="D4D4D4"/>
-                </a:solidFill>
-                <a:latin typeface="Consolas" panose="020B0609020204030204" pitchFamily="49" charset="0"/>
-              </a:rPr>
-              <a:t>: </a:t>
-            </a:r>
-            <a:r>
-              <a:rPr lang="en-GB" sz="1800" dirty="0" err="1">
-                <a:solidFill>
-                  <a:srgbClr val="CE9178"/>
-                </a:solidFill>
-                <a:latin typeface="Consolas" panose="020B0609020204030204" pitchFamily="49" charset="0"/>
-              </a:rPr>
-              <a:t>nginx</a:t>
-            </a:r>
-            <a:r>
-              <a:rPr lang="en-GB" sz="1800" dirty="0">
-                <a:solidFill>
-                  <a:srgbClr val="CE9178"/>
-                </a:solidFill>
-                <a:latin typeface="Consolas" panose="020B0609020204030204" pitchFamily="49" charset="0"/>
-              </a:rPr>
-              <a:t>-deploy</a:t>
-            </a:r>
-            <a:endParaRPr lang="en-GB" sz="1800" dirty="0">
-              <a:solidFill>
-                <a:srgbClr val="D4D4D4"/>
-              </a:solidFill>
-              <a:latin typeface="Consolas" panose="020B0609020204030204" pitchFamily="49" charset="0"/>
-            </a:endParaRPr>
-          </a:p>
-          <a:p>
-            <a:pPr>
-              <a:lnSpc>
-                <a:spcPct val="100000"/>
-              </a:lnSpc>
-            </a:pPr>
-            <a:r>
-              <a:rPr lang="en-GB" sz="1800" dirty="0">
-                <a:solidFill>
-                  <a:srgbClr val="D4D4D4"/>
-                </a:solidFill>
-                <a:latin typeface="Consolas" panose="020B0609020204030204" pitchFamily="49" charset="0"/>
-              </a:rPr>
-              <a:t>  </a:t>
-            </a:r>
-            <a:r>
-              <a:rPr lang="en-GB" sz="1800" dirty="0">
-                <a:solidFill>
-                  <a:srgbClr val="569CD6"/>
-                </a:solidFill>
-                <a:latin typeface="Consolas" panose="020B0609020204030204" pitchFamily="49" charset="0"/>
-              </a:rPr>
-              <a:t>labels</a:t>
-            </a:r>
-            <a:r>
-              <a:rPr lang="en-GB" sz="1800" dirty="0">
-                <a:solidFill>
-                  <a:srgbClr val="D4D4D4"/>
-                </a:solidFill>
-                <a:latin typeface="Consolas" panose="020B0609020204030204" pitchFamily="49" charset="0"/>
-              </a:rPr>
-              <a:t>:</a:t>
-            </a:r>
-          </a:p>
-          <a:p>
-            <a:pPr>
-              <a:lnSpc>
-                <a:spcPct val="100000"/>
-              </a:lnSpc>
-            </a:pPr>
-            <a:r>
-              <a:rPr lang="en-GB" sz="1800" dirty="0">
-                <a:solidFill>
-                  <a:srgbClr val="D4D4D4"/>
-                </a:solidFill>
-                <a:latin typeface="Consolas" panose="020B0609020204030204" pitchFamily="49" charset="0"/>
-              </a:rPr>
-              <a:t>    </a:t>
-            </a:r>
-            <a:r>
-              <a:rPr lang="en-GB" sz="1800" dirty="0" err="1">
-                <a:solidFill>
-                  <a:srgbClr val="569CD6"/>
-                </a:solidFill>
-                <a:latin typeface="Consolas" panose="020B0609020204030204" pitchFamily="49" charset="0"/>
-              </a:rPr>
-              <a:t>env</a:t>
-            </a:r>
-            <a:r>
-              <a:rPr lang="en-GB" sz="1800" dirty="0">
-                <a:solidFill>
-                  <a:srgbClr val="D4D4D4"/>
-                </a:solidFill>
-                <a:latin typeface="Consolas" panose="020B0609020204030204" pitchFamily="49" charset="0"/>
-              </a:rPr>
-              <a:t>: </a:t>
-            </a:r>
-            <a:r>
-              <a:rPr lang="en-GB" sz="1800" dirty="0">
-                <a:solidFill>
-                  <a:srgbClr val="CE9178"/>
-                </a:solidFill>
-                <a:latin typeface="Consolas" panose="020B0609020204030204" pitchFamily="49" charset="0"/>
-              </a:rPr>
-              <a:t>dev</a:t>
-            </a:r>
-            <a:endParaRPr lang="en-GB" sz="1800" dirty="0">
-              <a:solidFill>
-                <a:srgbClr val="D4D4D4"/>
-              </a:solidFill>
-              <a:latin typeface="Consolas" panose="020B0609020204030204" pitchFamily="49" charset="0"/>
-            </a:endParaRPr>
-          </a:p>
-          <a:p>
-            <a:pPr>
-              <a:lnSpc>
-                <a:spcPct val="100000"/>
-              </a:lnSpc>
-            </a:pPr>
-            <a:r>
-              <a:rPr lang="en-GB" sz="1800" dirty="0">
-                <a:solidFill>
-                  <a:srgbClr val="569CD6"/>
-                </a:solidFill>
-                <a:latin typeface="Consolas" panose="020B0609020204030204" pitchFamily="49" charset="0"/>
-              </a:rPr>
-              <a:t>spec</a:t>
-            </a:r>
-            <a:r>
-              <a:rPr lang="en-GB" sz="1800" dirty="0">
-                <a:solidFill>
-                  <a:srgbClr val="D4D4D4"/>
-                </a:solidFill>
-                <a:latin typeface="Consolas" panose="020B0609020204030204" pitchFamily="49" charset="0"/>
-              </a:rPr>
-              <a:t>:</a:t>
-            </a:r>
-          </a:p>
-          <a:p>
-            <a:pPr>
-              <a:lnSpc>
-                <a:spcPct val="100000"/>
-              </a:lnSpc>
-            </a:pPr>
-            <a:r>
-              <a:rPr lang="en-GB" sz="1800" dirty="0">
-                <a:solidFill>
-                  <a:srgbClr val="D4D4D4"/>
-                </a:solidFill>
-                <a:latin typeface="Consolas" panose="020B0609020204030204" pitchFamily="49" charset="0"/>
-              </a:rPr>
-              <a:t>  </a:t>
-            </a:r>
-            <a:r>
-              <a:rPr lang="en-GB" sz="1800" dirty="0">
-                <a:solidFill>
-                  <a:srgbClr val="569CD6"/>
-                </a:solidFill>
-                <a:latin typeface="Consolas" panose="020B0609020204030204" pitchFamily="49" charset="0"/>
-              </a:rPr>
-              <a:t>replicas</a:t>
-            </a:r>
-            <a:r>
-              <a:rPr lang="en-GB" sz="1800" dirty="0">
-                <a:solidFill>
-                  <a:srgbClr val="D4D4D4"/>
-                </a:solidFill>
-                <a:latin typeface="Consolas" panose="020B0609020204030204" pitchFamily="49" charset="0"/>
-              </a:rPr>
-              <a:t>: </a:t>
-            </a:r>
-            <a:r>
-              <a:rPr lang="en-GB" sz="1800" dirty="0">
-                <a:solidFill>
-                  <a:srgbClr val="B5CEA8"/>
-                </a:solidFill>
-                <a:latin typeface="Consolas" panose="020B0609020204030204" pitchFamily="49" charset="0"/>
-              </a:rPr>
-              <a:t>1</a:t>
-            </a:r>
-            <a:endParaRPr lang="en-GB" sz="1800" dirty="0">
-              <a:solidFill>
-                <a:srgbClr val="D4D4D4"/>
-              </a:solidFill>
-              <a:latin typeface="Consolas" panose="020B0609020204030204" pitchFamily="49" charset="0"/>
-            </a:endParaRPr>
-          </a:p>
-          <a:p>
-            <a:pPr>
-              <a:lnSpc>
-                <a:spcPct val="100000"/>
-              </a:lnSpc>
-            </a:pPr>
-            <a:r>
-              <a:rPr lang="en-GB" sz="1800" dirty="0">
-                <a:solidFill>
-                  <a:srgbClr val="D4D4D4"/>
-                </a:solidFill>
-                <a:latin typeface="Consolas" panose="020B0609020204030204" pitchFamily="49" charset="0"/>
-              </a:rPr>
-              <a:t>  </a:t>
-            </a:r>
-            <a:r>
-              <a:rPr lang="en-GB" sz="1800" dirty="0">
-                <a:solidFill>
-                  <a:srgbClr val="569CD6"/>
-                </a:solidFill>
-                <a:latin typeface="Consolas" panose="020B0609020204030204" pitchFamily="49" charset="0"/>
-              </a:rPr>
-              <a:t>selector</a:t>
-            </a:r>
-            <a:r>
-              <a:rPr lang="en-GB" sz="1800" dirty="0">
-                <a:solidFill>
-                  <a:srgbClr val="D4D4D4"/>
-                </a:solidFill>
-                <a:latin typeface="Consolas" panose="020B0609020204030204" pitchFamily="49" charset="0"/>
-              </a:rPr>
-              <a:t>:</a:t>
-            </a:r>
-          </a:p>
-          <a:p>
-            <a:pPr>
-              <a:lnSpc>
-                <a:spcPct val="100000"/>
-              </a:lnSpc>
-            </a:pPr>
-            <a:r>
-              <a:rPr lang="en-GB" sz="1800" dirty="0">
-                <a:solidFill>
-                  <a:srgbClr val="D4D4D4"/>
-                </a:solidFill>
-                <a:latin typeface="Consolas" panose="020B0609020204030204" pitchFamily="49" charset="0"/>
-              </a:rPr>
-              <a:t>    </a:t>
-            </a:r>
-            <a:r>
-              <a:rPr lang="en-GB" sz="1800" dirty="0" err="1">
-                <a:solidFill>
-                  <a:srgbClr val="569CD6"/>
-                </a:solidFill>
-                <a:latin typeface="Consolas" panose="020B0609020204030204" pitchFamily="49" charset="0"/>
-              </a:rPr>
-              <a:t>matchLabels</a:t>
-            </a:r>
-            <a:r>
-              <a:rPr lang="en-GB" sz="1800" dirty="0">
-                <a:solidFill>
-                  <a:srgbClr val="D4D4D4"/>
-                </a:solidFill>
-                <a:latin typeface="Consolas" panose="020B0609020204030204" pitchFamily="49" charset="0"/>
-              </a:rPr>
-              <a:t>:</a:t>
-            </a:r>
-          </a:p>
-          <a:p>
-            <a:pPr>
-              <a:lnSpc>
-                <a:spcPct val="100000"/>
-              </a:lnSpc>
-            </a:pPr>
-            <a:r>
-              <a:rPr lang="en-GB" sz="1800" dirty="0">
-                <a:solidFill>
-                  <a:srgbClr val="D4D4D4"/>
-                </a:solidFill>
-                <a:latin typeface="Consolas" panose="020B0609020204030204" pitchFamily="49" charset="0"/>
-              </a:rPr>
-              <a:t>      </a:t>
-            </a:r>
-            <a:r>
-              <a:rPr lang="en-GB" sz="1800" dirty="0">
-                <a:solidFill>
-                  <a:srgbClr val="569CD6"/>
-                </a:solidFill>
-                <a:latin typeface="Consolas" panose="020B0609020204030204" pitchFamily="49" charset="0"/>
-              </a:rPr>
-              <a:t>app</a:t>
-            </a:r>
-            <a:r>
-              <a:rPr lang="en-GB" sz="1800" dirty="0">
-                <a:solidFill>
-                  <a:srgbClr val="D4D4D4"/>
-                </a:solidFill>
-                <a:latin typeface="Consolas" panose="020B0609020204030204" pitchFamily="49" charset="0"/>
-              </a:rPr>
-              <a:t>: </a:t>
-            </a:r>
-            <a:r>
-              <a:rPr lang="en-GB" sz="1800" dirty="0">
-                <a:solidFill>
-                  <a:srgbClr val="CE9178"/>
-                </a:solidFill>
-                <a:latin typeface="Consolas" panose="020B0609020204030204" pitchFamily="49" charset="0"/>
-              </a:rPr>
-              <a:t>my-app</a:t>
-            </a:r>
-            <a:endParaRPr lang="en-GB" sz="1800" dirty="0">
-              <a:solidFill>
-                <a:srgbClr val="D4D4D4"/>
-              </a:solidFill>
-              <a:latin typeface="Consolas" panose="020B0609020204030204" pitchFamily="49" charset="0"/>
-            </a:endParaRPr>
-          </a:p>
-          <a:p>
-            <a:pPr>
-              <a:lnSpc>
-                <a:spcPct val="100000"/>
-              </a:lnSpc>
-            </a:pPr>
-            <a:r>
-              <a:rPr lang="en-GB" sz="1800" dirty="0">
-                <a:solidFill>
-                  <a:srgbClr val="D4D4D4"/>
-                </a:solidFill>
-                <a:latin typeface="Consolas" panose="020B0609020204030204" pitchFamily="49" charset="0"/>
-              </a:rPr>
-              <a:t>  </a:t>
-            </a:r>
-            <a:r>
-              <a:rPr lang="en-GB" sz="1800" dirty="0">
-                <a:solidFill>
-                  <a:srgbClr val="569CD6"/>
-                </a:solidFill>
-                <a:latin typeface="Consolas" panose="020B0609020204030204" pitchFamily="49" charset="0"/>
-              </a:rPr>
-              <a:t>template</a:t>
-            </a:r>
-            <a:r>
-              <a:rPr lang="en-GB" sz="1800" dirty="0">
-                <a:solidFill>
-                  <a:srgbClr val="D4D4D4"/>
-                </a:solidFill>
-                <a:latin typeface="Consolas" panose="020B0609020204030204" pitchFamily="49" charset="0"/>
-              </a:rPr>
-              <a:t>:</a:t>
-            </a:r>
-          </a:p>
-          <a:p>
-            <a:pPr>
-              <a:lnSpc>
-                <a:spcPct val="100000"/>
-              </a:lnSpc>
-            </a:pPr>
-            <a:r>
-              <a:rPr lang="en-GB" sz="1800" dirty="0">
-                <a:solidFill>
-                  <a:srgbClr val="D4D4D4"/>
-                </a:solidFill>
-                <a:latin typeface="Consolas" panose="020B0609020204030204" pitchFamily="49" charset="0"/>
-              </a:rPr>
-              <a:t>    </a:t>
-            </a:r>
-            <a:r>
-              <a:rPr lang="en-GB" sz="1800" dirty="0">
-                <a:solidFill>
-                  <a:srgbClr val="569CD6"/>
-                </a:solidFill>
-                <a:latin typeface="Consolas" panose="020B0609020204030204" pitchFamily="49" charset="0"/>
-              </a:rPr>
-              <a:t>metadata</a:t>
-            </a:r>
-            <a:r>
-              <a:rPr lang="en-GB" sz="1800" dirty="0">
-                <a:solidFill>
-                  <a:srgbClr val="D4D4D4"/>
-                </a:solidFill>
-                <a:latin typeface="Consolas" panose="020B0609020204030204" pitchFamily="49" charset="0"/>
-              </a:rPr>
-              <a:t>:</a:t>
-            </a:r>
-          </a:p>
-          <a:p>
-            <a:pPr>
-              <a:lnSpc>
-                <a:spcPct val="100000"/>
-              </a:lnSpc>
-            </a:pPr>
-            <a:r>
-              <a:rPr lang="en-GB" sz="1800" dirty="0">
-                <a:solidFill>
-                  <a:srgbClr val="D4D4D4"/>
-                </a:solidFill>
-                <a:latin typeface="Consolas" panose="020B0609020204030204" pitchFamily="49" charset="0"/>
-              </a:rPr>
-              <a:t>      </a:t>
-            </a:r>
-            <a:r>
-              <a:rPr lang="en-GB" sz="1800" dirty="0">
-                <a:solidFill>
-                  <a:srgbClr val="569CD6"/>
-                </a:solidFill>
-                <a:latin typeface="Consolas" panose="020B0609020204030204" pitchFamily="49" charset="0"/>
-              </a:rPr>
-              <a:t>labels</a:t>
-            </a:r>
-            <a:r>
-              <a:rPr lang="en-GB" sz="1800" dirty="0">
-                <a:solidFill>
-                  <a:srgbClr val="D4D4D4"/>
-                </a:solidFill>
-                <a:latin typeface="Consolas" panose="020B0609020204030204" pitchFamily="49" charset="0"/>
-              </a:rPr>
-              <a:t>:</a:t>
-            </a:r>
-          </a:p>
-          <a:p>
-            <a:pPr>
-              <a:lnSpc>
-                <a:spcPct val="100000"/>
-              </a:lnSpc>
-            </a:pPr>
-            <a:r>
-              <a:rPr lang="en-GB" sz="1800" dirty="0">
-                <a:solidFill>
-                  <a:srgbClr val="D4D4D4"/>
-                </a:solidFill>
-                <a:latin typeface="Consolas" panose="020B0609020204030204" pitchFamily="49" charset="0"/>
-              </a:rPr>
-              <a:t>        </a:t>
-            </a:r>
-            <a:r>
-              <a:rPr lang="en-GB" sz="1800" dirty="0">
-                <a:solidFill>
-                  <a:srgbClr val="569CD6"/>
-                </a:solidFill>
-                <a:latin typeface="Consolas" panose="020B0609020204030204" pitchFamily="49" charset="0"/>
-              </a:rPr>
-              <a:t>app</a:t>
-            </a:r>
-            <a:r>
-              <a:rPr lang="en-GB" sz="1800" dirty="0">
-                <a:solidFill>
-                  <a:srgbClr val="D4D4D4"/>
-                </a:solidFill>
-                <a:latin typeface="Consolas" panose="020B0609020204030204" pitchFamily="49" charset="0"/>
-              </a:rPr>
-              <a:t>: </a:t>
-            </a:r>
-            <a:r>
-              <a:rPr lang="en-GB" sz="1800" dirty="0">
-                <a:solidFill>
-                  <a:srgbClr val="CE9178"/>
-                </a:solidFill>
-                <a:latin typeface="Consolas" panose="020B0609020204030204" pitchFamily="49" charset="0"/>
-              </a:rPr>
-              <a:t>my-app</a:t>
-            </a:r>
-            <a:endParaRPr lang="en-GB" sz="1800" dirty="0">
-              <a:solidFill>
-                <a:srgbClr val="D4D4D4"/>
-              </a:solidFill>
-              <a:latin typeface="Consolas" panose="020B0609020204030204" pitchFamily="49" charset="0"/>
-            </a:endParaRPr>
-          </a:p>
-          <a:p>
-            <a:pPr>
-              <a:lnSpc>
-                <a:spcPct val="100000"/>
-              </a:lnSpc>
-            </a:pPr>
-            <a:r>
-              <a:rPr lang="en-GB" sz="1800" dirty="0">
-                <a:solidFill>
-                  <a:srgbClr val="D4D4D4"/>
-                </a:solidFill>
-                <a:latin typeface="Consolas" panose="020B0609020204030204" pitchFamily="49" charset="0"/>
-              </a:rPr>
-              <a:t>    </a:t>
-            </a:r>
-            <a:r>
-              <a:rPr lang="en-GB" sz="1800" dirty="0">
-                <a:solidFill>
-                  <a:srgbClr val="569CD6"/>
-                </a:solidFill>
-                <a:latin typeface="Consolas" panose="020B0609020204030204" pitchFamily="49" charset="0"/>
-              </a:rPr>
-              <a:t>spec</a:t>
-            </a:r>
-            <a:r>
-              <a:rPr lang="en-GB" sz="1800" dirty="0">
-                <a:solidFill>
-                  <a:srgbClr val="D4D4D4"/>
-                </a:solidFill>
-                <a:latin typeface="Consolas" panose="020B0609020204030204" pitchFamily="49" charset="0"/>
-              </a:rPr>
-              <a:t>:</a:t>
-            </a:r>
-          </a:p>
-          <a:p>
-            <a:pPr>
-              <a:lnSpc>
-                <a:spcPct val="100000"/>
-              </a:lnSpc>
-            </a:pPr>
-            <a:r>
-              <a:rPr lang="en-GB" sz="1800" dirty="0">
-                <a:solidFill>
-                  <a:srgbClr val="D4D4D4"/>
-                </a:solidFill>
-                <a:latin typeface="Consolas" panose="020B0609020204030204" pitchFamily="49" charset="0"/>
-              </a:rPr>
-              <a:t>      </a:t>
-            </a:r>
-            <a:r>
-              <a:rPr lang="en-GB" sz="1800" dirty="0">
-                <a:solidFill>
-                  <a:srgbClr val="569CD6"/>
-                </a:solidFill>
-                <a:latin typeface="Consolas" panose="020B0609020204030204" pitchFamily="49" charset="0"/>
-              </a:rPr>
-              <a:t>containers</a:t>
-            </a:r>
-            <a:r>
-              <a:rPr lang="en-GB" sz="1800" dirty="0">
-                <a:solidFill>
-                  <a:srgbClr val="D4D4D4"/>
-                </a:solidFill>
-                <a:latin typeface="Consolas" panose="020B0609020204030204" pitchFamily="49" charset="0"/>
-              </a:rPr>
-              <a:t>:</a:t>
-            </a:r>
-          </a:p>
-          <a:p>
-            <a:pPr>
-              <a:lnSpc>
-                <a:spcPct val="100000"/>
-              </a:lnSpc>
-            </a:pPr>
-            <a:r>
-              <a:rPr lang="en-GB" sz="1800" dirty="0">
-                <a:solidFill>
-                  <a:srgbClr val="D4D4D4"/>
-                </a:solidFill>
-                <a:latin typeface="Consolas" panose="020B0609020204030204" pitchFamily="49" charset="0"/>
-              </a:rPr>
-              <a:t>      - </a:t>
-            </a:r>
-            <a:r>
-              <a:rPr lang="en-GB" sz="1800" dirty="0">
-                <a:solidFill>
-                  <a:srgbClr val="569CD6"/>
-                </a:solidFill>
-                <a:latin typeface="Consolas" panose="020B0609020204030204" pitchFamily="49" charset="0"/>
-              </a:rPr>
-              <a:t>image</a:t>
-            </a:r>
-            <a:r>
-              <a:rPr lang="en-GB" sz="1800" dirty="0">
-                <a:solidFill>
-                  <a:srgbClr val="D4D4D4"/>
-                </a:solidFill>
-                <a:latin typeface="Consolas" panose="020B0609020204030204" pitchFamily="49" charset="0"/>
-              </a:rPr>
-              <a:t>: </a:t>
-            </a:r>
-            <a:r>
-              <a:rPr lang="en-GB" sz="1800" dirty="0" err="1">
-                <a:solidFill>
-                  <a:srgbClr val="CE9178"/>
-                </a:solidFill>
-                <a:latin typeface="Consolas" panose="020B0609020204030204" pitchFamily="49" charset="0"/>
-              </a:rPr>
-              <a:t>nginx</a:t>
-            </a:r>
-            <a:endParaRPr lang="en-GB" sz="1800" dirty="0">
-              <a:solidFill>
-                <a:srgbClr val="D4D4D4"/>
-              </a:solidFill>
-              <a:latin typeface="Consolas" panose="020B0609020204030204" pitchFamily="49" charset="0"/>
-            </a:endParaRPr>
-          </a:p>
-          <a:p>
-            <a:pPr>
-              <a:lnSpc>
-                <a:spcPct val="100000"/>
-              </a:lnSpc>
-            </a:pPr>
-            <a:r>
-              <a:rPr lang="en-GB" sz="1800" dirty="0">
-                <a:solidFill>
-                  <a:srgbClr val="D4D4D4"/>
-                </a:solidFill>
-                <a:latin typeface="Consolas" panose="020B0609020204030204" pitchFamily="49" charset="0"/>
-              </a:rPr>
-              <a:t>        </a:t>
-            </a:r>
-            <a:r>
-              <a:rPr lang="en-GB" sz="1800" dirty="0">
-                <a:solidFill>
-                  <a:srgbClr val="569CD6"/>
-                </a:solidFill>
-                <a:latin typeface="Consolas" panose="020B0609020204030204" pitchFamily="49" charset="0"/>
-              </a:rPr>
-              <a:t>name</a:t>
-            </a:r>
-            <a:r>
-              <a:rPr lang="en-GB" sz="1800" dirty="0">
-                <a:solidFill>
-                  <a:srgbClr val="D4D4D4"/>
-                </a:solidFill>
-                <a:latin typeface="Consolas" panose="020B0609020204030204" pitchFamily="49" charset="0"/>
-              </a:rPr>
-              <a:t>: </a:t>
-            </a:r>
-            <a:r>
-              <a:rPr lang="en-GB" sz="1800" dirty="0" err="1">
-                <a:solidFill>
-                  <a:srgbClr val="CE9178"/>
-                </a:solidFill>
-                <a:latin typeface="Consolas" panose="020B0609020204030204" pitchFamily="49" charset="0"/>
-              </a:rPr>
-              <a:t>nginx</a:t>
-            </a:r>
-            <a:r>
-              <a:rPr lang="en-GB" sz="1800" dirty="0">
-                <a:solidFill>
-                  <a:srgbClr val="CE9178"/>
-                </a:solidFill>
-                <a:latin typeface="Consolas" panose="020B0609020204030204" pitchFamily="49" charset="0"/>
-              </a:rPr>
-              <a:t>-container</a:t>
-            </a:r>
-            <a:endParaRPr lang="en-GB" sz="1800" b="0" dirty="0">
-              <a:solidFill>
-                <a:srgbClr val="D4D4D4"/>
-              </a:solidFill>
-              <a:effectLst/>
-              <a:latin typeface="Consolas" panose="020B0609020204030204" pitchFamily="49" charset="0"/>
-            </a:endParaRPr>
-          </a:p>
-        </p:txBody>
-      </p:sp>
-      <p:sp>
-        <p:nvSpPr>
-          <p:cNvPr id="13" name="Rectangle 12"/>
-          <p:cNvSpPr/>
-          <p:nvPr/>
-        </p:nvSpPr>
-        <p:spPr>
-          <a:xfrm>
-            <a:off x="949035" y="2036618"/>
-            <a:ext cx="3290319" cy="287207"/>
-          </a:xfrm>
-          <a:prstGeom prst="rect">
-            <a:avLst/>
-          </a:prstGeom>
-          <a:noFill/>
-          <a:ln w="19050">
-            <a:solidFill>
-              <a:schemeClr val="accent2"/>
-            </a:solidFill>
-            <a:prstDash val="sysDash"/>
-          </a:ln>
-        </p:spPr>
-        <p:style>
-          <a:lnRef idx="2">
-            <a:schemeClr val="accent1">
-              <a:shade val="50000"/>
-            </a:schemeClr>
-          </a:lnRef>
-          <a:fillRef idx="1">
-            <a:schemeClr val="accent1"/>
-          </a:fillRef>
-          <a:effectRef idx="0">
-            <a:schemeClr val="accent1"/>
-          </a:effectRef>
-          <a:fontRef idx="minor">
-            <a:schemeClr val="lt1"/>
-          </a:fontRef>
-        </p:style>
-        <p:txBody>
-          <a:bodyPr rtlCol="0" anchor="ctr"/>
-          <a:lstStyle/>
-          <a:p>
-            <a:pPr algn="ctr"/>
-            <a:endParaRPr lang="en-GB"/>
-          </a:p>
-        </p:txBody>
-      </p:sp>
-      <p:sp>
-        <p:nvSpPr>
-          <p:cNvPr id="3" name="Rectangular Callout 2"/>
-          <p:cNvSpPr/>
-          <p:nvPr/>
-        </p:nvSpPr>
-        <p:spPr>
-          <a:xfrm>
-            <a:off x="4639733" y="1930397"/>
-            <a:ext cx="3031067" cy="612648"/>
-          </a:xfrm>
-          <a:prstGeom prst="wedgeRectCallout">
-            <a:avLst>
-              <a:gd name="adj1" fmla="val -60777"/>
-              <a:gd name="adj2" fmla="val -21801"/>
-            </a:avLst>
-          </a:prstGeom>
-        </p:spPr>
-        <p:style>
-          <a:lnRef idx="2">
-            <a:schemeClr val="accent2">
-              <a:shade val="50000"/>
-            </a:schemeClr>
-          </a:lnRef>
-          <a:fillRef idx="1">
-            <a:schemeClr val="accent2"/>
-          </a:fillRef>
-          <a:effectRef idx="0">
-            <a:schemeClr val="accent2"/>
-          </a:effectRef>
-          <a:fontRef idx="minor">
-            <a:schemeClr val="lt1"/>
-          </a:fontRef>
-        </p:style>
-        <p:txBody>
-          <a:bodyPr rtlCol="0" anchor="ctr"/>
-          <a:lstStyle/>
-          <a:p>
-            <a:pPr algn="ctr"/>
-            <a:r>
-              <a:rPr lang="en-GB" dirty="0"/>
-              <a:t>This </a:t>
-            </a:r>
-            <a:r>
-              <a:rPr lang="en-GB" b="1" dirty="0"/>
-              <a:t>labels</a:t>
-            </a:r>
-            <a:r>
-              <a:rPr lang="en-GB" dirty="0"/>
-              <a:t> section applies to the Deployment object</a:t>
-            </a:r>
-          </a:p>
-        </p:txBody>
-      </p:sp>
-      <p:sp>
-        <p:nvSpPr>
-          <p:cNvPr id="11" name="Rectangle 10"/>
-          <p:cNvSpPr/>
-          <p:nvPr/>
-        </p:nvSpPr>
-        <p:spPr>
-          <a:xfrm>
-            <a:off x="1423169" y="4517356"/>
-            <a:ext cx="3047232" cy="287207"/>
-          </a:xfrm>
-          <a:prstGeom prst="rect">
-            <a:avLst/>
-          </a:prstGeom>
-          <a:noFill/>
-          <a:ln w="19050">
-            <a:solidFill>
-              <a:schemeClr val="accent2"/>
-            </a:solidFill>
-            <a:prstDash val="sysDash"/>
-          </a:ln>
-        </p:spPr>
-        <p:style>
-          <a:lnRef idx="2">
-            <a:schemeClr val="accent1">
-              <a:shade val="50000"/>
-            </a:schemeClr>
-          </a:lnRef>
-          <a:fillRef idx="1">
-            <a:schemeClr val="accent1"/>
-          </a:fillRef>
-          <a:effectRef idx="0">
-            <a:schemeClr val="accent1"/>
-          </a:effectRef>
-          <a:fontRef idx="minor">
-            <a:schemeClr val="lt1"/>
-          </a:fontRef>
-        </p:style>
-        <p:txBody>
-          <a:bodyPr rtlCol="0" anchor="ctr"/>
-          <a:lstStyle/>
-          <a:p>
-            <a:pPr algn="ctr"/>
-            <a:endParaRPr lang="en-GB"/>
-          </a:p>
-        </p:txBody>
-      </p:sp>
-      <p:sp>
-        <p:nvSpPr>
-          <p:cNvPr id="14" name="Rectangular Callout 13"/>
-          <p:cNvSpPr/>
-          <p:nvPr/>
-        </p:nvSpPr>
-        <p:spPr>
-          <a:xfrm>
-            <a:off x="4834468" y="4491889"/>
-            <a:ext cx="4512732" cy="612648"/>
-          </a:xfrm>
-          <a:prstGeom prst="wedgeRectCallout">
-            <a:avLst>
-              <a:gd name="adj1" fmla="val -56556"/>
-              <a:gd name="adj2" fmla="val -20764"/>
-            </a:avLst>
-          </a:prstGeom>
-        </p:spPr>
-        <p:style>
-          <a:lnRef idx="2">
-            <a:schemeClr val="accent2">
-              <a:shade val="50000"/>
-            </a:schemeClr>
-          </a:lnRef>
-          <a:fillRef idx="1">
-            <a:schemeClr val="accent2"/>
-          </a:fillRef>
-          <a:effectRef idx="0">
-            <a:schemeClr val="accent2"/>
-          </a:effectRef>
-          <a:fontRef idx="minor">
-            <a:schemeClr val="lt1"/>
-          </a:fontRef>
-        </p:style>
-        <p:txBody>
-          <a:bodyPr rtlCol="0" anchor="ctr"/>
-          <a:lstStyle/>
-          <a:p>
-            <a:pPr algn="ctr"/>
-            <a:r>
-              <a:rPr lang="en-GB" dirty="0"/>
-              <a:t>This </a:t>
-            </a:r>
-            <a:r>
-              <a:rPr lang="en-GB" b="1" dirty="0"/>
-              <a:t>labels</a:t>
-            </a:r>
-            <a:r>
-              <a:rPr lang="en-GB" dirty="0"/>
-              <a:t> section applies to the Pod object that is managed from the Deployment</a:t>
-            </a:r>
-          </a:p>
-        </p:txBody>
-      </p:sp>
-    </p:spTree>
-    <p:extLst>
-      <p:ext uri="{BB962C8B-B14F-4D97-AF65-F5344CB8AC3E}">
-        <p14:creationId xmlns:p14="http://schemas.microsoft.com/office/powerpoint/2010/main" val="2243219143"/>
+        <p14:creationId xmlns:p14="http://schemas.microsoft.com/office/powerpoint/2010/main" val="599557762"/>
       </p:ext>
     </p:extLst>
   </p:cSld>
@@ -11814,6 +11182,1054 @@
         </p:nvSpPr>
         <p:spPr>
           <a:xfrm>
+            <a:off x="949035" y="2036618"/>
+            <a:ext cx="3290319" cy="287207"/>
+          </a:xfrm>
+          <a:prstGeom prst="rect">
+            <a:avLst/>
+          </a:prstGeom>
+          <a:noFill/>
+          <a:ln w="19050">
+            <a:solidFill>
+              <a:schemeClr val="accent2"/>
+            </a:solidFill>
+            <a:prstDash val="sysDash"/>
+          </a:ln>
+        </p:spPr>
+        <p:style>
+          <a:lnRef idx="2">
+            <a:schemeClr val="accent1">
+              <a:shade val="50000"/>
+            </a:schemeClr>
+          </a:lnRef>
+          <a:fillRef idx="1">
+            <a:schemeClr val="accent1"/>
+          </a:fillRef>
+          <a:effectRef idx="0">
+            <a:schemeClr val="accent1"/>
+          </a:effectRef>
+          <a:fontRef idx="minor">
+            <a:schemeClr val="lt1"/>
+          </a:fontRef>
+        </p:style>
+        <p:txBody>
+          <a:bodyPr rtlCol="0" anchor="ctr"/>
+          <a:lstStyle/>
+          <a:p>
+            <a:pPr algn="ctr"/>
+            <a:endParaRPr lang="en-GB"/>
+          </a:p>
+        </p:txBody>
+      </p:sp>
+      <p:sp>
+        <p:nvSpPr>
+          <p:cNvPr id="3" name="Rectangular Callout 2"/>
+          <p:cNvSpPr/>
+          <p:nvPr/>
+        </p:nvSpPr>
+        <p:spPr>
+          <a:xfrm>
+            <a:off x="4639733" y="1930397"/>
+            <a:ext cx="3031067" cy="612648"/>
+          </a:xfrm>
+          <a:prstGeom prst="wedgeRectCallout">
+            <a:avLst>
+              <a:gd name="adj1" fmla="val -60777"/>
+              <a:gd name="adj2" fmla="val -21801"/>
+            </a:avLst>
+          </a:prstGeom>
+        </p:spPr>
+        <p:style>
+          <a:lnRef idx="2">
+            <a:schemeClr val="accent2">
+              <a:shade val="50000"/>
+            </a:schemeClr>
+          </a:lnRef>
+          <a:fillRef idx="1">
+            <a:schemeClr val="accent2"/>
+          </a:fillRef>
+          <a:effectRef idx="0">
+            <a:schemeClr val="accent2"/>
+          </a:effectRef>
+          <a:fontRef idx="minor">
+            <a:schemeClr val="lt1"/>
+          </a:fontRef>
+        </p:style>
+        <p:txBody>
+          <a:bodyPr rtlCol="0" anchor="ctr"/>
+          <a:lstStyle/>
+          <a:p>
+            <a:pPr algn="ctr"/>
+            <a:r>
+              <a:rPr lang="en-GB" dirty="0"/>
+              <a:t>This </a:t>
+            </a:r>
+            <a:r>
+              <a:rPr lang="en-GB" b="1" dirty="0"/>
+              <a:t>labels</a:t>
+            </a:r>
+            <a:r>
+              <a:rPr lang="en-GB" dirty="0"/>
+              <a:t> section applies to the Deployment object</a:t>
+            </a:r>
+          </a:p>
+        </p:txBody>
+      </p:sp>
+      <p:sp>
+        <p:nvSpPr>
+          <p:cNvPr id="11" name="Rectangle 10"/>
+          <p:cNvSpPr/>
+          <p:nvPr/>
+        </p:nvSpPr>
+        <p:spPr>
+          <a:xfrm>
+            <a:off x="1423169" y="4517356"/>
+            <a:ext cx="3047232" cy="287207"/>
+          </a:xfrm>
+          <a:prstGeom prst="rect">
+            <a:avLst/>
+          </a:prstGeom>
+          <a:noFill/>
+          <a:ln w="19050">
+            <a:solidFill>
+              <a:schemeClr val="accent2"/>
+            </a:solidFill>
+            <a:prstDash val="sysDash"/>
+          </a:ln>
+        </p:spPr>
+        <p:style>
+          <a:lnRef idx="2">
+            <a:schemeClr val="accent1">
+              <a:shade val="50000"/>
+            </a:schemeClr>
+          </a:lnRef>
+          <a:fillRef idx="1">
+            <a:schemeClr val="accent1"/>
+          </a:fillRef>
+          <a:effectRef idx="0">
+            <a:schemeClr val="accent1"/>
+          </a:effectRef>
+          <a:fontRef idx="minor">
+            <a:schemeClr val="lt1"/>
+          </a:fontRef>
+        </p:style>
+        <p:txBody>
+          <a:bodyPr rtlCol="0" anchor="ctr"/>
+          <a:lstStyle/>
+          <a:p>
+            <a:pPr algn="ctr"/>
+            <a:endParaRPr lang="en-GB"/>
+          </a:p>
+        </p:txBody>
+      </p:sp>
+      <p:sp>
+        <p:nvSpPr>
+          <p:cNvPr id="14" name="Rectangular Callout 13"/>
+          <p:cNvSpPr/>
+          <p:nvPr/>
+        </p:nvSpPr>
+        <p:spPr>
+          <a:xfrm>
+            <a:off x="4834468" y="4491889"/>
+            <a:ext cx="4512732" cy="612648"/>
+          </a:xfrm>
+          <a:prstGeom prst="wedgeRectCallout">
+            <a:avLst>
+              <a:gd name="adj1" fmla="val -56556"/>
+              <a:gd name="adj2" fmla="val -20764"/>
+            </a:avLst>
+          </a:prstGeom>
+        </p:spPr>
+        <p:style>
+          <a:lnRef idx="2">
+            <a:schemeClr val="accent2">
+              <a:shade val="50000"/>
+            </a:schemeClr>
+          </a:lnRef>
+          <a:fillRef idx="1">
+            <a:schemeClr val="accent2"/>
+          </a:fillRef>
+          <a:effectRef idx="0">
+            <a:schemeClr val="accent2"/>
+          </a:effectRef>
+          <a:fontRef idx="minor">
+            <a:schemeClr val="lt1"/>
+          </a:fontRef>
+        </p:style>
+        <p:txBody>
+          <a:bodyPr rtlCol="0" anchor="ctr"/>
+          <a:lstStyle/>
+          <a:p>
+            <a:pPr algn="ctr"/>
+            <a:r>
+              <a:rPr lang="en-GB" dirty="0"/>
+              <a:t>This </a:t>
+            </a:r>
+            <a:r>
+              <a:rPr lang="en-GB" b="1" dirty="0"/>
+              <a:t>labels</a:t>
+            </a:r>
+            <a:r>
+              <a:rPr lang="en-GB" dirty="0"/>
+              <a:t> section applies to the Pod object that is managed from the Deployment</a:t>
+            </a:r>
+          </a:p>
+        </p:txBody>
+      </p:sp>
+    </p:spTree>
+    <p:extLst>
+      <p:ext uri="{BB962C8B-B14F-4D97-AF65-F5344CB8AC3E}">
+        <p14:creationId xmlns:p14="http://schemas.microsoft.com/office/powerpoint/2010/main" val="2243219143"/>
+      </p:ext>
+    </p:extLst>
+  </p:cSld>
+  <p:clrMapOvr>
+    <a:masterClrMapping/>
+  </p:clrMapOvr>
+  <p:timing>
+    <p:tnLst>
+      <p:par>
+        <p:cTn id="1" dur="indefinite" restart="never" nodeType="tmRoot"/>
+      </p:par>
+    </p:tnLst>
+  </p:timing>
+</p:sld>
+</file>
+
+<file path=ppt/slides/slide19.xml><?xml version="1.0" encoding="utf-8"?>
+<p:sld xmlns:a="http://schemas.openxmlformats.org/drawingml/2006/main" xmlns:r="http://schemas.openxmlformats.org/officeDocument/2006/relationships" xmlns:p="http://schemas.openxmlformats.org/presentationml/2006/main">
+  <p:cSld>
+    <p:spTree>
+      <p:nvGrpSpPr>
+        <p:cNvPr id="1" name=""/>
+        <p:cNvGrpSpPr/>
+        <p:nvPr/>
+      </p:nvGrpSpPr>
+      <p:grpSpPr>
+        <a:xfrm>
+          <a:off x="0" y="0"/>
+          <a:ext cx="0" cy="0"/>
+          <a:chOff x="0" y="0"/>
+          <a:chExt cx="0" cy="0"/>
+        </a:xfrm>
+      </p:grpSpPr>
+      <p:sp>
+        <p:nvSpPr>
+          <p:cNvPr id="4" name="Title 1"/>
+          <p:cNvSpPr txBox="1">
+            <a:spLocks/>
+          </p:cNvSpPr>
+          <p:nvPr/>
+        </p:nvSpPr>
+        <p:spPr>
+          <a:xfrm>
+            <a:off x="538959" y="748305"/>
+            <a:ext cx="10919615" cy="5909670"/>
+          </a:xfrm>
+          <a:prstGeom prst="rect">
+            <a:avLst/>
+          </a:prstGeom>
+          <a:solidFill>
+            <a:schemeClr val="tx1"/>
+          </a:solidFill>
+        </p:spPr>
+        <p:txBody>
+          <a:bodyPr vert="horz" lIns="180000" tIns="180000" rIns="91440" bIns="45720" rtlCol="0" anchor="t">
+            <a:noAutofit/>
+          </a:bodyPr>
+          <a:lstStyle>
+            <a:lvl1pPr algn="l" defTabSz="914400" rtl="0" eaLnBrk="1" latinLnBrk="0" hangingPunct="1">
+              <a:lnSpc>
+                <a:spcPct val="90000"/>
+              </a:lnSpc>
+              <a:spcBef>
+                <a:spcPct val="0"/>
+              </a:spcBef>
+              <a:buNone/>
+              <a:defRPr sz="4400" kern="1200">
+                <a:solidFill>
+                  <a:schemeClr val="tx1"/>
+                </a:solidFill>
+                <a:latin typeface="+mj-lt"/>
+                <a:ea typeface="+mj-ea"/>
+                <a:cs typeface="+mj-cs"/>
+              </a:defRPr>
+            </a:lvl1pPr>
+          </a:lstStyle>
+          <a:p>
+            <a:pPr>
+              <a:lnSpc>
+                <a:spcPct val="100000"/>
+              </a:lnSpc>
+            </a:pPr>
+            <a:r>
+              <a:rPr lang="en-GB" sz="1800" dirty="0" err="1">
+                <a:solidFill>
+                  <a:srgbClr val="569CD6"/>
+                </a:solidFill>
+                <a:latin typeface="Consolas" panose="020B0609020204030204" pitchFamily="49" charset="0"/>
+              </a:rPr>
+              <a:t>apiVersion</a:t>
+            </a:r>
+            <a:r>
+              <a:rPr lang="en-GB" sz="1800" dirty="0">
+                <a:solidFill>
+                  <a:srgbClr val="D4D4D4"/>
+                </a:solidFill>
+                <a:latin typeface="Consolas" panose="020B0609020204030204" pitchFamily="49" charset="0"/>
+              </a:rPr>
+              <a:t>: </a:t>
+            </a:r>
+            <a:r>
+              <a:rPr lang="en-GB" sz="1800" dirty="0">
+                <a:solidFill>
+                  <a:srgbClr val="CE9178"/>
+                </a:solidFill>
+                <a:latin typeface="Consolas" panose="020B0609020204030204" pitchFamily="49" charset="0"/>
+              </a:rPr>
+              <a:t>apps/v1</a:t>
+            </a:r>
+            <a:endParaRPr lang="en-GB" sz="1800" dirty="0">
+              <a:solidFill>
+                <a:srgbClr val="D4D4D4"/>
+              </a:solidFill>
+              <a:latin typeface="Consolas" panose="020B0609020204030204" pitchFamily="49" charset="0"/>
+            </a:endParaRPr>
+          </a:p>
+          <a:p>
+            <a:pPr>
+              <a:lnSpc>
+                <a:spcPct val="100000"/>
+              </a:lnSpc>
+            </a:pPr>
+            <a:r>
+              <a:rPr lang="en-GB" sz="1800" dirty="0">
+                <a:solidFill>
+                  <a:srgbClr val="569CD6"/>
+                </a:solidFill>
+                <a:latin typeface="Consolas" panose="020B0609020204030204" pitchFamily="49" charset="0"/>
+              </a:rPr>
+              <a:t>kind</a:t>
+            </a:r>
+            <a:r>
+              <a:rPr lang="en-GB" sz="1800" dirty="0">
+                <a:solidFill>
+                  <a:srgbClr val="D4D4D4"/>
+                </a:solidFill>
+                <a:latin typeface="Consolas" panose="020B0609020204030204" pitchFamily="49" charset="0"/>
+              </a:rPr>
+              <a:t>: </a:t>
+            </a:r>
+            <a:r>
+              <a:rPr lang="en-GB" sz="1800" dirty="0">
+                <a:solidFill>
+                  <a:srgbClr val="CE9178"/>
+                </a:solidFill>
+                <a:latin typeface="Consolas" panose="020B0609020204030204" pitchFamily="49" charset="0"/>
+              </a:rPr>
+              <a:t>Deployment</a:t>
+            </a:r>
+            <a:endParaRPr lang="en-GB" sz="1800" dirty="0">
+              <a:solidFill>
+                <a:srgbClr val="D4D4D4"/>
+              </a:solidFill>
+              <a:latin typeface="Consolas" panose="020B0609020204030204" pitchFamily="49" charset="0"/>
+            </a:endParaRPr>
+          </a:p>
+          <a:p>
+            <a:pPr>
+              <a:lnSpc>
+                <a:spcPct val="100000"/>
+              </a:lnSpc>
+            </a:pPr>
+            <a:r>
+              <a:rPr lang="en-GB" sz="1800" dirty="0">
+                <a:solidFill>
+                  <a:srgbClr val="569CD6"/>
+                </a:solidFill>
+                <a:latin typeface="Consolas" panose="020B0609020204030204" pitchFamily="49" charset="0"/>
+              </a:rPr>
+              <a:t>metadata</a:t>
+            </a:r>
+            <a:r>
+              <a:rPr lang="en-GB" sz="1800" dirty="0">
+                <a:solidFill>
+                  <a:srgbClr val="D4D4D4"/>
+                </a:solidFill>
+                <a:latin typeface="Consolas" panose="020B0609020204030204" pitchFamily="49" charset="0"/>
+              </a:rPr>
+              <a:t>:</a:t>
+            </a:r>
+          </a:p>
+          <a:p>
+            <a:pPr>
+              <a:lnSpc>
+                <a:spcPct val="100000"/>
+              </a:lnSpc>
+            </a:pPr>
+            <a:r>
+              <a:rPr lang="en-GB" sz="1800" dirty="0">
+                <a:solidFill>
+                  <a:srgbClr val="D4D4D4"/>
+                </a:solidFill>
+                <a:latin typeface="Consolas" panose="020B0609020204030204" pitchFamily="49" charset="0"/>
+              </a:rPr>
+              <a:t>  </a:t>
+            </a:r>
+            <a:r>
+              <a:rPr lang="en-GB" sz="1800" dirty="0">
+                <a:solidFill>
+                  <a:srgbClr val="569CD6"/>
+                </a:solidFill>
+                <a:latin typeface="Consolas" panose="020B0609020204030204" pitchFamily="49" charset="0"/>
+              </a:rPr>
+              <a:t>name</a:t>
+            </a:r>
+            <a:r>
+              <a:rPr lang="en-GB" sz="1800" dirty="0">
+                <a:solidFill>
+                  <a:srgbClr val="D4D4D4"/>
+                </a:solidFill>
+                <a:latin typeface="Consolas" panose="020B0609020204030204" pitchFamily="49" charset="0"/>
+              </a:rPr>
+              <a:t>: </a:t>
+            </a:r>
+            <a:r>
+              <a:rPr lang="en-GB" sz="1800" dirty="0" err="1">
+                <a:solidFill>
+                  <a:srgbClr val="CE9178"/>
+                </a:solidFill>
+                <a:latin typeface="Consolas" panose="020B0609020204030204" pitchFamily="49" charset="0"/>
+              </a:rPr>
+              <a:t>nginx</a:t>
+            </a:r>
+            <a:r>
+              <a:rPr lang="en-GB" sz="1800" dirty="0">
+                <a:solidFill>
+                  <a:srgbClr val="CE9178"/>
+                </a:solidFill>
+                <a:latin typeface="Consolas" panose="020B0609020204030204" pitchFamily="49" charset="0"/>
+              </a:rPr>
+              <a:t>-deploy</a:t>
+            </a:r>
+            <a:endParaRPr lang="en-GB" sz="1800" dirty="0">
+              <a:solidFill>
+                <a:srgbClr val="D4D4D4"/>
+              </a:solidFill>
+              <a:latin typeface="Consolas" panose="020B0609020204030204" pitchFamily="49" charset="0"/>
+            </a:endParaRPr>
+          </a:p>
+          <a:p>
+            <a:pPr>
+              <a:lnSpc>
+                <a:spcPct val="100000"/>
+              </a:lnSpc>
+            </a:pPr>
+            <a:r>
+              <a:rPr lang="en-GB" sz="1800" dirty="0">
+                <a:solidFill>
+                  <a:srgbClr val="D4D4D4"/>
+                </a:solidFill>
+                <a:latin typeface="Consolas" panose="020B0609020204030204" pitchFamily="49" charset="0"/>
+              </a:rPr>
+              <a:t>  </a:t>
+            </a:r>
+            <a:r>
+              <a:rPr lang="en-GB" sz="1800" dirty="0">
+                <a:solidFill>
+                  <a:srgbClr val="569CD6"/>
+                </a:solidFill>
+                <a:latin typeface="Consolas" panose="020B0609020204030204" pitchFamily="49" charset="0"/>
+              </a:rPr>
+              <a:t>labels</a:t>
+            </a:r>
+            <a:r>
+              <a:rPr lang="en-GB" sz="1800" dirty="0">
+                <a:solidFill>
+                  <a:srgbClr val="D4D4D4"/>
+                </a:solidFill>
+                <a:latin typeface="Consolas" panose="020B0609020204030204" pitchFamily="49" charset="0"/>
+              </a:rPr>
+              <a:t>:</a:t>
+            </a:r>
+          </a:p>
+          <a:p>
+            <a:pPr>
+              <a:lnSpc>
+                <a:spcPct val="100000"/>
+              </a:lnSpc>
+            </a:pPr>
+            <a:r>
+              <a:rPr lang="en-GB" sz="1800" dirty="0">
+                <a:solidFill>
+                  <a:srgbClr val="D4D4D4"/>
+                </a:solidFill>
+                <a:latin typeface="Consolas" panose="020B0609020204030204" pitchFamily="49" charset="0"/>
+              </a:rPr>
+              <a:t>    </a:t>
+            </a:r>
+            <a:r>
+              <a:rPr lang="en-GB" sz="1800" dirty="0" err="1">
+                <a:solidFill>
+                  <a:srgbClr val="569CD6"/>
+                </a:solidFill>
+                <a:latin typeface="Consolas" panose="020B0609020204030204" pitchFamily="49" charset="0"/>
+              </a:rPr>
+              <a:t>env</a:t>
+            </a:r>
+            <a:r>
+              <a:rPr lang="en-GB" sz="1800" dirty="0">
+                <a:solidFill>
+                  <a:srgbClr val="D4D4D4"/>
+                </a:solidFill>
+                <a:latin typeface="Consolas" panose="020B0609020204030204" pitchFamily="49" charset="0"/>
+              </a:rPr>
+              <a:t>: </a:t>
+            </a:r>
+            <a:r>
+              <a:rPr lang="en-GB" sz="1800" dirty="0">
+                <a:solidFill>
+                  <a:srgbClr val="CE9178"/>
+                </a:solidFill>
+                <a:latin typeface="Consolas" panose="020B0609020204030204" pitchFamily="49" charset="0"/>
+              </a:rPr>
+              <a:t>dev</a:t>
+            </a:r>
+            <a:endParaRPr lang="en-GB" sz="1800" dirty="0">
+              <a:solidFill>
+                <a:srgbClr val="D4D4D4"/>
+              </a:solidFill>
+              <a:latin typeface="Consolas" panose="020B0609020204030204" pitchFamily="49" charset="0"/>
+            </a:endParaRPr>
+          </a:p>
+          <a:p>
+            <a:pPr>
+              <a:lnSpc>
+                <a:spcPct val="100000"/>
+              </a:lnSpc>
+            </a:pPr>
+            <a:r>
+              <a:rPr lang="en-GB" sz="1800" dirty="0">
+                <a:solidFill>
+                  <a:srgbClr val="569CD6"/>
+                </a:solidFill>
+                <a:latin typeface="Consolas" panose="020B0609020204030204" pitchFamily="49" charset="0"/>
+              </a:rPr>
+              <a:t>spec</a:t>
+            </a:r>
+            <a:r>
+              <a:rPr lang="en-GB" sz="1800" dirty="0">
+                <a:solidFill>
+                  <a:srgbClr val="D4D4D4"/>
+                </a:solidFill>
+                <a:latin typeface="Consolas" panose="020B0609020204030204" pitchFamily="49" charset="0"/>
+              </a:rPr>
+              <a:t>:</a:t>
+            </a:r>
+          </a:p>
+          <a:p>
+            <a:pPr>
+              <a:lnSpc>
+                <a:spcPct val="100000"/>
+              </a:lnSpc>
+            </a:pPr>
+            <a:r>
+              <a:rPr lang="en-GB" sz="1800" dirty="0">
+                <a:solidFill>
+                  <a:srgbClr val="D4D4D4"/>
+                </a:solidFill>
+                <a:latin typeface="Consolas" panose="020B0609020204030204" pitchFamily="49" charset="0"/>
+              </a:rPr>
+              <a:t>  </a:t>
+            </a:r>
+            <a:r>
+              <a:rPr lang="en-GB" sz="1800" dirty="0">
+                <a:solidFill>
+                  <a:srgbClr val="569CD6"/>
+                </a:solidFill>
+                <a:latin typeface="Consolas" panose="020B0609020204030204" pitchFamily="49" charset="0"/>
+              </a:rPr>
+              <a:t>replicas</a:t>
+            </a:r>
+            <a:r>
+              <a:rPr lang="en-GB" sz="1800" dirty="0">
+                <a:solidFill>
+                  <a:srgbClr val="D4D4D4"/>
+                </a:solidFill>
+                <a:latin typeface="Consolas" panose="020B0609020204030204" pitchFamily="49" charset="0"/>
+              </a:rPr>
+              <a:t>: </a:t>
+            </a:r>
+            <a:r>
+              <a:rPr lang="en-GB" sz="1800" dirty="0">
+                <a:solidFill>
+                  <a:srgbClr val="B5CEA8"/>
+                </a:solidFill>
+                <a:latin typeface="Consolas" panose="020B0609020204030204" pitchFamily="49" charset="0"/>
+              </a:rPr>
+              <a:t>1</a:t>
+            </a:r>
+            <a:endParaRPr lang="en-GB" sz="1800" dirty="0">
+              <a:solidFill>
+                <a:srgbClr val="D4D4D4"/>
+              </a:solidFill>
+              <a:latin typeface="Consolas" panose="020B0609020204030204" pitchFamily="49" charset="0"/>
+            </a:endParaRPr>
+          </a:p>
+          <a:p>
+            <a:pPr>
+              <a:lnSpc>
+                <a:spcPct val="100000"/>
+              </a:lnSpc>
+            </a:pPr>
+            <a:r>
+              <a:rPr lang="en-GB" sz="1800" dirty="0">
+                <a:solidFill>
+                  <a:srgbClr val="D4D4D4"/>
+                </a:solidFill>
+                <a:latin typeface="Consolas" panose="020B0609020204030204" pitchFamily="49" charset="0"/>
+              </a:rPr>
+              <a:t>  </a:t>
+            </a:r>
+            <a:r>
+              <a:rPr lang="en-GB" sz="1800" dirty="0">
+                <a:solidFill>
+                  <a:srgbClr val="569CD6"/>
+                </a:solidFill>
+                <a:latin typeface="Consolas" panose="020B0609020204030204" pitchFamily="49" charset="0"/>
+              </a:rPr>
+              <a:t>selector</a:t>
+            </a:r>
+            <a:r>
+              <a:rPr lang="en-GB" sz="1800" dirty="0">
+                <a:solidFill>
+                  <a:srgbClr val="D4D4D4"/>
+                </a:solidFill>
+                <a:latin typeface="Consolas" panose="020B0609020204030204" pitchFamily="49" charset="0"/>
+              </a:rPr>
+              <a:t>:</a:t>
+            </a:r>
+          </a:p>
+          <a:p>
+            <a:pPr>
+              <a:lnSpc>
+                <a:spcPct val="100000"/>
+              </a:lnSpc>
+            </a:pPr>
+            <a:r>
+              <a:rPr lang="en-GB" sz="1800" dirty="0">
+                <a:solidFill>
+                  <a:srgbClr val="D4D4D4"/>
+                </a:solidFill>
+                <a:latin typeface="Consolas" panose="020B0609020204030204" pitchFamily="49" charset="0"/>
+              </a:rPr>
+              <a:t>    </a:t>
+            </a:r>
+            <a:r>
+              <a:rPr lang="en-GB" sz="1800" dirty="0" err="1">
+                <a:solidFill>
+                  <a:srgbClr val="569CD6"/>
+                </a:solidFill>
+                <a:latin typeface="Consolas" panose="020B0609020204030204" pitchFamily="49" charset="0"/>
+              </a:rPr>
+              <a:t>matchLabels</a:t>
+            </a:r>
+            <a:r>
+              <a:rPr lang="en-GB" sz="1800" dirty="0">
+                <a:solidFill>
+                  <a:srgbClr val="D4D4D4"/>
+                </a:solidFill>
+                <a:latin typeface="Consolas" panose="020B0609020204030204" pitchFamily="49" charset="0"/>
+              </a:rPr>
+              <a:t>:</a:t>
+            </a:r>
+          </a:p>
+          <a:p>
+            <a:pPr>
+              <a:lnSpc>
+                <a:spcPct val="100000"/>
+              </a:lnSpc>
+            </a:pPr>
+            <a:r>
+              <a:rPr lang="en-GB" sz="1800" dirty="0">
+                <a:solidFill>
+                  <a:srgbClr val="D4D4D4"/>
+                </a:solidFill>
+                <a:latin typeface="Consolas" panose="020B0609020204030204" pitchFamily="49" charset="0"/>
+              </a:rPr>
+              <a:t>      </a:t>
+            </a:r>
+            <a:r>
+              <a:rPr lang="en-GB" sz="1800" dirty="0">
+                <a:solidFill>
+                  <a:srgbClr val="569CD6"/>
+                </a:solidFill>
+                <a:latin typeface="Consolas" panose="020B0609020204030204" pitchFamily="49" charset="0"/>
+              </a:rPr>
+              <a:t>app</a:t>
+            </a:r>
+            <a:r>
+              <a:rPr lang="en-GB" sz="1800" dirty="0">
+                <a:solidFill>
+                  <a:srgbClr val="D4D4D4"/>
+                </a:solidFill>
+                <a:latin typeface="Consolas" panose="020B0609020204030204" pitchFamily="49" charset="0"/>
+              </a:rPr>
+              <a:t>: </a:t>
+            </a:r>
+            <a:r>
+              <a:rPr lang="en-GB" sz="1800" dirty="0">
+                <a:solidFill>
+                  <a:srgbClr val="CE9178"/>
+                </a:solidFill>
+                <a:latin typeface="Consolas" panose="020B0609020204030204" pitchFamily="49" charset="0"/>
+              </a:rPr>
+              <a:t>my-app</a:t>
+            </a:r>
+            <a:endParaRPr lang="en-GB" sz="1800" dirty="0">
+              <a:solidFill>
+                <a:srgbClr val="D4D4D4"/>
+              </a:solidFill>
+              <a:latin typeface="Consolas" panose="020B0609020204030204" pitchFamily="49" charset="0"/>
+            </a:endParaRPr>
+          </a:p>
+          <a:p>
+            <a:pPr>
+              <a:lnSpc>
+                <a:spcPct val="100000"/>
+              </a:lnSpc>
+            </a:pPr>
+            <a:r>
+              <a:rPr lang="en-GB" sz="1800" dirty="0">
+                <a:solidFill>
+                  <a:srgbClr val="D4D4D4"/>
+                </a:solidFill>
+                <a:latin typeface="Consolas" panose="020B0609020204030204" pitchFamily="49" charset="0"/>
+              </a:rPr>
+              <a:t>  </a:t>
+            </a:r>
+            <a:r>
+              <a:rPr lang="en-GB" sz="1800" dirty="0">
+                <a:solidFill>
+                  <a:srgbClr val="569CD6"/>
+                </a:solidFill>
+                <a:latin typeface="Consolas" panose="020B0609020204030204" pitchFamily="49" charset="0"/>
+              </a:rPr>
+              <a:t>template</a:t>
+            </a:r>
+            <a:r>
+              <a:rPr lang="en-GB" sz="1800" dirty="0">
+                <a:solidFill>
+                  <a:srgbClr val="D4D4D4"/>
+                </a:solidFill>
+                <a:latin typeface="Consolas" panose="020B0609020204030204" pitchFamily="49" charset="0"/>
+              </a:rPr>
+              <a:t>:</a:t>
+            </a:r>
+          </a:p>
+          <a:p>
+            <a:pPr>
+              <a:lnSpc>
+                <a:spcPct val="100000"/>
+              </a:lnSpc>
+            </a:pPr>
+            <a:r>
+              <a:rPr lang="en-GB" sz="1800" dirty="0">
+                <a:solidFill>
+                  <a:srgbClr val="D4D4D4"/>
+                </a:solidFill>
+                <a:latin typeface="Consolas" panose="020B0609020204030204" pitchFamily="49" charset="0"/>
+              </a:rPr>
+              <a:t>    </a:t>
+            </a:r>
+            <a:r>
+              <a:rPr lang="en-GB" sz="1800" dirty="0">
+                <a:solidFill>
+                  <a:srgbClr val="569CD6"/>
+                </a:solidFill>
+                <a:latin typeface="Consolas" panose="020B0609020204030204" pitchFamily="49" charset="0"/>
+              </a:rPr>
+              <a:t>metadata</a:t>
+            </a:r>
+            <a:r>
+              <a:rPr lang="en-GB" sz="1800" dirty="0">
+                <a:solidFill>
+                  <a:srgbClr val="D4D4D4"/>
+                </a:solidFill>
+                <a:latin typeface="Consolas" panose="020B0609020204030204" pitchFamily="49" charset="0"/>
+              </a:rPr>
+              <a:t>:</a:t>
+            </a:r>
+          </a:p>
+          <a:p>
+            <a:pPr>
+              <a:lnSpc>
+                <a:spcPct val="100000"/>
+              </a:lnSpc>
+            </a:pPr>
+            <a:r>
+              <a:rPr lang="en-GB" sz="1800" dirty="0">
+                <a:solidFill>
+                  <a:srgbClr val="D4D4D4"/>
+                </a:solidFill>
+                <a:latin typeface="Consolas" panose="020B0609020204030204" pitchFamily="49" charset="0"/>
+              </a:rPr>
+              <a:t>      </a:t>
+            </a:r>
+            <a:r>
+              <a:rPr lang="en-GB" sz="1800" dirty="0">
+                <a:solidFill>
+                  <a:srgbClr val="569CD6"/>
+                </a:solidFill>
+                <a:latin typeface="Consolas" panose="020B0609020204030204" pitchFamily="49" charset="0"/>
+              </a:rPr>
+              <a:t>labels</a:t>
+            </a:r>
+            <a:r>
+              <a:rPr lang="en-GB" sz="1800" dirty="0">
+                <a:solidFill>
+                  <a:srgbClr val="D4D4D4"/>
+                </a:solidFill>
+                <a:latin typeface="Consolas" panose="020B0609020204030204" pitchFamily="49" charset="0"/>
+              </a:rPr>
+              <a:t>:</a:t>
+            </a:r>
+          </a:p>
+          <a:p>
+            <a:pPr>
+              <a:lnSpc>
+                <a:spcPct val="100000"/>
+              </a:lnSpc>
+            </a:pPr>
+            <a:r>
+              <a:rPr lang="en-GB" sz="1800" dirty="0">
+                <a:solidFill>
+                  <a:srgbClr val="D4D4D4"/>
+                </a:solidFill>
+                <a:latin typeface="Consolas" panose="020B0609020204030204" pitchFamily="49" charset="0"/>
+              </a:rPr>
+              <a:t>        </a:t>
+            </a:r>
+            <a:r>
+              <a:rPr lang="en-GB" sz="1800" dirty="0">
+                <a:solidFill>
+                  <a:srgbClr val="569CD6"/>
+                </a:solidFill>
+                <a:latin typeface="Consolas" panose="020B0609020204030204" pitchFamily="49" charset="0"/>
+              </a:rPr>
+              <a:t>app</a:t>
+            </a:r>
+            <a:r>
+              <a:rPr lang="en-GB" sz="1800" dirty="0">
+                <a:solidFill>
+                  <a:srgbClr val="D4D4D4"/>
+                </a:solidFill>
+                <a:latin typeface="Consolas" panose="020B0609020204030204" pitchFamily="49" charset="0"/>
+              </a:rPr>
+              <a:t>: </a:t>
+            </a:r>
+            <a:r>
+              <a:rPr lang="en-GB" sz="1800" dirty="0">
+                <a:solidFill>
+                  <a:srgbClr val="CE9178"/>
+                </a:solidFill>
+                <a:latin typeface="Consolas" panose="020B0609020204030204" pitchFamily="49" charset="0"/>
+              </a:rPr>
+              <a:t>my-app</a:t>
+            </a:r>
+            <a:endParaRPr lang="en-GB" sz="1800" dirty="0">
+              <a:solidFill>
+                <a:srgbClr val="D4D4D4"/>
+              </a:solidFill>
+              <a:latin typeface="Consolas" panose="020B0609020204030204" pitchFamily="49" charset="0"/>
+            </a:endParaRPr>
+          </a:p>
+          <a:p>
+            <a:pPr>
+              <a:lnSpc>
+                <a:spcPct val="100000"/>
+              </a:lnSpc>
+            </a:pPr>
+            <a:r>
+              <a:rPr lang="en-GB" sz="1800" dirty="0">
+                <a:solidFill>
+                  <a:srgbClr val="D4D4D4"/>
+                </a:solidFill>
+                <a:latin typeface="Consolas" panose="020B0609020204030204" pitchFamily="49" charset="0"/>
+              </a:rPr>
+              <a:t>    </a:t>
+            </a:r>
+            <a:r>
+              <a:rPr lang="en-GB" sz="1800" dirty="0">
+                <a:solidFill>
+                  <a:srgbClr val="569CD6"/>
+                </a:solidFill>
+                <a:latin typeface="Consolas" panose="020B0609020204030204" pitchFamily="49" charset="0"/>
+              </a:rPr>
+              <a:t>spec</a:t>
+            </a:r>
+            <a:r>
+              <a:rPr lang="en-GB" sz="1800" dirty="0">
+                <a:solidFill>
+                  <a:srgbClr val="D4D4D4"/>
+                </a:solidFill>
+                <a:latin typeface="Consolas" panose="020B0609020204030204" pitchFamily="49" charset="0"/>
+              </a:rPr>
+              <a:t>:</a:t>
+            </a:r>
+          </a:p>
+          <a:p>
+            <a:pPr>
+              <a:lnSpc>
+                <a:spcPct val="100000"/>
+              </a:lnSpc>
+            </a:pPr>
+            <a:r>
+              <a:rPr lang="en-GB" sz="1800" dirty="0">
+                <a:solidFill>
+                  <a:srgbClr val="D4D4D4"/>
+                </a:solidFill>
+                <a:latin typeface="Consolas" panose="020B0609020204030204" pitchFamily="49" charset="0"/>
+              </a:rPr>
+              <a:t>      </a:t>
+            </a:r>
+            <a:r>
+              <a:rPr lang="en-GB" sz="1800" dirty="0">
+                <a:solidFill>
+                  <a:srgbClr val="569CD6"/>
+                </a:solidFill>
+                <a:latin typeface="Consolas" panose="020B0609020204030204" pitchFamily="49" charset="0"/>
+              </a:rPr>
+              <a:t>containers</a:t>
+            </a:r>
+            <a:r>
+              <a:rPr lang="en-GB" sz="1800" dirty="0">
+                <a:solidFill>
+                  <a:srgbClr val="D4D4D4"/>
+                </a:solidFill>
+                <a:latin typeface="Consolas" panose="020B0609020204030204" pitchFamily="49" charset="0"/>
+              </a:rPr>
+              <a:t>:</a:t>
+            </a:r>
+          </a:p>
+          <a:p>
+            <a:pPr>
+              <a:lnSpc>
+                <a:spcPct val="100000"/>
+              </a:lnSpc>
+            </a:pPr>
+            <a:r>
+              <a:rPr lang="en-GB" sz="1800" dirty="0">
+                <a:solidFill>
+                  <a:srgbClr val="D4D4D4"/>
+                </a:solidFill>
+                <a:latin typeface="Consolas" panose="020B0609020204030204" pitchFamily="49" charset="0"/>
+              </a:rPr>
+              <a:t>      - </a:t>
+            </a:r>
+            <a:r>
+              <a:rPr lang="en-GB" sz="1800" dirty="0">
+                <a:solidFill>
+                  <a:srgbClr val="569CD6"/>
+                </a:solidFill>
+                <a:latin typeface="Consolas" panose="020B0609020204030204" pitchFamily="49" charset="0"/>
+              </a:rPr>
+              <a:t>image</a:t>
+            </a:r>
+            <a:r>
+              <a:rPr lang="en-GB" sz="1800" dirty="0">
+                <a:solidFill>
+                  <a:srgbClr val="D4D4D4"/>
+                </a:solidFill>
+                <a:latin typeface="Consolas" panose="020B0609020204030204" pitchFamily="49" charset="0"/>
+              </a:rPr>
+              <a:t>: </a:t>
+            </a:r>
+            <a:r>
+              <a:rPr lang="en-GB" sz="1800" dirty="0" err="1">
+                <a:solidFill>
+                  <a:srgbClr val="CE9178"/>
+                </a:solidFill>
+                <a:latin typeface="Consolas" panose="020B0609020204030204" pitchFamily="49" charset="0"/>
+              </a:rPr>
+              <a:t>nginx</a:t>
+            </a:r>
+            <a:endParaRPr lang="en-GB" sz="1800" dirty="0">
+              <a:solidFill>
+                <a:srgbClr val="D4D4D4"/>
+              </a:solidFill>
+              <a:latin typeface="Consolas" panose="020B0609020204030204" pitchFamily="49" charset="0"/>
+            </a:endParaRPr>
+          </a:p>
+          <a:p>
+            <a:pPr>
+              <a:lnSpc>
+                <a:spcPct val="100000"/>
+              </a:lnSpc>
+            </a:pPr>
+            <a:r>
+              <a:rPr lang="en-GB" sz="1800" dirty="0">
+                <a:solidFill>
+                  <a:srgbClr val="D4D4D4"/>
+                </a:solidFill>
+                <a:latin typeface="Consolas" panose="020B0609020204030204" pitchFamily="49" charset="0"/>
+              </a:rPr>
+              <a:t>        </a:t>
+            </a:r>
+            <a:r>
+              <a:rPr lang="en-GB" sz="1800" dirty="0">
+                <a:solidFill>
+                  <a:srgbClr val="569CD6"/>
+                </a:solidFill>
+                <a:latin typeface="Consolas" panose="020B0609020204030204" pitchFamily="49" charset="0"/>
+              </a:rPr>
+              <a:t>name</a:t>
+            </a:r>
+            <a:r>
+              <a:rPr lang="en-GB" sz="1800" dirty="0">
+                <a:solidFill>
+                  <a:srgbClr val="D4D4D4"/>
+                </a:solidFill>
+                <a:latin typeface="Consolas" panose="020B0609020204030204" pitchFamily="49" charset="0"/>
+              </a:rPr>
+              <a:t>: </a:t>
+            </a:r>
+            <a:r>
+              <a:rPr lang="en-GB" sz="1800" dirty="0" err="1">
+                <a:solidFill>
+                  <a:srgbClr val="CE9178"/>
+                </a:solidFill>
+                <a:latin typeface="Consolas" panose="020B0609020204030204" pitchFamily="49" charset="0"/>
+              </a:rPr>
+              <a:t>nginx</a:t>
+            </a:r>
+            <a:r>
+              <a:rPr lang="en-GB" sz="1800" dirty="0">
+                <a:solidFill>
+                  <a:srgbClr val="CE9178"/>
+                </a:solidFill>
+                <a:latin typeface="Consolas" panose="020B0609020204030204" pitchFamily="49" charset="0"/>
+              </a:rPr>
+              <a:t>-container</a:t>
+            </a:r>
+            <a:endParaRPr lang="en-GB" sz="1800" b="0" dirty="0">
+              <a:solidFill>
+                <a:srgbClr val="D4D4D4"/>
+              </a:solidFill>
+              <a:effectLst/>
+              <a:latin typeface="Consolas" panose="020B0609020204030204" pitchFamily="49" charset="0"/>
+            </a:endParaRPr>
+          </a:p>
+        </p:txBody>
+      </p:sp>
+      <p:sp>
+        <p:nvSpPr>
+          <p:cNvPr id="13" name="Rectangle 12"/>
+          <p:cNvSpPr/>
+          <p:nvPr/>
+        </p:nvSpPr>
+        <p:spPr>
+          <a:xfrm>
             <a:off x="662741" y="2565498"/>
             <a:ext cx="3290319" cy="287207"/>
           </a:xfrm>
@@ -12016,74 +12432,6 @@
     <p:extLst>
       <p:ext uri="{BB962C8B-B14F-4D97-AF65-F5344CB8AC3E}">
         <p14:creationId xmlns:p14="http://schemas.microsoft.com/office/powerpoint/2010/main" val="3052865207"/>
-      </p:ext>
-    </p:extLst>
-  </p:cSld>
-  <p:clrMapOvr>
-    <a:masterClrMapping/>
-  </p:clrMapOvr>
-  <p:timing>
-    <p:tnLst>
-      <p:par>
-        <p:cTn id="1" dur="indefinite" restart="never" nodeType="tmRoot"/>
-      </p:par>
-    </p:tnLst>
-  </p:timing>
-</p:sld>
-</file>
-
-<file path=ppt/slides/slide19.xml><?xml version="1.0" encoding="utf-8"?>
-<p:sld xmlns:a="http://schemas.openxmlformats.org/drawingml/2006/main" xmlns:r="http://schemas.openxmlformats.org/officeDocument/2006/relationships" xmlns:p="http://schemas.openxmlformats.org/presentationml/2006/main">
-  <p:cSld>
-    <p:spTree>
-      <p:nvGrpSpPr>
-        <p:cNvPr id="1" name=""/>
-        <p:cNvGrpSpPr/>
-        <p:nvPr/>
-      </p:nvGrpSpPr>
-      <p:grpSpPr>
-        <a:xfrm>
-          <a:off x="0" y="0"/>
-          <a:ext cx="0" cy="0"/>
-          <a:chOff x="0" y="0"/>
-          <a:chExt cx="0" cy="0"/>
-        </a:xfrm>
-      </p:grpSpPr>
-      <p:sp>
-        <p:nvSpPr>
-          <p:cNvPr id="2" name="Title 1"/>
-          <p:cNvSpPr>
-            <a:spLocks noGrp="1"/>
-          </p:cNvSpPr>
-          <p:nvPr>
-            <p:ph type="title"/>
-          </p:nvPr>
-        </p:nvSpPr>
-        <p:spPr/>
-        <p:txBody>
-          <a:bodyPr/>
-          <a:lstStyle/>
-          <a:p>
-            <a:r>
-              <a:rPr lang="en-US" dirty="0"/>
-              <a:t>Section </a:t>
-            </a:r>
-            <a:r>
-              <a:rPr lang="en-US" dirty="0" smtClean="0"/>
-              <a:t>6</a:t>
-            </a:r>
-            <a:r>
-              <a:rPr lang="en-US" dirty="0"/>
-              <a:t> - Kubernetes Services</a:t>
-            </a:r>
-            <a:endParaRPr lang="en-GB" dirty="0"/>
-          </a:p>
-        </p:txBody>
-      </p:sp>
-    </p:spTree>
-    <p:extLst>
-      <p:ext uri="{BB962C8B-B14F-4D97-AF65-F5344CB8AC3E}">
-        <p14:creationId xmlns:p14="http://schemas.microsoft.com/office/powerpoint/2010/main" val="3882183709"/>
       </p:ext>
     </p:extLst>
   </p:cSld>
@@ -12792,6 +13140,74 @@
       </p:grpSpPr>
       <p:sp>
         <p:nvSpPr>
+          <p:cNvPr id="2" name="Title 1"/>
+          <p:cNvSpPr>
+            <a:spLocks noGrp="1"/>
+          </p:cNvSpPr>
+          <p:nvPr>
+            <p:ph type="title"/>
+          </p:nvPr>
+        </p:nvSpPr>
+        <p:spPr/>
+        <p:txBody>
+          <a:bodyPr/>
+          <a:lstStyle/>
+          <a:p>
+            <a:r>
+              <a:rPr lang="en-US" dirty="0"/>
+              <a:t>Section </a:t>
+            </a:r>
+            <a:r>
+              <a:rPr lang="en-US" dirty="0" smtClean="0"/>
+              <a:t>6</a:t>
+            </a:r>
+            <a:r>
+              <a:rPr lang="en-US" dirty="0"/>
+              <a:t> - Kubernetes Services</a:t>
+            </a:r>
+            <a:endParaRPr lang="en-GB" dirty="0"/>
+          </a:p>
+        </p:txBody>
+      </p:sp>
+    </p:spTree>
+    <p:extLst>
+      <p:ext uri="{BB962C8B-B14F-4D97-AF65-F5344CB8AC3E}">
+        <p14:creationId xmlns:p14="http://schemas.microsoft.com/office/powerpoint/2010/main" val="3882183709"/>
+      </p:ext>
+    </p:extLst>
+  </p:cSld>
+  <p:clrMapOvr>
+    <a:masterClrMapping/>
+  </p:clrMapOvr>
+  <p:timing>
+    <p:tnLst>
+      <p:par>
+        <p:cTn id="1" dur="indefinite" restart="never" nodeType="tmRoot"/>
+      </p:par>
+    </p:tnLst>
+  </p:timing>
+</p:sld>
+</file>
+
+<file path=ppt/slides/slide21.xml><?xml version="1.0" encoding="utf-8"?>
+<p:sld xmlns:a="http://schemas.openxmlformats.org/drawingml/2006/main" xmlns:r="http://schemas.openxmlformats.org/officeDocument/2006/relationships" xmlns:p="http://schemas.openxmlformats.org/presentationml/2006/main">
+  <p:cSld>
+    <p:spTree>
+      <p:nvGrpSpPr>
+        <p:cNvPr id="1" name=""/>
+        <p:cNvGrpSpPr/>
+        <p:nvPr/>
+      </p:nvGrpSpPr>
+      <p:grpSpPr>
+        <a:xfrm>
+          <a:off x="0" y="0"/>
+          <a:ext cx="0" cy="0"/>
+          <a:chOff x="0" y="0"/>
+          <a:chExt cx="0" cy="0"/>
+        </a:xfrm>
+      </p:grpSpPr>
+      <p:sp>
+        <p:nvSpPr>
           <p:cNvPr id="4" name="Title 1"/>
           <p:cNvSpPr txBox="1">
             <a:spLocks/>
@@ -13635,7 +14051,7 @@
 </p:sld>
 </file>
 
-<file path=ppt/slides/slide21.xml><?xml version="1.0" encoding="utf-8"?>
+<file path=ppt/slides/slide22.xml><?xml version="1.0" encoding="utf-8"?>
 <p:sld xmlns:a="http://schemas.openxmlformats.org/drawingml/2006/main" xmlns:r="http://schemas.openxmlformats.org/officeDocument/2006/relationships" xmlns:p="http://schemas.openxmlformats.org/presentationml/2006/main">
   <p:cSld>
     <p:spTree>
@@ -15025,7 +15441,7 @@
 </p:sld>
 </file>
 
-<file path=ppt/slides/slide22.xml><?xml version="1.0" encoding="utf-8"?>
+<file path=ppt/slides/slide23.xml><?xml version="1.0" encoding="utf-8"?>
 <p:sld xmlns:a="http://schemas.openxmlformats.org/drawingml/2006/main" xmlns:r="http://schemas.openxmlformats.org/officeDocument/2006/relationships" xmlns:p="http://schemas.openxmlformats.org/presentationml/2006/main">
   <p:cSld>
     <p:spTree>
@@ -15296,7 +15712,7 @@
 </p:sld>
 </file>
 
-<file path=ppt/slides/slide23.xml><?xml version="1.0" encoding="utf-8"?>
+<file path=ppt/slides/slide24.xml><?xml version="1.0" encoding="utf-8"?>
 <p:sld xmlns:a="http://schemas.openxmlformats.org/drawingml/2006/main" xmlns:r="http://schemas.openxmlformats.org/officeDocument/2006/relationships" xmlns:p="http://schemas.openxmlformats.org/presentationml/2006/main">
   <p:cSld>
     <p:spTree>
@@ -15961,7 +16377,7 @@
 </p:sld>
 </file>
 
-<file path=ppt/slides/slide24.xml><?xml version="1.0" encoding="utf-8"?>
+<file path=ppt/slides/slide25.xml><?xml version="1.0" encoding="utf-8"?>
 <p:sld xmlns:a="http://schemas.openxmlformats.org/drawingml/2006/main" xmlns:r="http://schemas.openxmlformats.org/officeDocument/2006/relationships" xmlns:p="http://schemas.openxmlformats.org/presentationml/2006/main">
   <p:cSld>
     <p:spTree>
@@ -16025,7 +16441,7 @@
 </p:sld>
 </file>
 
-<file path=ppt/slides/slide25.xml><?xml version="1.0" encoding="utf-8"?>
+<file path=ppt/slides/slide26.xml><?xml version="1.0" encoding="utf-8"?>
 <p:sld xmlns:a="http://schemas.openxmlformats.org/drawingml/2006/main" xmlns:r="http://schemas.openxmlformats.org/officeDocument/2006/relationships" xmlns:p="http://schemas.openxmlformats.org/presentationml/2006/main">
   <p:cSld>
     <p:spTree>
@@ -16678,7 +17094,7 @@
 </p:sld>
 </file>
 
-<file path=ppt/slides/slide26.xml><?xml version="1.0" encoding="utf-8"?>
+<file path=ppt/slides/slide27.xml><?xml version="1.0" encoding="utf-8"?>
 <p:sld xmlns:a="http://schemas.openxmlformats.org/drawingml/2006/main" xmlns:r="http://schemas.openxmlformats.org/officeDocument/2006/relationships" xmlns:p="http://schemas.openxmlformats.org/presentationml/2006/main">
   <p:cSld>
     <p:spTree>
@@ -17440,7 +17856,7 @@
 </p:sld>
 </file>
 
-<file path=ppt/slides/slide27.xml><?xml version="1.0" encoding="utf-8"?>
+<file path=ppt/slides/slide28.xml><?xml version="1.0" encoding="utf-8"?>
 <p:sld xmlns:a="http://schemas.openxmlformats.org/drawingml/2006/main" xmlns:r="http://schemas.openxmlformats.org/officeDocument/2006/relationships" xmlns:p="http://schemas.openxmlformats.org/presentationml/2006/main">
   <p:cSld>
     <p:spTree>

</xml_diff>

<commit_message>
update S6 - Kubernetes Services - formatting
</commit_message>
<xml_diff>
--- a/docs/images/slides_images.pptx
+++ b/docs/images/slides_images.pptx
@@ -29,10 +29,11 @@
     <p:sldId id="260" r:id="rId23"/>
     <p:sldId id="261" r:id="rId24"/>
     <p:sldId id="262" r:id="rId25"/>
-    <p:sldId id="266" r:id="rId26"/>
-    <p:sldId id="270" r:id="rId27"/>
-    <p:sldId id="268" r:id="rId28"/>
-    <p:sldId id="269" r:id="rId29"/>
+    <p:sldId id="288" r:id="rId26"/>
+    <p:sldId id="266" r:id="rId27"/>
+    <p:sldId id="270" r:id="rId28"/>
+    <p:sldId id="268" r:id="rId29"/>
+    <p:sldId id="269" r:id="rId30"/>
   </p:sldIdLst>
   <p:sldSz cx="12192000" cy="6858000"/>
   <p:notesSz cx="6858000" cy="9144000"/>
@@ -270,7 +271,7 @@
           <a:p>
             <a:fld id="{7F7B62DA-8992-4475-B647-5FA8317943B2}" type="datetimeFigureOut">
               <a:rPr lang="en-GB" smtClean="0"/>
-              <a:t>20/05/2021</a:t>
+              <a:t>23/05/2021</a:t>
             </a:fld>
             <a:endParaRPr lang="en-GB"/>
           </a:p>
@@ -440,7 +441,7 @@
           <a:p>
             <a:fld id="{7F7B62DA-8992-4475-B647-5FA8317943B2}" type="datetimeFigureOut">
               <a:rPr lang="en-GB" smtClean="0"/>
-              <a:t>20/05/2021</a:t>
+              <a:t>23/05/2021</a:t>
             </a:fld>
             <a:endParaRPr lang="en-GB"/>
           </a:p>
@@ -620,7 +621,7 @@
           <a:p>
             <a:fld id="{7F7B62DA-8992-4475-B647-5FA8317943B2}" type="datetimeFigureOut">
               <a:rPr lang="en-GB" smtClean="0"/>
-              <a:t>20/05/2021</a:t>
+              <a:t>23/05/2021</a:t>
             </a:fld>
             <a:endParaRPr lang="en-GB"/>
           </a:p>
@@ -790,7 +791,7 @@
           <a:p>
             <a:fld id="{7F7B62DA-8992-4475-B647-5FA8317943B2}" type="datetimeFigureOut">
               <a:rPr lang="en-GB" smtClean="0"/>
-              <a:t>20/05/2021</a:t>
+              <a:t>23/05/2021</a:t>
             </a:fld>
             <a:endParaRPr lang="en-GB"/>
           </a:p>
@@ -1036,7 +1037,7 @@
           <a:p>
             <a:fld id="{7F7B62DA-8992-4475-B647-5FA8317943B2}" type="datetimeFigureOut">
               <a:rPr lang="en-GB" smtClean="0"/>
-              <a:t>20/05/2021</a:t>
+              <a:t>23/05/2021</a:t>
             </a:fld>
             <a:endParaRPr lang="en-GB"/>
           </a:p>
@@ -1268,7 +1269,7 @@
           <a:p>
             <a:fld id="{7F7B62DA-8992-4475-B647-5FA8317943B2}" type="datetimeFigureOut">
               <a:rPr lang="en-GB" smtClean="0"/>
-              <a:t>20/05/2021</a:t>
+              <a:t>23/05/2021</a:t>
             </a:fld>
             <a:endParaRPr lang="en-GB"/>
           </a:p>
@@ -1635,7 +1636,7 @@
           <a:p>
             <a:fld id="{7F7B62DA-8992-4475-B647-5FA8317943B2}" type="datetimeFigureOut">
               <a:rPr lang="en-GB" smtClean="0"/>
-              <a:t>20/05/2021</a:t>
+              <a:t>23/05/2021</a:t>
             </a:fld>
             <a:endParaRPr lang="en-GB"/>
           </a:p>
@@ -1753,7 +1754,7 @@
           <a:p>
             <a:fld id="{7F7B62DA-8992-4475-B647-5FA8317943B2}" type="datetimeFigureOut">
               <a:rPr lang="en-GB" smtClean="0"/>
-              <a:t>20/05/2021</a:t>
+              <a:t>23/05/2021</a:t>
             </a:fld>
             <a:endParaRPr lang="en-GB"/>
           </a:p>
@@ -1848,7 +1849,7 @@
           <a:p>
             <a:fld id="{7F7B62DA-8992-4475-B647-5FA8317943B2}" type="datetimeFigureOut">
               <a:rPr lang="en-GB" smtClean="0"/>
-              <a:t>20/05/2021</a:t>
+              <a:t>23/05/2021</a:t>
             </a:fld>
             <a:endParaRPr lang="en-GB"/>
           </a:p>
@@ -2125,7 +2126,7 @@
           <a:p>
             <a:fld id="{7F7B62DA-8992-4475-B647-5FA8317943B2}" type="datetimeFigureOut">
               <a:rPr lang="en-GB" smtClean="0"/>
-              <a:t>20/05/2021</a:t>
+              <a:t>23/05/2021</a:t>
             </a:fld>
             <a:endParaRPr lang="en-GB"/>
           </a:p>
@@ -2378,7 +2379,7 @@
           <a:p>
             <a:fld id="{7F7B62DA-8992-4475-B647-5FA8317943B2}" type="datetimeFigureOut">
               <a:rPr lang="en-GB" smtClean="0"/>
-              <a:t>20/05/2021</a:t>
+              <a:t>23/05/2021</a:t>
             </a:fld>
             <a:endParaRPr lang="en-GB"/>
           </a:p>
@@ -2591,7 +2592,7 @@
           <a:p>
             <a:fld id="{7F7B62DA-8992-4475-B647-5FA8317943B2}" type="datetimeFigureOut">
               <a:rPr lang="en-GB" smtClean="0"/>
-              <a:t>20/05/2021</a:t>
+              <a:t>23/05/2021</a:t>
             </a:fld>
             <a:endParaRPr lang="en-GB"/>
           </a:p>
@@ -16396,35 +16397,1301 @@
       </p:grpSpPr>
       <p:sp>
         <p:nvSpPr>
-          <p:cNvPr id="2" name="Title 1"/>
-          <p:cNvSpPr>
-            <a:spLocks noGrp="1"/>
+          <p:cNvPr id="9" name="Title 1"/>
+          <p:cNvSpPr txBox="1">
+            <a:spLocks/>
           </p:cNvSpPr>
-          <p:nvPr>
-            <p:ph type="title"/>
-          </p:nvPr>
+          <p:nvPr/>
         </p:nvSpPr>
-        <p:spPr/>
+        <p:spPr>
+          <a:xfrm>
+            <a:off x="6587063" y="748306"/>
+            <a:ext cx="5167812" cy="4219934"/>
+          </a:xfrm>
+          <a:prstGeom prst="rect">
+            <a:avLst/>
+          </a:prstGeom>
+          <a:solidFill>
+            <a:schemeClr val="tx1"/>
+          </a:solidFill>
+        </p:spPr>
         <p:txBody>
-          <a:bodyPr/>
-          <a:lstStyle/>
-          <a:p>
-            <a:r>
-              <a:rPr lang="en-US" dirty="0"/>
-              <a:t>Section </a:t>
-            </a:r>
-            <a:r>
-              <a:rPr lang="en-US" dirty="0" smtClean="0"/>
-              <a:t>7</a:t>
-            </a:r>
-            <a:endParaRPr lang="en-GB" dirty="0"/>
+          <a:bodyPr vert="horz" lIns="180000" tIns="180000" rIns="91440" bIns="45720" rtlCol="0" anchor="t">
+            <a:noAutofit/>
+          </a:bodyPr>
+          <a:lstStyle>
+            <a:lvl1pPr algn="l" defTabSz="914400" rtl="0" eaLnBrk="1" latinLnBrk="0" hangingPunct="1">
+              <a:lnSpc>
+                <a:spcPct val="90000"/>
+              </a:lnSpc>
+              <a:spcBef>
+                <a:spcPct val="0"/>
+              </a:spcBef>
+              <a:buNone/>
+              <a:defRPr sz="4400" kern="1200">
+                <a:solidFill>
+                  <a:schemeClr val="tx1"/>
+                </a:solidFill>
+                <a:latin typeface="+mj-lt"/>
+                <a:ea typeface="+mj-ea"/>
+                <a:cs typeface="+mj-cs"/>
+              </a:defRPr>
+            </a:lvl1pPr>
+          </a:lstStyle>
+          <a:p>
+            <a:pPr>
+              <a:lnSpc>
+                <a:spcPct val="100000"/>
+              </a:lnSpc>
+            </a:pPr>
+            <a:r>
+              <a:rPr lang="en-GB" sz="2000" dirty="0" err="1" smtClean="0">
+                <a:solidFill>
+                  <a:srgbClr val="569CD6"/>
+                </a:solidFill>
+                <a:latin typeface="Consolas" panose="020B0609020204030204" pitchFamily="49" charset="0"/>
+              </a:rPr>
+              <a:t>apiVersion</a:t>
+            </a:r>
+            <a:r>
+              <a:rPr lang="en-GB" sz="2000" dirty="0">
+                <a:solidFill>
+                  <a:srgbClr val="D4D4D4"/>
+                </a:solidFill>
+                <a:latin typeface="Consolas" panose="020B0609020204030204" pitchFamily="49" charset="0"/>
+              </a:rPr>
+              <a:t>: </a:t>
+            </a:r>
+            <a:r>
+              <a:rPr lang="en-GB" sz="2000" dirty="0">
+                <a:solidFill>
+                  <a:srgbClr val="CE9178"/>
+                </a:solidFill>
+                <a:latin typeface="Consolas" panose="020B0609020204030204" pitchFamily="49" charset="0"/>
+              </a:rPr>
+              <a:t>v1</a:t>
+            </a:r>
+            <a:endParaRPr lang="en-GB" sz="2000" dirty="0">
+              <a:solidFill>
+                <a:srgbClr val="D4D4D4"/>
+              </a:solidFill>
+              <a:latin typeface="Consolas" panose="020B0609020204030204" pitchFamily="49" charset="0"/>
+            </a:endParaRPr>
+          </a:p>
+          <a:p>
+            <a:pPr>
+              <a:lnSpc>
+                <a:spcPct val="100000"/>
+              </a:lnSpc>
+            </a:pPr>
+            <a:r>
+              <a:rPr lang="en-GB" sz="2000" dirty="0">
+                <a:solidFill>
+                  <a:srgbClr val="569CD6"/>
+                </a:solidFill>
+                <a:latin typeface="Consolas" panose="020B0609020204030204" pitchFamily="49" charset="0"/>
+              </a:rPr>
+              <a:t>kind</a:t>
+            </a:r>
+            <a:r>
+              <a:rPr lang="en-GB" sz="2000" dirty="0">
+                <a:solidFill>
+                  <a:srgbClr val="D4D4D4"/>
+                </a:solidFill>
+                <a:latin typeface="Consolas" panose="020B0609020204030204" pitchFamily="49" charset="0"/>
+              </a:rPr>
+              <a:t>: </a:t>
+            </a:r>
+            <a:r>
+              <a:rPr lang="en-GB" sz="2000" dirty="0">
+                <a:solidFill>
+                  <a:srgbClr val="CE9178"/>
+                </a:solidFill>
+                <a:latin typeface="Consolas" panose="020B0609020204030204" pitchFamily="49" charset="0"/>
+              </a:rPr>
+              <a:t>Pod</a:t>
+            </a:r>
+            <a:endParaRPr lang="en-GB" sz="2000" dirty="0">
+              <a:solidFill>
+                <a:srgbClr val="D4D4D4"/>
+              </a:solidFill>
+              <a:latin typeface="Consolas" panose="020B0609020204030204" pitchFamily="49" charset="0"/>
+            </a:endParaRPr>
+          </a:p>
+          <a:p>
+            <a:pPr>
+              <a:lnSpc>
+                <a:spcPct val="100000"/>
+              </a:lnSpc>
+            </a:pPr>
+            <a:r>
+              <a:rPr lang="en-GB" sz="2000" dirty="0">
+                <a:solidFill>
+                  <a:srgbClr val="569CD6"/>
+                </a:solidFill>
+                <a:latin typeface="Consolas" panose="020B0609020204030204" pitchFamily="49" charset="0"/>
+              </a:rPr>
+              <a:t>metadata</a:t>
+            </a:r>
+            <a:r>
+              <a:rPr lang="en-GB" sz="2000" dirty="0">
+                <a:solidFill>
+                  <a:srgbClr val="D4D4D4"/>
+                </a:solidFill>
+                <a:latin typeface="Consolas" panose="020B0609020204030204" pitchFamily="49" charset="0"/>
+              </a:rPr>
+              <a:t>:</a:t>
+            </a:r>
+          </a:p>
+          <a:p>
+            <a:pPr>
+              <a:lnSpc>
+                <a:spcPct val="100000"/>
+              </a:lnSpc>
+            </a:pPr>
+            <a:r>
+              <a:rPr lang="en-GB" sz="2000" dirty="0">
+                <a:solidFill>
+                  <a:srgbClr val="D4D4D4"/>
+                </a:solidFill>
+                <a:latin typeface="Consolas" panose="020B0609020204030204" pitchFamily="49" charset="0"/>
+              </a:rPr>
+              <a:t>  </a:t>
+            </a:r>
+            <a:r>
+              <a:rPr lang="en-GB" sz="2000" dirty="0">
+                <a:solidFill>
+                  <a:srgbClr val="569CD6"/>
+                </a:solidFill>
+                <a:latin typeface="Consolas" panose="020B0609020204030204" pitchFamily="49" charset="0"/>
+              </a:rPr>
+              <a:t>name</a:t>
+            </a:r>
+            <a:r>
+              <a:rPr lang="en-GB" sz="2000" dirty="0">
+                <a:solidFill>
+                  <a:srgbClr val="D4D4D4"/>
+                </a:solidFill>
+                <a:latin typeface="Consolas" panose="020B0609020204030204" pitchFamily="49" charset="0"/>
+              </a:rPr>
+              <a:t>: </a:t>
+            </a:r>
+            <a:r>
+              <a:rPr lang="en-GB" sz="2000" dirty="0" err="1" smtClean="0">
+                <a:solidFill>
+                  <a:srgbClr val="CE9178"/>
+                </a:solidFill>
+                <a:latin typeface="Consolas" panose="020B0609020204030204" pitchFamily="49" charset="0"/>
+              </a:rPr>
+              <a:t>myapp</a:t>
+            </a:r>
+            <a:r>
+              <a:rPr lang="en-GB" sz="2000" dirty="0" smtClean="0">
+                <a:solidFill>
+                  <a:srgbClr val="CE9178"/>
+                </a:solidFill>
+                <a:latin typeface="Consolas" panose="020B0609020204030204" pitchFamily="49" charset="0"/>
+              </a:rPr>
+              <a:t>-back-end-</a:t>
+            </a:r>
+            <a:r>
+              <a:rPr lang="en-GB" sz="2000" dirty="0" smtClean="0">
+                <a:solidFill>
+                  <a:srgbClr val="CE9178"/>
+                </a:solidFill>
+                <a:latin typeface="Consolas" panose="020B0609020204030204" pitchFamily="49" charset="0"/>
+              </a:rPr>
+              <a:t>pod</a:t>
+            </a:r>
+            <a:endParaRPr lang="en-GB" sz="2000" dirty="0">
+              <a:solidFill>
+                <a:srgbClr val="D4D4D4"/>
+              </a:solidFill>
+              <a:latin typeface="Consolas" panose="020B0609020204030204" pitchFamily="49" charset="0"/>
+            </a:endParaRPr>
+          </a:p>
+          <a:p>
+            <a:pPr>
+              <a:lnSpc>
+                <a:spcPct val="100000"/>
+              </a:lnSpc>
+            </a:pPr>
+            <a:r>
+              <a:rPr lang="en-GB" sz="2000" dirty="0">
+                <a:solidFill>
+                  <a:srgbClr val="D4D4D4"/>
+                </a:solidFill>
+                <a:latin typeface="Consolas" panose="020B0609020204030204" pitchFamily="49" charset="0"/>
+              </a:rPr>
+              <a:t>  </a:t>
+            </a:r>
+            <a:r>
+              <a:rPr lang="en-GB" sz="2000" dirty="0">
+                <a:solidFill>
+                  <a:srgbClr val="569CD6"/>
+                </a:solidFill>
+                <a:latin typeface="Consolas" panose="020B0609020204030204" pitchFamily="49" charset="0"/>
+              </a:rPr>
+              <a:t>labels</a:t>
+            </a:r>
+            <a:r>
+              <a:rPr lang="en-GB" sz="2000" dirty="0">
+                <a:solidFill>
+                  <a:srgbClr val="D4D4D4"/>
+                </a:solidFill>
+                <a:latin typeface="Consolas" panose="020B0609020204030204" pitchFamily="49" charset="0"/>
+              </a:rPr>
+              <a:t>:</a:t>
+            </a:r>
+          </a:p>
+          <a:p>
+            <a:pPr>
+              <a:lnSpc>
+                <a:spcPct val="100000"/>
+              </a:lnSpc>
+            </a:pPr>
+            <a:r>
+              <a:rPr lang="en-GB" sz="2000" dirty="0">
+                <a:solidFill>
+                  <a:srgbClr val="D4D4D4"/>
+                </a:solidFill>
+                <a:latin typeface="Consolas" panose="020B0609020204030204" pitchFamily="49" charset="0"/>
+              </a:rPr>
+              <a:t>    </a:t>
+            </a:r>
+            <a:r>
+              <a:rPr lang="en-GB" sz="2000" dirty="0">
+                <a:solidFill>
+                  <a:srgbClr val="569CD6"/>
+                </a:solidFill>
+                <a:latin typeface="Consolas" panose="020B0609020204030204" pitchFamily="49" charset="0"/>
+              </a:rPr>
+              <a:t>app</a:t>
+            </a:r>
+            <a:r>
+              <a:rPr lang="en-GB" sz="2000" dirty="0">
+                <a:solidFill>
+                  <a:srgbClr val="D4D4D4"/>
+                </a:solidFill>
+                <a:latin typeface="Consolas" panose="020B0609020204030204" pitchFamily="49" charset="0"/>
+              </a:rPr>
+              <a:t>: </a:t>
+            </a:r>
+            <a:r>
+              <a:rPr lang="en-GB" sz="2000" dirty="0" err="1">
+                <a:solidFill>
+                  <a:srgbClr val="CE9178"/>
+                </a:solidFill>
+                <a:latin typeface="Consolas" panose="020B0609020204030204" pitchFamily="49" charset="0"/>
+              </a:rPr>
+              <a:t>myapp</a:t>
+            </a:r>
+            <a:endParaRPr lang="en-GB" sz="2000" dirty="0">
+              <a:solidFill>
+                <a:srgbClr val="D4D4D4"/>
+              </a:solidFill>
+              <a:latin typeface="Consolas" panose="020B0609020204030204" pitchFamily="49" charset="0"/>
+            </a:endParaRPr>
+          </a:p>
+          <a:p>
+            <a:pPr>
+              <a:lnSpc>
+                <a:spcPct val="100000"/>
+              </a:lnSpc>
+            </a:pPr>
+            <a:r>
+              <a:rPr lang="en-GB" sz="2000" dirty="0">
+                <a:solidFill>
+                  <a:srgbClr val="D4D4D4"/>
+                </a:solidFill>
+                <a:latin typeface="Consolas" panose="020B0609020204030204" pitchFamily="49" charset="0"/>
+              </a:rPr>
+              <a:t>    </a:t>
+            </a:r>
+            <a:r>
+              <a:rPr lang="en-GB" sz="2000" dirty="0">
+                <a:solidFill>
+                  <a:srgbClr val="569CD6"/>
+                </a:solidFill>
+                <a:latin typeface="Consolas" panose="020B0609020204030204" pitchFamily="49" charset="0"/>
+              </a:rPr>
+              <a:t>type</a:t>
+            </a:r>
+            <a:r>
+              <a:rPr lang="en-GB" sz="2000" dirty="0">
+                <a:solidFill>
+                  <a:srgbClr val="D4D4D4"/>
+                </a:solidFill>
+                <a:latin typeface="Consolas" panose="020B0609020204030204" pitchFamily="49" charset="0"/>
+              </a:rPr>
+              <a:t>: </a:t>
+            </a:r>
+            <a:r>
+              <a:rPr lang="en-GB" sz="2000" dirty="0">
+                <a:solidFill>
+                  <a:srgbClr val="CE9178"/>
+                </a:solidFill>
+                <a:latin typeface="Consolas" panose="020B0609020204030204" pitchFamily="49" charset="0"/>
+              </a:rPr>
+              <a:t> back-end</a:t>
+            </a:r>
+            <a:endParaRPr lang="en-GB" sz="2000" dirty="0">
+              <a:solidFill>
+                <a:srgbClr val="D4D4D4"/>
+              </a:solidFill>
+              <a:latin typeface="Consolas" panose="020B0609020204030204" pitchFamily="49" charset="0"/>
+            </a:endParaRPr>
+          </a:p>
+          <a:p>
+            <a:pPr>
+              <a:lnSpc>
+                <a:spcPct val="100000"/>
+              </a:lnSpc>
+            </a:pPr>
+            <a:r>
+              <a:rPr lang="en-GB" sz="2000" dirty="0">
+                <a:solidFill>
+                  <a:srgbClr val="569CD6"/>
+                </a:solidFill>
+                <a:latin typeface="Consolas" panose="020B0609020204030204" pitchFamily="49" charset="0"/>
+              </a:rPr>
+              <a:t>spec</a:t>
+            </a:r>
+            <a:r>
+              <a:rPr lang="en-GB" sz="2000" dirty="0">
+                <a:solidFill>
+                  <a:srgbClr val="D4D4D4"/>
+                </a:solidFill>
+                <a:latin typeface="Consolas" panose="020B0609020204030204" pitchFamily="49" charset="0"/>
+              </a:rPr>
+              <a:t>:</a:t>
+            </a:r>
+          </a:p>
+          <a:p>
+            <a:pPr>
+              <a:lnSpc>
+                <a:spcPct val="100000"/>
+              </a:lnSpc>
+            </a:pPr>
+            <a:r>
+              <a:rPr lang="en-GB" sz="2000" dirty="0">
+                <a:solidFill>
+                  <a:srgbClr val="D4D4D4"/>
+                </a:solidFill>
+                <a:latin typeface="Consolas" panose="020B0609020204030204" pitchFamily="49" charset="0"/>
+              </a:rPr>
+              <a:t>  </a:t>
+            </a:r>
+            <a:r>
+              <a:rPr lang="en-GB" sz="2000" dirty="0">
+                <a:solidFill>
+                  <a:srgbClr val="569CD6"/>
+                </a:solidFill>
+                <a:latin typeface="Consolas" panose="020B0609020204030204" pitchFamily="49" charset="0"/>
+              </a:rPr>
+              <a:t>containers</a:t>
+            </a:r>
+            <a:r>
+              <a:rPr lang="en-GB" sz="2000" dirty="0">
+                <a:solidFill>
+                  <a:srgbClr val="D4D4D4"/>
+                </a:solidFill>
+                <a:latin typeface="Consolas" panose="020B0609020204030204" pitchFamily="49" charset="0"/>
+              </a:rPr>
+              <a:t>:</a:t>
+            </a:r>
+          </a:p>
+          <a:p>
+            <a:pPr>
+              <a:lnSpc>
+                <a:spcPct val="100000"/>
+              </a:lnSpc>
+            </a:pPr>
+            <a:r>
+              <a:rPr lang="en-GB" sz="2000" dirty="0">
+                <a:solidFill>
+                  <a:srgbClr val="D4D4D4"/>
+                </a:solidFill>
+                <a:latin typeface="Consolas" panose="020B0609020204030204" pitchFamily="49" charset="0"/>
+              </a:rPr>
+              <a:t>  - </a:t>
+            </a:r>
+            <a:r>
+              <a:rPr lang="en-GB" sz="2000" dirty="0">
+                <a:solidFill>
+                  <a:srgbClr val="569CD6"/>
+                </a:solidFill>
+                <a:latin typeface="Consolas" panose="020B0609020204030204" pitchFamily="49" charset="0"/>
+              </a:rPr>
+              <a:t>name</a:t>
+            </a:r>
+            <a:r>
+              <a:rPr lang="en-GB" sz="2000" dirty="0">
+                <a:solidFill>
+                  <a:srgbClr val="D4D4D4"/>
+                </a:solidFill>
+                <a:latin typeface="Consolas" panose="020B0609020204030204" pitchFamily="49" charset="0"/>
+              </a:rPr>
+              <a:t>: </a:t>
+            </a:r>
+            <a:r>
+              <a:rPr lang="en-GB" sz="2000" dirty="0" err="1">
+                <a:solidFill>
+                  <a:srgbClr val="CE9178"/>
+                </a:solidFill>
+                <a:latin typeface="Consolas" panose="020B0609020204030204" pitchFamily="49" charset="0"/>
+              </a:rPr>
+              <a:t>nginx</a:t>
+            </a:r>
+            <a:r>
+              <a:rPr lang="en-GB" sz="2000" dirty="0">
+                <a:solidFill>
+                  <a:srgbClr val="CE9178"/>
+                </a:solidFill>
+                <a:latin typeface="Consolas" panose="020B0609020204030204" pitchFamily="49" charset="0"/>
+              </a:rPr>
+              <a:t>-container</a:t>
+            </a:r>
+            <a:endParaRPr lang="en-GB" sz="2000" dirty="0">
+              <a:solidFill>
+                <a:srgbClr val="D4D4D4"/>
+              </a:solidFill>
+              <a:latin typeface="Consolas" panose="020B0609020204030204" pitchFamily="49" charset="0"/>
+            </a:endParaRPr>
+          </a:p>
+          <a:p>
+            <a:pPr>
+              <a:lnSpc>
+                <a:spcPct val="100000"/>
+              </a:lnSpc>
+            </a:pPr>
+            <a:r>
+              <a:rPr lang="en-GB" sz="2000" dirty="0">
+                <a:solidFill>
+                  <a:srgbClr val="D4D4D4"/>
+                </a:solidFill>
+                <a:latin typeface="Consolas" panose="020B0609020204030204" pitchFamily="49" charset="0"/>
+              </a:rPr>
+              <a:t>    </a:t>
+            </a:r>
+            <a:r>
+              <a:rPr lang="en-GB" sz="2000" dirty="0">
+                <a:solidFill>
+                  <a:srgbClr val="569CD6"/>
+                </a:solidFill>
+                <a:latin typeface="Consolas" panose="020B0609020204030204" pitchFamily="49" charset="0"/>
+              </a:rPr>
+              <a:t>image</a:t>
+            </a:r>
+            <a:r>
+              <a:rPr lang="en-GB" sz="2000" dirty="0">
+                <a:solidFill>
+                  <a:srgbClr val="D4D4D4"/>
+                </a:solidFill>
+                <a:latin typeface="Consolas" panose="020B0609020204030204" pitchFamily="49" charset="0"/>
+              </a:rPr>
+              <a:t>: </a:t>
+            </a:r>
+            <a:r>
+              <a:rPr lang="en-GB" sz="2000" dirty="0" err="1">
+                <a:solidFill>
+                  <a:srgbClr val="CE9178"/>
+                </a:solidFill>
+                <a:latin typeface="Consolas" panose="020B0609020204030204" pitchFamily="49" charset="0"/>
+              </a:rPr>
+              <a:t>nginx</a:t>
+            </a:r>
+            <a:endParaRPr lang="en-GB" sz="2000" dirty="0">
+              <a:solidFill>
+                <a:srgbClr val="D4D4D4"/>
+              </a:solidFill>
+              <a:latin typeface="Consolas" panose="020B0609020204030204" pitchFamily="49" charset="0"/>
+            </a:endParaRPr>
+          </a:p>
+          <a:p>
+            <a:pPr>
+              <a:lnSpc>
+                <a:spcPct val="100000"/>
+              </a:lnSpc>
+            </a:pPr>
+            <a:r>
+              <a:rPr lang="en-GB" sz="2000" b="0" dirty="0" smtClean="0">
+                <a:solidFill>
+                  <a:srgbClr val="D4D4D4"/>
+                </a:solidFill>
+                <a:effectLst/>
+                <a:latin typeface="Consolas" panose="020B0609020204030204" pitchFamily="49" charset="0"/>
+              </a:rPr>
+              <a:t>  </a:t>
+            </a:r>
+            <a:endParaRPr lang="en-GB" sz="2000" dirty="0"/>
           </a:p>
         </p:txBody>
       </p:sp>
+      <p:sp>
+        <p:nvSpPr>
+          <p:cNvPr id="4" name="Title 1"/>
+          <p:cNvSpPr txBox="1">
+            <a:spLocks/>
+          </p:cNvSpPr>
+          <p:nvPr/>
+        </p:nvSpPr>
+        <p:spPr>
+          <a:xfrm>
+            <a:off x="538960" y="748305"/>
+            <a:ext cx="5167812" cy="4219935"/>
+          </a:xfrm>
+          <a:prstGeom prst="rect">
+            <a:avLst/>
+          </a:prstGeom>
+          <a:solidFill>
+            <a:schemeClr val="tx1"/>
+          </a:solidFill>
+        </p:spPr>
+        <p:txBody>
+          <a:bodyPr vert="horz" lIns="180000" tIns="180000" rIns="91440" bIns="45720" rtlCol="0" anchor="t">
+            <a:noAutofit/>
+          </a:bodyPr>
+          <a:lstStyle>
+            <a:lvl1pPr algn="l" defTabSz="914400" rtl="0" eaLnBrk="1" latinLnBrk="0" hangingPunct="1">
+              <a:lnSpc>
+                <a:spcPct val="90000"/>
+              </a:lnSpc>
+              <a:spcBef>
+                <a:spcPct val="0"/>
+              </a:spcBef>
+              <a:buNone/>
+              <a:defRPr sz="4400" kern="1200">
+                <a:solidFill>
+                  <a:schemeClr val="tx1"/>
+                </a:solidFill>
+                <a:latin typeface="+mj-lt"/>
+                <a:ea typeface="+mj-ea"/>
+                <a:cs typeface="+mj-cs"/>
+              </a:defRPr>
+            </a:lvl1pPr>
+          </a:lstStyle>
+          <a:p>
+            <a:pPr>
+              <a:lnSpc>
+                <a:spcPct val="100000"/>
+              </a:lnSpc>
+            </a:pPr>
+            <a:r>
+              <a:rPr lang="en-GB" sz="1800" dirty="0" err="1" smtClean="0">
+                <a:solidFill>
+                  <a:srgbClr val="569CD6"/>
+                </a:solidFill>
+                <a:latin typeface="Consolas" panose="020B0609020204030204" pitchFamily="49" charset="0"/>
+              </a:rPr>
+              <a:t>apiVersion</a:t>
+            </a:r>
+            <a:r>
+              <a:rPr lang="en-GB" sz="1800" dirty="0">
+                <a:solidFill>
+                  <a:srgbClr val="D4D4D4"/>
+                </a:solidFill>
+                <a:latin typeface="Consolas" panose="020B0609020204030204" pitchFamily="49" charset="0"/>
+              </a:rPr>
+              <a:t>: </a:t>
+            </a:r>
+            <a:r>
+              <a:rPr lang="en-GB" sz="1800" dirty="0">
+                <a:solidFill>
+                  <a:srgbClr val="CE9178"/>
+                </a:solidFill>
+                <a:latin typeface="Consolas" panose="020B0609020204030204" pitchFamily="49" charset="0"/>
+              </a:rPr>
+              <a:t>v1</a:t>
+            </a:r>
+            <a:endParaRPr lang="en-GB" sz="1800" dirty="0">
+              <a:solidFill>
+                <a:srgbClr val="D4D4D4"/>
+              </a:solidFill>
+              <a:latin typeface="Consolas" panose="020B0609020204030204" pitchFamily="49" charset="0"/>
+            </a:endParaRPr>
+          </a:p>
+          <a:p>
+            <a:pPr>
+              <a:lnSpc>
+                <a:spcPct val="100000"/>
+              </a:lnSpc>
+            </a:pPr>
+            <a:r>
+              <a:rPr lang="en-GB" sz="1800" dirty="0">
+                <a:solidFill>
+                  <a:srgbClr val="569CD6"/>
+                </a:solidFill>
+                <a:latin typeface="Consolas" panose="020B0609020204030204" pitchFamily="49" charset="0"/>
+              </a:rPr>
+              <a:t>kind</a:t>
+            </a:r>
+            <a:r>
+              <a:rPr lang="en-GB" sz="1800" dirty="0">
+                <a:solidFill>
+                  <a:srgbClr val="D4D4D4"/>
+                </a:solidFill>
+                <a:latin typeface="Consolas" panose="020B0609020204030204" pitchFamily="49" charset="0"/>
+              </a:rPr>
+              <a:t>: </a:t>
+            </a:r>
+            <a:r>
+              <a:rPr lang="en-GB" sz="1800" dirty="0">
+                <a:solidFill>
+                  <a:srgbClr val="CE9178"/>
+                </a:solidFill>
+                <a:latin typeface="Consolas" panose="020B0609020204030204" pitchFamily="49" charset="0"/>
+              </a:rPr>
+              <a:t>Service</a:t>
+            </a:r>
+            <a:endParaRPr lang="en-GB" sz="1800" dirty="0">
+              <a:solidFill>
+                <a:srgbClr val="D4D4D4"/>
+              </a:solidFill>
+              <a:latin typeface="Consolas" panose="020B0609020204030204" pitchFamily="49" charset="0"/>
+            </a:endParaRPr>
+          </a:p>
+          <a:p>
+            <a:pPr>
+              <a:lnSpc>
+                <a:spcPct val="100000"/>
+              </a:lnSpc>
+            </a:pPr>
+            <a:r>
+              <a:rPr lang="en-GB" sz="1800" dirty="0">
+                <a:solidFill>
+                  <a:srgbClr val="569CD6"/>
+                </a:solidFill>
+                <a:latin typeface="Consolas" panose="020B0609020204030204" pitchFamily="49" charset="0"/>
+              </a:rPr>
+              <a:t>metadata</a:t>
+            </a:r>
+            <a:r>
+              <a:rPr lang="en-GB" sz="1800" dirty="0">
+                <a:solidFill>
+                  <a:srgbClr val="D4D4D4"/>
+                </a:solidFill>
+                <a:latin typeface="Consolas" panose="020B0609020204030204" pitchFamily="49" charset="0"/>
+              </a:rPr>
+              <a:t>:</a:t>
+            </a:r>
+          </a:p>
+          <a:p>
+            <a:pPr>
+              <a:lnSpc>
+                <a:spcPct val="100000"/>
+              </a:lnSpc>
+            </a:pPr>
+            <a:r>
+              <a:rPr lang="en-GB" sz="1800" dirty="0">
+                <a:solidFill>
+                  <a:srgbClr val="D4D4D4"/>
+                </a:solidFill>
+                <a:latin typeface="Consolas" panose="020B0609020204030204" pitchFamily="49" charset="0"/>
+              </a:rPr>
+              <a:t>  </a:t>
+            </a:r>
+            <a:r>
+              <a:rPr lang="en-GB" sz="1800" dirty="0">
+                <a:solidFill>
+                  <a:srgbClr val="569CD6"/>
+                </a:solidFill>
+                <a:latin typeface="Consolas" panose="020B0609020204030204" pitchFamily="49" charset="0"/>
+              </a:rPr>
+              <a:t>name</a:t>
+            </a:r>
+            <a:r>
+              <a:rPr lang="en-GB" sz="1800" dirty="0">
+                <a:solidFill>
+                  <a:srgbClr val="D4D4D4"/>
+                </a:solidFill>
+                <a:latin typeface="Consolas" panose="020B0609020204030204" pitchFamily="49" charset="0"/>
+              </a:rPr>
+              <a:t>: </a:t>
+            </a:r>
+            <a:r>
+              <a:rPr lang="en-GB" sz="1800" dirty="0">
+                <a:solidFill>
+                  <a:srgbClr val="CE9178"/>
+                </a:solidFill>
+                <a:latin typeface="Consolas" panose="020B0609020204030204" pitchFamily="49" charset="0"/>
+              </a:rPr>
+              <a:t> </a:t>
+            </a:r>
+            <a:r>
+              <a:rPr lang="en-GB" sz="1800" dirty="0" smtClean="0">
+                <a:solidFill>
+                  <a:srgbClr val="CE9178"/>
+                </a:solidFill>
+                <a:latin typeface="Consolas" panose="020B0609020204030204" pitchFamily="49" charset="0"/>
+              </a:rPr>
+              <a:t>back-end</a:t>
+            </a:r>
+            <a:endParaRPr lang="en-GB" sz="1800" dirty="0">
+              <a:solidFill>
+                <a:srgbClr val="D4D4D4"/>
+              </a:solidFill>
+              <a:latin typeface="Consolas" panose="020B0609020204030204" pitchFamily="49" charset="0"/>
+            </a:endParaRPr>
+          </a:p>
+          <a:p>
+            <a:pPr>
+              <a:lnSpc>
+                <a:spcPct val="100000"/>
+              </a:lnSpc>
+            </a:pPr>
+            <a:r>
+              <a:rPr lang="en-GB" sz="1800" dirty="0">
+                <a:solidFill>
+                  <a:srgbClr val="569CD6"/>
+                </a:solidFill>
+                <a:latin typeface="Consolas" panose="020B0609020204030204" pitchFamily="49" charset="0"/>
+              </a:rPr>
+              <a:t>spec</a:t>
+            </a:r>
+            <a:r>
+              <a:rPr lang="en-GB" sz="1800" dirty="0">
+                <a:solidFill>
+                  <a:srgbClr val="D4D4D4"/>
+                </a:solidFill>
+                <a:latin typeface="Consolas" panose="020B0609020204030204" pitchFamily="49" charset="0"/>
+              </a:rPr>
+              <a:t>:</a:t>
+            </a:r>
+          </a:p>
+          <a:p>
+            <a:pPr>
+              <a:lnSpc>
+                <a:spcPct val="100000"/>
+              </a:lnSpc>
+            </a:pPr>
+            <a:r>
+              <a:rPr lang="en-GB" sz="1800" dirty="0">
+                <a:solidFill>
+                  <a:srgbClr val="D4D4D4"/>
+                </a:solidFill>
+                <a:latin typeface="Consolas" panose="020B0609020204030204" pitchFamily="49" charset="0"/>
+              </a:rPr>
+              <a:t>  </a:t>
+            </a:r>
+            <a:r>
+              <a:rPr lang="en-GB" sz="1800" dirty="0">
+                <a:solidFill>
+                  <a:srgbClr val="569CD6"/>
+                </a:solidFill>
+                <a:latin typeface="Consolas" panose="020B0609020204030204" pitchFamily="49" charset="0"/>
+              </a:rPr>
+              <a:t>type</a:t>
+            </a:r>
+            <a:r>
+              <a:rPr lang="en-GB" sz="1800" dirty="0">
+                <a:solidFill>
+                  <a:srgbClr val="D4D4D4"/>
+                </a:solidFill>
+                <a:latin typeface="Consolas" panose="020B0609020204030204" pitchFamily="49" charset="0"/>
+              </a:rPr>
+              <a:t>: </a:t>
+            </a:r>
+            <a:r>
+              <a:rPr lang="en-GB" sz="1800" dirty="0" err="1" smtClean="0">
+                <a:solidFill>
+                  <a:srgbClr val="CE9178"/>
+                </a:solidFill>
+                <a:latin typeface="Consolas" panose="020B0609020204030204" pitchFamily="49" charset="0"/>
+              </a:rPr>
+              <a:t>ClusterIP</a:t>
+            </a:r>
+            <a:endParaRPr lang="en-GB" sz="1800" dirty="0">
+              <a:solidFill>
+                <a:srgbClr val="D4D4D4"/>
+              </a:solidFill>
+              <a:latin typeface="Consolas" panose="020B0609020204030204" pitchFamily="49" charset="0"/>
+            </a:endParaRPr>
+          </a:p>
+          <a:p>
+            <a:pPr>
+              <a:lnSpc>
+                <a:spcPct val="100000"/>
+              </a:lnSpc>
+            </a:pPr>
+            <a:r>
+              <a:rPr lang="en-GB" sz="1800" dirty="0">
+                <a:solidFill>
+                  <a:srgbClr val="D4D4D4"/>
+                </a:solidFill>
+                <a:latin typeface="Consolas" panose="020B0609020204030204" pitchFamily="49" charset="0"/>
+              </a:rPr>
+              <a:t>  </a:t>
+            </a:r>
+            <a:r>
+              <a:rPr lang="en-GB" sz="1800" dirty="0">
+                <a:solidFill>
+                  <a:srgbClr val="569CD6"/>
+                </a:solidFill>
+                <a:latin typeface="Consolas" panose="020B0609020204030204" pitchFamily="49" charset="0"/>
+              </a:rPr>
+              <a:t>ports</a:t>
+            </a:r>
+            <a:r>
+              <a:rPr lang="en-GB" sz="1800" dirty="0">
+                <a:solidFill>
+                  <a:srgbClr val="D4D4D4"/>
+                </a:solidFill>
+                <a:latin typeface="Consolas" panose="020B0609020204030204" pitchFamily="49" charset="0"/>
+              </a:rPr>
+              <a:t>:</a:t>
+            </a:r>
+          </a:p>
+          <a:p>
+            <a:pPr>
+              <a:lnSpc>
+                <a:spcPct val="100000"/>
+              </a:lnSpc>
+            </a:pPr>
+            <a:r>
+              <a:rPr lang="en-GB" sz="1800" dirty="0">
+                <a:solidFill>
+                  <a:srgbClr val="D4D4D4"/>
+                </a:solidFill>
+                <a:latin typeface="Consolas" panose="020B0609020204030204" pitchFamily="49" charset="0"/>
+              </a:rPr>
+              <a:t>  - </a:t>
+            </a:r>
+            <a:r>
+              <a:rPr lang="en-GB" sz="1800" dirty="0">
+                <a:solidFill>
+                  <a:srgbClr val="569CD6"/>
+                </a:solidFill>
+                <a:latin typeface="Consolas" panose="020B0609020204030204" pitchFamily="49" charset="0"/>
+              </a:rPr>
+              <a:t>port</a:t>
+            </a:r>
+            <a:r>
+              <a:rPr lang="en-GB" sz="1800" dirty="0">
+                <a:solidFill>
+                  <a:srgbClr val="D4D4D4"/>
+                </a:solidFill>
+                <a:latin typeface="Consolas" panose="020B0609020204030204" pitchFamily="49" charset="0"/>
+              </a:rPr>
+              <a:t>: </a:t>
+            </a:r>
+            <a:r>
+              <a:rPr lang="en-GB" sz="1800" dirty="0">
+                <a:solidFill>
+                  <a:srgbClr val="B5CEA8"/>
+                </a:solidFill>
+                <a:latin typeface="Consolas" panose="020B0609020204030204" pitchFamily="49" charset="0"/>
+              </a:rPr>
+              <a:t>80</a:t>
+            </a:r>
+            <a:endParaRPr lang="en-GB" sz="1800" dirty="0">
+              <a:solidFill>
+                <a:srgbClr val="D4D4D4"/>
+              </a:solidFill>
+              <a:latin typeface="Consolas" panose="020B0609020204030204" pitchFamily="49" charset="0"/>
+            </a:endParaRPr>
+          </a:p>
+          <a:p>
+            <a:pPr>
+              <a:lnSpc>
+                <a:spcPct val="100000"/>
+              </a:lnSpc>
+            </a:pPr>
+            <a:r>
+              <a:rPr lang="en-GB" sz="1800" dirty="0">
+                <a:solidFill>
+                  <a:srgbClr val="D4D4D4"/>
+                </a:solidFill>
+                <a:latin typeface="Consolas" panose="020B0609020204030204" pitchFamily="49" charset="0"/>
+              </a:rPr>
+              <a:t>    </a:t>
+            </a:r>
+            <a:r>
+              <a:rPr lang="en-GB" sz="1800" dirty="0" err="1">
+                <a:solidFill>
+                  <a:srgbClr val="569CD6"/>
+                </a:solidFill>
+                <a:latin typeface="Consolas" panose="020B0609020204030204" pitchFamily="49" charset="0"/>
+              </a:rPr>
+              <a:t>targetPort</a:t>
+            </a:r>
+            <a:r>
+              <a:rPr lang="en-GB" sz="1800" dirty="0">
+                <a:solidFill>
+                  <a:srgbClr val="D4D4D4"/>
+                </a:solidFill>
+                <a:latin typeface="Consolas" panose="020B0609020204030204" pitchFamily="49" charset="0"/>
+              </a:rPr>
+              <a:t>: </a:t>
+            </a:r>
+            <a:r>
+              <a:rPr lang="en-GB" sz="1800" dirty="0">
+                <a:solidFill>
+                  <a:srgbClr val="B5CEA8"/>
+                </a:solidFill>
+                <a:latin typeface="Consolas" panose="020B0609020204030204" pitchFamily="49" charset="0"/>
+              </a:rPr>
+              <a:t>80</a:t>
+            </a:r>
+            <a:endParaRPr lang="en-GB" sz="1800" dirty="0">
+              <a:solidFill>
+                <a:srgbClr val="D4D4D4"/>
+              </a:solidFill>
+              <a:latin typeface="Consolas" panose="020B0609020204030204" pitchFamily="49" charset="0"/>
+            </a:endParaRPr>
+          </a:p>
+          <a:p>
+            <a:pPr>
+              <a:lnSpc>
+                <a:spcPct val="100000"/>
+              </a:lnSpc>
+            </a:pPr>
+            <a:r>
+              <a:rPr lang="en-GB" sz="1800" dirty="0">
+                <a:solidFill>
+                  <a:srgbClr val="D4D4D4"/>
+                </a:solidFill>
+                <a:latin typeface="Consolas" panose="020B0609020204030204" pitchFamily="49" charset="0"/>
+              </a:rPr>
+              <a:t>  </a:t>
+            </a:r>
+            <a:r>
+              <a:rPr lang="en-GB" sz="1800" dirty="0">
+                <a:solidFill>
+                  <a:srgbClr val="569CD6"/>
+                </a:solidFill>
+                <a:latin typeface="Consolas" panose="020B0609020204030204" pitchFamily="49" charset="0"/>
+              </a:rPr>
+              <a:t>selector</a:t>
+            </a:r>
+            <a:r>
+              <a:rPr lang="en-GB" sz="1800" dirty="0">
+                <a:solidFill>
+                  <a:srgbClr val="D4D4D4"/>
+                </a:solidFill>
+                <a:latin typeface="Consolas" panose="020B0609020204030204" pitchFamily="49" charset="0"/>
+              </a:rPr>
+              <a:t>:</a:t>
+            </a:r>
+          </a:p>
+          <a:p>
+            <a:pPr>
+              <a:lnSpc>
+                <a:spcPct val="100000"/>
+              </a:lnSpc>
+            </a:pPr>
+            <a:r>
+              <a:rPr lang="en-GB" sz="1800" dirty="0">
+                <a:solidFill>
+                  <a:srgbClr val="D4D4D4"/>
+                </a:solidFill>
+                <a:latin typeface="Consolas" panose="020B0609020204030204" pitchFamily="49" charset="0"/>
+              </a:rPr>
+              <a:t>    </a:t>
+            </a:r>
+            <a:r>
+              <a:rPr lang="en-GB" sz="1800" dirty="0">
+                <a:solidFill>
+                  <a:srgbClr val="569CD6"/>
+                </a:solidFill>
+                <a:latin typeface="Consolas" panose="020B0609020204030204" pitchFamily="49" charset="0"/>
+              </a:rPr>
+              <a:t>app</a:t>
+            </a:r>
+            <a:r>
+              <a:rPr lang="en-GB" sz="1800" dirty="0">
+                <a:solidFill>
+                  <a:srgbClr val="D4D4D4"/>
+                </a:solidFill>
+                <a:latin typeface="Consolas" panose="020B0609020204030204" pitchFamily="49" charset="0"/>
+              </a:rPr>
+              <a:t>: </a:t>
+            </a:r>
+            <a:r>
+              <a:rPr lang="en-GB" sz="1800" dirty="0" err="1">
+                <a:solidFill>
+                  <a:srgbClr val="CE9178"/>
+                </a:solidFill>
+                <a:latin typeface="Consolas" panose="020B0609020204030204" pitchFamily="49" charset="0"/>
+              </a:rPr>
+              <a:t>myapp</a:t>
+            </a:r>
+            <a:endParaRPr lang="en-GB" sz="1800" dirty="0">
+              <a:solidFill>
+                <a:srgbClr val="D4D4D4"/>
+              </a:solidFill>
+              <a:latin typeface="Consolas" panose="020B0609020204030204" pitchFamily="49" charset="0"/>
+            </a:endParaRPr>
+          </a:p>
+          <a:p>
+            <a:r>
+              <a:rPr lang="en-GB" sz="1800" dirty="0">
+                <a:solidFill>
+                  <a:srgbClr val="D4D4D4"/>
+                </a:solidFill>
+                <a:latin typeface="Consolas" panose="020B0609020204030204" pitchFamily="49" charset="0"/>
+              </a:rPr>
+              <a:t>    </a:t>
+            </a:r>
+            <a:r>
+              <a:rPr lang="en-GB" sz="1800" dirty="0">
+                <a:solidFill>
+                  <a:srgbClr val="569CD6"/>
+                </a:solidFill>
+                <a:latin typeface="Consolas" panose="020B0609020204030204" pitchFamily="49" charset="0"/>
+              </a:rPr>
+              <a:t>type</a:t>
+            </a:r>
+            <a:r>
+              <a:rPr lang="en-GB" sz="1800" dirty="0">
+                <a:solidFill>
+                  <a:srgbClr val="D4D4D4"/>
+                </a:solidFill>
+                <a:latin typeface="Consolas" panose="020B0609020204030204" pitchFamily="49" charset="0"/>
+              </a:rPr>
+              <a:t>: </a:t>
+            </a:r>
+            <a:r>
+              <a:rPr lang="en-GB" sz="1800" dirty="0" smtClean="0">
+                <a:solidFill>
+                  <a:srgbClr val="CE9178"/>
+                </a:solidFill>
+                <a:latin typeface="Consolas" panose="020B0609020204030204" pitchFamily="49" charset="0"/>
+              </a:rPr>
+              <a:t>back-end</a:t>
+            </a:r>
+            <a:endParaRPr lang="en-GB" sz="1800" dirty="0">
+              <a:solidFill>
+                <a:srgbClr val="D4D4D4"/>
+              </a:solidFill>
+              <a:latin typeface="Consolas" panose="020B0609020204030204" pitchFamily="49" charset="0"/>
+            </a:endParaRPr>
+          </a:p>
+        </p:txBody>
+      </p:sp>
+      <p:sp>
+        <p:nvSpPr>
+          <p:cNvPr id="12" name="Rectangle 11"/>
+          <p:cNvSpPr/>
+          <p:nvPr/>
+        </p:nvSpPr>
+        <p:spPr>
+          <a:xfrm>
+            <a:off x="7193279" y="2473234"/>
+            <a:ext cx="3000583" cy="609600"/>
+          </a:xfrm>
+          <a:prstGeom prst="rect">
+            <a:avLst/>
+          </a:prstGeom>
+          <a:noFill/>
+          <a:ln w="19050">
+            <a:solidFill>
+              <a:schemeClr val="accent2"/>
+            </a:solidFill>
+            <a:prstDash val="sysDash"/>
+          </a:ln>
+        </p:spPr>
+        <p:style>
+          <a:lnRef idx="2">
+            <a:schemeClr val="accent1">
+              <a:shade val="50000"/>
+            </a:schemeClr>
+          </a:lnRef>
+          <a:fillRef idx="1">
+            <a:schemeClr val="accent1"/>
+          </a:fillRef>
+          <a:effectRef idx="0">
+            <a:schemeClr val="accent1"/>
+          </a:effectRef>
+          <a:fontRef idx="minor">
+            <a:schemeClr val="lt1"/>
+          </a:fontRef>
+        </p:style>
+        <p:txBody>
+          <a:bodyPr rtlCol="0" anchor="ctr"/>
+          <a:lstStyle/>
+          <a:p>
+            <a:pPr algn="ctr"/>
+            <a:endParaRPr lang="en-GB"/>
+          </a:p>
+        </p:txBody>
+      </p:sp>
+      <p:sp>
+        <p:nvSpPr>
+          <p:cNvPr id="13" name="Rectangle 12"/>
+          <p:cNvSpPr/>
+          <p:nvPr/>
+        </p:nvSpPr>
+        <p:spPr>
+          <a:xfrm>
+            <a:off x="1027610" y="3688081"/>
+            <a:ext cx="3234242" cy="583473"/>
+          </a:xfrm>
+          <a:prstGeom prst="rect">
+            <a:avLst/>
+          </a:prstGeom>
+          <a:noFill/>
+          <a:ln w="19050">
+            <a:solidFill>
+              <a:schemeClr val="accent2"/>
+            </a:solidFill>
+            <a:prstDash val="sysDash"/>
+          </a:ln>
+        </p:spPr>
+        <p:style>
+          <a:lnRef idx="2">
+            <a:schemeClr val="accent1">
+              <a:shade val="50000"/>
+            </a:schemeClr>
+          </a:lnRef>
+          <a:fillRef idx="1">
+            <a:schemeClr val="accent1"/>
+          </a:fillRef>
+          <a:effectRef idx="0">
+            <a:schemeClr val="accent1"/>
+          </a:effectRef>
+          <a:fontRef idx="minor">
+            <a:schemeClr val="lt1"/>
+          </a:fontRef>
+        </p:style>
+        <p:txBody>
+          <a:bodyPr rtlCol="0" anchor="ctr"/>
+          <a:lstStyle/>
+          <a:p>
+            <a:pPr algn="ctr"/>
+            <a:endParaRPr lang="en-GB"/>
+          </a:p>
+        </p:txBody>
+      </p:sp>
+      <p:sp>
+        <p:nvSpPr>
+          <p:cNvPr id="6" name="Snip Single Corner Rectangle 5"/>
+          <p:cNvSpPr/>
+          <p:nvPr/>
+        </p:nvSpPr>
+        <p:spPr>
+          <a:xfrm>
+            <a:off x="544105" y="400050"/>
+            <a:ext cx="2038350" cy="348255"/>
+          </a:xfrm>
+          <a:prstGeom prst="snip1Rect">
+            <a:avLst/>
+          </a:prstGeom>
+        </p:spPr>
+        <p:style>
+          <a:lnRef idx="2">
+            <a:schemeClr val="dk1">
+              <a:shade val="50000"/>
+            </a:schemeClr>
+          </a:lnRef>
+          <a:fillRef idx="1">
+            <a:schemeClr val="dk1"/>
+          </a:fillRef>
+          <a:effectRef idx="0">
+            <a:schemeClr val="dk1"/>
+          </a:effectRef>
+          <a:fontRef idx="minor">
+            <a:schemeClr val="lt1"/>
+          </a:fontRef>
+        </p:style>
+        <p:txBody>
+          <a:bodyPr rtlCol="0" anchor="ctr"/>
+          <a:lstStyle/>
+          <a:p>
+            <a:pPr algn="ctr"/>
+            <a:r>
+              <a:rPr lang="en-US" dirty="0" err="1" smtClean="0"/>
+              <a:t>service.yml</a:t>
+            </a:r>
+            <a:endParaRPr lang="en-GB" dirty="0"/>
+          </a:p>
+        </p:txBody>
+      </p:sp>
+      <p:sp>
+        <p:nvSpPr>
+          <p:cNvPr id="14" name="Snip Single Corner Rectangle 13"/>
+          <p:cNvSpPr/>
+          <p:nvPr/>
+        </p:nvSpPr>
+        <p:spPr>
+          <a:xfrm>
+            <a:off x="6592480" y="419100"/>
+            <a:ext cx="2038350" cy="348255"/>
+          </a:xfrm>
+          <a:prstGeom prst="snip1Rect">
+            <a:avLst/>
+          </a:prstGeom>
+        </p:spPr>
+        <p:style>
+          <a:lnRef idx="2">
+            <a:schemeClr val="dk1">
+              <a:shade val="50000"/>
+            </a:schemeClr>
+          </a:lnRef>
+          <a:fillRef idx="1">
+            <a:schemeClr val="dk1"/>
+          </a:fillRef>
+          <a:effectRef idx="0">
+            <a:schemeClr val="dk1"/>
+          </a:effectRef>
+          <a:fontRef idx="minor">
+            <a:schemeClr val="lt1"/>
+          </a:fontRef>
+        </p:style>
+        <p:txBody>
+          <a:bodyPr rtlCol="0" anchor="ctr"/>
+          <a:lstStyle/>
+          <a:p>
+            <a:pPr algn="ctr"/>
+            <a:r>
+              <a:rPr lang="en-US" dirty="0" err="1" smtClean="0"/>
+              <a:t>pod.yml</a:t>
+            </a:r>
+            <a:endParaRPr lang="en-GB" dirty="0"/>
+          </a:p>
+        </p:txBody>
+      </p:sp>
+      <p:cxnSp>
+        <p:nvCxnSpPr>
+          <p:cNvPr id="3" name="Elbow Connector 2"/>
+          <p:cNvCxnSpPr>
+            <a:stCxn id="12" idx="1"/>
+          </p:cNvCxnSpPr>
+          <p:nvPr/>
+        </p:nvCxnSpPr>
+        <p:spPr>
+          <a:xfrm rot="10800000" flipV="1">
+            <a:off x="4261853" y="2778033"/>
+            <a:ext cx="2931427" cy="1201783"/>
+          </a:xfrm>
+          <a:prstGeom prst="bentConnector3">
+            <a:avLst>
+              <a:gd name="adj1" fmla="val 38414"/>
+            </a:avLst>
+          </a:prstGeom>
+          <a:ln w="38100">
+            <a:tailEnd type="triangle"/>
+          </a:ln>
+        </p:spPr>
+        <p:style>
+          <a:lnRef idx="1">
+            <a:schemeClr val="accent2"/>
+          </a:lnRef>
+          <a:fillRef idx="0">
+            <a:schemeClr val="accent2"/>
+          </a:fillRef>
+          <a:effectRef idx="0">
+            <a:schemeClr val="accent2"/>
+          </a:effectRef>
+          <a:fontRef idx="minor">
+            <a:schemeClr val="tx1"/>
+          </a:fontRef>
+        </p:style>
+      </p:cxnSp>
     </p:spTree>
     <p:extLst>
       <p:ext uri="{BB962C8B-B14F-4D97-AF65-F5344CB8AC3E}">
-        <p14:creationId xmlns:p14="http://schemas.microsoft.com/office/powerpoint/2010/main" val="2055157450"/>
+        <p14:creationId xmlns:p14="http://schemas.microsoft.com/office/powerpoint/2010/main" val="1205814113"/>
       </p:ext>
     </p:extLst>
   </p:cSld>
@@ -16460,624 +17727,35 @@
       </p:grpSpPr>
       <p:sp>
         <p:nvSpPr>
-          <p:cNvPr id="9" name="Title 1"/>
-          <p:cNvSpPr txBox="1">
-            <a:spLocks/>
-          </p:cNvSpPr>
-          <p:nvPr/>
-        </p:nvSpPr>
-        <p:spPr>
-          <a:xfrm>
-            <a:off x="6592481" y="748306"/>
-            <a:ext cx="4162606" cy="3448556"/>
-          </a:xfrm>
-          <a:prstGeom prst="rect">
-            <a:avLst/>
-          </a:prstGeom>
-          <a:solidFill>
-            <a:schemeClr val="tx1"/>
-          </a:solidFill>
-        </p:spPr>
-        <p:txBody>
-          <a:bodyPr vert="horz" lIns="180000" tIns="180000" rIns="91440" bIns="45720" rtlCol="0" anchor="t">
-            <a:noAutofit/>
-          </a:bodyPr>
-          <a:lstStyle>
-            <a:lvl1pPr algn="l" defTabSz="914400" rtl="0" eaLnBrk="1" latinLnBrk="0" hangingPunct="1">
-              <a:lnSpc>
-                <a:spcPct val="90000"/>
-              </a:lnSpc>
-              <a:spcBef>
-                <a:spcPct val="0"/>
-              </a:spcBef>
-              <a:buNone/>
-              <a:defRPr sz="4400" kern="1200">
-                <a:solidFill>
-                  <a:schemeClr val="tx1"/>
-                </a:solidFill>
-                <a:latin typeface="+mj-lt"/>
-                <a:ea typeface="+mj-ea"/>
-                <a:cs typeface="+mj-cs"/>
-              </a:defRPr>
-            </a:lvl1pPr>
-          </a:lstStyle>
-          <a:p>
-            <a:pPr>
-              <a:lnSpc>
-                <a:spcPct val="100000"/>
-              </a:lnSpc>
-            </a:pPr>
-            <a:r>
-              <a:rPr lang="en-GB" sz="2000" dirty="0" err="1">
-                <a:solidFill>
-                  <a:srgbClr val="569CD6"/>
-                </a:solidFill>
-                <a:latin typeface="Consolas" panose="020B0609020204030204" pitchFamily="49" charset="0"/>
-              </a:rPr>
-              <a:t>apiVersion</a:t>
-            </a:r>
-            <a:r>
-              <a:rPr lang="en-GB" sz="2000" dirty="0">
-                <a:solidFill>
-                  <a:srgbClr val="D4D4D4"/>
-                </a:solidFill>
-                <a:latin typeface="Consolas" panose="020B0609020204030204" pitchFamily="49" charset="0"/>
-              </a:rPr>
-              <a:t>: </a:t>
-            </a:r>
-            <a:r>
-              <a:rPr lang="en-GB" sz="2000" dirty="0">
-                <a:solidFill>
-                  <a:srgbClr val="CE9178"/>
-                </a:solidFill>
-                <a:latin typeface="Consolas" panose="020B0609020204030204" pitchFamily="49" charset="0"/>
-              </a:rPr>
-              <a:t>v1</a:t>
-            </a:r>
-            <a:endParaRPr lang="en-GB" sz="2000" dirty="0">
-              <a:solidFill>
-                <a:srgbClr val="D4D4D4"/>
-              </a:solidFill>
-              <a:latin typeface="Consolas" panose="020B0609020204030204" pitchFamily="49" charset="0"/>
-            </a:endParaRPr>
-          </a:p>
-          <a:p>
-            <a:pPr>
-              <a:lnSpc>
-                <a:spcPct val="100000"/>
-              </a:lnSpc>
-            </a:pPr>
-            <a:r>
-              <a:rPr lang="en-GB" sz="2000" dirty="0">
-                <a:solidFill>
-                  <a:srgbClr val="569CD6"/>
-                </a:solidFill>
-                <a:latin typeface="Consolas" panose="020B0609020204030204" pitchFamily="49" charset="0"/>
-              </a:rPr>
-              <a:t>kind</a:t>
-            </a:r>
-            <a:r>
-              <a:rPr lang="en-GB" sz="2000" dirty="0">
-                <a:solidFill>
-                  <a:srgbClr val="D4D4D4"/>
-                </a:solidFill>
-                <a:latin typeface="Consolas" panose="020B0609020204030204" pitchFamily="49" charset="0"/>
-              </a:rPr>
-              <a:t>: </a:t>
-            </a:r>
-            <a:r>
-              <a:rPr lang="en-GB" sz="2000" dirty="0">
-                <a:solidFill>
-                  <a:srgbClr val="CE9178"/>
-                </a:solidFill>
-                <a:latin typeface="Consolas" panose="020B0609020204030204" pitchFamily="49" charset="0"/>
-              </a:rPr>
-              <a:t>Pod</a:t>
-            </a:r>
-            <a:endParaRPr lang="en-GB" sz="2000" dirty="0">
-              <a:solidFill>
-                <a:srgbClr val="D4D4D4"/>
-              </a:solidFill>
-              <a:latin typeface="Consolas" panose="020B0609020204030204" pitchFamily="49" charset="0"/>
-            </a:endParaRPr>
-          </a:p>
-          <a:p>
-            <a:pPr>
-              <a:lnSpc>
-                <a:spcPct val="100000"/>
-              </a:lnSpc>
-            </a:pPr>
-            <a:r>
-              <a:rPr lang="en-GB" sz="2000" dirty="0">
-                <a:solidFill>
-                  <a:srgbClr val="569CD6"/>
-                </a:solidFill>
-                <a:latin typeface="Consolas" panose="020B0609020204030204" pitchFamily="49" charset="0"/>
-              </a:rPr>
-              <a:t>metadata</a:t>
-            </a:r>
-            <a:r>
-              <a:rPr lang="en-GB" sz="2000" dirty="0">
-                <a:solidFill>
-                  <a:srgbClr val="D4D4D4"/>
-                </a:solidFill>
-                <a:latin typeface="Consolas" panose="020B0609020204030204" pitchFamily="49" charset="0"/>
-              </a:rPr>
-              <a:t>:</a:t>
-            </a:r>
-          </a:p>
-          <a:p>
-            <a:pPr>
-              <a:lnSpc>
-                <a:spcPct val="100000"/>
-              </a:lnSpc>
-            </a:pPr>
-            <a:r>
-              <a:rPr lang="en-GB" sz="2000" dirty="0">
-                <a:solidFill>
-                  <a:srgbClr val="D4D4D4"/>
-                </a:solidFill>
-                <a:latin typeface="Consolas" panose="020B0609020204030204" pitchFamily="49" charset="0"/>
-              </a:rPr>
-              <a:t>  </a:t>
-            </a:r>
-            <a:r>
-              <a:rPr lang="en-GB" sz="2000" dirty="0">
-                <a:solidFill>
-                  <a:srgbClr val="569CD6"/>
-                </a:solidFill>
-                <a:latin typeface="Consolas" panose="020B0609020204030204" pitchFamily="49" charset="0"/>
-              </a:rPr>
-              <a:t>name</a:t>
-            </a:r>
-            <a:r>
-              <a:rPr lang="en-GB" sz="2000" dirty="0">
-                <a:solidFill>
-                  <a:srgbClr val="D4D4D4"/>
-                </a:solidFill>
-                <a:latin typeface="Consolas" panose="020B0609020204030204" pitchFamily="49" charset="0"/>
-              </a:rPr>
-              <a:t>: </a:t>
-            </a:r>
-            <a:r>
-              <a:rPr lang="en-GB" sz="2000" dirty="0" err="1">
-                <a:solidFill>
-                  <a:srgbClr val="CE9178"/>
-                </a:solidFill>
-                <a:latin typeface="Consolas" panose="020B0609020204030204" pitchFamily="49" charset="0"/>
-              </a:rPr>
-              <a:t>ubuntu</a:t>
-            </a:r>
-            <a:r>
-              <a:rPr lang="en-GB" sz="2000" dirty="0">
-                <a:solidFill>
-                  <a:srgbClr val="CE9178"/>
-                </a:solidFill>
-                <a:latin typeface="Consolas" panose="020B0609020204030204" pitchFamily="49" charset="0"/>
-              </a:rPr>
-              <a:t>-sleeper-pod</a:t>
-            </a:r>
-            <a:endParaRPr lang="en-GB" sz="2000" dirty="0">
-              <a:solidFill>
-                <a:srgbClr val="D4D4D4"/>
-              </a:solidFill>
-              <a:latin typeface="Consolas" panose="020B0609020204030204" pitchFamily="49" charset="0"/>
-            </a:endParaRPr>
-          </a:p>
-          <a:p>
-            <a:pPr>
-              <a:lnSpc>
-                <a:spcPct val="100000"/>
-              </a:lnSpc>
-            </a:pPr>
-            <a:r>
-              <a:rPr lang="en-GB" sz="2000" dirty="0">
-                <a:solidFill>
-                  <a:srgbClr val="569CD6"/>
-                </a:solidFill>
-                <a:latin typeface="Consolas" panose="020B0609020204030204" pitchFamily="49" charset="0"/>
-              </a:rPr>
-              <a:t>spec</a:t>
-            </a:r>
-            <a:r>
-              <a:rPr lang="en-GB" sz="2000" dirty="0">
-                <a:solidFill>
-                  <a:srgbClr val="D4D4D4"/>
-                </a:solidFill>
-                <a:latin typeface="Consolas" panose="020B0609020204030204" pitchFamily="49" charset="0"/>
-              </a:rPr>
-              <a:t>:</a:t>
-            </a:r>
-          </a:p>
-          <a:p>
-            <a:pPr>
-              <a:lnSpc>
-                <a:spcPct val="100000"/>
-              </a:lnSpc>
-            </a:pPr>
-            <a:r>
-              <a:rPr lang="en-GB" sz="2000" dirty="0">
-                <a:solidFill>
-                  <a:srgbClr val="D4D4D4"/>
-                </a:solidFill>
-                <a:latin typeface="Consolas" panose="020B0609020204030204" pitchFamily="49" charset="0"/>
-              </a:rPr>
-              <a:t>  </a:t>
-            </a:r>
-            <a:r>
-              <a:rPr lang="en-GB" sz="2000" dirty="0">
-                <a:solidFill>
-                  <a:srgbClr val="569CD6"/>
-                </a:solidFill>
-                <a:latin typeface="Consolas" panose="020B0609020204030204" pitchFamily="49" charset="0"/>
-              </a:rPr>
-              <a:t>containers</a:t>
-            </a:r>
-            <a:r>
-              <a:rPr lang="en-GB" sz="2000" dirty="0">
-                <a:solidFill>
-                  <a:srgbClr val="D4D4D4"/>
-                </a:solidFill>
-                <a:latin typeface="Consolas" panose="020B0609020204030204" pitchFamily="49" charset="0"/>
-              </a:rPr>
-              <a:t>:</a:t>
-            </a:r>
-          </a:p>
-          <a:p>
-            <a:pPr>
-              <a:lnSpc>
-                <a:spcPct val="100000"/>
-              </a:lnSpc>
-            </a:pPr>
-            <a:r>
-              <a:rPr lang="en-GB" sz="2000" dirty="0">
-                <a:solidFill>
-                  <a:srgbClr val="D4D4D4"/>
-                </a:solidFill>
-                <a:latin typeface="Consolas" panose="020B0609020204030204" pitchFamily="49" charset="0"/>
-              </a:rPr>
-              <a:t>  - </a:t>
-            </a:r>
-            <a:r>
-              <a:rPr lang="en-GB" sz="2000" dirty="0">
-                <a:solidFill>
-                  <a:srgbClr val="569CD6"/>
-                </a:solidFill>
-                <a:latin typeface="Consolas" panose="020B0609020204030204" pitchFamily="49" charset="0"/>
-              </a:rPr>
-              <a:t>name</a:t>
-            </a:r>
-            <a:r>
-              <a:rPr lang="en-GB" sz="2000" dirty="0">
-                <a:solidFill>
-                  <a:srgbClr val="D4D4D4"/>
-                </a:solidFill>
-                <a:latin typeface="Consolas" panose="020B0609020204030204" pitchFamily="49" charset="0"/>
-              </a:rPr>
-              <a:t>: </a:t>
-            </a:r>
-            <a:r>
-              <a:rPr lang="en-GB" sz="2000" dirty="0" err="1" smtClean="0">
-                <a:solidFill>
-                  <a:srgbClr val="CE9178"/>
-                </a:solidFill>
-                <a:latin typeface="Consolas" panose="020B0609020204030204" pitchFamily="49" charset="0"/>
-              </a:rPr>
-              <a:t>ubuntu</a:t>
-            </a:r>
-            <a:r>
-              <a:rPr lang="en-GB" sz="2000" dirty="0" smtClean="0">
-                <a:solidFill>
-                  <a:srgbClr val="CE9178"/>
-                </a:solidFill>
-                <a:latin typeface="Consolas" panose="020B0609020204030204" pitchFamily="49" charset="0"/>
-              </a:rPr>
-              <a:t>-sleeper</a:t>
-            </a:r>
-            <a:endParaRPr lang="en-GB" sz="2000" dirty="0">
-              <a:solidFill>
-                <a:srgbClr val="D4D4D4"/>
-              </a:solidFill>
-              <a:latin typeface="Consolas" panose="020B0609020204030204" pitchFamily="49" charset="0"/>
-            </a:endParaRPr>
-          </a:p>
-          <a:p>
-            <a:pPr>
-              <a:lnSpc>
-                <a:spcPct val="100000"/>
-              </a:lnSpc>
-            </a:pPr>
-            <a:r>
-              <a:rPr lang="en-GB" sz="2000" dirty="0">
-                <a:solidFill>
-                  <a:srgbClr val="D4D4D4"/>
-                </a:solidFill>
-                <a:latin typeface="Consolas" panose="020B0609020204030204" pitchFamily="49" charset="0"/>
-              </a:rPr>
-              <a:t>    </a:t>
-            </a:r>
-            <a:r>
-              <a:rPr lang="en-GB" sz="2000" dirty="0">
-                <a:solidFill>
-                  <a:srgbClr val="569CD6"/>
-                </a:solidFill>
-                <a:latin typeface="Consolas" panose="020B0609020204030204" pitchFamily="49" charset="0"/>
-              </a:rPr>
-              <a:t>image</a:t>
-            </a:r>
-            <a:r>
-              <a:rPr lang="en-GB" sz="2000" dirty="0">
-                <a:solidFill>
-                  <a:srgbClr val="D4D4D4"/>
-                </a:solidFill>
-                <a:latin typeface="Consolas" panose="020B0609020204030204" pitchFamily="49" charset="0"/>
-              </a:rPr>
-              <a:t>: </a:t>
-            </a:r>
-            <a:r>
-              <a:rPr lang="en-GB" sz="2000" dirty="0" err="1">
-                <a:solidFill>
-                  <a:srgbClr val="CE9178"/>
-                </a:solidFill>
-                <a:latin typeface="Consolas" panose="020B0609020204030204" pitchFamily="49" charset="0"/>
-              </a:rPr>
-              <a:t>ubuntu</a:t>
-            </a:r>
-            <a:r>
-              <a:rPr lang="en-GB" sz="2000" dirty="0">
-                <a:solidFill>
-                  <a:srgbClr val="CE9178"/>
-                </a:solidFill>
-                <a:latin typeface="Consolas" panose="020B0609020204030204" pitchFamily="49" charset="0"/>
-              </a:rPr>
-              <a:t>-sleeper</a:t>
-            </a:r>
-            <a:endParaRPr lang="en-GB" sz="2000" dirty="0">
-              <a:solidFill>
-                <a:srgbClr val="D4D4D4"/>
-              </a:solidFill>
-              <a:latin typeface="Consolas" panose="020B0609020204030204" pitchFamily="49" charset="0"/>
-            </a:endParaRPr>
-          </a:p>
-          <a:p>
-            <a:pPr>
-              <a:lnSpc>
-                <a:spcPct val="100000"/>
-              </a:lnSpc>
-            </a:pPr>
-            <a:r>
-              <a:rPr lang="en-GB" sz="2000" dirty="0">
-                <a:solidFill>
-                  <a:srgbClr val="D4D4D4"/>
-                </a:solidFill>
-                <a:latin typeface="Consolas" panose="020B0609020204030204" pitchFamily="49" charset="0"/>
-              </a:rPr>
-              <a:t>    </a:t>
-            </a:r>
-            <a:r>
-              <a:rPr lang="en-GB" sz="2000" dirty="0">
-                <a:solidFill>
-                  <a:srgbClr val="569CD6"/>
-                </a:solidFill>
-                <a:latin typeface="Consolas" panose="020B0609020204030204" pitchFamily="49" charset="0"/>
-              </a:rPr>
-              <a:t>command</a:t>
-            </a:r>
-            <a:r>
-              <a:rPr lang="en-GB" sz="2000" dirty="0">
-                <a:solidFill>
-                  <a:srgbClr val="D4D4D4"/>
-                </a:solidFill>
-                <a:latin typeface="Consolas" panose="020B0609020204030204" pitchFamily="49" charset="0"/>
-              </a:rPr>
-              <a:t>: [</a:t>
-            </a:r>
-            <a:r>
-              <a:rPr lang="en-GB" sz="2000" dirty="0">
-                <a:solidFill>
-                  <a:srgbClr val="CE9178"/>
-                </a:solidFill>
-                <a:latin typeface="Consolas" panose="020B0609020204030204" pitchFamily="49" charset="0"/>
-              </a:rPr>
-              <a:t>sleep3.0</a:t>
-            </a:r>
-            <a:r>
-              <a:rPr lang="en-GB" sz="2000" dirty="0">
-                <a:solidFill>
-                  <a:srgbClr val="D4D4D4"/>
-                </a:solidFill>
-                <a:latin typeface="Consolas" panose="020B0609020204030204" pitchFamily="49" charset="0"/>
-              </a:rPr>
-              <a:t>]</a:t>
-            </a:r>
-          </a:p>
-          <a:p>
-            <a:pPr>
-              <a:lnSpc>
-                <a:spcPct val="100000"/>
-              </a:lnSpc>
-            </a:pPr>
-            <a:r>
-              <a:rPr lang="en-GB" sz="2000" dirty="0">
-                <a:solidFill>
-                  <a:srgbClr val="D4D4D4"/>
-                </a:solidFill>
-                <a:latin typeface="Consolas" panose="020B0609020204030204" pitchFamily="49" charset="0"/>
-              </a:rPr>
-              <a:t>    </a:t>
-            </a:r>
-            <a:r>
-              <a:rPr lang="en-GB" sz="2000" dirty="0" err="1">
-                <a:solidFill>
-                  <a:srgbClr val="569CD6"/>
-                </a:solidFill>
-                <a:latin typeface="Consolas" panose="020B0609020204030204" pitchFamily="49" charset="0"/>
-              </a:rPr>
-              <a:t>args</a:t>
-            </a:r>
-            <a:r>
-              <a:rPr lang="en-GB" sz="2000" dirty="0">
-                <a:solidFill>
-                  <a:srgbClr val="D4D4D4"/>
-                </a:solidFill>
-                <a:latin typeface="Consolas" panose="020B0609020204030204" pitchFamily="49" charset="0"/>
-              </a:rPr>
-              <a:t>: [</a:t>
-            </a:r>
-            <a:r>
-              <a:rPr lang="en-GB" sz="2000" dirty="0">
-                <a:solidFill>
-                  <a:srgbClr val="CE9178"/>
-                </a:solidFill>
-                <a:latin typeface="Consolas" panose="020B0609020204030204" pitchFamily="49" charset="0"/>
-              </a:rPr>
-              <a:t>"15"</a:t>
-            </a:r>
-            <a:r>
-              <a:rPr lang="en-GB" sz="2000" dirty="0">
-                <a:solidFill>
-                  <a:srgbClr val="D4D4D4"/>
-                </a:solidFill>
-                <a:latin typeface="Consolas" panose="020B0609020204030204" pitchFamily="49" charset="0"/>
-              </a:rPr>
-              <a:t>]</a:t>
-            </a:r>
-            <a:endParaRPr lang="en-GB" sz="2000" b="0" dirty="0">
-              <a:solidFill>
-                <a:srgbClr val="D4D4D4"/>
-              </a:solidFill>
-              <a:effectLst/>
-              <a:latin typeface="Consolas" panose="020B0609020204030204" pitchFamily="49" charset="0"/>
-            </a:endParaRPr>
-          </a:p>
-        </p:txBody>
-      </p:sp>
-      <p:sp>
-        <p:nvSpPr>
-          <p:cNvPr id="14" name="Snip Single Corner Rectangle 13"/>
-          <p:cNvSpPr/>
-          <p:nvPr/>
-        </p:nvSpPr>
-        <p:spPr>
-          <a:xfrm>
-            <a:off x="6598349" y="419100"/>
-            <a:ext cx="2038350" cy="348255"/>
-          </a:xfrm>
-          <a:prstGeom prst="snip1Rect">
-            <a:avLst/>
-          </a:prstGeom>
-        </p:spPr>
-        <p:style>
-          <a:lnRef idx="2">
-            <a:schemeClr val="dk1">
-              <a:shade val="50000"/>
-            </a:schemeClr>
-          </a:lnRef>
-          <a:fillRef idx="1">
-            <a:schemeClr val="dk1"/>
-          </a:fillRef>
-          <a:effectRef idx="0">
-            <a:schemeClr val="dk1"/>
-          </a:effectRef>
-          <a:fontRef idx="minor">
-            <a:schemeClr val="lt1"/>
-          </a:fontRef>
-        </p:style>
-        <p:txBody>
-          <a:bodyPr rtlCol="0" anchor="ctr"/>
-          <a:lstStyle/>
-          <a:p>
-            <a:pPr algn="ctr"/>
-            <a:r>
-              <a:rPr lang="en-US" dirty="0" err="1" smtClean="0"/>
-              <a:t>pod.yml</a:t>
-            </a:r>
-            <a:endParaRPr lang="en-GB" dirty="0"/>
-          </a:p>
-        </p:txBody>
-      </p:sp>
-      <p:sp>
-        <p:nvSpPr>
-          <p:cNvPr id="10" name="Content Placeholder 2"/>
+          <p:cNvPr id="2" name="Title 1"/>
           <p:cNvSpPr>
             <a:spLocks noGrp="1"/>
           </p:cNvSpPr>
           <p:nvPr>
-            <p:ph idx="1"/>
+            <p:ph type="title"/>
           </p:nvPr>
         </p:nvSpPr>
-        <p:spPr>
-          <a:xfrm>
-            <a:off x="838200" y="1825625"/>
-            <a:ext cx="2581275" cy="4351338"/>
-          </a:xfrm>
-        </p:spPr>
+        <p:spPr/>
         <p:txBody>
           <a:bodyPr/>
           <a:lstStyle/>
           <a:p>
-            <a:pPr marL="0" indent="0">
-              <a:buNone/>
-            </a:pPr>
+            <a:r>
+              <a:rPr lang="en-US" dirty="0"/>
+              <a:t>Section </a:t>
+            </a:r>
             <a:r>
               <a:rPr lang="en-US" dirty="0" smtClean="0"/>
-              <a:t>s</a:t>
+              <a:t>7</a:t>
             </a:r>
             <a:endParaRPr lang="en-GB" dirty="0"/>
-          </a:p>
-        </p:txBody>
-      </p:sp>
-      <p:sp>
-        <p:nvSpPr>
-          <p:cNvPr id="6" name="Rectangle 5"/>
-          <p:cNvSpPr/>
-          <p:nvPr/>
-        </p:nvSpPr>
-        <p:spPr>
-          <a:xfrm>
-            <a:off x="7110046" y="3387970"/>
-            <a:ext cx="3182816" cy="668216"/>
-          </a:xfrm>
-          <a:prstGeom prst="rect">
-            <a:avLst/>
-          </a:prstGeom>
-          <a:noFill/>
-          <a:ln w="19050">
-            <a:solidFill>
-              <a:schemeClr val="accent2"/>
-            </a:solidFill>
-            <a:prstDash val="sysDash"/>
-          </a:ln>
-        </p:spPr>
-        <p:style>
-          <a:lnRef idx="2">
-            <a:schemeClr val="accent1">
-              <a:shade val="50000"/>
-            </a:schemeClr>
-          </a:lnRef>
-          <a:fillRef idx="1">
-            <a:schemeClr val="accent1"/>
-          </a:fillRef>
-          <a:effectRef idx="0">
-            <a:schemeClr val="accent1"/>
-          </a:effectRef>
-          <a:fontRef idx="minor">
-            <a:schemeClr val="lt1"/>
-          </a:fontRef>
-        </p:style>
-        <p:txBody>
-          <a:bodyPr rtlCol="0" anchor="ctr"/>
-          <a:lstStyle/>
-          <a:p>
-            <a:pPr algn="ctr"/>
-            <a:endParaRPr lang="en-GB"/>
           </a:p>
         </p:txBody>
       </p:sp>
     </p:spTree>
     <p:extLst>
       <p:ext uri="{BB962C8B-B14F-4D97-AF65-F5344CB8AC3E}">
-        <p14:creationId xmlns:p14="http://schemas.microsoft.com/office/powerpoint/2010/main" val="3223514410"/>
+        <p14:creationId xmlns:p14="http://schemas.microsoft.com/office/powerpoint/2010/main" val="2055157450"/>
       </p:ext>
     </p:extLst>
   </p:cSld>
@@ -17122,6 +17800,659 @@
         <p:spPr>
           <a:xfrm>
             <a:off x="6592481" y="748306"/>
+            <a:ext cx="4162606" cy="3448556"/>
+          </a:xfrm>
+          <a:prstGeom prst="rect">
+            <a:avLst/>
+          </a:prstGeom>
+          <a:solidFill>
+            <a:schemeClr val="tx1"/>
+          </a:solidFill>
+        </p:spPr>
+        <p:txBody>
+          <a:bodyPr vert="horz" lIns="180000" tIns="180000" rIns="91440" bIns="45720" rtlCol="0" anchor="t">
+            <a:noAutofit/>
+          </a:bodyPr>
+          <a:lstStyle>
+            <a:lvl1pPr algn="l" defTabSz="914400" rtl="0" eaLnBrk="1" latinLnBrk="0" hangingPunct="1">
+              <a:lnSpc>
+                <a:spcPct val="90000"/>
+              </a:lnSpc>
+              <a:spcBef>
+                <a:spcPct val="0"/>
+              </a:spcBef>
+              <a:buNone/>
+              <a:defRPr sz="4400" kern="1200">
+                <a:solidFill>
+                  <a:schemeClr val="tx1"/>
+                </a:solidFill>
+                <a:latin typeface="+mj-lt"/>
+                <a:ea typeface="+mj-ea"/>
+                <a:cs typeface="+mj-cs"/>
+              </a:defRPr>
+            </a:lvl1pPr>
+          </a:lstStyle>
+          <a:p>
+            <a:pPr>
+              <a:lnSpc>
+                <a:spcPct val="100000"/>
+              </a:lnSpc>
+            </a:pPr>
+            <a:r>
+              <a:rPr lang="en-GB" sz="2000" dirty="0" err="1">
+                <a:solidFill>
+                  <a:srgbClr val="569CD6"/>
+                </a:solidFill>
+                <a:latin typeface="Consolas" panose="020B0609020204030204" pitchFamily="49" charset="0"/>
+              </a:rPr>
+              <a:t>apiVersion</a:t>
+            </a:r>
+            <a:r>
+              <a:rPr lang="en-GB" sz="2000" dirty="0">
+                <a:solidFill>
+                  <a:srgbClr val="D4D4D4"/>
+                </a:solidFill>
+                <a:latin typeface="Consolas" panose="020B0609020204030204" pitchFamily="49" charset="0"/>
+              </a:rPr>
+              <a:t>: </a:t>
+            </a:r>
+            <a:r>
+              <a:rPr lang="en-GB" sz="2000" dirty="0">
+                <a:solidFill>
+                  <a:srgbClr val="CE9178"/>
+                </a:solidFill>
+                <a:latin typeface="Consolas" panose="020B0609020204030204" pitchFamily="49" charset="0"/>
+              </a:rPr>
+              <a:t>v1</a:t>
+            </a:r>
+            <a:endParaRPr lang="en-GB" sz="2000" dirty="0">
+              <a:solidFill>
+                <a:srgbClr val="D4D4D4"/>
+              </a:solidFill>
+              <a:latin typeface="Consolas" panose="020B0609020204030204" pitchFamily="49" charset="0"/>
+            </a:endParaRPr>
+          </a:p>
+          <a:p>
+            <a:pPr>
+              <a:lnSpc>
+                <a:spcPct val="100000"/>
+              </a:lnSpc>
+            </a:pPr>
+            <a:r>
+              <a:rPr lang="en-GB" sz="2000" dirty="0">
+                <a:solidFill>
+                  <a:srgbClr val="569CD6"/>
+                </a:solidFill>
+                <a:latin typeface="Consolas" panose="020B0609020204030204" pitchFamily="49" charset="0"/>
+              </a:rPr>
+              <a:t>kind</a:t>
+            </a:r>
+            <a:r>
+              <a:rPr lang="en-GB" sz="2000" dirty="0">
+                <a:solidFill>
+                  <a:srgbClr val="D4D4D4"/>
+                </a:solidFill>
+                <a:latin typeface="Consolas" panose="020B0609020204030204" pitchFamily="49" charset="0"/>
+              </a:rPr>
+              <a:t>: </a:t>
+            </a:r>
+            <a:r>
+              <a:rPr lang="en-GB" sz="2000" dirty="0">
+                <a:solidFill>
+                  <a:srgbClr val="CE9178"/>
+                </a:solidFill>
+                <a:latin typeface="Consolas" panose="020B0609020204030204" pitchFamily="49" charset="0"/>
+              </a:rPr>
+              <a:t>Pod</a:t>
+            </a:r>
+            <a:endParaRPr lang="en-GB" sz="2000" dirty="0">
+              <a:solidFill>
+                <a:srgbClr val="D4D4D4"/>
+              </a:solidFill>
+              <a:latin typeface="Consolas" panose="020B0609020204030204" pitchFamily="49" charset="0"/>
+            </a:endParaRPr>
+          </a:p>
+          <a:p>
+            <a:pPr>
+              <a:lnSpc>
+                <a:spcPct val="100000"/>
+              </a:lnSpc>
+            </a:pPr>
+            <a:r>
+              <a:rPr lang="en-GB" sz="2000" dirty="0">
+                <a:solidFill>
+                  <a:srgbClr val="569CD6"/>
+                </a:solidFill>
+                <a:latin typeface="Consolas" panose="020B0609020204030204" pitchFamily="49" charset="0"/>
+              </a:rPr>
+              <a:t>metadata</a:t>
+            </a:r>
+            <a:r>
+              <a:rPr lang="en-GB" sz="2000" dirty="0">
+                <a:solidFill>
+                  <a:srgbClr val="D4D4D4"/>
+                </a:solidFill>
+                <a:latin typeface="Consolas" panose="020B0609020204030204" pitchFamily="49" charset="0"/>
+              </a:rPr>
+              <a:t>:</a:t>
+            </a:r>
+          </a:p>
+          <a:p>
+            <a:pPr>
+              <a:lnSpc>
+                <a:spcPct val="100000"/>
+              </a:lnSpc>
+            </a:pPr>
+            <a:r>
+              <a:rPr lang="en-GB" sz="2000" dirty="0">
+                <a:solidFill>
+                  <a:srgbClr val="D4D4D4"/>
+                </a:solidFill>
+                <a:latin typeface="Consolas" panose="020B0609020204030204" pitchFamily="49" charset="0"/>
+              </a:rPr>
+              <a:t>  </a:t>
+            </a:r>
+            <a:r>
+              <a:rPr lang="en-GB" sz="2000" dirty="0">
+                <a:solidFill>
+                  <a:srgbClr val="569CD6"/>
+                </a:solidFill>
+                <a:latin typeface="Consolas" panose="020B0609020204030204" pitchFamily="49" charset="0"/>
+              </a:rPr>
+              <a:t>name</a:t>
+            </a:r>
+            <a:r>
+              <a:rPr lang="en-GB" sz="2000" dirty="0">
+                <a:solidFill>
+                  <a:srgbClr val="D4D4D4"/>
+                </a:solidFill>
+                <a:latin typeface="Consolas" panose="020B0609020204030204" pitchFamily="49" charset="0"/>
+              </a:rPr>
+              <a:t>: </a:t>
+            </a:r>
+            <a:r>
+              <a:rPr lang="en-GB" sz="2000" dirty="0" err="1">
+                <a:solidFill>
+                  <a:srgbClr val="CE9178"/>
+                </a:solidFill>
+                <a:latin typeface="Consolas" panose="020B0609020204030204" pitchFamily="49" charset="0"/>
+              </a:rPr>
+              <a:t>ubuntu</a:t>
+            </a:r>
+            <a:r>
+              <a:rPr lang="en-GB" sz="2000" dirty="0">
+                <a:solidFill>
+                  <a:srgbClr val="CE9178"/>
+                </a:solidFill>
+                <a:latin typeface="Consolas" panose="020B0609020204030204" pitchFamily="49" charset="0"/>
+              </a:rPr>
+              <a:t>-sleeper-pod</a:t>
+            </a:r>
+            <a:endParaRPr lang="en-GB" sz="2000" dirty="0">
+              <a:solidFill>
+                <a:srgbClr val="D4D4D4"/>
+              </a:solidFill>
+              <a:latin typeface="Consolas" panose="020B0609020204030204" pitchFamily="49" charset="0"/>
+            </a:endParaRPr>
+          </a:p>
+          <a:p>
+            <a:pPr>
+              <a:lnSpc>
+                <a:spcPct val="100000"/>
+              </a:lnSpc>
+            </a:pPr>
+            <a:r>
+              <a:rPr lang="en-GB" sz="2000" dirty="0">
+                <a:solidFill>
+                  <a:srgbClr val="569CD6"/>
+                </a:solidFill>
+                <a:latin typeface="Consolas" panose="020B0609020204030204" pitchFamily="49" charset="0"/>
+              </a:rPr>
+              <a:t>spec</a:t>
+            </a:r>
+            <a:r>
+              <a:rPr lang="en-GB" sz="2000" dirty="0">
+                <a:solidFill>
+                  <a:srgbClr val="D4D4D4"/>
+                </a:solidFill>
+                <a:latin typeface="Consolas" panose="020B0609020204030204" pitchFamily="49" charset="0"/>
+              </a:rPr>
+              <a:t>:</a:t>
+            </a:r>
+          </a:p>
+          <a:p>
+            <a:pPr>
+              <a:lnSpc>
+                <a:spcPct val="100000"/>
+              </a:lnSpc>
+            </a:pPr>
+            <a:r>
+              <a:rPr lang="en-GB" sz="2000" dirty="0">
+                <a:solidFill>
+                  <a:srgbClr val="D4D4D4"/>
+                </a:solidFill>
+                <a:latin typeface="Consolas" panose="020B0609020204030204" pitchFamily="49" charset="0"/>
+              </a:rPr>
+              <a:t>  </a:t>
+            </a:r>
+            <a:r>
+              <a:rPr lang="en-GB" sz="2000" dirty="0">
+                <a:solidFill>
+                  <a:srgbClr val="569CD6"/>
+                </a:solidFill>
+                <a:latin typeface="Consolas" panose="020B0609020204030204" pitchFamily="49" charset="0"/>
+              </a:rPr>
+              <a:t>containers</a:t>
+            </a:r>
+            <a:r>
+              <a:rPr lang="en-GB" sz="2000" dirty="0">
+                <a:solidFill>
+                  <a:srgbClr val="D4D4D4"/>
+                </a:solidFill>
+                <a:latin typeface="Consolas" panose="020B0609020204030204" pitchFamily="49" charset="0"/>
+              </a:rPr>
+              <a:t>:</a:t>
+            </a:r>
+          </a:p>
+          <a:p>
+            <a:pPr>
+              <a:lnSpc>
+                <a:spcPct val="100000"/>
+              </a:lnSpc>
+            </a:pPr>
+            <a:r>
+              <a:rPr lang="en-GB" sz="2000" dirty="0">
+                <a:solidFill>
+                  <a:srgbClr val="D4D4D4"/>
+                </a:solidFill>
+                <a:latin typeface="Consolas" panose="020B0609020204030204" pitchFamily="49" charset="0"/>
+              </a:rPr>
+              <a:t>  - </a:t>
+            </a:r>
+            <a:r>
+              <a:rPr lang="en-GB" sz="2000" dirty="0">
+                <a:solidFill>
+                  <a:srgbClr val="569CD6"/>
+                </a:solidFill>
+                <a:latin typeface="Consolas" panose="020B0609020204030204" pitchFamily="49" charset="0"/>
+              </a:rPr>
+              <a:t>name</a:t>
+            </a:r>
+            <a:r>
+              <a:rPr lang="en-GB" sz="2000" dirty="0">
+                <a:solidFill>
+                  <a:srgbClr val="D4D4D4"/>
+                </a:solidFill>
+                <a:latin typeface="Consolas" panose="020B0609020204030204" pitchFamily="49" charset="0"/>
+              </a:rPr>
+              <a:t>: </a:t>
+            </a:r>
+            <a:r>
+              <a:rPr lang="en-GB" sz="2000" dirty="0" err="1" smtClean="0">
+                <a:solidFill>
+                  <a:srgbClr val="CE9178"/>
+                </a:solidFill>
+                <a:latin typeface="Consolas" panose="020B0609020204030204" pitchFamily="49" charset="0"/>
+              </a:rPr>
+              <a:t>ubuntu</a:t>
+            </a:r>
+            <a:r>
+              <a:rPr lang="en-GB" sz="2000" dirty="0" smtClean="0">
+                <a:solidFill>
+                  <a:srgbClr val="CE9178"/>
+                </a:solidFill>
+                <a:latin typeface="Consolas" panose="020B0609020204030204" pitchFamily="49" charset="0"/>
+              </a:rPr>
+              <a:t>-sleeper</a:t>
+            </a:r>
+            <a:endParaRPr lang="en-GB" sz="2000" dirty="0">
+              <a:solidFill>
+                <a:srgbClr val="D4D4D4"/>
+              </a:solidFill>
+              <a:latin typeface="Consolas" panose="020B0609020204030204" pitchFamily="49" charset="0"/>
+            </a:endParaRPr>
+          </a:p>
+          <a:p>
+            <a:pPr>
+              <a:lnSpc>
+                <a:spcPct val="100000"/>
+              </a:lnSpc>
+            </a:pPr>
+            <a:r>
+              <a:rPr lang="en-GB" sz="2000" dirty="0">
+                <a:solidFill>
+                  <a:srgbClr val="D4D4D4"/>
+                </a:solidFill>
+                <a:latin typeface="Consolas" panose="020B0609020204030204" pitchFamily="49" charset="0"/>
+              </a:rPr>
+              <a:t>    </a:t>
+            </a:r>
+            <a:r>
+              <a:rPr lang="en-GB" sz="2000" dirty="0">
+                <a:solidFill>
+                  <a:srgbClr val="569CD6"/>
+                </a:solidFill>
+                <a:latin typeface="Consolas" panose="020B0609020204030204" pitchFamily="49" charset="0"/>
+              </a:rPr>
+              <a:t>image</a:t>
+            </a:r>
+            <a:r>
+              <a:rPr lang="en-GB" sz="2000" dirty="0">
+                <a:solidFill>
+                  <a:srgbClr val="D4D4D4"/>
+                </a:solidFill>
+                <a:latin typeface="Consolas" panose="020B0609020204030204" pitchFamily="49" charset="0"/>
+              </a:rPr>
+              <a:t>: </a:t>
+            </a:r>
+            <a:r>
+              <a:rPr lang="en-GB" sz="2000" dirty="0" err="1">
+                <a:solidFill>
+                  <a:srgbClr val="CE9178"/>
+                </a:solidFill>
+                <a:latin typeface="Consolas" panose="020B0609020204030204" pitchFamily="49" charset="0"/>
+              </a:rPr>
+              <a:t>ubuntu</a:t>
+            </a:r>
+            <a:r>
+              <a:rPr lang="en-GB" sz="2000" dirty="0">
+                <a:solidFill>
+                  <a:srgbClr val="CE9178"/>
+                </a:solidFill>
+                <a:latin typeface="Consolas" panose="020B0609020204030204" pitchFamily="49" charset="0"/>
+              </a:rPr>
+              <a:t>-sleeper</a:t>
+            </a:r>
+            <a:endParaRPr lang="en-GB" sz="2000" dirty="0">
+              <a:solidFill>
+                <a:srgbClr val="D4D4D4"/>
+              </a:solidFill>
+              <a:latin typeface="Consolas" panose="020B0609020204030204" pitchFamily="49" charset="0"/>
+            </a:endParaRPr>
+          </a:p>
+          <a:p>
+            <a:pPr>
+              <a:lnSpc>
+                <a:spcPct val="100000"/>
+              </a:lnSpc>
+            </a:pPr>
+            <a:r>
+              <a:rPr lang="en-GB" sz="2000" dirty="0">
+                <a:solidFill>
+                  <a:srgbClr val="D4D4D4"/>
+                </a:solidFill>
+                <a:latin typeface="Consolas" panose="020B0609020204030204" pitchFamily="49" charset="0"/>
+              </a:rPr>
+              <a:t>    </a:t>
+            </a:r>
+            <a:r>
+              <a:rPr lang="en-GB" sz="2000" dirty="0">
+                <a:solidFill>
+                  <a:srgbClr val="569CD6"/>
+                </a:solidFill>
+                <a:latin typeface="Consolas" panose="020B0609020204030204" pitchFamily="49" charset="0"/>
+              </a:rPr>
+              <a:t>command</a:t>
+            </a:r>
+            <a:r>
+              <a:rPr lang="en-GB" sz="2000" dirty="0">
+                <a:solidFill>
+                  <a:srgbClr val="D4D4D4"/>
+                </a:solidFill>
+                <a:latin typeface="Consolas" panose="020B0609020204030204" pitchFamily="49" charset="0"/>
+              </a:rPr>
+              <a:t>: [</a:t>
+            </a:r>
+            <a:r>
+              <a:rPr lang="en-GB" sz="2000" dirty="0">
+                <a:solidFill>
+                  <a:srgbClr val="CE9178"/>
+                </a:solidFill>
+                <a:latin typeface="Consolas" panose="020B0609020204030204" pitchFamily="49" charset="0"/>
+              </a:rPr>
+              <a:t>sleep3.0</a:t>
+            </a:r>
+            <a:r>
+              <a:rPr lang="en-GB" sz="2000" dirty="0">
+                <a:solidFill>
+                  <a:srgbClr val="D4D4D4"/>
+                </a:solidFill>
+                <a:latin typeface="Consolas" panose="020B0609020204030204" pitchFamily="49" charset="0"/>
+              </a:rPr>
+              <a:t>]</a:t>
+            </a:r>
+          </a:p>
+          <a:p>
+            <a:pPr>
+              <a:lnSpc>
+                <a:spcPct val="100000"/>
+              </a:lnSpc>
+            </a:pPr>
+            <a:r>
+              <a:rPr lang="en-GB" sz="2000" dirty="0">
+                <a:solidFill>
+                  <a:srgbClr val="D4D4D4"/>
+                </a:solidFill>
+                <a:latin typeface="Consolas" panose="020B0609020204030204" pitchFamily="49" charset="0"/>
+              </a:rPr>
+              <a:t>    </a:t>
+            </a:r>
+            <a:r>
+              <a:rPr lang="en-GB" sz="2000" dirty="0" err="1">
+                <a:solidFill>
+                  <a:srgbClr val="569CD6"/>
+                </a:solidFill>
+                <a:latin typeface="Consolas" panose="020B0609020204030204" pitchFamily="49" charset="0"/>
+              </a:rPr>
+              <a:t>args</a:t>
+            </a:r>
+            <a:r>
+              <a:rPr lang="en-GB" sz="2000" dirty="0">
+                <a:solidFill>
+                  <a:srgbClr val="D4D4D4"/>
+                </a:solidFill>
+                <a:latin typeface="Consolas" panose="020B0609020204030204" pitchFamily="49" charset="0"/>
+              </a:rPr>
+              <a:t>: [</a:t>
+            </a:r>
+            <a:r>
+              <a:rPr lang="en-GB" sz="2000" dirty="0">
+                <a:solidFill>
+                  <a:srgbClr val="CE9178"/>
+                </a:solidFill>
+                <a:latin typeface="Consolas" panose="020B0609020204030204" pitchFamily="49" charset="0"/>
+              </a:rPr>
+              <a:t>"15"</a:t>
+            </a:r>
+            <a:r>
+              <a:rPr lang="en-GB" sz="2000" dirty="0">
+                <a:solidFill>
+                  <a:srgbClr val="D4D4D4"/>
+                </a:solidFill>
+                <a:latin typeface="Consolas" panose="020B0609020204030204" pitchFamily="49" charset="0"/>
+              </a:rPr>
+              <a:t>]</a:t>
+            </a:r>
+            <a:endParaRPr lang="en-GB" sz="2000" b="0" dirty="0">
+              <a:solidFill>
+                <a:srgbClr val="D4D4D4"/>
+              </a:solidFill>
+              <a:effectLst/>
+              <a:latin typeface="Consolas" panose="020B0609020204030204" pitchFamily="49" charset="0"/>
+            </a:endParaRPr>
+          </a:p>
+        </p:txBody>
+      </p:sp>
+      <p:sp>
+        <p:nvSpPr>
+          <p:cNvPr id="14" name="Snip Single Corner Rectangle 13"/>
+          <p:cNvSpPr/>
+          <p:nvPr/>
+        </p:nvSpPr>
+        <p:spPr>
+          <a:xfrm>
+            <a:off x="6598349" y="419100"/>
+            <a:ext cx="2038350" cy="348255"/>
+          </a:xfrm>
+          <a:prstGeom prst="snip1Rect">
+            <a:avLst/>
+          </a:prstGeom>
+        </p:spPr>
+        <p:style>
+          <a:lnRef idx="2">
+            <a:schemeClr val="dk1">
+              <a:shade val="50000"/>
+            </a:schemeClr>
+          </a:lnRef>
+          <a:fillRef idx="1">
+            <a:schemeClr val="dk1"/>
+          </a:fillRef>
+          <a:effectRef idx="0">
+            <a:schemeClr val="dk1"/>
+          </a:effectRef>
+          <a:fontRef idx="minor">
+            <a:schemeClr val="lt1"/>
+          </a:fontRef>
+        </p:style>
+        <p:txBody>
+          <a:bodyPr rtlCol="0" anchor="ctr"/>
+          <a:lstStyle/>
+          <a:p>
+            <a:pPr algn="ctr"/>
+            <a:r>
+              <a:rPr lang="en-US" dirty="0" err="1" smtClean="0"/>
+              <a:t>pod.yml</a:t>
+            </a:r>
+            <a:endParaRPr lang="en-GB" dirty="0"/>
+          </a:p>
+        </p:txBody>
+      </p:sp>
+      <p:sp>
+        <p:nvSpPr>
+          <p:cNvPr id="10" name="Content Placeholder 2"/>
+          <p:cNvSpPr>
+            <a:spLocks noGrp="1"/>
+          </p:cNvSpPr>
+          <p:nvPr>
+            <p:ph idx="1"/>
+          </p:nvPr>
+        </p:nvSpPr>
+        <p:spPr>
+          <a:xfrm>
+            <a:off x="838200" y="1825625"/>
+            <a:ext cx="2581275" cy="4351338"/>
+          </a:xfrm>
+        </p:spPr>
+        <p:txBody>
+          <a:bodyPr/>
+          <a:lstStyle/>
+          <a:p>
+            <a:pPr marL="0" indent="0">
+              <a:buNone/>
+            </a:pPr>
+            <a:r>
+              <a:rPr lang="en-US" dirty="0" smtClean="0"/>
+              <a:t>s</a:t>
+            </a:r>
+            <a:endParaRPr lang="en-GB" dirty="0"/>
+          </a:p>
+        </p:txBody>
+      </p:sp>
+      <p:sp>
+        <p:nvSpPr>
+          <p:cNvPr id="6" name="Rectangle 5"/>
+          <p:cNvSpPr/>
+          <p:nvPr/>
+        </p:nvSpPr>
+        <p:spPr>
+          <a:xfrm>
+            <a:off x="7110046" y="3387970"/>
+            <a:ext cx="3182816" cy="668216"/>
+          </a:xfrm>
+          <a:prstGeom prst="rect">
+            <a:avLst/>
+          </a:prstGeom>
+          <a:noFill/>
+          <a:ln w="19050">
+            <a:solidFill>
+              <a:schemeClr val="accent2"/>
+            </a:solidFill>
+            <a:prstDash val="sysDash"/>
+          </a:ln>
+        </p:spPr>
+        <p:style>
+          <a:lnRef idx="2">
+            <a:schemeClr val="accent1">
+              <a:shade val="50000"/>
+            </a:schemeClr>
+          </a:lnRef>
+          <a:fillRef idx="1">
+            <a:schemeClr val="accent1"/>
+          </a:fillRef>
+          <a:effectRef idx="0">
+            <a:schemeClr val="accent1"/>
+          </a:effectRef>
+          <a:fontRef idx="minor">
+            <a:schemeClr val="lt1"/>
+          </a:fontRef>
+        </p:style>
+        <p:txBody>
+          <a:bodyPr rtlCol="0" anchor="ctr"/>
+          <a:lstStyle/>
+          <a:p>
+            <a:pPr algn="ctr"/>
+            <a:endParaRPr lang="en-GB"/>
+          </a:p>
+        </p:txBody>
+      </p:sp>
+    </p:spTree>
+    <p:extLst>
+      <p:ext uri="{BB962C8B-B14F-4D97-AF65-F5344CB8AC3E}">
+        <p14:creationId xmlns:p14="http://schemas.microsoft.com/office/powerpoint/2010/main" val="3223514410"/>
+      </p:ext>
+    </p:extLst>
+  </p:cSld>
+  <p:clrMapOvr>
+    <a:masterClrMapping/>
+  </p:clrMapOvr>
+  <p:timing>
+    <p:tnLst>
+      <p:par>
+        <p:cTn id="1" dur="indefinite" restart="never" nodeType="tmRoot"/>
+      </p:par>
+    </p:tnLst>
+  </p:timing>
+</p:sld>
+</file>
+
+<file path=ppt/slides/slide28.xml><?xml version="1.0" encoding="utf-8"?>
+<p:sld xmlns:a="http://schemas.openxmlformats.org/drawingml/2006/main" xmlns:r="http://schemas.openxmlformats.org/officeDocument/2006/relationships" xmlns:p="http://schemas.openxmlformats.org/presentationml/2006/main">
+  <p:cSld>
+    <p:spTree>
+      <p:nvGrpSpPr>
+        <p:cNvPr id="1" name=""/>
+        <p:cNvGrpSpPr/>
+        <p:nvPr/>
+      </p:nvGrpSpPr>
+      <p:grpSpPr>
+        <a:xfrm>
+          <a:off x="0" y="0"/>
+          <a:ext cx="0" cy="0"/>
+          <a:chOff x="0" y="0"/>
+          <a:chExt cx="0" cy="0"/>
+        </a:xfrm>
+      </p:grpSpPr>
+      <p:sp>
+        <p:nvSpPr>
+          <p:cNvPr id="9" name="Title 1"/>
+          <p:cNvSpPr txBox="1">
+            <a:spLocks/>
+          </p:cNvSpPr>
+          <p:nvPr/>
+        </p:nvSpPr>
+        <p:spPr>
+          <a:xfrm>
+            <a:off x="6592481" y="748306"/>
             <a:ext cx="4532720" cy="5576294"/>
           </a:xfrm>
           <a:prstGeom prst="rect">
@@ -17856,7 +19187,7 @@
 </p:sld>
 </file>
 
-<file path=ppt/slides/slide28.xml><?xml version="1.0" encoding="utf-8"?>
+<file path=ppt/slides/slide29.xml><?xml version="1.0" encoding="utf-8"?>
 <p:sld xmlns:a="http://schemas.openxmlformats.org/drawingml/2006/main" xmlns:r="http://schemas.openxmlformats.org/officeDocument/2006/relationships" xmlns:p="http://schemas.openxmlformats.org/presentationml/2006/main">
   <p:cSld>
     <p:spTree>

</xml_diff>